<commit_message>
New working function, edits made: Logos are placed in the correct position Size adjustments and small tweaks are still needed
</commit_message>
<xml_diff>
--- a/buyers_presentation.pptx
+++ b/buyers_presentation.pptx
@@ -13383,6 +13383,126 @@
           </a:graphicData>
         </a:graphic>
       </p:graphicFrame>
+      <p:pic>
+        <p:nvPicPr>
+          <p:cNvPr id="4" name="Picture 3" descr="afya.png"/>
+          <p:cNvPicPr>
+            <a:picLocks noChangeAspect="1"/>
+          </p:cNvPicPr>
+          <p:nvPr/>
+        </p:nvPicPr>
+        <p:blipFill>
+          <a:blip r:embed="rId2"/>
+          <a:stretch>
+            <a:fillRect/>
+          </a:stretch>
+        </p:blipFill>
+        <p:spPr>
+          <a:xfrm>
+            <a:off x="798213" y="1387592"/>
+            <a:ext cx="1448346" cy="533941"/>
+          </a:xfrm>
+          <a:prstGeom prst="rect">
+            <a:avLst/>
+          </a:prstGeom>
+        </p:spPr>
+      </p:pic>
+      <p:pic>
+        <p:nvPicPr>
+          <p:cNvPr id="5" name="Picture 4" descr="bionexo.png"/>
+          <p:cNvPicPr>
+            <a:picLocks noChangeAspect="1"/>
+          </p:cNvPicPr>
+          <p:nvPr/>
+        </p:nvPicPr>
+        <p:blipFill>
+          <a:blip r:embed="rId3"/>
+          <a:stretch>
+            <a:fillRect/>
+          </a:stretch>
+        </p:blipFill>
+        <p:spPr>
+          <a:xfrm>
+            <a:off x="798213" y="2148906"/>
+            <a:ext cx="1448346" cy="528831"/>
+          </a:xfrm>
+          <a:prstGeom prst="rect">
+            <a:avLst/>
+          </a:prstGeom>
+        </p:spPr>
+      </p:pic>
+      <p:pic>
+        <p:nvPicPr>
+          <p:cNvPr id="6" name="Picture 5" descr="merative.png"/>
+          <p:cNvPicPr>
+            <a:picLocks noChangeAspect="1"/>
+          </p:cNvPicPr>
+          <p:nvPr/>
+        </p:nvPicPr>
+        <p:blipFill>
+          <a:blip r:embed="rId4"/>
+          <a:stretch>
+            <a:fillRect/>
+          </a:stretch>
+        </p:blipFill>
+        <p:spPr>
+          <a:xfrm>
+            <a:off x="798213" y="2904379"/>
+            <a:ext cx="1448346" cy="528831"/>
+          </a:xfrm>
+          <a:prstGeom prst="rect">
+            <a:avLst/>
+          </a:prstGeom>
+        </p:spPr>
+      </p:pic>
+      <p:pic>
+        <p:nvPicPr>
+          <p:cNvPr id="7" name="Picture 6" descr="cerner.png"/>
+          <p:cNvPicPr>
+            <a:picLocks noChangeAspect="1"/>
+          </p:cNvPicPr>
+          <p:nvPr/>
+        </p:nvPicPr>
+        <p:blipFill>
+          <a:blip r:embed="rId5"/>
+          <a:stretch>
+            <a:fillRect/>
+          </a:stretch>
+        </p:blipFill>
+        <p:spPr>
+          <a:xfrm>
+            <a:off x="798213" y="3659852"/>
+            <a:ext cx="1448346" cy="528831"/>
+          </a:xfrm>
+          <a:prstGeom prst="rect">
+            <a:avLst/>
+          </a:prstGeom>
+        </p:spPr>
+      </p:pic>
+      <p:pic>
+        <p:nvPicPr>
+          <p:cNvPr id="8" name="Picture 7" descr="conexasaude.png"/>
+          <p:cNvPicPr>
+            <a:picLocks noChangeAspect="1"/>
+          </p:cNvPicPr>
+          <p:nvPr/>
+        </p:nvPicPr>
+        <p:blipFill>
+          <a:blip r:embed="rId6"/>
+          <a:stretch>
+            <a:fillRect/>
+          </a:stretch>
+        </p:blipFill>
+        <p:spPr>
+          <a:xfrm>
+            <a:off x="798213" y="4415325"/>
+            <a:ext cx="1448346" cy="528831"/>
+          </a:xfrm>
+          <a:prstGeom prst="rect">
+            <a:avLst/>
+          </a:prstGeom>
+        </p:spPr>
+      </p:pic>
     </p:spTree>
   </p:cSld>
   <p:clrMapOvr>
@@ -14568,7 +14688,7 @@
                           <a:ea typeface="+mn-ea"/>
                           <a:cs typeface="+mn-cs"/>
                         </a:rPr>
-                        <a:t>#</a:t>
+                        <a:t>8</a:t>
                       </a:r>
                       <a:endParaRPr lang="en-US" sz="600" b="1" i="0" u="none" kern="1200" noProof="0" dirty="0">
                         <a:solidFill>
@@ -14807,26 +14927,68 @@
                           <a:ea typeface="+mn-ea"/>
                           <a:cs typeface="+mn-cs"/>
                         </a:rPr>
-                        <a:t>(Ticker2)</a:t>
+                        <a:t>(Private)
+Brazil</a:t>
                       </a:r>
                     </a:p>
-                    <a:p>
-                      <a:pPr marL="0" marR="0" lvl="0" indent="0" algn="l" defTabSz="958850" rtl="0" eaLnBrk="1" fontAlgn="base" latinLnBrk="0" hangingPunct="1">
-                        <a:lnSpc>
-                          <a:spcPct val="100000"/>
-                        </a:lnSpc>
-                        <a:spcBef>
-                          <a:spcPct val="0"/>
-                        </a:spcBef>
-                        <a:spcAft>
-                          <a:spcPct val="0"/>
+                  </a:txBody>
+                  <a:tcPr marL="0" marR="84406" marT="0" marB="0" anchor="ctr" horzOverflow="overflow">
+                    <a:lnL cap="flat">
+                      <a:noFill/>
+                    </a:lnL>
+                    <a:lnR>
+                      <a:noFill/>
+                    </a:lnR>
+                    <a:lnT w="6350" cap="flat" cmpd="sng" algn="ctr">
+                      <a:solidFill>
+                        <a:srgbClr val="DBD5CD"/>
+                      </a:solidFill>
+                      <a:prstDash val="solid"/>
+                      <a:round/>
+                      <a:headEnd type="none" w="med" len="med"/>
+                      <a:tailEnd type="none" w="med" len="med"/>
+                    </a:lnT>
+                    <a:lnB w="6350" cap="flat" cmpd="sng" algn="ctr">
+                      <a:solidFill>
+                        <a:srgbClr val="DBD5CD"/>
+                      </a:solidFill>
+                      <a:prstDash val="solid"/>
+                      <a:round/>
+                      <a:headEnd type="none" w="med" len="med"/>
+                      <a:tailEnd type="none" w="med" len="med"/>
+                    </a:lnB>
+                    <a:lnTlToBr>
+                      <a:noFill/>
+                    </a:lnTlToBr>
+                    <a:lnBlToTr>
+                      <a:noFill/>
+                    </a:lnBlToTr>
+                    <a:solidFill>
+                      <a:srgbClr val="F0F5F7"/>
+                    </a:solidFill>
+                  </a:tcPr>
+                </a:tc>
+                <a:tc>
+                  <a:txBody>
+                    <a:bodyPr/>
+                    <a:lstStyle/>
+                    <a:p>
+                      <a:pPr marL="171450" marR="0" lvl="0" indent="-171450" algn="l" defTabSz="914395" rtl="0" eaLnBrk="1" fontAlgn="t" latinLnBrk="0" hangingPunct="1">
+                        <a:lnSpc>
+                          <a:spcPct val="100000"/>
+                        </a:lnSpc>
+                        <a:spcBef>
+                          <a:spcPts val="0"/>
+                        </a:spcBef>
+                        <a:spcAft>
+                          <a:spcPts val="0"/>
                         </a:spcAft>
                         <a:buClr>
-                          <a:srgbClr val="000080"/>
+                          <a:srgbClr val="003B4C"/>
                         </a:buClr>
                         <a:buSzTx/>
-                        <a:buFont typeface="Wingdings" pitchFamily="2" charset="2"/>
-                        <a:buNone/>
+                        <a:buFont typeface="Wingdings" panose="05000000000000000000" pitchFamily="2" charset="2"/>
+                        <a:buChar char="§"/>
                         <a:tabLst/>
                         <a:defRPr/>
                       </a:pPr>
@@ -14845,8 +15007,320 @@
                           <a:ea typeface="+mn-ea"/>
                           <a:cs typeface="+mn-cs"/>
                         </a:rPr>
-                        <a:t>Country2</a:t>
+                        <a:t>Manufacturer of pharmaceuticals medicines intended to supply innovative drugs to the market with proven quality. The company offers RX drugs, OTC 
+drugs, generics drugs and dermo cosmetics that can only be acquired through medical prescription only, enabling healthcare professionals to promote health and well-being by prescribing generic medicines.</a:t>
                       </a:r>
+                    </a:p>
+                  </a:txBody>
+                  <a:tcPr marL="168812" marR="0" marT="0" marB="0" anchor="ctr">
+                    <a:lnL>
+                      <a:noFill/>
+                    </a:lnL>
+                    <a:lnR>
+                      <a:noFill/>
+                    </a:lnR>
+                    <a:lnT w="6350" cap="flat" cmpd="sng" algn="ctr">
+                      <a:solidFill>
+                        <a:srgbClr val="DBD5CD"/>
+                      </a:solidFill>
+                      <a:prstDash val="solid"/>
+                      <a:round/>
+                      <a:headEnd type="none" w="med" len="med"/>
+                      <a:tailEnd type="none" w="med" len="med"/>
+                    </a:lnT>
+                    <a:lnB w="6350" cap="flat" cmpd="sng" algn="ctr">
+                      <a:solidFill>
+                        <a:srgbClr val="DBD5CD"/>
+                      </a:solidFill>
+                      <a:prstDash val="solid"/>
+                      <a:round/>
+                      <a:headEnd type="none" w="med" len="med"/>
+                      <a:tailEnd type="none" w="med" len="med"/>
+                    </a:lnB>
+                    <a:lnTlToBr>
+                      <a:noFill/>
+                    </a:lnTlToBr>
+                    <a:lnBlToTr>
+                      <a:noFill/>
+                    </a:lnBlToTr>
+                    <a:solidFill>
+                      <a:srgbClr val="F0F5F7"/>
+                    </a:solidFill>
+                  </a:tcPr>
+                </a:tc>
+                <a:tc>
+                  <a:txBody>
+                    <a:bodyPr/>
+                    <a:lstStyle/>
+                    <a:p>
+                      <a:pPr marL="0" marR="0" lvl="0" indent="0" algn="ctr" defTabSz="914395" rtl="0" eaLnBrk="1" fontAlgn="t" latinLnBrk="0" hangingPunct="1">
+                        <a:lnSpc>
+                          <a:spcPct val="100000"/>
+                        </a:lnSpc>
+                        <a:spcBef>
+                          <a:spcPts val="0"/>
+                        </a:spcBef>
+                        <a:spcAft>
+                          <a:spcPts val="0"/>
+                        </a:spcAft>
+                        <a:buClrTx/>
+                        <a:buSzTx/>
+                        <a:buFontTx/>
+                        <a:buNone/>
+                        <a:tabLst/>
+                        <a:defRPr/>
+                      </a:pPr>
+                      <a:r>
+                        <a:rPr kumimoji="0" lang="en-US" sz="2200" b="0" i="0" u="none" strike="noStrike" kern="1200" cap="none" spc="0" normalizeH="0" baseline="0" noProof="0" dirty="0">
+                          <a:ln>
+                            <a:noFill/>
+                          </a:ln>
+                          <a:solidFill>
+                            <a:srgbClr val="00A87E"/>
+                          </a:solidFill>
+                          <a:effectLst/>
+                          <a:uLnTx/>
+                          <a:uFillTx/>
+                          <a:latin typeface="+mn-lt"/>
+                          <a:ea typeface="+mn-ea"/>
+                          <a:cs typeface="+mn-cs"/>
+                          <a:sym typeface="Wingdings"/>
+                        </a:rPr>
+                        <a:t>✓</a:t>
+                      </a:r>
+                      <a:endParaRPr kumimoji="0" lang="en-US" sz="2200" b="0" i="0" u="none" strike="noStrike" kern="1200" cap="none" spc="0" normalizeH="0" baseline="0" noProof="0" dirty="0">
+                        <a:ln>
+                          <a:noFill/>
+                        </a:ln>
+                        <a:solidFill>
+                          <a:srgbClr val="FF0000"/>
+                        </a:solidFill>
+                        <a:effectLst/>
+                        <a:uLnTx/>
+                        <a:uFillTx/>
+                        <a:latin typeface="+mn-lt"/>
+                        <a:ea typeface="+mn-ea"/>
+                        <a:cs typeface="+mn-cs"/>
+                      </a:endParaRPr>
+                    </a:p>
+                  </a:txBody>
+                  <a:tcPr marL="0" marR="0" marT="0" marB="0" anchor="ctr">
+                    <a:lnL>
+                      <a:noFill/>
+                    </a:lnL>
+                    <a:lnR cap="flat">
+                      <a:noFill/>
+                    </a:lnR>
+                    <a:lnT w="6350" cap="flat" cmpd="sng" algn="ctr">
+                      <a:solidFill>
+                        <a:srgbClr val="DBD5CD"/>
+                      </a:solidFill>
+                      <a:prstDash val="solid"/>
+                      <a:round/>
+                      <a:headEnd type="none" w="med" len="med"/>
+                      <a:tailEnd type="none" w="med" len="med"/>
+                    </a:lnT>
+                    <a:lnB w="6350" cap="flat" cmpd="sng" algn="ctr">
+                      <a:solidFill>
+                        <a:srgbClr val="DBD5CD"/>
+                      </a:solidFill>
+                      <a:prstDash val="solid"/>
+                      <a:round/>
+                      <a:headEnd type="none" w="med" len="med"/>
+                      <a:tailEnd type="none" w="med" len="med"/>
+                    </a:lnB>
+                    <a:lnTlToBr>
+                      <a:noFill/>
+                    </a:lnTlToBr>
+                    <a:lnBlToTr>
+                      <a:noFill/>
+                    </a:lnBlToTr>
+                    <a:solidFill>
+                      <a:srgbClr val="F0F5F7"/>
+                    </a:solidFill>
+                  </a:tcPr>
+                </a:tc>
+                <a:tc>
+                  <a:txBody>
+                    <a:bodyPr/>
+                    <a:lstStyle/>
+                    <a:p>
+                      <a:pPr marL="0" marR="0" lvl="0" indent="0" algn="ctr" defTabSz="914395" rtl="0" eaLnBrk="1" fontAlgn="t" latinLnBrk="0" hangingPunct="1">
+                        <a:lnSpc>
+                          <a:spcPct val="100000"/>
+                        </a:lnSpc>
+                        <a:spcBef>
+                          <a:spcPts val="0"/>
+                        </a:spcBef>
+                        <a:spcAft>
+                          <a:spcPts val="0"/>
+                        </a:spcAft>
+                        <a:buClrTx/>
+                        <a:buSzTx/>
+                        <a:buFontTx/>
+                        <a:buNone/>
+                        <a:tabLst/>
+                        <a:defRPr/>
+                      </a:pPr>
+                      <a:r>
+                        <a:rPr kumimoji="0" lang="en-US" sz="700" b="1" i="0" u="none" strike="noStrike" kern="1200" cap="none" spc="0" normalizeH="0" baseline="0" noProof="0" dirty="0">
+                          <a:ln>
+                            <a:noFill/>
+                          </a:ln>
+                          <a:solidFill>
+                            <a:srgbClr val="003B4C"/>
+                          </a:solidFill>
+                          <a:effectLst/>
+                          <a:uLnTx/>
+                          <a:uFillTx/>
+                          <a:latin typeface="+mn-lt"/>
+                          <a:ea typeface="+mn-ea"/>
+                          <a:cs typeface="+mn-cs"/>
+                        </a:rPr>
+                        <a:t>Acquisitions: 2 
+Companies: Melcon Indústria Farmacêutica, Nortis Farmacêutica</a:t>
+                      </a:r>
+                      <a:endParaRPr kumimoji="0" lang="en-US" sz="700" b="0" i="0" u="none" strike="noStrike" kern="1200" cap="none" spc="0" normalizeH="0" baseline="0" noProof="0" dirty="0">
+                        <a:ln>
+                          <a:noFill/>
+                        </a:ln>
+                        <a:solidFill>
+                          <a:srgbClr val="003B4C"/>
+                        </a:solidFill>
+                        <a:effectLst/>
+                        <a:uLnTx/>
+                        <a:uFillTx/>
+                        <a:latin typeface="+mn-lt"/>
+                        <a:ea typeface="+mn-ea"/>
+                        <a:cs typeface="+mn-cs"/>
+                      </a:endParaRPr>
+                    </a:p>
+                    <a:p>
+                      <a:pPr marL="0" marR="0" lvl="0" indent="0" algn="ctr" defTabSz="914395" rtl="0" eaLnBrk="1" fontAlgn="t" latinLnBrk="0" hangingPunct="1">
+                        <a:lnSpc>
+                          <a:spcPct val="100000"/>
+                        </a:lnSpc>
+                        <a:spcBef>
+                          <a:spcPts val="0"/>
+                        </a:spcBef>
+                        <a:spcAft>
+                          <a:spcPts val="0"/>
+                        </a:spcAft>
+                        <a:buClrTx/>
+                        <a:buSzTx/>
+                        <a:buFontTx/>
+                        <a:buNone/>
+                        <a:tabLst/>
+                        <a:defRPr/>
+                      </a:pPr>
+                      <a:endParaRPr kumimoji="0" lang="en-US" sz="700" b="0" i="0" u="none" strike="noStrike" kern="1200" cap="none" spc="0" normalizeH="0" baseline="0" noProof="0" dirty="0">
+                        <a:ln>
+                          <a:noFill/>
+                        </a:ln>
+                        <a:solidFill>
+                          <a:srgbClr val="003B4C"/>
+                        </a:solidFill>
+                        <a:effectLst/>
+                        <a:uLnTx/>
+                        <a:uFillTx/>
+                        <a:latin typeface="+mn-lt"/>
+                        <a:ea typeface="+mn-ea"/>
+                        <a:cs typeface="+mn-cs"/>
+                      </a:endParaRPr>
+                    </a:p>
+                  </a:txBody>
+                  <a:tcPr marL="0" marR="0" marT="0" marB="0" anchor="ctr">
+                    <a:lnL>
+                      <a:noFill/>
+                    </a:lnL>
+                    <a:lnR cap="flat">
+                      <a:noFill/>
+                    </a:lnR>
+                    <a:lnT w="6350" cap="flat" cmpd="sng" algn="ctr">
+                      <a:solidFill>
+                        <a:srgbClr val="DBD5CD"/>
+                      </a:solidFill>
+                      <a:prstDash val="solid"/>
+                      <a:round/>
+                      <a:headEnd type="none" w="med" len="med"/>
+                      <a:tailEnd type="none" w="med" len="med"/>
+                    </a:lnT>
+                    <a:lnB w="6350" cap="flat" cmpd="sng" algn="ctr">
+                      <a:solidFill>
+                        <a:srgbClr val="DBD5CD"/>
+                      </a:solidFill>
+                      <a:prstDash val="solid"/>
+                      <a:round/>
+                      <a:headEnd type="none" w="med" len="med"/>
+                      <a:tailEnd type="none" w="med" len="med"/>
+                    </a:lnB>
+                    <a:lnTlToBr>
+                      <a:noFill/>
+                    </a:lnTlToBr>
+                    <a:lnBlToTr>
+                      <a:noFill/>
+                    </a:lnBlToTr>
+                    <a:solidFill>
+                      <a:srgbClr val="F0F5F7"/>
+                    </a:solidFill>
+                  </a:tcPr>
+                </a:tc>
+                <a:extLst>
+                  <a:ext uri="{0D108BD9-81ED-4DB2-BD59-A6C34878D82A}">
+                    <a16:rowId xmlns:a16="http://schemas.microsoft.com/office/drawing/2014/main" val="2943688724"/>
+                  </a:ext>
+                </a:extLst>
+              </a:tr>
+              <a:tr h="755473">
+                <a:tc>
+                  <a:txBody>
+                    <a:bodyPr/>
+                    <a:lstStyle/>
+                    <a:p>
+                      <a:pPr marL="0" marR="0" lvl="0" indent="0" algn="ctr" defTabSz="958850" rtl="0" eaLnBrk="1" fontAlgn="base" latinLnBrk="0" hangingPunct="1">
+                        <a:lnSpc>
+                          <a:spcPct val="100000"/>
+                        </a:lnSpc>
+                        <a:spcBef>
+                          <a:spcPct val="0"/>
+                        </a:spcBef>
+                        <a:spcAft>
+                          <a:spcPct val="0"/>
+                        </a:spcAft>
+                        <a:buClr>
+                          <a:srgbClr val="000080"/>
+                        </a:buClr>
+                        <a:buSzTx/>
+                        <a:buFont typeface="Wingdings" pitchFamily="2" charset="2"/>
+                        <a:buNone/>
+                        <a:tabLst/>
+                        <a:defRPr/>
+                      </a:pPr>
+                      <a:r>
+                        <a:rPr kumimoji="0" lang="en-US" sz="600" b="1" i="0" u="none" strike="noStrike" kern="1200" cap="none" spc="0" normalizeH="0" baseline="0" noProof="0" dirty="0">
+                          <a:ln>
+                            <a:noFill/>
+                          </a:ln>
+                          <a:solidFill>
+                            <a:srgbClr val="003B4C"/>
+                          </a:solidFill>
+                          <a:effectLst/>
+                          <a:uLnTx/>
+                          <a:uFillTx/>
+                          <a:latin typeface="Arial" panose="020B0604020202020204" pitchFamily="34" charset="0"/>
+                          <a:ea typeface="+mn-ea"/>
+                          <a:cs typeface="+mn-cs"/>
+                        </a:rPr>
+                        <a:t>#</a:t>
+                      </a:r>
+                      <a:endParaRPr lang="en-US" sz="600" b="1" i="0" u="none" kern="1200" noProof="0" dirty="0">
+                        <a:solidFill>
+                          <a:schemeClr val="tx2"/>
+                        </a:solidFill>
+                        <a:latin typeface="Arial" panose="020B0604020202020204" pitchFamily="34" charset="0"/>
+                        <a:ea typeface="+mn-ea"/>
+                        <a:cs typeface="+mn-cs"/>
+                      </a:endParaRPr>
                     </a:p>
                   </a:txBody>
                   <a:tcPr marL="0" marR="84406" marT="0" marB="0" anchor="ctr" horzOverflow="overflow">
@@ -14865,9 +15339,9 @@
                       <a:headEnd type="none" w="med" len="med"/>
                       <a:tailEnd type="none" w="med" len="med"/>
                     </a:lnT>
-                    <a:lnB w="6350" cap="flat" cmpd="sng" algn="ctr">
-                      <a:solidFill>
-                        <a:srgbClr val="DBD5CD"/>
+                    <a:lnB w="9525" cap="flat" cmpd="sng" algn="ctr">
+                      <a:solidFill>
+                        <a:schemeClr val="bg2"/>
                       </a:solidFill>
                       <a:prstDash val="solid"/>
                       <a:round/>
@@ -14881,7 +15355,276 @@
                       <a:noFill/>
                     </a:lnBlToTr>
                     <a:solidFill>
-                      <a:srgbClr val="F0F5F7"/>
+                      <a:srgbClr val="FFFFFF"/>
+                    </a:solidFill>
+                  </a:tcPr>
+                </a:tc>
+                <a:tc>
+                  <a:txBody>
+                    <a:bodyPr/>
+                    <a:lstStyle/>
+                    <a:p>
+                      <a:pPr marL="0" marR="0" lvl="0" indent="0" algn="l" defTabSz="958850" rtl="0" eaLnBrk="1" fontAlgn="base" latinLnBrk="0" hangingPunct="1">
+                        <a:lnSpc>
+                          <a:spcPct val="100000"/>
+                        </a:lnSpc>
+                        <a:spcBef>
+                          <a:spcPct val="0"/>
+                        </a:spcBef>
+                        <a:spcAft>
+                          <a:spcPct val="0"/>
+                        </a:spcAft>
+                        <a:buClr>
+                          <a:srgbClr val="000080"/>
+                        </a:buClr>
+                        <a:buSzTx/>
+                        <a:buFont typeface="Wingdings" pitchFamily="2" charset="2"/>
+                        <a:buNone/>
+                        <a:tabLst/>
+                        <a:defRPr/>
+                      </a:pPr>
+                      <a:endParaRPr kumimoji="0" lang="en-US" sz="700" b="0" i="0" u="none" strike="noStrike" kern="1200" cap="none" spc="0" normalizeH="0" baseline="0" noProof="0" dirty="0">
+                        <a:ln>
+                          <a:noFill/>
+                        </a:ln>
+                        <a:solidFill>
+                          <a:srgbClr val="003B4C"/>
+                        </a:solidFill>
+                        <a:effectLst/>
+                        <a:highlight>
+                          <a:srgbClr val="FFFF00"/>
+                        </a:highlight>
+                        <a:uLnTx/>
+                        <a:uFillTx/>
+                        <a:latin typeface="Arial" panose="020B0604020202020204" pitchFamily="34" charset="0"/>
+                        <a:ea typeface="+mn-ea"/>
+                        <a:cs typeface="+mn-cs"/>
+                      </a:endParaRPr>
+                    </a:p>
+                    <a:p>
+                      <a:pPr marL="0" marR="0" lvl="0" indent="0" algn="l" defTabSz="958850" rtl="0" eaLnBrk="1" fontAlgn="base" latinLnBrk="0" hangingPunct="1">
+                        <a:lnSpc>
+                          <a:spcPct val="100000"/>
+                        </a:lnSpc>
+                        <a:spcBef>
+                          <a:spcPct val="0"/>
+                        </a:spcBef>
+                        <a:spcAft>
+                          <a:spcPct val="0"/>
+                        </a:spcAft>
+                        <a:buClr>
+                          <a:srgbClr val="000080"/>
+                        </a:buClr>
+                        <a:buSzTx/>
+                        <a:buFont typeface="Wingdings" pitchFamily="2" charset="2"/>
+                        <a:buNone/>
+                        <a:tabLst/>
+                        <a:defRPr/>
+                      </a:pPr>
+                      <a:endParaRPr kumimoji="0" lang="en-US" sz="700" b="0" i="0" u="none" strike="noStrike" kern="1200" cap="none" spc="0" normalizeH="0" baseline="0" noProof="0" dirty="0">
+                        <a:ln>
+                          <a:noFill/>
+                        </a:ln>
+                        <a:solidFill>
+                          <a:srgbClr val="003B4C"/>
+                        </a:solidFill>
+                        <a:effectLst/>
+                        <a:highlight>
+                          <a:srgbClr val="FFFF00"/>
+                        </a:highlight>
+                        <a:uLnTx/>
+                        <a:uFillTx/>
+                        <a:latin typeface="Arial" panose="020B0604020202020204" pitchFamily="34" charset="0"/>
+                        <a:ea typeface="+mn-ea"/>
+                        <a:cs typeface="+mn-cs"/>
+                      </a:endParaRPr>
+                    </a:p>
+                    <a:p>
+                      <a:pPr marL="0" marR="0" lvl="0" indent="0" algn="l" defTabSz="958850" rtl="0" eaLnBrk="1" fontAlgn="base" latinLnBrk="0" hangingPunct="1">
+                        <a:lnSpc>
+                          <a:spcPct val="100000"/>
+                        </a:lnSpc>
+                        <a:spcBef>
+                          <a:spcPct val="0"/>
+                        </a:spcBef>
+                        <a:spcAft>
+                          <a:spcPct val="0"/>
+                        </a:spcAft>
+                        <a:buClr>
+                          <a:srgbClr val="000080"/>
+                        </a:buClr>
+                        <a:buSzTx/>
+                        <a:buFont typeface="Wingdings" pitchFamily="2" charset="2"/>
+                        <a:buNone/>
+                        <a:tabLst/>
+                        <a:defRPr/>
+                      </a:pPr>
+                      <a:endParaRPr kumimoji="0" lang="en-US" sz="700" b="0" i="0" u="none" strike="noStrike" kern="1200" cap="none" spc="0" normalizeH="0" baseline="0" noProof="0" dirty="0">
+                        <a:ln>
+                          <a:noFill/>
+                        </a:ln>
+                        <a:solidFill>
+                          <a:srgbClr val="003B4C"/>
+                        </a:solidFill>
+                        <a:effectLst/>
+                        <a:highlight>
+                          <a:srgbClr val="FFFF00"/>
+                        </a:highlight>
+                        <a:uLnTx/>
+                        <a:uFillTx/>
+                        <a:latin typeface="Arial" panose="020B0604020202020204" pitchFamily="34" charset="0"/>
+                        <a:ea typeface="+mn-ea"/>
+                        <a:cs typeface="+mn-cs"/>
+                      </a:endParaRPr>
+                    </a:p>
+                    <a:p>
+                      <a:pPr marL="0" marR="0" lvl="0" indent="0" algn="l" defTabSz="958850" rtl="0" eaLnBrk="1" fontAlgn="base" latinLnBrk="0" hangingPunct="1">
+                        <a:lnSpc>
+                          <a:spcPct val="100000"/>
+                        </a:lnSpc>
+                        <a:spcBef>
+                          <a:spcPct val="0"/>
+                        </a:spcBef>
+                        <a:spcAft>
+                          <a:spcPct val="0"/>
+                        </a:spcAft>
+                        <a:buClr>
+                          <a:srgbClr val="000080"/>
+                        </a:buClr>
+                        <a:buSzTx/>
+                        <a:buFont typeface="Wingdings" pitchFamily="2" charset="2"/>
+                        <a:buNone/>
+                        <a:tabLst/>
+                        <a:defRPr/>
+                      </a:pPr>
+                      <a:endParaRPr kumimoji="0" lang="en-US" sz="700" b="0" i="0" u="none" strike="noStrike" kern="1200" cap="none" spc="0" normalizeH="0" baseline="0" noProof="0" dirty="0">
+                        <a:ln>
+                          <a:noFill/>
+                        </a:ln>
+                        <a:solidFill>
+                          <a:srgbClr val="003B4C"/>
+                        </a:solidFill>
+                        <a:effectLst/>
+                        <a:highlight>
+                          <a:srgbClr val="FFFF00"/>
+                        </a:highlight>
+                        <a:uLnTx/>
+                        <a:uFillTx/>
+                        <a:latin typeface="Arial" panose="020B0604020202020204" pitchFamily="34" charset="0"/>
+                        <a:ea typeface="+mn-ea"/>
+                        <a:cs typeface="+mn-cs"/>
+                      </a:endParaRPr>
+                    </a:p>
+                    <a:p>
+                      <a:pPr marL="0" marR="0" lvl="0" indent="0" algn="l" defTabSz="958850" rtl="0" eaLnBrk="1" fontAlgn="base" latinLnBrk="0" hangingPunct="1">
+                        <a:lnSpc>
+                          <a:spcPct val="100000"/>
+                        </a:lnSpc>
+                        <a:spcBef>
+                          <a:spcPct val="0"/>
+                        </a:spcBef>
+                        <a:spcAft>
+                          <a:spcPct val="0"/>
+                        </a:spcAft>
+                        <a:buClr>
+                          <a:srgbClr val="000080"/>
+                        </a:buClr>
+                        <a:buSzTx/>
+                        <a:buFont typeface="Wingdings" pitchFamily="2" charset="2"/>
+                        <a:buNone/>
+                        <a:tabLst/>
+                        <a:defRPr/>
+                      </a:pPr>
+                      <a:r>
+                        <a:rPr kumimoji="0" lang="en-US" sz="700" b="0" i="0" u="none" strike="noStrike" kern="1200" cap="none" spc="0" normalizeH="0" baseline="0" noProof="0" dirty="0">
+                          <a:ln>
+                            <a:noFill/>
+                          </a:ln>
+                          <a:solidFill>
+                            <a:srgbClr val="003B4C"/>
+                          </a:solidFill>
+                          <a:effectLst/>
+                          <a:uLnTx/>
+                          <a:uFillTx/>
+                          <a:latin typeface="Arial" panose="020B0604020202020204" pitchFamily="34" charset="0"/>
+                          <a:ea typeface="+mn-ea"/>
+                          <a:cs typeface="+mn-cs"/>
+                        </a:rPr>
+                        <a:t>(Ticker3)</a:t>
+                      </a:r>
+                    </a:p>
+                    <a:p>
+                      <a:pPr marL="0" marR="0" lvl="0" indent="0" algn="l" defTabSz="958850" rtl="0" eaLnBrk="1" fontAlgn="base" latinLnBrk="0" hangingPunct="1">
+                        <a:lnSpc>
+                          <a:spcPct val="100000"/>
+                        </a:lnSpc>
+                        <a:spcBef>
+                          <a:spcPct val="0"/>
+                        </a:spcBef>
+                        <a:spcAft>
+                          <a:spcPct val="0"/>
+                        </a:spcAft>
+                        <a:buClr>
+                          <a:srgbClr val="000080"/>
+                        </a:buClr>
+                        <a:buSzTx/>
+                        <a:buFont typeface="Wingdings" pitchFamily="2" charset="2"/>
+                        <a:buNone/>
+                        <a:tabLst/>
+                        <a:defRPr/>
+                      </a:pPr>
+                      <a:r>
+                        <a:rPr kumimoji="0" lang="en-US" sz="700" b="0" i="0" u="none" strike="noStrike" kern="1200" cap="none" spc="0" normalizeH="0" baseline="0" noProof="0" dirty="0">
+                          <a:ln>
+                            <a:noFill/>
+                          </a:ln>
+                          <a:solidFill>
+                            <a:srgbClr val="003B4C"/>
+                          </a:solidFill>
+                          <a:effectLst/>
+                          <a:uLnTx/>
+                          <a:uFillTx/>
+                          <a:latin typeface="Arial" panose="020B0604020202020204" pitchFamily="34" charset="0"/>
+                          <a:ea typeface="+mn-ea"/>
+                          <a:cs typeface="+mn-cs"/>
+                        </a:rPr>
+                        <a:t>Country3</a:t>
+                      </a:r>
+                    </a:p>
+                  </a:txBody>
+                  <a:tcPr marL="0" marR="84406" marT="0" marB="0" anchor="ctr" horzOverflow="overflow">
+                    <a:lnL cap="flat">
+                      <a:noFill/>
+                    </a:lnL>
+                    <a:lnR>
+                      <a:noFill/>
+                    </a:lnR>
+                    <a:lnT w="6350" cap="flat" cmpd="sng" algn="ctr">
+                      <a:solidFill>
+                        <a:srgbClr val="DBD5CD"/>
+                      </a:solidFill>
+                      <a:prstDash val="solid"/>
+                      <a:round/>
+                      <a:headEnd type="none" w="med" len="med"/>
+                      <a:tailEnd type="none" w="med" len="med"/>
+                    </a:lnT>
+                    <a:lnB w="9525" cap="flat" cmpd="sng" algn="ctr">
+                      <a:solidFill>
+                        <a:schemeClr val="bg2"/>
+                      </a:solidFill>
+                      <a:prstDash val="solid"/>
+                      <a:round/>
+                      <a:headEnd type="none" w="med" len="med"/>
+                      <a:tailEnd type="none" w="med" len="med"/>
+                    </a:lnB>
+                    <a:lnTlToBr>
+                      <a:noFill/>
+                    </a:lnTlToBr>
+                    <a:lnBlToTr>
+                      <a:noFill/>
+                    </a:lnBlToTr>
+                    <a:solidFill>
+                      <a:srgbClr val="FFFFFF"/>
                     </a:solidFill>
                   </a:tcPr>
                 </a:tc>
@@ -14932,8 +15675,12 @@
                     <a:lnL>
                       <a:noFill/>
                     </a:lnL>
-                    <a:lnR>
-                      <a:noFill/>
+                    <a:lnR w="12700" cap="flat" cmpd="sng" algn="ctr">
+                      <a:noFill/>
+                      <a:prstDash val="solid"/>
+                      <a:round/>
+                      <a:headEnd type="none" w="med" len="med"/>
+                      <a:tailEnd type="none" w="med" len="med"/>
                     </a:lnR>
                     <a:lnT w="6350" cap="flat" cmpd="sng" algn="ctr">
                       <a:solidFill>
@@ -14944,9 +15691,693 @@
                       <a:headEnd type="none" w="med" len="med"/>
                       <a:tailEnd type="none" w="med" len="med"/>
                     </a:lnT>
-                    <a:lnB w="6350" cap="flat" cmpd="sng" algn="ctr">
+                    <a:lnB w="9525" cap="flat" cmpd="sng" algn="ctr">
+                      <a:solidFill>
+                        <a:schemeClr val="bg2"/>
+                      </a:solidFill>
+                      <a:prstDash val="solid"/>
+                      <a:round/>
+                      <a:headEnd type="none" w="med" len="med"/>
+                      <a:tailEnd type="none" w="med" len="med"/>
+                    </a:lnB>
+                    <a:lnTlToBr>
+                      <a:noFill/>
+                    </a:lnTlToBr>
+                    <a:lnBlToTr>
+                      <a:noFill/>
+                    </a:lnBlToTr>
+                    <a:solidFill>
+                      <a:srgbClr val="FFFFFF"/>
+                    </a:solidFill>
+                  </a:tcPr>
+                </a:tc>
+                <a:tc>
+                  <a:txBody>
+                    <a:bodyPr/>
+                    <a:lstStyle/>
+                    <a:p>
+                      <a:pPr marL="0" marR="0" lvl="0" indent="0" algn="ctr" defTabSz="914395" rtl="0" eaLnBrk="1" fontAlgn="t" latinLnBrk="0" hangingPunct="1">
+                        <a:lnSpc>
+                          <a:spcPct val="100000"/>
+                        </a:lnSpc>
+                        <a:spcBef>
+                          <a:spcPts val="0"/>
+                        </a:spcBef>
+                        <a:spcAft>
+                          <a:spcPts val="0"/>
+                        </a:spcAft>
+                        <a:buClrTx/>
+                        <a:buSzTx/>
+                        <a:buFontTx/>
+                        <a:buNone/>
+                        <a:tabLst/>
+                        <a:defRPr/>
+                      </a:pPr>
+                      <a:r>
+                        <a:rPr kumimoji="0" lang="en-US" sz="2200" b="1" i="0" u="none" strike="noStrike" kern="1200" cap="none" spc="0" normalizeH="0" baseline="0" noProof="0" dirty="0">
+                          <a:ln>
+                            <a:noFill/>
+                          </a:ln>
+                          <a:solidFill>
+                            <a:srgbClr val="C00000"/>
+                          </a:solidFill>
+                          <a:effectLst/>
+                          <a:uLnTx/>
+                          <a:uFillTx/>
+                          <a:latin typeface="+mn-lt"/>
+                          <a:ea typeface="+mn-ea"/>
+                          <a:cs typeface="Arial"/>
+                          <a:sym typeface="Wingdings" panose="05000000000000000000" pitchFamily="2" charset="2"/>
+                        </a:rPr>
+                        <a:t></a:t>
+                      </a:r>
+                      <a:endParaRPr kumimoji="0" lang="en-US" sz="2200" b="0" i="0" u="none" strike="noStrike" kern="1200" cap="none" spc="0" normalizeH="0" baseline="0" noProof="0" dirty="0">
+                        <a:ln>
+                          <a:noFill/>
+                        </a:ln>
+                        <a:solidFill>
+                          <a:srgbClr val="FF0000"/>
+                        </a:solidFill>
+                        <a:effectLst/>
+                        <a:uLnTx/>
+                        <a:uFillTx/>
+                        <a:latin typeface="+mn-lt"/>
+                        <a:ea typeface="+mn-ea"/>
+                        <a:cs typeface="+mn-cs"/>
+                      </a:endParaRPr>
+                    </a:p>
+                  </a:txBody>
+                  <a:tcPr marL="0" marR="0" marT="0" marB="0" anchor="ctr">
+                    <a:lnL>
+                      <a:noFill/>
+                    </a:lnL>
+                    <a:lnR cap="flat">
+                      <a:noFill/>
+                    </a:lnR>
+                    <a:lnT w="6350" cap="flat" cmpd="sng" algn="ctr">
                       <a:solidFill>
                         <a:srgbClr val="DBD5CD"/>
+                      </a:solidFill>
+                      <a:prstDash val="solid"/>
+                      <a:round/>
+                      <a:headEnd type="none" w="med" len="med"/>
+                      <a:tailEnd type="none" w="med" len="med"/>
+                    </a:lnT>
+                    <a:lnB w="9525" cap="flat" cmpd="sng" algn="ctr">
+                      <a:solidFill>
+                        <a:schemeClr val="bg2"/>
+                      </a:solidFill>
+                      <a:prstDash val="solid"/>
+                      <a:round/>
+                      <a:headEnd type="none" w="med" len="med"/>
+                      <a:tailEnd type="none" w="med" len="med"/>
+                    </a:lnB>
+                    <a:lnTlToBr>
+                      <a:noFill/>
+                    </a:lnTlToBr>
+                    <a:lnBlToTr>
+                      <a:noFill/>
+                    </a:lnBlToTr>
+                    <a:solidFill>
+                      <a:srgbClr val="FFFFFF"/>
+                    </a:solidFill>
+                  </a:tcPr>
+                </a:tc>
+                <a:tc>
+                  <a:txBody>
+                    <a:bodyPr/>
+                    <a:lstStyle/>
+                    <a:p>
+                      <a:pPr marL="0" marR="0" lvl="0" indent="0" algn="ctr" defTabSz="914395" rtl="0" eaLnBrk="1" fontAlgn="t" latinLnBrk="0" hangingPunct="1">
+                        <a:lnSpc>
+                          <a:spcPct val="100000"/>
+                        </a:lnSpc>
+                        <a:spcBef>
+                          <a:spcPts val="0"/>
+                        </a:spcBef>
+                        <a:spcAft>
+                          <a:spcPts val="0"/>
+                        </a:spcAft>
+                        <a:buClrTx/>
+                        <a:buSzTx/>
+                        <a:buFontTx/>
+                        <a:buNone/>
+                        <a:tabLst/>
+                        <a:defRPr/>
+                      </a:pPr>
+                      <a:r>
+                        <a:rPr kumimoji="0" lang="en-US" sz="700" b="1" i="0" u="none" strike="noStrike" kern="1200" cap="none" spc="0" normalizeH="0" baseline="0" noProof="0" dirty="0">
+                          <a:ln>
+                            <a:noFill/>
+                          </a:ln>
+                          <a:solidFill>
+                            <a:srgbClr val="003B4C"/>
+                          </a:solidFill>
+                          <a:effectLst/>
+                          <a:uLnTx/>
+                          <a:uFillTx/>
+                          <a:latin typeface="+mn-lt"/>
+                          <a:ea typeface="+mn-ea"/>
+                          <a:cs typeface="+mn-cs"/>
+                        </a:rPr>
+                        <a:t>Acquisitions:</a:t>
+                      </a:r>
+                      <a:endParaRPr kumimoji="0" lang="en-US" sz="700" b="0" i="0" u="none" strike="noStrike" kern="1200" cap="none" spc="0" normalizeH="0" baseline="0" noProof="0" dirty="0">
+                        <a:ln>
+                          <a:noFill/>
+                        </a:ln>
+                        <a:solidFill>
+                          <a:srgbClr val="003B4C"/>
+                        </a:solidFill>
+                        <a:effectLst/>
+                        <a:uLnTx/>
+                        <a:uFillTx/>
+                        <a:latin typeface="+mn-lt"/>
+                        <a:ea typeface="+mn-ea"/>
+                        <a:cs typeface="+mn-cs"/>
+                      </a:endParaRPr>
+                    </a:p>
+                    <a:p>
+                      <a:pPr marL="0" marR="0" lvl="0" indent="0" algn="ctr" defTabSz="914395" rtl="0" eaLnBrk="1" fontAlgn="t" latinLnBrk="0" hangingPunct="1">
+                        <a:lnSpc>
+                          <a:spcPct val="100000"/>
+                        </a:lnSpc>
+                        <a:spcBef>
+                          <a:spcPts val="0"/>
+                        </a:spcBef>
+                        <a:spcAft>
+                          <a:spcPts val="0"/>
+                        </a:spcAft>
+                        <a:buClrTx/>
+                        <a:buSzTx/>
+                        <a:buFontTx/>
+                        <a:buNone/>
+                        <a:tabLst/>
+                        <a:defRPr/>
+                      </a:pPr>
+                      <a:endParaRPr kumimoji="0" lang="en-US" sz="700" b="0" i="0" u="none" strike="noStrike" kern="1200" cap="none" spc="0" normalizeH="0" baseline="0" noProof="0" dirty="0">
+                        <a:ln>
+                          <a:noFill/>
+                        </a:ln>
+                        <a:solidFill>
+                          <a:srgbClr val="003B4C"/>
+                        </a:solidFill>
+                        <a:effectLst/>
+                        <a:uLnTx/>
+                        <a:uFillTx/>
+                        <a:latin typeface="+mn-lt"/>
+                        <a:ea typeface="+mn-ea"/>
+                        <a:cs typeface="+mn-cs"/>
+                      </a:endParaRPr>
+                    </a:p>
+                    <a:p>
+                      <a:pPr marL="0" marR="0" lvl="0" indent="0" algn="ctr" defTabSz="914395" rtl="0" eaLnBrk="1" fontAlgn="t" latinLnBrk="0" hangingPunct="1">
+                        <a:lnSpc>
+                          <a:spcPct val="100000"/>
+                        </a:lnSpc>
+                        <a:spcBef>
+                          <a:spcPts val="0"/>
+                        </a:spcBef>
+                        <a:spcAft>
+                          <a:spcPts val="0"/>
+                        </a:spcAft>
+                        <a:buClrTx/>
+                        <a:buSzTx/>
+                        <a:buFontTx/>
+                        <a:buNone/>
+                        <a:tabLst/>
+                        <a:defRPr/>
+                      </a:pPr>
+                      <a:r>
+                        <a:rPr kumimoji="0" lang="en-US" sz="700" b="1" i="0" u="none" strike="noStrike" kern="1200" cap="none" spc="0" normalizeH="0" baseline="0" noProof="0" dirty="0">
+                          <a:ln>
+                            <a:noFill/>
+                          </a:ln>
+                          <a:solidFill>
+                            <a:srgbClr val="003B4C"/>
+                          </a:solidFill>
+                          <a:effectLst/>
+                          <a:uLnTx/>
+                          <a:uFillTx/>
+                          <a:latin typeface="+mn-lt"/>
+                          <a:ea typeface="+mn-ea"/>
+                          <a:cs typeface="+mn-cs"/>
+                        </a:rPr>
+                        <a:t>Companies:</a:t>
+                      </a:r>
+                      <a:endParaRPr kumimoji="0" lang="en-US" sz="700" b="0" i="0" u="none" strike="noStrike" kern="1200" cap="none" spc="0" normalizeH="0" baseline="0" noProof="0" dirty="0">
+                        <a:ln>
+                          <a:noFill/>
+                        </a:ln>
+                        <a:solidFill>
+                          <a:srgbClr val="003B4C"/>
+                        </a:solidFill>
+                        <a:effectLst/>
+                        <a:uLnTx/>
+                        <a:uFillTx/>
+                        <a:latin typeface="+mn-lt"/>
+                        <a:ea typeface="+mn-ea"/>
+                        <a:cs typeface="+mn-cs"/>
+                      </a:endParaRPr>
+                    </a:p>
+                  </a:txBody>
+                  <a:tcPr marL="0" marR="0" marT="0" marB="0" anchor="ctr">
+                    <a:lnL>
+                      <a:noFill/>
+                    </a:lnL>
+                    <a:lnR cap="flat">
+                      <a:noFill/>
+                    </a:lnR>
+                    <a:lnT w="6350" cap="flat" cmpd="sng" algn="ctr">
+                      <a:solidFill>
+                        <a:srgbClr val="DBD5CD"/>
+                      </a:solidFill>
+                      <a:prstDash val="solid"/>
+                      <a:round/>
+                      <a:headEnd type="none" w="med" len="med"/>
+                      <a:tailEnd type="none" w="med" len="med"/>
+                    </a:lnT>
+                    <a:lnB w="9525" cap="flat" cmpd="sng" algn="ctr">
+                      <a:solidFill>
+                        <a:schemeClr val="bg2"/>
+                      </a:solidFill>
+                      <a:prstDash val="solid"/>
+                      <a:round/>
+                      <a:headEnd type="none" w="med" len="med"/>
+                      <a:tailEnd type="none" w="med" len="med"/>
+                    </a:lnB>
+                    <a:lnTlToBr>
+                      <a:noFill/>
+                    </a:lnTlToBr>
+                    <a:lnBlToTr>
+                      <a:noFill/>
+                    </a:lnBlToTr>
+                    <a:solidFill>
+                      <a:srgbClr val="FFFFFF"/>
+                    </a:solidFill>
+                  </a:tcPr>
+                </a:tc>
+                <a:extLst>
+                  <a:ext uri="{0D108BD9-81ED-4DB2-BD59-A6C34878D82A}">
+                    <a16:rowId xmlns:a16="http://schemas.microsoft.com/office/drawing/2014/main" val="10003"/>
+                  </a:ext>
+                </a:extLst>
+              </a:tr>
+              <a:tr h="755473">
+                <a:tc>
+                  <a:txBody>
+                    <a:bodyPr/>
+                    <a:lstStyle/>
+                    <a:p>
+                      <a:pPr marL="0" marR="0" lvl="0" indent="0" algn="ctr" defTabSz="958850" rtl="0" eaLnBrk="1" fontAlgn="base" latinLnBrk="0" hangingPunct="1">
+                        <a:lnSpc>
+                          <a:spcPct val="100000"/>
+                        </a:lnSpc>
+                        <a:spcBef>
+                          <a:spcPct val="0"/>
+                        </a:spcBef>
+                        <a:spcAft>
+                          <a:spcPct val="0"/>
+                        </a:spcAft>
+                        <a:buClr>
+                          <a:srgbClr val="000080"/>
+                        </a:buClr>
+                        <a:buSzTx/>
+                        <a:buFont typeface="Wingdings" pitchFamily="2" charset="2"/>
+                        <a:buNone/>
+                        <a:tabLst/>
+                        <a:defRPr/>
+                      </a:pPr>
+                      <a:r>
+                        <a:rPr kumimoji="0" lang="en-US" sz="600" b="1" i="0" u="none" strike="noStrike" kern="1200" cap="none" spc="0" normalizeH="0" baseline="0" noProof="0" dirty="0">
+                          <a:ln>
+                            <a:noFill/>
+                          </a:ln>
+                          <a:solidFill>
+                            <a:srgbClr val="003B4C"/>
+                          </a:solidFill>
+                          <a:effectLst/>
+                          <a:uLnTx/>
+                          <a:uFillTx/>
+                          <a:latin typeface="Arial" panose="020B0604020202020204" pitchFamily="34" charset="0"/>
+                          <a:ea typeface="+mn-ea"/>
+                          <a:cs typeface="+mn-cs"/>
+                        </a:rPr>
+                        <a:t>#</a:t>
+                      </a:r>
+                      <a:endParaRPr lang="en-US" sz="600" b="1" i="0" u="none" kern="1200" noProof="0" dirty="0">
+                        <a:solidFill>
+                          <a:schemeClr val="tx2"/>
+                        </a:solidFill>
+                        <a:latin typeface="Arial" panose="020B0604020202020204" pitchFamily="34" charset="0"/>
+                        <a:ea typeface="+mn-ea"/>
+                        <a:cs typeface="+mn-cs"/>
+                      </a:endParaRPr>
+                    </a:p>
+                  </a:txBody>
+                  <a:tcPr marL="0" marR="84406" marT="0" marB="0" anchor="ctr" horzOverflow="overflow">
+                    <a:lnL cap="flat">
+                      <a:noFill/>
+                    </a:lnL>
+                    <a:lnR>
+                      <a:noFill/>
+                    </a:lnR>
+                    <a:lnT w="9525" cap="flat" cmpd="sng" algn="ctr">
+                      <a:solidFill>
+                        <a:schemeClr val="bg2"/>
+                      </a:solidFill>
+                      <a:prstDash val="solid"/>
+                      <a:round/>
+                      <a:headEnd type="none" w="med" len="med"/>
+                      <a:tailEnd type="none" w="med" len="med"/>
+                    </a:lnT>
+                    <a:lnB w="9525" cap="flat" cmpd="sng" algn="ctr">
+                      <a:solidFill>
+                        <a:schemeClr val="bg2"/>
+                      </a:solidFill>
+                      <a:prstDash val="solid"/>
+                      <a:round/>
+                      <a:headEnd type="none" w="med" len="med"/>
+                      <a:tailEnd type="none" w="med" len="med"/>
+                    </a:lnB>
+                    <a:lnTlToBr>
+                      <a:noFill/>
+                    </a:lnTlToBr>
+                    <a:lnBlToTr>
+                      <a:noFill/>
+                    </a:lnBlToTr>
+                    <a:solidFill>
+                      <a:srgbClr val="F0F5F7"/>
+                    </a:solidFill>
+                  </a:tcPr>
+                </a:tc>
+                <a:tc>
+                  <a:txBody>
+                    <a:bodyPr/>
+                    <a:lstStyle/>
+                    <a:p>
+                      <a:pPr marL="0" marR="0" lvl="0" indent="0" algn="l" defTabSz="958850" rtl="0" eaLnBrk="1" fontAlgn="base" latinLnBrk="0" hangingPunct="1">
+                        <a:lnSpc>
+                          <a:spcPct val="100000"/>
+                        </a:lnSpc>
+                        <a:spcBef>
+                          <a:spcPct val="0"/>
+                        </a:spcBef>
+                        <a:spcAft>
+                          <a:spcPct val="0"/>
+                        </a:spcAft>
+                        <a:buClr>
+                          <a:srgbClr val="000080"/>
+                        </a:buClr>
+                        <a:buSzTx/>
+                        <a:buFont typeface="Wingdings" pitchFamily="2" charset="2"/>
+                        <a:buNone/>
+                        <a:tabLst/>
+                        <a:defRPr/>
+                      </a:pPr>
+                      <a:endParaRPr lang="en-US" sz="700" b="0" i="0" u="none" kern="1200" noProof="0" dirty="0">
+                        <a:solidFill>
+                          <a:schemeClr val="tx2"/>
+                        </a:solidFill>
+                        <a:highlight>
+                          <a:srgbClr val="FFFF00"/>
+                        </a:highlight>
+                        <a:latin typeface="Arial" panose="020B0604020202020204" pitchFamily="34" charset="0"/>
+                        <a:ea typeface="+mn-ea"/>
+                        <a:cs typeface="+mn-cs"/>
+                      </a:endParaRPr>
+                    </a:p>
+                    <a:p>
+                      <a:pPr marL="0" marR="0" lvl="0" indent="0" algn="l" defTabSz="958850" rtl="0" eaLnBrk="1" fontAlgn="base" latinLnBrk="0" hangingPunct="1">
+                        <a:lnSpc>
+                          <a:spcPct val="100000"/>
+                        </a:lnSpc>
+                        <a:spcBef>
+                          <a:spcPct val="0"/>
+                        </a:spcBef>
+                        <a:spcAft>
+                          <a:spcPct val="0"/>
+                        </a:spcAft>
+                        <a:buClr>
+                          <a:srgbClr val="000080"/>
+                        </a:buClr>
+                        <a:buSzTx/>
+                        <a:buFont typeface="Wingdings" pitchFamily="2" charset="2"/>
+                        <a:buNone/>
+                        <a:tabLst/>
+                        <a:defRPr/>
+                      </a:pPr>
+                      <a:endParaRPr lang="en-US" sz="700" b="0" i="0" u="none" kern="1200" noProof="0" dirty="0">
+                        <a:solidFill>
+                          <a:schemeClr val="tx2"/>
+                        </a:solidFill>
+                        <a:highlight>
+                          <a:srgbClr val="FFFF00"/>
+                        </a:highlight>
+                        <a:latin typeface="Arial" panose="020B0604020202020204" pitchFamily="34" charset="0"/>
+                        <a:ea typeface="+mn-ea"/>
+                        <a:cs typeface="+mn-cs"/>
+                      </a:endParaRPr>
+                    </a:p>
+                    <a:p>
+                      <a:pPr marL="0" marR="0" lvl="0" indent="0" algn="l" defTabSz="958850" rtl="0" eaLnBrk="1" fontAlgn="base" latinLnBrk="0" hangingPunct="1">
+                        <a:lnSpc>
+                          <a:spcPct val="100000"/>
+                        </a:lnSpc>
+                        <a:spcBef>
+                          <a:spcPct val="0"/>
+                        </a:spcBef>
+                        <a:spcAft>
+                          <a:spcPct val="0"/>
+                        </a:spcAft>
+                        <a:buClr>
+                          <a:srgbClr val="000080"/>
+                        </a:buClr>
+                        <a:buSzTx/>
+                        <a:buFont typeface="Wingdings" pitchFamily="2" charset="2"/>
+                        <a:buNone/>
+                        <a:tabLst/>
+                        <a:defRPr/>
+                      </a:pPr>
+                      <a:endParaRPr lang="en-US" sz="700" b="0" i="0" u="none" kern="1200" noProof="0" dirty="0">
+                        <a:solidFill>
+                          <a:schemeClr val="tx2"/>
+                        </a:solidFill>
+                        <a:highlight>
+                          <a:srgbClr val="FFFF00"/>
+                        </a:highlight>
+                        <a:latin typeface="Arial" panose="020B0604020202020204" pitchFamily="34" charset="0"/>
+                        <a:ea typeface="+mn-ea"/>
+                        <a:cs typeface="+mn-cs"/>
+                      </a:endParaRPr>
+                    </a:p>
+                    <a:p>
+                      <a:pPr marL="0" marR="0" lvl="0" indent="0" algn="l" defTabSz="958850" rtl="0" eaLnBrk="1" fontAlgn="base" latinLnBrk="0" hangingPunct="1">
+                        <a:lnSpc>
+                          <a:spcPct val="100000"/>
+                        </a:lnSpc>
+                        <a:spcBef>
+                          <a:spcPct val="0"/>
+                        </a:spcBef>
+                        <a:spcAft>
+                          <a:spcPct val="0"/>
+                        </a:spcAft>
+                        <a:buClr>
+                          <a:srgbClr val="000080"/>
+                        </a:buClr>
+                        <a:buSzTx/>
+                        <a:buFont typeface="Wingdings" pitchFamily="2" charset="2"/>
+                        <a:buNone/>
+                        <a:tabLst/>
+                        <a:defRPr/>
+                      </a:pPr>
+                      <a:endParaRPr lang="en-US" sz="700" b="0" i="0" u="none" kern="1200" noProof="0" dirty="0">
+                        <a:solidFill>
+                          <a:schemeClr val="tx2"/>
+                        </a:solidFill>
+                        <a:highlight>
+                          <a:srgbClr val="FFFF00"/>
+                        </a:highlight>
+                        <a:latin typeface="Arial" panose="020B0604020202020204" pitchFamily="34" charset="0"/>
+                        <a:ea typeface="+mn-ea"/>
+                        <a:cs typeface="+mn-cs"/>
+                      </a:endParaRPr>
+                    </a:p>
+                    <a:p>
+                      <a:pPr marL="0" marR="0" lvl="0" indent="0" algn="l" defTabSz="958850" rtl="0" eaLnBrk="1" fontAlgn="base" latinLnBrk="0" hangingPunct="1">
+                        <a:lnSpc>
+                          <a:spcPct val="100000"/>
+                        </a:lnSpc>
+                        <a:spcBef>
+                          <a:spcPct val="0"/>
+                        </a:spcBef>
+                        <a:spcAft>
+                          <a:spcPct val="0"/>
+                        </a:spcAft>
+                        <a:buClr>
+                          <a:srgbClr val="000080"/>
+                        </a:buClr>
+                        <a:buSzTx/>
+                        <a:buFont typeface="Wingdings" pitchFamily="2" charset="2"/>
+                        <a:buNone/>
+                        <a:tabLst/>
+                        <a:defRPr/>
+                      </a:pPr>
+                      <a:r>
+                        <a:rPr kumimoji="0" lang="en-US" sz="700" b="0" i="0" u="none" strike="noStrike" kern="1200" cap="none" spc="0" normalizeH="0" baseline="0" noProof="0" dirty="0">
+                          <a:ln>
+                            <a:noFill/>
+                          </a:ln>
+                          <a:solidFill>
+                            <a:srgbClr val="003B4C"/>
+                          </a:solidFill>
+                          <a:effectLst/>
+                          <a:uLnTx/>
+                          <a:uFillTx/>
+                          <a:latin typeface="Arial" panose="020B0604020202020204" pitchFamily="34" charset="0"/>
+                          <a:ea typeface="+mn-ea"/>
+                          <a:cs typeface="+mn-cs"/>
+                        </a:rPr>
+                        <a:t>(Ticker4)</a:t>
+                      </a:r>
+                    </a:p>
+                    <a:p>
+                      <a:pPr marL="0" marR="0" lvl="0" indent="0" algn="l" defTabSz="958850" rtl="0" eaLnBrk="1" fontAlgn="base" latinLnBrk="0" hangingPunct="1">
+                        <a:lnSpc>
+                          <a:spcPct val="100000"/>
+                        </a:lnSpc>
+                        <a:spcBef>
+                          <a:spcPct val="0"/>
+                        </a:spcBef>
+                        <a:spcAft>
+                          <a:spcPct val="0"/>
+                        </a:spcAft>
+                        <a:buClr>
+                          <a:srgbClr val="000080"/>
+                        </a:buClr>
+                        <a:buSzTx/>
+                        <a:buFont typeface="Wingdings" pitchFamily="2" charset="2"/>
+                        <a:buNone/>
+                        <a:tabLst/>
+                        <a:defRPr/>
+                      </a:pPr>
+                      <a:r>
+                        <a:rPr kumimoji="0" lang="en-US" sz="700" b="0" i="0" u="none" strike="noStrike" kern="1200" cap="none" spc="0" normalizeH="0" baseline="0" noProof="0" dirty="0">
+                          <a:ln>
+                            <a:noFill/>
+                          </a:ln>
+                          <a:solidFill>
+                            <a:srgbClr val="003B4C"/>
+                          </a:solidFill>
+                          <a:effectLst/>
+                          <a:uLnTx/>
+                          <a:uFillTx/>
+                          <a:latin typeface="Arial" panose="020B0604020202020204" pitchFamily="34" charset="0"/>
+                          <a:ea typeface="+mn-ea"/>
+                          <a:cs typeface="+mn-cs"/>
+                        </a:rPr>
+                        <a:t>Country4</a:t>
+                      </a:r>
+                    </a:p>
+                  </a:txBody>
+                  <a:tcPr marL="0" marR="84406" marT="0" marB="0" anchor="ctr" horzOverflow="overflow">
+                    <a:lnL cap="flat">
+                      <a:noFill/>
+                    </a:lnL>
+                    <a:lnR>
+                      <a:noFill/>
+                    </a:lnR>
+                    <a:lnT w="9525" cap="flat" cmpd="sng" algn="ctr">
+                      <a:solidFill>
+                        <a:schemeClr val="bg2"/>
+                      </a:solidFill>
+                      <a:prstDash val="solid"/>
+                      <a:round/>
+                      <a:headEnd type="none" w="med" len="med"/>
+                      <a:tailEnd type="none" w="med" len="med"/>
+                    </a:lnT>
+                    <a:lnB w="9525" cap="flat" cmpd="sng" algn="ctr">
+                      <a:solidFill>
+                        <a:schemeClr val="bg2"/>
+                      </a:solidFill>
+                      <a:prstDash val="solid"/>
+                      <a:round/>
+                      <a:headEnd type="none" w="med" len="med"/>
+                      <a:tailEnd type="none" w="med" len="med"/>
+                    </a:lnB>
+                    <a:lnTlToBr>
+                      <a:noFill/>
+                    </a:lnTlToBr>
+                    <a:lnBlToTr>
+                      <a:noFill/>
+                    </a:lnBlToTr>
+                    <a:solidFill>
+                      <a:srgbClr val="F0F5F7"/>
+                    </a:solidFill>
+                  </a:tcPr>
+                </a:tc>
+                <a:tc>
+                  <a:txBody>
+                    <a:bodyPr/>
+                    <a:lstStyle/>
+                    <a:p>
+                      <a:pPr marL="171450" marR="0" lvl="0" indent="-171450" algn="l" defTabSz="914395" rtl="0" eaLnBrk="1" fontAlgn="t" latinLnBrk="0" hangingPunct="1">
+                        <a:lnSpc>
+                          <a:spcPct val="100000"/>
+                        </a:lnSpc>
+                        <a:spcBef>
+                          <a:spcPts val="0"/>
+                        </a:spcBef>
+                        <a:spcAft>
+                          <a:spcPts val="0"/>
+                        </a:spcAft>
+                        <a:buClr>
+                          <a:srgbClr val="003B4C"/>
+                        </a:buClr>
+                        <a:buSzTx/>
+                        <a:buFont typeface="Wingdings" panose="05000000000000000000" pitchFamily="2" charset="2"/>
+                        <a:buChar char="§"/>
+                        <a:tabLst/>
+                        <a:defRPr/>
+                      </a:pPr>
+                      <a:r>
+                        <a:rPr kumimoji="0" lang="en-US" sz="700" b="0" i="0" u="none" strike="noStrike" kern="1200" cap="none" spc="0" normalizeH="0" baseline="0" noProof="0" dirty="0">
+                          <a:ln>
+                            <a:noFill/>
+                          </a:ln>
+                          <a:solidFill>
+                            <a:srgbClr val="003B4C"/>
+                          </a:solidFill>
+                          <a:effectLst/>
+                          <a:uLnTx/>
+                          <a:uFillTx/>
+                          <a:latin typeface="Arial" panose="020B0604020202020204" pitchFamily="34" charset="0"/>
+                          <a:ea typeface="+mn-ea"/>
+                          <a:cs typeface="+mn-cs"/>
+                        </a:rPr>
+                        <a:t>D</a:t>
+                      </a:r>
+                    </a:p>
+                  </a:txBody>
+                  <a:tcPr marL="168812" marR="0" marT="0" marB="0" anchor="ctr">
+                    <a:lnL>
+                      <a:noFill/>
+                    </a:lnL>
+                    <a:lnR>
+                      <a:noFill/>
+                    </a:lnR>
+                    <a:lnT w="9525" cap="flat" cmpd="sng" algn="ctr">
+                      <a:solidFill>
+                        <a:schemeClr val="bg2"/>
+                      </a:solidFill>
+                      <a:prstDash val="solid"/>
+                      <a:round/>
+                      <a:headEnd type="none" w="med" len="med"/>
+                      <a:tailEnd type="none" w="med" len="med"/>
+                    </a:lnT>
+                    <a:lnB w="9525" cap="flat" cmpd="sng" algn="ctr">
+                      <a:solidFill>
+                        <a:schemeClr val="bg2"/>
                       </a:solidFill>
                       <a:prstDash val="solid"/>
                       <a:round/>
@@ -15027,18 +16458,18 @@
                     <a:lnR cap="flat">
                       <a:noFill/>
                     </a:lnR>
-                    <a:lnT w="6350" cap="flat" cmpd="sng" algn="ctr">
-                      <a:solidFill>
-                        <a:srgbClr val="DBD5CD"/>
+                    <a:lnT w="9525" cap="flat" cmpd="sng" algn="ctr">
+                      <a:solidFill>
+                        <a:schemeClr val="bg2"/>
                       </a:solidFill>
                       <a:prstDash val="solid"/>
                       <a:round/>
                       <a:headEnd type="none" w="med" len="med"/>
                       <a:tailEnd type="none" w="med" len="med"/>
                     </a:lnT>
-                    <a:lnB w="6350" cap="flat" cmpd="sng" algn="ctr">
-                      <a:solidFill>
-                        <a:srgbClr val="DBD5CD"/>
+                    <a:lnB w="9525" cap="flat" cmpd="sng" algn="ctr">
+                      <a:solidFill>
+                        <a:schemeClr val="bg2"/>
                       </a:solidFill>
                       <a:prstDash val="solid"/>
                       <a:round/>
@@ -15201,18 +16632,18 @@
                     <a:lnR cap="flat">
                       <a:noFill/>
                     </a:lnR>
-                    <a:lnT w="6350" cap="flat" cmpd="sng" algn="ctr">
-                      <a:solidFill>
-                        <a:srgbClr val="DBD5CD"/>
+                    <a:lnT w="9525" cap="flat" cmpd="sng" algn="ctr">
+                      <a:solidFill>
+                        <a:schemeClr val="bg2"/>
                       </a:solidFill>
                       <a:prstDash val="solid"/>
                       <a:round/>
                       <a:headEnd type="none" w="med" len="med"/>
                       <a:tailEnd type="none" w="med" len="med"/>
                     </a:lnT>
-                    <a:lnB w="6350" cap="flat" cmpd="sng" algn="ctr">
-                      <a:solidFill>
-                        <a:srgbClr val="DBD5CD"/>
+                    <a:lnB w="9525" cap="flat" cmpd="sng" algn="ctr">
+                      <a:solidFill>
+                        <a:schemeClr val="bg2"/>
                       </a:solidFill>
                       <a:prstDash val="solid"/>
                       <a:round/>
@@ -15232,7 +16663,7 @@
                 </a:tc>
                 <a:extLst>
                   <a:ext uri="{0D108BD9-81ED-4DB2-BD59-A6C34878D82A}">
-                    <a16:rowId xmlns:a16="http://schemas.microsoft.com/office/drawing/2014/main" val="2943688724"/>
+                    <a16:rowId xmlns:a16="http://schemas.microsoft.com/office/drawing/2014/main" val="3264908770"/>
                   </a:ext>
                 </a:extLst>
               </a:tr>
@@ -15295,9 +16726,9 @@
                     <a:lnR>
                       <a:noFill/>
                     </a:lnR>
-                    <a:lnT w="6350" cap="flat" cmpd="sng" algn="ctr">
-                      <a:solidFill>
-                        <a:srgbClr val="DBD5CD"/>
+                    <a:lnT w="9525" cap="flat" cmpd="sng" algn="ctr">
+                      <a:solidFill>
+                        <a:schemeClr val="bg2"/>
                       </a:solidFill>
                       <a:prstDash val="solid"/>
                       <a:round/>
@@ -15515,7 +16946,7 @@
                           <a:ea typeface="+mn-ea"/>
                           <a:cs typeface="+mn-cs"/>
                         </a:rPr>
-                        <a:t>(Ticker3)</a:t>
+                        <a:t>(Ticker5)</a:t>
                       </a:r>
                     </a:p>
                     <a:p>
@@ -15553,7 +16984,7 @@
                           <a:ea typeface="+mn-ea"/>
                           <a:cs typeface="+mn-cs"/>
                         </a:rPr>
-                        <a:t>Country3</a:t>
+                        <a:t>Country5</a:t>
                       </a:r>
                     </a:p>
                   </a:txBody>
@@ -15564,9 +16995,9 @@
                     <a:lnR>
                       <a:noFill/>
                     </a:lnR>
-                    <a:lnT w="6350" cap="flat" cmpd="sng" algn="ctr">
-                      <a:solidFill>
-                        <a:srgbClr val="DBD5CD"/>
+                    <a:lnT w="9525" cap="flat" cmpd="sng" algn="ctr">
+                      <a:solidFill>
+                        <a:schemeClr val="bg2"/>
                       </a:solidFill>
                       <a:prstDash val="solid"/>
                       <a:round/>
@@ -15640,16 +17071,12 @@
                     <a:lnL>
                       <a:noFill/>
                     </a:lnL>
-                    <a:lnR w="12700" cap="flat" cmpd="sng" algn="ctr">
-                      <a:noFill/>
-                      <a:prstDash val="solid"/>
-                      <a:round/>
-                      <a:headEnd type="none" w="med" len="med"/>
-                      <a:tailEnd type="none" w="med" len="med"/>
+                    <a:lnR>
+                      <a:noFill/>
                     </a:lnR>
-                    <a:lnT w="6350" cap="flat" cmpd="sng" algn="ctr">
-                      <a:solidFill>
-                        <a:srgbClr val="DBD5CD"/>
+                    <a:lnT w="9525" cap="flat" cmpd="sng" algn="ctr">
+                      <a:solidFill>
+                        <a:schemeClr val="bg2"/>
                       </a:solidFill>
                       <a:prstDash val="solid"/>
                       <a:round/>
@@ -15673,690 +17100,6 @@
                     </a:lnBlToTr>
                     <a:solidFill>
                       <a:srgbClr val="FFFFFF"/>
-                    </a:solidFill>
-                  </a:tcPr>
-                </a:tc>
-                <a:tc>
-                  <a:txBody>
-                    <a:bodyPr/>
-                    <a:lstStyle/>
-                    <a:p>
-                      <a:pPr marL="0" marR="0" lvl="0" indent="0" algn="ctr" defTabSz="914395" rtl="0" eaLnBrk="1" fontAlgn="t" latinLnBrk="0" hangingPunct="1">
-                        <a:lnSpc>
-                          <a:spcPct val="100000"/>
-                        </a:lnSpc>
-                        <a:spcBef>
-                          <a:spcPts val="0"/>
-                        </a:spcBef>
-                        <a:spcAft>
-                          <a:spcPts val="0"/>
-                        </a:spcAft>
-                        <a:buClrTx/>
-                        <a:buSzTx/>
-                        <a:buFontTx/>
-                        <a:buNone/>
-                        <a:tabLst/>
-                        <a:defRPr/>
-                      </a:pPr>
-                      <a:r>
-                        <a:rPr kumimoji="0" lang="en-US" sz="2200" b="1" i="0" u="none" strike="noStrike" kern="1200" cap="none" spc="0" normalizeH="0" baseline="0" noProof="0" dirty="0">
-                          <a:ln>
-                            <a:noFill/>
-                          </a:ln>
-                          <a:solidFill>
-                            <a:srgbClr val="C00000"/>
-                          </a:solidFill>
-                          <a:effectLst/>
-                          <a:uLnTx/>
-                          <a:uFillTx/>
-                          <a:latin typeface="+mn-lt"/>
-                          <a:ea typeface="+mn-ea"/>
-                          <a:cs typeface="Arial"/>
-                          <a:sym typeface="Wingdings" panose="05000000000000000000" pitchFamily="2" charset="2"/>
-                        </a:rPr>
-                        <a:t></a:t>
-                      </a:r>
-                      <a:endParaRPr kumimoji="0" lang="en-US" sz="2200" b="0" i="0" u="none" strike="noStrike" kern="1200" cap="none" spc="0" normalizeH="0" baseline="0" noProof="0" dirty="0">
-                        <a:ln>
-                          <a:noFill/>
-                        </a:ln>
-                        <a:solidFill>
-                          <a:srgbClr val="FF0000"/>
-                        </a:solidFill>
-                        <a:effectLst/>
-                        <a:uLnTx/>
-                        <a:uFillTx/>
-                        <a:latin typeface="+mn-lt"/>
-                        <a:ea typeface="+mn-ea"/>
-                        <a:cs typeface="+mn-cs"/>
-                      </a:endParaRPr>
-                    </a:p>
-                  </a:txBody>
-                  <a:tcPr marL="0" marR="0" marT="0" marB="0" anchor="ctr">
-                    <a:lnL>
-                      <a:noFill/>
-                    </a:lnL>
-                    <a:lnR cap="flat">
-                      <a:noFill/>
-                    </a:lnR>
-                    <a:lnT w="6350" cap="flat" cmpd="sng" algn="ctr">
-                      <a:solidFill>
-                        <a:srgbClr val="DBD5CD"/>
-                      </a:solidFill>
-                      <a:prstDash val="solid"/>
-                      <a:round/>
-                      <a:headEnd type="none" w="med" len="med"/>
-                      <a:tailEnd type="none" w="med" len="med"/>
-                    </a:lnT>
-                    <a:lnB w="9525" cap="flat" cmpd="sng" algn="ctr">
-                      <a:solidFill>
-                        <a:schemeClr val="bg2"/>
-                      </a:solidFill>
-                      <a:prstDash val="solid"/>
-                      <a:round/>
-                      <a:headEnd type="none" w="med" len="med"/>
-                      <a:tailEnd type="none" w="med" len="med"/>
-                    </a:lnB>
-                    <a:lnTlToBr>
-                      <a:noFill/>
-                    </a:lnTlToBr>
-                    <a:lnBlToTr>
-                      <a:noFill/>
-                    </a:lnBlToTr>
-                    <a:solidFill>
-                      <a:srgbClr val="FFFFFF"/>
-                    </a:solidFill>
-                  </a:tcPr>
-                </a:tc>
-                <a:tc>
-                  <a:txBody>
-                    <a:bodyPr/>
-                    <a:lstStyle/>
-                    <a:p>
-                      <a:pPr marL="0" marR="0" lvl="0" indent="0" algn="ctr" defTabSz="914395" rtl="0" eaLnBrk="1" fontAlgn="t" latinLnBrk="0" hangingPunct="1">
-                        <a:lnSpc>
-                          <a:spcPct val="100000"/>
-                        </a:lnSpc>
-                        <a:spcBef>
-                          <a:spcPts val="0"/>
-                        </a:spcBef>
-                        <a:spcAft>
-                          <a:spcPts val="0"/>
-                        </a:spcAft>
-                        <a:buClrTx/>
-                        <a:buSzTx/>
-                        <a:buFontTx/>
-                        <a:buNone/>
-                        <a:tabLst/>
-                        <a:defRPr/>
-                      </a:pPr>
-                      <a:r>
-                        <a:rPr kumimoji="0" lang="en-US" sz="700" b="1" i="0" u="none" strike="noStrike" kern="1200" cap="none" spc="0" normalizeH="0" baseline="0" noProof="0" dirty="0">
-                          <a:ln>
-                            <a:noFill/>
-                          </a:ln>
-                          <a:solidFill>
-                            <a:srgbClr val="003B4C"/>
-                          </a:solidFill>
-                          <a:effectLst/>
-                          <a:uLnTx/>
-                          <a:uFillTx/>
-                          <a:latin typeface="+mn-lt"/>
-                          <a:ea typeface="+mn-ea"/>
-                          <a:cs typeface="+mn-cs"/>
-                        </a:rPr>
-                        <a:t>Acquisitions:</a:t>
-                      </a:r>
-                      <a:endParaRPr kumimoji="0" lang="en-US" sz="700" b="0" i="0" u="none" strike="noStrike" kern="1200" cap="none" spc="0" normalizeH="0" baseline="0" noProof="0" dirty="0">
-                        <a:ln>
-                          <a:noFill/>
-                        </a:ln>
-                        <a:solidFill>
-                          <a:srgbClr val="003B4C"/>
-                        </a:solidFill>
-                        <a:effectLst/>
-                        <a:uLnTx/>
-                        <a:uFillTx/>
-                        <a:latin typeface="+mn-lt"/>
-                        <a:ea typeface="+mn-ea"/>
-                        <a:cs typeface="+mn-cs"/>
-                      </a:endParaRPr>
-                    </a:p>
-                    <a:p>
-                      <a:pPr marL="0" marR="0" lvl="0" indent="0" algn="ctr" defTabSz="914395" rtl="0" eaLnBrk="1" fontAlgn="t" latinLnBrk="0" hangingPunct="1">
-                        <a:lnSpc>
-                          <a:spcPct val="100000"/>
-                        </a:lnSpc>
-                        <a:spcBef>
-                          <a:spcPts val="0"/>
-                        </a:spcBef>
-                        <a:spcAft>
-                          <a:spcPts val="0"/>
-                        </a:spcAft>
-                        <a:buClrTx/>
-                        <a:buSzTx/>
-                        <a:buFontTx/>
-                        <a:buNone/>
-                        <a:tabLst/>
-                        <a:defRPr/>
-                      </a:pPr>
-                      <a:endParaRPr kumimoji="0" lang="en-US" sz="700" b="0" i="0" u="none" strike="noStrike" kern="1200" cap="none" spc="0" normalizeH="0" baseline="0" noProof="0" dirty="0">
-                        <a:ln>
-                          <a:noFill/>
-                        </a:ln>
-                        <a:solidFill>
-                          <a:srgbClr val="003B4C"/>
-                        </a:solidFill>
-                        <a:effectLst/>
-                        <a:uLnTx/>
-                        <a:uFillTx/>
-                        <a:latin typeface="+mn-lt"/>
-                        <a:ea typeface="+mn-ea"/>
-                        <a:cs typeface="+mn-cs"/>
-                      </a:endParaRPr>
-                    </a:p>
-                    <a:p>
-                      <a:pPr marL="0" marR="0" lvl="0" indent="0" algn="ctr" defTabSz="914395" rtl="0" eaLnBrk="1" fontAlgn="t" latinLnBrk="0" hangingPunct="1">
-                        <a:lnSpc>
-                          <a:spcPct val="100000"/>
-                        </a:lnSpc>
-                        <a:spcBef>
-                          <a:spcPts val="0"/>
-                        </a:spcBef>
-                        <a:spcAft>
-                          <a:spcPts val="0"/>
-                        </a:spcAft>
-                        <a:buClrTx/>
-                        <a:buSzTx/>
-                        <a:buFontTx/>
-                        <a:buNone/>
-                        <a:tabLst/>
-                        <a:defRPr/>
-                      </a:pPr>
-                      <a:r>
-                        <a:rPr kumimoji="0" lang="en-US" sz="700" b="1" i="0" u="none" strike="noStrike" kern="1200" cap="none" spc="0" normalizeH="0" baseline="0" noProof="0" dirty="0">
-                          <a:ln>
-                            <a:noFill/>
-                          </a:ln>
-                          <a:solidFill>
-                            <a:srgbClr val="003B4C"/>
-                          </a:solidFill>
-                          <a:effectLst/>
-                          <a:uLnTx/>
-                          <a:uFillTx/>
-                          <a:latin typeface="+mn-lt"/>
-                          <a:ea typeface="+mn-ea"/>
-                          <a:cs typeface="+mn-cs"/>
-                        </a:rPr>
-                        <a:t>Companies:</a:t>
-                      </a:r>
-                      <a:endParaRPr kumimoji="0" lang="en-US" sz="700" b="0" i="0" u="none" strike="noStrike" kern="1200" cap="none" spc="0" normalizeH="0" baseline="0" noProof="0" dirty="0">
-                        <a:ln>
-                          <a:noFill/>
-                        </a:ln>
-                        <a:solidFill>
-                          <a:srgbClr val="003B4C"/>
-                        </a:solidFill>
-                        <a:effectLst/>
-                        <a:uLnTx/>
-                        <a:uFillTx/>
-                        <a:latin typeface="+mn-lt"/>
-                        <a:ea typeface="+mn-ea"/>
-                        <a:cs typeface="+mn-cs"/>
-                      </a:endParaRPr>
-                    </a:p>
-                  </a:txBody>
-                  <a:tcPr marL="0" marR="0" marT="0" marB="0" anchor="ctr">
-                    <a:lnL>
-                      <a:noFill/>
-                    </a:lnL>
-                    <a:lnR cap="flat">
-                      <a:noFill/>
-                    </a:lnR>
-                    <a:lnT w="6350" cap="flat" cmpd="sng" algn="ctr">
-                      <a:solidFill>
-                        <a:srgbClr val="DBD5CD"/>
-                      </a:solidFill>
-                      <a:prstDash val="solid"/>
-                      <a:round/>
-                      <a:headEnd type="none" w="med" len="med"/>
-                      <a:tailEnd type="none" w="med" len="med"/>
-                    </a:lnT>
-                    <a:lnB w="9525" cap="flat" cmpd="sng" algn="ctr">
-                      <a:solidFill>
-                        <a:schemeClr val="bg2"/>
-                      </a:solidFill>
-                      <a:prstDash val="solid"/>
-                      <a:round/>
-                      <a:headEnd type="none" w="med" len="med"/>
-                      <a:tailEnd type="none" w="med" len="med"/>
-                    </a:lnB>
-                    <a:lnTlToBr>
-                      <a:noFill/>
-                    </a:lnTlToBr>
-                    <a:lnBlToTr>
-                      <a:noFill/>
-                    </a:lnBlToTr>
-                    <a:solidFill>
-                      <a:srgbClr val="FFFFFF"/>
-                    </a:solidFill>
-                  </a:tcPr>
-                </a:tc>
-                <a:extLst>
-                  <a:ext uri="{0D108BD9-81ED-4DB2-BD59-A6C34878D82A}">
-                    <a16:rowId xmlns:a16="http://schemas.microsoft.com/office/drawing/2014/main" val="10003"/>
-                  </a:ext>
-                </a:extLst>
-              </a:tr>
-              <a:tr h="755473">
-                <a:tc>
-                  <a:txBody>
-                    <a:bodyPr/>
-                    <a:lstStyle/>
-                    <a:p>
-                      <a:pPr marL="0" marR="0" lvl="0" indent="0" algn="ctr" defTabSz="958850" rtl="0" eaLnBrk="1" fontAlgn="base" latinLnBrk="0" hangingPunct="1">
-                        <a:lnSpc>
-                          <a:spcPct val="100000"/>
-                        </a:lnSpc>
-                        <a:spcBef>
-                          <a:spcPct val="0"/>
-                        </a:spcBef>
-                        <a:spcAft>
-                          <a:spcPct val="0"/>
-                        </a:spcAft>
-                        <a:buClr>
-                          <a:srgbClr val="000080"/>
-                        </a:buClr>
-                        <a:buSzTx/>
-                        <a:buFont typeface="Wingdings" pitchFamily="2" charset="2"/>
-                        <a:buNone/>
-                        <a:tabLst/>
-                        <a:defRPr/>
-                      </a:pPr>
-                      <a:r>
-                        <a:rPr kumimoji="0" lang="en-US" sz="600" b="1" i="0" u="none" strike="noStrike" kern="1200" cap="none" spc="0" normalizeH="0" baseline="0" noProof="0" dirty="0">
-                          <a:ln>
-                            <a:noFill/>
-                          </a:ln>
-                          <a:solidFill>
-                            <a:srgbClr val="003B4C"/>
-                          </a:solidFill>
-                          <a:effectLst/>
-                          <a:uLnTx/>
-                          <a:uFillTx/>
-                          <a:latin typeface="Arial" panose="020B0604020202020204" pitchFamily="34" charset="0"/>
-                          <a:ea typeface="+mn-ea"/>
-                          <a:cs typeface="+mn-cs"/>
-                        </a:rPr>
-                        <a:t>#</a:t>
-                      </a:r>
-                      <a:endParaRPr lang="en-US" sz="600" b="1" i="0" u="none" kern="1200" noProof="0" dirty="0">
-                        <a:solidFill>
-                          <a:schemeClr val="tx2"/>
-                        </a:solidFill>
-                        <a:latin typeface="Arial" panose="020B0604020202020204" pitchFamily="34" charset="0"/>
-                        <a:ea typeface="+mn-ea"/>
-                        <a:cs typeface="+mn-cs"/>
-                      </a:endParaRPr>
-                    </a:p>
-                  </a:txBody>
-                  <a:tcPr marL="0" marR="84406" marT="0" marB="0" anchor="ctr" horzOverflow="overflow">
-                    <a:lnL cap="flat">
-                      <a:noFill/>
-                    </a:lnL>
-                    <a:lnR>
-                      <a:noFill/>
-                    </a:lnR>
-                    <a:lnT w="9525" cap="flat" cmpd="sng" algn="ctr">
-                      <a:solidFill>
-                        <a:schemeClr val="bg2"/>
-                      </a:solidFill>
-                      <a:prstDash val="solid"/>
-                      <a:round/>
-                      <a:headEnd type="none" w="med" len="med"/>
-                      <a:tailEnd type="none" w="med" len="med"/>
-                    </a:lnT>
-                    <a:lnB w="9525" cap="flat" cmpd="sng" algn="ctr">
-                      <a:solidFill>
-                        <a:schemeClr val="bg2"/>
-                      </a:solidFill>
-                      <a:prstDash val="solid"/>
-                      <a:round/>
-                      <a:headEnd type="none" w="med" len="med"/>
-                      <a:tailEnd type="none" w="med" len="med"/>
-                    </a:lnB>
-                    <a:lnTlToBr>
-                      <a:noFill/>
-                    </a:lnTlToBr>
-                    <a:lnBlToTr>
-                      <a:noFill/>
-                    </a:lnBlToTr>
-                    <a:solidFill>
-                      <a:srgbClr val="F0F5F7"/>
-                    </a:solidFill>
-                  </a:tcPr>
-                </a:tc>
-                <a:tc>
-                  <a:txBody>
-                    <a:bodyPr/>
-                    <a:lstStyle/>
-                    <a:p>
-                      <a:pPr marL="0" marR="0" lvl="0" indent="0" algn="l" defTabSz="958850" rtl="0" eaLnBrk="1" fontAlgn="base" latinLnBrk="0" hangingPunct="1">
-                        <a:lnSpc>
-                          <a:spcPct val="100000"/>
-                        </a:lnSpc>
-                        <a:spcBef>
-                          <a:spcPct val="0"/>
-                        </a:spcBef>
-                        <a:spcAft>
-                          <a:spcPct val="0"/>
-                        </a:spcAft>
-                        <a:buClr>
-                          <a:srgbClr val="000080"/>
-                        </a:buClr>
-                        <a:buSzTx/>
-                        <a:buFont typeface="Wingdings" pitchFamily="2" charset="2"/>
-                        <a:buNone/>
-                        <a:tabLst/>
-                        <a:defRPr/>
-                      </a:pPr>
-                      <a:endParaRPr lang="en-US" sz="700" b="0" i="0" u="none" kern="1200" noProof="0" dirty="0">
-                        <a:solidFill>
-                          <a:schemeClr val="tx2"/>
-                        </a:solidFill>
-                        <a:highlight>
-                          <a:srgbClr val="FFFF00"/>
-                        </a:highlight>
-                        <a:latin typeface="Arial" panose="020B0604020202020204" pitchFamily="34" charset="0"/>
-                        <a:ea typeface="+mn-ea"/>
-                        <a:cs typeface="+mn-cs"/>
-                      </a:endParaRPr>
-                    </a:p>
-                    <a:p>
-                      <a:pPr marL="0" marR="0" lvl="0" indent="0" algn="l" defTabSz="958850" rtl="0" eaLnBrk="1" fontAlgn="base" latinLnBrk="0" hangingPunct="1">
-                        <a:lnSpc>
-                          <a:spcPct val="100000"/>
-                        </a:lnSpc>
-                        <a:spcBef>
-                          <a:spcPct val="0"/>
-                        </a:spcBef>
-                        <a:spcAft>
-                          <a:spcPct val="0"/>
-                        </a:spcAft>
-                        <a:buClr>
-                          <a:srgbClr val="000080"/>
-                        </a:buClr>
-                        <a:buSzTx/>
-                        <a:buFont typeface="Wingdings" pitchFamily="2" charset="2"/>
-                        <a:buNone/>
-                        <a:tabLst/>
-                        <a:defRPr/>
-                      </a:pPr>
-                      <a:endParaRPr lang="en-US" sz="700" b="0" i="0" u="none" kern="1200" noProof="0" dirty="0">
-                        <a:solidFill>
-                          <a:schemeClr val="tx2"/>
-                        </a:solidFill>
-                        <a:highlight>
-                          <a:srgbClr val="FFFF00"/>
-                        </a:highlight>
-                        <a:latin typeface="Arial" panose="020B0604020202020204" pitchFamily="34" charset="0"/>
-                        <a:ea typeface="+mn-ea"/>
-                        <a:cs typeface="+mn-cs"/>
-                      </a:endParaRPr>
-                    </a:p>
-                    <a:p>
-                      <a:pPr marL="0" marR="0" lvl="0" indent="0" algn="l" defTabSz="958850" rtl="0" eaLnBrk="1" fontAlgn="base" latinLnBrk="0" hangingPunct="1">
-                        <a:lnSpc>
-                          <a:spcPct val="100000"/>
-                        </a:lnSpc>
-                        <a:spcBef>
-                          <a:spcPct val="0"/>
-                        </a:spcBef>
-                        <a:spcAft>
-                          <a:spcPct val="0"/>
-                        </a:spcAft>
-                        <a:buClr>
-                          <a:srgbClr val="000080"/>
-                        </a:buClr>
-                        <a:buSzTx/>
-                        <a:buFont typeface="Wingdings" pitchFamily="2" charset="2"/>
-                        <a:buNone/>
-                        <a:tabLst/>
-                        <a:defRPr/>
-                      </a:pPr>
-                      <a:endParaRPr lang="en-US" sz="700" b="0" i="0" u="none" kern="1200" noProof="0" dirty="0">
-                        <a:solidFill>
-                          <a:schemeClr val="tx2"/>
-                        </a:solidFill>
-                        <a:highlight>
-                          <a:srgbClr val="FFFF00"/>
-                        </a:highlight>
-                        <a:latin typeface="Arial" panose="020B0604020202020204" pitchFamily="34" charset="0"/>
-                        <a:ea typeface="+mn-ea"/>
-                        <a:cs typeface="+mn-cs"/>
-                      </a:endParaRPr>
-                    </a:p>
-                    <a:p>
-                      <a:pPr marL="0" marR="0" lvl="0" indent="0" algn="l" defTabSz="958850" rtl="0" eaLnBrk="1" fontAlgn="base" latinLnBrk="0" hangingPunct="1">
-                        <a:lnSpc>
-                          <a:spcPct val="100000"/>
-                        </a:lnSpc>
-                        <a:spcBef>
-                          <a:spcPct val="0"/>
-                        </a:spcBef>
-                        <a:spcAft>
-                          <a:spcPct val="0"/>
-                        </a:spcAft>
-                        <a:buClr>
-                          <a:srgbClr val="000080"/>
-                        </a:buClr>
-                        <a:buSzTx/>
-                        <a:buFont typeface="Wingdings" pitchFamily="2" charset="2"/>
-                        <a:buNone/>
-                        <a:tabLst/>
-                        <a:defRPr/>
-                      </a:pPr>
-                      <a:endParaRPr lang="en-US" sz="700" b="0" i="0" u="none" kern="1200" noProof="0" dirty="0">
-                        <a:solidFill>
-                          <a:schemeClr val="tx2"/>
-                        </a:solidFill>
-                        <a:highlight>
-                          <a:srgbClr val="FFFF00"/>
-                        </a:highlight>
-                        <a:latin typeface="Arial" panose="020B0604020202020204" pitchFamily="34" charset="0"/>
-                        <a:ea typeface="+mn-ea"/>
-                        <a:cs typeface="+mn-cs"/>
-                      </a:endParaRPr>
-                    </a:p>
-                    <a:p>
-                      <a:pPr marL="0" marR="0" lvl="0" indent="0" algn="l" defTabSz="958850" rtl="0" eaLnBrk="1" fontAlgn="base" latinLnBrk="0" hangingPunct="1">
-                        <a:lnSpc>
-                          <a:spcPct val="100000"/>
-                        </a:lnSpc>
-                        <a:spcBef>
-                          <a:spcPct val="0"/>
-                        </a:spcBef>
-                        <a:spcAft>
-                          <a:spcPct val="0"/>
-                        </a:spcAft>
-                        <a:buClr>
-                          <a:srgbClr val="000080"/>
-                        </a:buClr>
-                        <a:buSzTx/>
-                        <a:buFont typeface="Wingdings" pitchFamily="2" charset="2"/>
-                        <a:buNone/>
-                        <a:tabLst/>
-                        <a:defRPr/>
-                      </a:pPr>
-                      <a:r>
-                        <a:rPr kumimoji="0" lang="en-US" sz="700" b="0" i="0" u="none" strike="noStrike" kern="1200" cap="none" spc="0" normalizeH="0" baseline="0" noProof="0" dirty="0">
-                          <a:ln>
-                            <a:noFill/>
-                          </a:ln>
-                          <a:solidFill>
-                            <a:srgbClr val="003B4C"/>
-                          </a:solidFill>
-                          <a:effectLst/>
-                          <a:uLnTx/>
-                          <a:uFillTx/>
-                          <a:latin typeface="Arial" panose="020B0604020202020204" pitchFamily="34" charset="0"/>
-                          <a:ea typeface="+mn-ea"/>
-                          <a:cs typeface="+mn-cs"/>
-                        </a:rPr>
-                        <a:t>(Ticker4)</a:t>
-                      </a:r>
-                    </a:p>
-                    <a:p>
-                      <a:pPr marL="0" marR="0" lvl="0" indent="0" algn="l" defTabSz="958850" rtl="0" eaLnBrk="1" fontAlgn="base" latinLnBrk="0" hangingPunct="1">
-                        <a:lnSpc>
-                          <a:spcPct val="100000"/>
-                        </a:lnSpc>
-                        <a:spcBef>
-                          <a:spcPct val="0"/>
-                        </a:spcBef>
-                        <a:spcAft>
-                          <a:spcPct val="0"/>
-                        </a:spcAft>
-                        <a:buClr>
-                          <a:srgbClr val="000080"/>
-                        </a:buClr>
-                        <a:buSzTx/>
-                        <a:buFont typeface="Wingdings" pitchFamily="2" charset="2"/>
-                        <a:buNone/>
-                        <a:tabLst/>
-                        <a:defRPr/>
-                      </a:pPr>
-                      <a:r>
-                        <a:rPr kumimoji="0" lang="en-US" sz="700" b="0" i="0" u="none" strike="noStrike" kern="1200" cap="none" spc="0" normalizeH="0" baseline="0" noProof="0" dirty="0">
-                          <a:ln>
-                            <a:noFill/>
-                          </a:ln>
-                          <a:solidFill>
-                            <a:srgbClr val="003B4C"/>
-                          </a:solidFill>
-                          <a:effectLst/>
-                          <a:uLnTx/>
-                          <a:uFillTx/>
-                          <a:latin typeface="Arial" panose="020B0604020202020204" pitchFamily="34" charset="0"/>
-                          <a:ea typeface="+mn-ea"/>
-                          <a:cs typeface="+mn-cs"/>
-                        </a:rPr>
-                        <a:t>Country4</a:t>
-                      </a:r>
-                    </a:p>
-                  </a:txBody>
-                  <a:tcPr marL="0" marR="84406" marT="0" marB="0" anchor="ctr" horzOverflow="overflow">
-                    <a:lnL cap="flat">
-                      <a:noFill/>
-                    </a:lnL>
-                    <a:lnR>
-                      <a:noFill/>
-                    </a:lnR>
-                    <a:lnT w="9525" cap="flat" cmpd="sng" algn="ctr">
-                      <a:solidFill>
-                        <a:schemeClr val="bg2"/>
-                      </a:solidFill>
-                      <a:prstDash val="solid"/>
-                      <a:round/>
-                      <a:headEnd type="none" w="med" len="med"/>
-                      <a:tailEnd type="none" w="med" len="med"/>
-                    </a:lnT>
-                    <a:lnB w="9525" cap="flat" cmpd="sng" algn="ctr">
-                      <a:solidFill>
-                        <a:schemeClr val="bg2"/>
-                      </a:solidFill>
-                      <a:prstDash val="solid"/>
-                      <a:round/>
-                      <a:headEnd type="none" w="med" len="med"/>
-                      <a:tailEnd type="none" w="med" len="med"/>
-                    </a:lnB>
-                    <a:lnTlToBr>
-                      <a:noFill/>
-                    </a:lnTlToBr>
-                    <a:lnBlToTr>
-                      <a:noFill/>
-                    </a:lnBlToTr>
-                    <a:solidFill>
-                      <a:srgbClr val="F0F5F7"/>
-                    </a:solidFill>
-                  </a:tcPr>
-                </a:tc>
-                <a:tc>
-                  <a:txBody>
-                    <a:bodyPr/>
-                    <a:lstStyle/>
-                    <a:p>
-                      <a:pPr marL="171450" marR="0" lvl="0" indent="-171450" algn="l" defTabSz="914395" rtl="0" eaLnBrk="1" fontAlgn="t" latinLnBrk="0" hangingPunct="1">
-                        <a:lnSpc>
-                          <a:spcPct val="100000"/>
-                        </a:lnSpc>
-                        <a:spcBef>
-                          <a:spcPts val="0"/>
-                        </a:spcBef>
-                        <a:spcAft>
-                          <a:spcPts val="0"/>
-                        </a:spcAft>
-                        <a:buClr>
-                          <a:srgbClr val="003B4C"/>
-                        </a:buClr>
-                        <a:buSzTx/>
-                        <a:buFont typeface="Wingdings" panose="05000000000000000000" pitchFamily="2" charset="2"/>
-                        <a:buChar char="§"/>
-                        <a:tabLst/>
-                        <a:defRPr/>
-                      </a:pPr>
-                      <a:r>
-                        <a:rPr kumimoji="0" lang="en-US" sz="700" b="0" i="0" u="none" strike="noStrike" kern="1200" cap="none" spc="0" normalizeH="0" baseline="0" noProof="0" dirty="0">
-                          <a:ln>
-                            <a:noFill/>
-                          </a:ln>
-                          <a:solidFill>
-                            <a:srgbClr val="003B4C"/>
-                          </a:solidFill>
-                          <a:effectLst/>
-                          <a:uLnTx/>
-                          <a:uFillTx/>
-                          <a:latin typeface="Arial" panose="020B0604020202020204" pitchFamily="34" charset="0"/>
-                          <a:ea typeface="+mn-ea"/>
-                          <a:cs typeface="+mn-cs"/>
-                        </a:rPr>
-                        <a:t>D</a:t>
-                      </a:r>
-                    </a:p>
-                  </a:txBody>
-                  <a:tcPr marL="168812" marR="0" marT="0" marB="0" anchor="ctr">
-                    <a:lnL>
-                      <a:noFill/>
-                    </a:lnL>
-                    <a:lnR>
-                      <a:noFill/>
-                    </a:lnR>
-                    <a:lnT w="9525" cap="flat" cmpd="sng" algn="ctr">
-                      <a:solidFill>
-                        <a:schemeClr val="bg2"/>
-                      </a:solidFill>
-                      <a:prstDash val="solid"/>
-                      <a:round/>
-                      <a:headEnd type="none" w="med" len="med"/>
-                      <a:tailEnd type="none" w="med" len="med"/>
-                    </a:lnT>
-                    <a:lnB w="9525" cap="flat" cmpd="sng" algn="ctr">
-                      <a:solidFill>
-                        <a:schemeClr val="bg2"/>
-                      </a:solidFill>
-                      <a:prstDash val="solid"/>
-                      <a:round/>
-                      <a:headEnd type="none" w="med" len="med"/>
-                      <a:tailEnd type="none" w="med" len="med"/>
-                    </a:lnB>
-                    <a:lnTlToBr>
-                      <a:noFill/>
-                    </a:lnTlToBr>
-                    <a:lnBlToTr>
-                      <a:noFill/>
-                    </a:lnBlToTr>
-                    <a:solidFill>
-                      <a:srgbClr val="F0F5F7"/>
                     </a:solidFill>
                   </a:tcPr>
                 </a:tc>
@@ -16448,714 +17191,6 @@
                       <a:noFill/>
                     </a:lnBlToTr>
                     <a:solidFill>
-                      <a:srgbClr val="F0F5F7"/>
-                    </a:solidFill>
-                  </a:tcPr>
-                </a:tc>
-                <a:tc>
-                  <a:txBody>
-                    <a:bodyPr/>
-                    <a:lstStyle/>
-                    <a:p>
-                      <a:pPr marL="0" marR="0" lvl="0" indent="0" algn="ctr" defTabSz="914395" rtl="0" eaLnBrk="1" fontAlgn="t" latinLnBrk="0" hangingPunct="1">
-                        <a:lnSpc>
-                          <a:spcPct val="100000"/>
-                        </a:lnSpc>
-                        <a:spcBef>
-                          <a:spcPts val="0"/>
-                        </a:spcBef>
-                        <a:spcAft>
-                          <a:spcPts val="0"/>
-                        </a:spcAft>
-                        <a:buClrTx/>
-                        <a:buSzTx/>
-                        <a:buFontTx/>
-                        <a:buNone/>
-                        <a:tabLst/>
-                        <a:defRPr/>
-                      </a:pPr>
-                      <a:r>
-                        <a:rPr kumimoji="0" lang="en-US" sz="700" b="1" i="0" u="none" strike="noStrike" kern="1200" cap="none" spc="0" normalizeH="0" baseline="0" noProof="0" dirty="0">
-                          <a:ln>
-                            <a:noFill/>
-                          </a:ln>
-                          <a:solidFill>
-                            <a:srgbClr val="003B4C"/>
-                          </a:solidFill>
-                          <a:effectLst/>
-                          <a:uLnTx/>
-                          <a:uFillTx/>
-                          <a:latin typeface="+mn-lt"/>
-                          <a:ea typeface="+mn-ea"/>
-                          <a:cs typeface="+mn-cs"/>
-                        </a:rPr>
-                        <a:t>Acquisitions:</a:t>
-                      </a:r>
-                      <a:endParaRPr kumimoji="0" lang="en-US" sz="700" b="0" i="0" u="none" strike="noStrike" kern="1200" cap="none" spc="0" normalizeH="0" baseline="0" noProof="0" dirty="0">
-                        <a:ln>
-                          <a:noFill/>
-                        </a:ln>
-                        <a:solidFill>
-                          <a:srgbClr val="003B4C"/>
-                        </a:solidFill>
-                        <a:effectLst/>
-                        <a:uLnTx/>
-                        <a:uFillTx/>
-                        <a:latin typeface="+mn-lt"/>
-                        <a:ea typeface="+mn-ea"/>
-                        <a:cs typeface="+mn-cs"/>
-                      </a:endParaRPr>
-                    </a:p>
-                    <a:p>
-                      <a:pPr marL="0" marR="0" lvl="0" indent="0" algn="ctr" defTabSz="914395" rtl="0" eaLnBrk="1" fontAlgn="t" latinLnBrk="0" hangingPunct="1">
-                        <a:lnSpc>
-                          <a:spcPct val="100000"/>
-                        </a:lnSpc>
-                        <a:spcBef>
-                          <a:spcPts val="0"/>
-                        </a:spcBef>
-                        <a:spcAft>
-                          <a:spcPts val="0"/>
-                        </a:spcAft>
-                        <a:buClrTx/>
-                        <a:buSzTx/>
-                        <a:buFontTx/>
-                        <a:buNone/>
-                        <a:tabLst/>
-                        <a:defRPr/>
-                      </a:pPr>
-                      <a:endParaRPr kumimoji="0" lang="en-US" sz="700" b="0" i="0" u="none" strike="noStrike" kern="1200" cap="none" spc="0" normalizeH="0" baseline="0" noProof="0" dirty="0">
-                        <a:ln>
-                          <a:noFill/>
-                        </a:ln>
-                        <a:solidFill>
-                          <a:srgbClr val="003B4C"/>
-                        </a:solidFill>
-                        <a:effectLst/>
-                        <a:uLnTx/>
-                        <a:uFillTx/>
-                        <a:latin typeface="+mn-lt"/>
-                        <a:ea typeface="+mn-ea"/>
-                        <a:cs typeface="+mn-cs"/>
-                      </a:endParaRPr>
-                    </a:p>
-                    <a:p>
-                      <a:pPr marL="0" marR="0" lvl="0" indent="0" algn="ctr" defTabSz="914395" rtl="0" eaLnBrk="1" fontAlgn="t" latinLnBrk="0" hangingPunct="1">
-                        <a:lnSpc>
-                          <a:spcPct val="100000"/>
-                        </a:lnSpc>
-                        <a:spcBef>
-                          <a:spcPts val="0"/>
-                        </a:spcBef>
-                        <a:spcAft>
-                          <a:spcPts val="0"/>
-                        </a:spcAft>
-                        <a:buClrTx/>
-                        <a:buSzTx/>
-                        <a:buFontTx/>
-                        <a:buNone/>
-                        <a:tabLst/>
-                        <a:defRPr/>
-                      </a:pPr>
-                      <a:r>
-                        <a:rPr kumimoji="0" lang="en-US" sz="700" b="1" i="0" u="none" strike="noStrike" kern="1200" cap="none" spc="0" normalizeH="0" baseline="0" noProof="0" dirty="0">
-                          <a:ln>
-                            <a:noFill/>
-                          </a:ln>
-                          <a:solidFill>
-                            <a:srgbClr val="003B4C"/>
-                          </a:solidFill>
-                          <a:effectLst/>
-                          <a:uLnTx/>
-                          <a:uFillTx/>
-                          <a:latin typeface="+mn-lt"/>
-                          <a:ea typeface="+mn-ea"/>
-                          <a:cs typeface="+mn-cs"/>
-                        </a:rPr>
-                        <a:t>Companies:</a:t>
-                      </a:r>
-                      <a:endParaRPr kumimoji="0" lang="en-US" sz="700" b="0" i="0" u="none" strike="noStrike" kern="1200" cap="none" spc="0" normalizeH="0" baseline="0" noProof="0" dirty="0">
-                        <a:ln>
-                          <a:noFill/>
-                        </a:ln>
-                        <a:solidFill>
-                          <a:srgbClr val="003B4C"/>
-                        </a:solidFill>
-                        <a:effectLst/>
-                        <a:uLnTx/>
-                        <a:uFillTx/>
-                        <a:latin typeface="+mn-lt"/>
-                        <a:ea typeface="+mn-ea"/>
-                        <a:cs typeface="+mn-cs"/>
-                      </a:endParaRPr>
-                    </a:p>
-                  </a:txBody>
-                  <a:tcPr marL="0" marR="0" marT="0" marB="0" anchor="ctr">
-                    <a:lnL>
-                      <a:noFill/>
-                    </a:lnL>
-                    <a:lnR cap="flat">
-                      <a:noFill/>
-                    </a:lnR>
-                    <a:lnT w="9525" cap="flat" cmpd="sng" algn="ctr">
-                      <a:solidFill>
-                        <a:schemeClr val="bg2"/>
-                      </a:solidFill>
-                      <a:prstDash val="solid"/>
-                      <a:round/>
-                      <a:headEnd type="none" w="med" len="med"/>
-                      <a:tailEnd type="none" w="med" len="med"/>
-                    </a:lnT>
-                    <a:lnB w="9525" cap="flat" cmpd="sng" algn="ctr">
-                      <a:solidFill>
-                        <a:schemeClr val="bg2"/>
-                      </a:solidFill>
-                      <a:prstDash val="solid"/>
-                      <a:round/>
-                      <a:headEnd type="none" w="med" len="med"/>
-                      <a:tailEnd type="none" w="med" len="med"/>
-                    </a:lnB>
-                    <a:lnTlToBr>
-                      <a:noFill/>
-                    </a:lnTlToBr>
-                    <a:lnBlToTr>
-                      <a:noFill/>
-                    </a:lnBlToTr>
-                    <a:solidFill>
-                      <a:srgbClr val="F0F5F7"/>
-                    </a:solidFill>
-                  </a:tcPr>
-                </a:tc>
-                <a:extLst>
-                  <a:ext uri="{0D108BD9-81ED-4DB2-BD59-A6C34878D82A}">
-                    <a16:rowId xmlns:a16="http://schemas.microsoft.com/office/drawing/2014/main" val="3264908770"/>
-                  </a:ext>
-                </a:extLst>
-              </a:tr>
-              <a:tr h="755473">
-                <a:tc>
-                  <a:txBody>
-                    <a:bodyPr/>
-                    <a:lstStyle/>
-                    <a:p>
-                      <a:pPr marL="0" marR="0" lvl="0" indent="0" algn="ctr" defTabSz="958850" rtl="0" eaLnBrk="1" fontAlgn="base" latinLnBrk="0" hangingPunct="1">
-                        <a:lnSpc>
-                          <a:spcPct val="100000"/>
-                        </a:lnSpc>
-                        <a:spcBef>
-                          <a:spcPct val="0"/>
-                        </a:spcBef>
-                        <a:spcAft>
-                          <a:spcPct val="0"/>
-                        </a:spcAft>
-                        <a:buClr>
-                          <a:srgbClr val="000080"/>
-                        </a:buClr>
-                        <a:buSzTx/>
-                        <a:buFont typeface="Wingdings" pitchFamily="2" charset="2"/>
-                        <a:buNone/>
-                        <a:tabLst/>
-                        <a:defRPr/>
-                      </a:pPr>
-                      <a:r>
-                        <a:rPr kumimoji="0" lang="en-US" sz="600" b="1" i="0" u="none" strike="noStrike" kern="1200" cap="none" spc="0" normalizeH="0" baseline="0" noProof="0" dirty="0">
-                          <a:ln>
-                            <a:noFill/>
-                          </a:ln>
-                          <a:solidFill>
-                            <a:srgbClr val="003B4C"/>
-                          </a:solidFill>
-                          <a:effectLst/>
-                          <a:uLnTx/>
-                          <a:uFillTx/>
-                          <a:latin typeface="Arial" panose="020B0604020202020204" pitchFamily="34" charset="0"/>
-                          <a:ea typeface="+mn-ea"/>
-                          <a:cs typeface="+mn-cs"/>
-                        </a:rPr>
-                        <a:t>#</a:t>
-                      </a:r>
-                      <a:endParaRPr lang="en-US" sz="600" b="1" i="0" u="none" kern="1200" noProof="0" dirty="0">
-                        <a:solidFill>
-                          <a:schemeClr val="tx2"/>
-                        </a:solidFill>
-                        <a:latin typeface="Arial" panose="020B0604020202020204" pitchFamily="34" charset="0"/>
-                        <a:ea typeface="+mn-ea"/>
-                        <a:cs typeface="+mn-cs"/>
-                      </a:endParaRPr>
-                    </a:p>
-                  </a:txBody>
-                  <a:tcPr marL="0" marR="84406" marT="0" marB="0" anchor="ctr" horzOverflow="overflow">
-                    <a:lnL cap="flat">
-                      <a:noFill/>
-                    </a:lnL>
-                    <a:lnR>
-                      <a:noFill/>
-                    </a:lnR>
-                    <a:lnT w="9525" cap="flat" cmpd="sng" algn="ctr">
-                      <a:solidFill>
-                        <a:schemeClr val="bg2"/>
-                      </a:solidFill>
-                      <a:prstDash val="solid"/>
-                      <a:round/>
-                      <a:headEnd type="none" w="med" len="med"/>
-                      <a:tailEnd type="none" w="med" len="med"/>
-                    </a:lnT>
-                    <a:lnB w="9525" cap="flat" cmpd="sng" algn="ctr">
-                      <a:solidFill>
-                        <a:schemeClr val="bg2"/>
-                      </a:solidFill>
-                      <a:prstDash val="solid"/>
-                      <a:round/>
-                      <a:headEnd type="none" w="med" len="med"/>
-                      <a:tailEnd type="none" w="med" len="med"/>
-                    </a:lnB>
-                    <a:lnTlToBr>
-                      <a:noFill/>
-                    </a:lnTlToBr>
-                    <a:lnBlToTr>
-                      <a:noFill/>
-                    </a:lnBlToTr>
-                    <a:solidFill>
-                      <a:srgbClr val="FFFFFF"/>
-                    </a:solidFill>
-                  </a:tcPr>
-                </a:tc>
-                <a:tc>
-                  <a:txBody>
-                    <a:bodyPr/>
-                    <a:lstStyle/>
-                    <a:p>
-                      <a:pPr marL="0" marR="0" lvl="0" indent="0" algn="l" defTabSz="958850" rtl="0" eaLnBrk="1" fontAlgn="base" latinLnBrk="0" hangingPunct="1">
-                        <a:lnSpc>
-                          <a:spcPct val="100000"/>
-                        </a:lnSpc>
-                        <a:spcBef>
-                          <a:spcPct val="0"/>
-                        </a:spcBef>
-                        <a:spcAft>
-                          <a:spcPct val="0"/>
-                        </a:spcAft>
-                        <a:buClr>
-                          <a:srgbClr val="000080"/>
-                        </a:buClr>
-                        <a:buSzTx/>
-                        <a:buFont typeface="Wingdings" pitchFamily="2" charset="2"/>
-                        <a:buNone/>
-                        <a:tabLst/>
-                        <a:defRPr/>
-                      </a:pPr>
-                      <a:endParaRPr kumimoji="0" lang="en-US" sz="700" b="0" i="0" u="none" strike="noStrike" kern="1200" cap="none" spc="0" normalizeH="0" baseline="0" noProof="0" dirty="0">
-                        <a:ln>
-                          <a:noFill/>
-                        </a:ln>
-                        <a:solidFill>
-                          <a:srgbClr val="003B4C"/>
-                        </a:solidFill>
-                        <a:effectLst/>
-                        <a:highlight>
-                          <a:srgbClr val="FFFF00"/>
-                        </a:highlight>
-                        <a:uLnTx/>
-                        <a:uFillTx/>
-                        <a:latin typeface="Arial" panose="020B0604020202020204" pitchFamily="34" charset="0"/>
-                        <a:ea typeface="+mn-ea"/>
-                        <a:cs typeface="+mn-cs"/>
-                      </a:endParaRPr>
-                    </a:p>
-                    <a:p>
-                      <a:pPr marL="0" marR="0" lvl="0" indent="0" algn="l" defTabSz="958850" rtl="0" eaLnBrk="1" fontAlgn="base" latinLnBrk="0" hangingPunct="1">
-                        <a:lnSpc>
-                          <a:spcPct val="100000"/>
-                        </a:lnSpc>
-                        <a:spcBef>
-                          <a:spcPct val="0"/>
-                        </a:spcBef>
-                        <a:spcAft>
-                          <a:spcPct val="0"/>
-                        </a:spcAft>
-                        <a:buClr>
-                          <a:srgbClr val="000080"/>
-                        </a:buClr>
-                        <a:buSzTx/>
-                        <a:buFont typeface="Wingdings" pitchFamily="2" charset="2"/>
-                        <a:buNone/>
-                        <a:tabLst/>
-                        <a:defRPr/>
-                      </a:pPr>
-                      <a:endParaRPr kumimoji="0" lang="en-US" sz="700" b="0" i="0" u="none" strike="noStrike" kern="1200" cap="none" spc="0" normalizeH="0" baseline="0" noProof="0" dirty="0">
-                        <a:ln>
-                          <a:noFill/>
-                        </a:ln>
-                        <a:solidFill>
-                          <a:srgbClr val="003B4C"/>
-                        </a:solidFill>
-                        <a:effectLst/>
-                        <a:highlight>
-                          <a:srgbClr val="FFFF00"/>
-                        </a:highlight>
-                        <a:uLnTx/>
-                        <a:uFillTx/>
-                        <a:latin typeface="Arial" panose="020B0604020202020204" pitchFamily="34" charset="0"/>
-                        <a:ea typeface="+mn-ea"/>
-                        <a:cs typeface="+mn-cs"/>
-                      </a:endParaRPr>
-                    </a:p>
-                    <a:p>
-                      <a:pPr marL="0" marR="0" lvl="0" indent="0" algn="l" defTabSz="958850" rtl="0" eaLnBrk="1" fontAlgn="base" latinLnBrk="0" hangingPunct="1">
-                        <a:lnSpc>
-                          <a:spcPct val="100000"/>
-                        </a:lnSpc>
-                        <a:spcBef>
-                          <a:spcPct val="0"/>
-                        </a:spcBef>
-                        <a:spcAft>
-                          <a:spcPct val="0"/>
-                        </a:spcAft>
-                        <a:buClr>
-                          <a:srgbClr val="000080"/>
-                        </a:buClr>
-                        <a:buSzTx/>
-                        <a:buFont typeface="Wingdings" pitchFamily="2" charset="2"/>
-                        <a:buNone/>
-                        <a:tabLst/>
-                        <a:defRPr/>
-                      </a:pPr>
-                      <a:endParaRPr kumimoji="0" lang="en-US" sz="700" b="0" i="0" u="none" strike="noStrike" kern="1200" cap="none" spc="0" normalizeH="0" baseline="0" noProof="0" dirty="0">
-                        <a:ln>
-                          <a:noFill/>
-                        </a:ln>
-                        <a:solidFill>
-                          <a:srgbClr val="003B4C"/>
-                        </a:solidFill>
-                        <a:effectLst/>
-                        <a:highlight>
-                          <a:srgbClr val="FFFF00"/>
-                        </a:highlight>
-                        <a:uLnTx/>
-                        <a:uFillTx/>
-                        <a:latin typeface="Arial" panose="020B0604020202020204" pitchFamily="34" charset="0"/>
-                        <a:ea typeface="+mn-ea"/>
-                        <a:cs typeface="+mn-cs"/>
-                      </a:endParaRPr>
-                    </a:p>
-                    <a:p>
-                      <a:pPr marL="0" marR="0" lvl="0" indent="0" algn="l" defTabSz="958850" rtl="0" eaLnBrk="1" fontAlgn="base" latinLnBrk="0" hangingPunct="1">
-                        <a:lnSpc>
-                          <a:spcPct val="100000"/>
-                        </a:lnSpc>
-                        <a:spcBef>
-                          <a:spcPct val="0"/>
-                        </a:spcBef>
-                        <a:spcAft>
-                          <a:spcPct val="0"/>
-                        </a:spcAft>
-                        <a:buClr>
-                          <a:srgbClr val="000080"/>
-                        </a:buClr>
-                        <a:buSzTx/>
-                        <a:buFont typeface="Wingdings" pitchFamily="2" charset="2"/>
-                        <a:buNone/>
-                        <a:tabLst/>
-                        <a:defRPr/>
-                      </a:pPr>
-                      <a:endParaRPr kumimoji="0" lang="en-US" sz="700" b="0" i="0" u="none" strike="noStrike" kern="1200" cap="none" spc="0" normalizeH="0" baseline="0" noProof="0" dirty="0">
-                        <a:ln>
-                          <a:noFill/>
-                        </a:ln>
-                        <a:solidFill>
-                          <a:srgbClr val="003B4C"/>
-                        </a:solidFill>
-                        <a:effectLst/>
-                        <a:highlight>
-                          <a:srgbClr val="FFFF00"/>
-                        </a:highlight>
-                        <a:uLnTx/>
-                        <a:uFillTx/>
-                        <a:latin typeface="Arial" panose="020B0604020202020204" pitchFamily="34" charset="0"/>
-                        <a:ea typeface="+mn-ea"/>
-                        <a:cs typeface="+mn-cs"/>
-                      </a:endParaRPr>
-                    </a:p>
-                    <a:p>
-                      <a:pPr marL="0" marR="0" lvl="0" indent="0" algn="l" defTabSz="958850" rtl="0" eaLnBrk="1" fontAlgn="base" latinLnBrk="0" hangingPunct="1">
-                        <a:lnSpc>
-                          <a:spcPct val="100000"/>
-                        </a:lnSpc>
-                        <a:spcBef>
-                          <a:spcPct val="0"/>
-                        </a:spcBef>
-                        <a:spcAft>
-                          <a:spcPct val="0"/>
-                        </a:spcAft>
-                        <a:buClr>
-                          <a:srgbClr val="000080"/>
-                        </a:buClr>
-                        <a:buSzTx/>
-                        <a:buFont typeface="Wingdings" pitchFamily="2" charset="2"/>
-                        <a:buNone/>
-                        <a:tabLst/>
-                        <a:defRPr/>
-                      </a:pPr>
-                      <a:r>
-                        <a:rPr kumimoji="0" lang="en-US" sz="700" b="0" i="0" u="none" strike="noStrike" kern="1200" cap="none" spc="0" normalizeH="0" baseline="0" noProof="0" dirty="0">
-                          <a:ln>
-                            <a:noFill/>
-                          </a:ln>
-                          <a:solidFill>
-                            <a:srgbClr val="003B4C"/>
-                          </a:solidFill>
-                          <a:effectLst/>
-                          <a:uLnTx/>
-                          <a:uFillTx/>
-                          <a:latin typeface="Arial" panose="020B0604020202020204" pitchFamily="34" charset="0"/>
-                          <a:ea typeface="+mn-ea"/>
-                          <a:cs typeface="+mn-cs"/>
-                        </a:rPr>
-                        <a:t>(Ticker5)</a:t>
-                      </a:r>
-                    </a:p>
-                    <a:p>
-                      <a:pPr marL="0" marR="0" lvl="0" indent="0" algn="l" defTabSz="958850" rtl="0" eaLnBrk="1" fontAlgn="base" latinLnBrk="0" hangingPunct="1">
-                        <a:lnSpc>
-                          <a:spcPct val="100000"/>
-                        </a:lnSpc>
-                        <a:spcBef>
-                          <a:spcPct val="0"/>
-                        </a:spcBef>
-                        <a:spcAft>
-                          <a:spcPct val="0"/>
-                        </a:spcAft>
-                        <a:buClr>
-                          <a:srgbClr val="000080"/>
-                        </a:buClr>
-                        <a:buSzTx/>
-                        <a:buFont typeface="Wingdings" pitchFamily="2" charset="2"/>
-                        <a:buNone/>
-                        <a:tabLst/>
-                        <a:defRPr/>
-                      </a:pPr>
-                      <a:r>
-                        <a:rPr kumimoji="0" lang="en-US" sz="700" b="0" i="0" u="none" strike="noStrike" kern="1200" cap="none" spc="0" normalizeH="0" baseline="0" noProof="0" dirty="0">
-                          <a:ln>
-                            <a:noFill/>
-                          </a:ln>
-                          <a:solidFill>
-                            <a:srgbClr val="003B4C"/>
-                          </a:solidFill>
-                          <a:effectLst/>
-                          <a:uLnTx/>
-                          <a:uFillTx/>
-                          <a:latin typeface="Arial" panose="020B0604020202020204" pitchFamily="34" charset="0"/>
-                          <a:ea typeface="+mn-ea"/>
-                          <a:cs typeface="+mn-cs"/>
-                        </a:rPr>
-                        <a:t>Country5</a:t>
-                      </a:r>
-                    </a:p>
-                  </a:txBody>
-                  <a:tcPr marL="0" marR="84406" marT="0" marB="0" anchor="ctr" horzOverflow="overflow">
-                    <a:lnL cap="flat">
-                      <a:noFill/>
-                    </a:lnL>
-                    <a:lnR>
-                      <a:noFill/>
-                    </a:lnR>
-                    <a:lnT w="9525" cap="flat" cmpd="sng" algn="ctr">
-                      <a:solidFill>
-                        <a:schemeClr val="bg2"/>
-                      </a:solidFill>
-                      <a:prstDash val="solid"/>
-                      <a:round/>
-                      <a:headEnd type="none" w="med" len="med"/>
-                      <a:tailEnd type="none" w="med" len="med"/>
-                    </a:lnT>
-                    <a:lnB w="9525" cap="flat" cmpd="sng" algn="ctr">
-                      <a:solidFill>
-                        <a:schemeClr val="bg2"/>
-                      </a:solidFill>
-                      <a:prstDash val="solid"/>
-                      <a:round/>
-                      <a:headEnd type="none" w="med" len="med"/>
-                      <a:tailEnd type="none" w="med" len="med"/>
-                    </a:lnB>
-                    <a:lnTlToBr>
-                      <a:noFill/>
-                    </a:lnTlToBr>
-                    <a:lnBlToTr>
-                      <a:noFill/>
-                    </a:lnBlToTr>
-                    <a:solidFill>
-                      <a:srgbClr val="FFFFFF"/>
-                    </a:solidFill>
-                  </a:tcPr>
-                </a:tc>
-                <a:tc>
-                  <a:txBody>
-                    <a:bodyPr/>
-                    <a:lstStyle/>
-                    <a:p>
-                      <a:pPr marL="171450" marR="0" lvl="0" indent="-171450" algn="l" defTabSz="914395" rtl="0" eaLnBrk="1" fontAlgn="t" latinLnBrk="0" hangingPunct="1">
-                        <a:lnSpc>
-                          <a:spcPct val="100000"/>
-                        </a:lnSpc>
-                        <a:spcBef>
-                          <a:spcPts val="0"/>
-                        </a:spcBef>
-                        <a:spcAft>
-                          <a:spcPts val="0"/>
-                        </a:spcAft>
-                        <a:buClr>
-                          <a:srgbClr val="003B4C"/>
-                        </a:buClr>
-                        <a:buSzTx/>
-                        <a:buFont typeface="Wingdings" panose="05000000000000000000" pitchFamily="2" charset="2"/>
-                        <a:buChar char="§"/>
-                        <a:tabLst/>
-                        <a:defRPr/>
-                      </a:pPr>
-                      <a:r>
-                        <a:rPr kumimoji="0" lang="en-US" sz="700" b="0" i="0" u="none" strike="noStrike" kern="1200" cap="none" spc="0" normalizeH="0" baseline="0" noProof="0" dirty="0">
-                          <a:ln>
-                            <a:noFill/>
-                          </a:ln>
-                          <a:solidFill>
-                            <a:srgbClr val="003B4C"/>
-                          </a:solidFill>
-                          <a:effectLst/>
-                          <a:uLnTx/>
-                          <a:uFillTx/>
-                          <a:latin typeface="Arial" panose="020B0604020202020204" pitchFamily="34" charset="0"/>
-                          <a:ea typeface="+mn-ea"/>
-                          <a:cs typeface="+mn-cs"/>
-                        </a:rPr>
-                        <a:t>D</a:t>
-                      </a:r>
-                    </a:p>
-                  </a:txBody>
-                  <a:tcPr marL="168812" marR="0" marT="0" marB="0" anchor="ctr">
-                    <a:lnL>
-                      <a:noFill/>
-                    </a:lnL>
-                    <a:lnR>
-                      <a:noFill/>
-                    </a:lnR>
-                    <a:lnT w="9525" cap="flat" cmpd="sng" algn="ctr">
-                      <a:solidFill>
-                        <a:schemeClr val="bg2"/>
-                      </a:solidFill>
-                      <a:prstDash val="solid"/>
-                      <a:round/>
-                      <a:headEnd type="none" w="med" len="med"/>
-                      <a:tailEnd type="none" w="med" len="med"/>
-                    </a:lnT>
-                    <a:lnB w="9525" cap="flat" cmpd="sng" algn="ctr">
-                      <a:solidFill>
-                        <a:schemeClr val="bg2"/>
-                      </a:solidFill>
-                      <a:prstDash val="solid"/>
-                      <a:round/>
-                      <a:headEnd type="none" w="med" len="med"/>
-                      <a:tailEnd type="none" w="med" len="med"/>
-                    </a:lnB>
-                    <a:lnTlToBr>
-                      <a:noFill/>
-                    </a:lnTlToBr>
-                    <a:lnBlToTr>
-                      <a:noFill/>
-                    </a:lnBlToTr>
-                    <a:solidFill>
-                      <a:srgbClr val="FFFFFF"/>
-                    </a:solidFill>
-                  </a:tcPr>
-                </a:tc>
-                <a:tc>
-                  <a:txBody>
-                    <a:bodyPr/>
-                    <a:lstStyle/>
-                    <a:p>
-                      <a:pPr marL="0" marR="0" lvl="0" indent="0" algn="ctr" defTabSz="914395" rtl="0" eaLnBrk="1" fontAlgn="t" latinLnBrk="0" hangingPunct="1">
-                        <a:lnSpc>
-                          <a:spcPct val="100000"/>
-                        </a:lnSpc>
-                        <a:spcBef>
-                          <a:spcPts val="0"/>
-                        </a:spcBef>
-                        <a:spcAft>
-                          <a:spcPts val="0"/>
-                        </a:spcAft>
-                        <a:buClrTx/>
-                        <a:buSzTx/>
-                        <a:buFontTx/>
-                        <a:buNone/>
-                        <a:tabLst/>
-                        <a:defRPr/>
-                      </a:pPr>
-                      <a:r>
-                        <a:rPr kumimoji="0" lang="en-US" sz="2200" b="0" i="0" u="none" strike="noStrike" kern="1200" cap="none" spc="0" normalizeH="0" baseline="0" noProof="0" dirty="0">
-                          <a:ln>
-                            <a:noFill/>
-                          </a:ln>
-                          <a:solidFill>
-                            <a:srgbClr val="00A87E"/>
-                          </a:solidFill>
-                          <a:effectLst/>
-                          <a:uLnTx/>
-                          <a:uFillTx/>
-                          <a:latin typeface="+mn-lt"/>
-                          <a:ea typeface="+mn-ea"/>
-                          <a:cs typeface="+mn-cs"/>
-                          <a:sym typeface="Wingdings"/>
-                        </a:rPr>
-                        <a:t></a:t>
-                      </a:r>
-                      <a:endParaRPr kumimoji="0" lang="en-US" sz="2200" b="0" i="0" u="none" strike="noStrike" kern="1200" cap="none" spc="0" normalizeH="0" baseline="0" noProof="0" dirty="0">
-                        <a:ln>
-                          <a:noFill/>
-                        </a:ln>
-                        <a:solidFill>
-                          <a:srgbClr val="FF0000"/>
-                        </a:solidFill>
-                        <a:effectLst/>
-                        <a:uLnTx/>
-                        <a:uFillTx/>
-                        <a:latin typeface="+mn-lt"/>
-                        <a:ea typeface="+mn-ea"/>
-                        <a:cs typeface="+mn-cs"/>
-                      </a:endParaRPr>
-                    </a:p>
-                  </a:txBody>
-                  <a:tcPr marL="0" marR="0" marT="0" marB="0" anchor="ctr">
-                    <a:lnL>
-                      <a:noFill/>
-                    </a:lnL>
-                    <a:lnR cap="flat">
-                      <a:noFill/>
-                    </a:lnR>
-                    <a:lnT w="9525" cap="flat" cmpd="sng" algn="ctr">
-                      <a:solidFill>
-                        <a:schemeClr val="bg2"/>
-                      </a:solidFill>
-                      <a:prstDash val="solid"/>
-                      <a:round/>
-                      <a:headEnd type="none" w="med" len="med"/>
-                      <a:tailEnd type="none" w="med" len="med"/>
-                    </a:lnT>
-                    <a:lnB w="9525" cap="flat" cmpd="sng" algn="ctr">
-                      <a:solidFill>
-                        <a:schemeClr val="bg2"/>
-                      </a:solidFill>
-                      <a:prstDash val="solid"/>
-                      <a:round/>
-                      <a:headEnd type="none" w="med" len="med"/>
-                      <a:tailEnd type="none" w="med" len="med"/>
-                    </a:lnB>
-                    <a:lnTlToBr>
-                      <a:noFill/>
-                    </a:lnTlToBr>
-                    <a:lnBlToTr>
-                      <a:noFill/>
-                    </a:lnBlToTr>
-                    <a:solidFill>
                       <a:srgbClr val="FFFFFF"/>
                     </a:solidFill>
                   </a:tcPr>
@@ -18040,6 +18075,54 @@
           </a:graphicData>
         </a:graphic>
       </p:graphicFrame>
+      <p:pic>
+        <p:nvPicPr>
+          <p:cNvPr id="4" name="Picture 3" descr="dedalus.png"/>
+          <p:cNvPicPr>
+            <a:picLocks noChangeAspect="1"/>
+          </p:cNvPicPr>
+          <p:nvPr/>
+        </p:nvPicPr>
+        <p:blipFill>
+          <a:blip r:embed="rId2"/>
+          <a:stretch>
+            <a:fillRect/>
+          </a:stretch>
+        </p:blipFill>
+        <p:spPr>
+          <a:xfrm>
+            <a:off x="798213" y="1387592"/>
+            <a:ext cx="1448346" cy="533941"/>
+          </a:xfrm>
+          <a:prstGeom prst="rect">
+            <a:avLst/>
+          </a:prstGeom>
+        </p:spPr>
+      </p:pic>
+      <p:pic>
+        <p:nvPicPr>
+          <p:cNvPr id="5" name="Picture 4" descr="ache.png"/>
+          <p:cNvPicPr>
+            <a:picLocks noChangeAspect="1"/>
+          </p:cNvPicPr>
+          <p:nvPr/>
+        </p:nvPicPr>
+        <p:blipFill>
+          <a:blip r:embed="rId3"/>
+          <a:stretch>
+            <a:fillRect/>
+          </a:stretch>
+        </p:blipFill>
+        <p:spPr>
+          <a:xfrm>
+            <a:off x="798213" y="2148906"/>
+            <a:ext cx="1448346" cy="528831"/>
+          </a:xfrm>
+          <a:prstGeom prst="rect">
+            <a:avLst/>
+          </a:prstGeom>
+        </p:spPr>
+      </p:pic>
     </p:spTree>
   </p:cSld>
   <p:clrMapOvr>

</xml_diff>

<commit_message>
Logo sizing and placement adjustments
</commit_message>
<xml_diff>
--- a/buyers_presentation.pptx
+++ b/buyers_presentation.pptx
@@ -13399,8 +13399,8 @@
         </p:blipFill>
         <p:spPr>
           <a:xfrm>
-            <a:off x="798213" y="1387592"/>
-            <a:ext cx="1448346" cy="533941"/>
+            <a:off x="798213" y="1349454"/>
+            <a:ext cx="1367882" cy="419525"/>
           </a:xfrm>
           <a:prstGeom prst="rect">
             <a:avLst/>
@@ -13423,8 +13423,8 @@
         </p:blipFill>
         <p:spPr>
           <a:xfrm>
-            <a:off x="798213" y="2148906"/>
-            <a:ext cx="1448346" cy="528831"/>
+            <a:off x="798213" y="2111132"/>
+            <a:ext cx="1367882" cy="415510"/>
           </a:xfrm>
           <a:prstGeom prst="rect">
             <a:avLst/>
@@ -13447,8 +13447,8 @@
         </p:blipFill>
         <p:spPr>
           <a:xfrm>
-            <a:off x="798213" y="2904379"/>
-            <a:ext cx="1448346" cy="528831"/>
+            <a:off x="798213" y="2866605"/>
+            <a:ext cx="1367882" cy="415510"/>
           </a:xfrm>
           <a:prstGeom prst="rect">
             <a:avLst/>
@@ -13471,8 +13471,8 @@
         </p:blipFill>
         <p:spPr>
           <a:xfrm>
-            <a:off x="798213" y="3659852"/>
-            <a:ext cx="1448346" cy="528831"/>
+            <a:off x="798213" y="3622078"/>
+            <a:ext cx="1367882" cy="415510"/>
           </a:xfrm>
           <a:prstGeom prst="rect">
             <a:avLst/>
@@ -13495,8 +13495,8 @@
         </p:blipFill>
         <p:spPr>
           <a:xfrm>
-            <a:off x="798213" y="4415325"/>
-            <a:ext cx="1448346" cy="528831"/>
+            <a:off x="798213" y="4377551"/>
+            <a:ext cx="1367882" cy="415510"/>
           </a:xfrm>
           <a:prstGeom prst="rect">
             <a:avLst/>
@@ -15311,7 +15311,7 @@
                           <a:ea typeface="+mn-ea"/>
                           <a:cs typeface="+mn-cs"/>
                         </a:rPr>
-                        <a:t>#</a:t>
+                        <a:t>9</a:t>
                       </a:r>
                       <a:endParaRPr lang="en-US" sz="600" b="1" i="0" u="none" kern="1200" noProof="0" dirty="0">
                         <a:solidFill>
@@ -15550,26 +15550,68 @@
                           <a:ea typeface="+mn-ea"/>
                           <a:cs typeface="+mn-cs"/>
                         </a:rPr>
-                        <a:t>(Ticker3)</a:t>
+                        <a:t>(BVMF:ABCB4)
+Brazil</a:t>
                       </a:r>
                     </a:p>
-                    <a:p>
-                      <a:pPr marL="0" marR="0" lvl="0" indent="0" algn="l" defTabSz="958850" rtl="0" eaLnBrk="1" fontAlgn="base" latinLnBrk="0" hangingPunct="1">
-                        <a:lnSpc>
-                          <a:spcPct val="100000"/>
-                        </a:lnSpc>
-                        <a:spcBef>
-                          <a:spcPct val="0"/>
-                        </a:spcBef>
-                        <a:spcAft>
-                          <a:spcPct val="0"/>
+                  </a:txBody>
+                  <a:tcPr marL="0" marR="84406" marT="0" marB="0" anchor="ctr" horzOverflow="overflow">
+                    <a:lnL cap="flat">
+                      <a:noFill/>
+                    </a:lnL>
+                    <a:lnR>
+                      <a:noFill/>
+                    </a:lnR>
+                    <a:lnT w="6350" cap="flat" cmpd="sng" algn="ctr">
+                      <a:solidFill>
+                        <a:srgbClr val="DBD5CD"/>
+                      </a:solidFill>
+                      <a:prstDash val="solid"/>
+                      <a:round/>
+                      <a:headEnd type="none" w="med" len="med"/>
+                      <a:tailEnd type="none" w="med" len="med"/>
+                    </a:lnT>
+                    <a:lnB w="9525" cap="flat" cmpd="sng" algn="ctr">
+                      <a:solidFill>
+                        <a:schemeClr val="bg2"/>
+                      </a:solidFill>
+                      <a:prstDash val="solid"/>
+                      <a:round/>
+                      <a:headEnd type="none" w="med" len="med"/>
+                      <a:tailEnd type="none" w="med" len="med"/>
+                    </a:lnB>
+                    <a:lnTlToBr>
+                      <a:noFill/>
+                    </a:lnTlToBr>
+                    <a:lnBlToTr>
+                      <a:noFill/>
+                    </a:lnBlToTr>
+                    <a:solidFill>
+                      <a:srgbClr val="FFFFFF"/>
+                    </a:solidFill>
+                  </a:tcPr>
+                </a:tc>
+                <a:tc>
+                  <a:txBody>
+                    <a:bodyPr/>
+                    <a:lstStyle/>
+                    <a:p>
+                      <a:pPr marL="171450" marR="0" lvl="0" indent="-171450" algn="l" defTabSz="914395" rtl="0" eaLnBrk="1" fontAlgn="t" latinLnBrk="0" hangingPunct="1">
+                        <a:lnSpc>
+                          <a:spcPct val="100000"/>
+                        </a:lnSpc>
+                        <a:spcBef>
+                          <a:spcPts val="0"/>
+                        </a:spcBef>
+                        <a:spcAft>
+                          <a:spcPts val="0"/>
                         </a:spcAft>
                         <a:buClr>
-                          <a:srgbClr val="000080"/>
+                          <a:srgbClr val="003B4C"/>
                         </a:buClr>
                         <a:buSzTx/>
-                        <a:buFont typeface="Wingdings" pitchFamily="2" charset="2"/>
-                        <a:buNone/>
+                        <a:buFont typeface="Wingdings" panose="05000000000000000000" pitchFamily="2" charset="2"/>
+                        <a:buChar char="§"/>
                         <a:tabLst/>
                         <a:defRPr/>
                       </a:pPr>
@@ -15588,16 +15630,20 @@
                           <a:ea typeface="+mn-ea"/>
                           <a:cs typeface="+mn-cs"/>
                         </a:rPr>
-                        <a:t>Country3</a:t>
+                        <a:t>Banco ABC Brasil SA operates in the banking sector of Brazil. k is engaged in asset and liability operations inherent to multiple bank activities, being authorized to operate with commercial, foreign exchange, investment, credit and financing and housing financing portfolios.</a:t>
                       </a:r>
                     </a:p>
                   </a:txBody>
-                  <a:tcPr marL="0" marR="84406" marT="0" marB="0" anchor="ctr" horzOverflow="overflow">
-                    <a:lnL cap="flat">
+                  <a:tcPr marL="168812" marR="0" marT="0" marB="0" anchor="ctr">
+                    <a:lnL>
                       <a:noFill/>
                     </a:lnL>
-                    <a:lnR>
-                      <a:noFill/>
+                    <a:lnR w="12700" cap="flat" cmpd="sng" algn="ctr">
+                      <a:noFill/>
+                      <a:prstDash val="solid"/>
+                      <a:round/>
+                      <a:headEnd type="none" w="med" len="med"/>
+                      <a:tailEnd type="none" w="med" len="med"/>
                     </a:lnR>
                     <a:lnT w="6350" cap="flat" cmpd="sng" algn="ctr">
                       <a:solidFill>
@@ -15633,89 +15679,6 @@
                     <a:bodyPr/>
                     <a:lstStyle/>
                     <a:p>
-                      <a:pPr marL="171450" marR="0" lvl="0" indent="-171450" algn="l" defTabSz="914395" rtl="0" eaLnBrk="1" fontAlgn="t" latinLnBrk="0" hangingPunct="1">
-                        <a:lnSpc>
-                          <a:spcPct val="100000"/>
-                        </a:lnSpc>
-                        <a:spcBef>
-                          <a:spcPts val="0"/>
-                        </a:spcBef>
-                        <a:spcAft>
-                          <a:spcPts val="0"/>
-                        </a:spcAft>
-                        <a:buClr>
-                          <a:srgbClr val="003B4C"/>
-                        </a:buClr>
-                        <a:buSzTx/>
-                        <a:buFont typeface="Wingdings" panose="05000000000000000000" pitchFamily="2" charset="2"/>
-                        <a:buChar char="§"/>
-                        <a:tabLst/>
-                        <a:defRPr/>
-                      </a:pPr>
-                      <a:r>
-                        <a:rPr kumimoji="0" lang="en-US" sz="700" b="0" i="0" u="none" strike="noStrike" kern="1200" cap="none" spc="0" normalizeH="0" baseline="0" noProof="0" dirty="0">
-                          <a:ln>
-                            <a:noFill/>
-                          </a:ln>
-                          <a:solidFill>
-                            <a:srgbClr val="003B4C"/>
-                          </a:solidFill>
-                          <a:effectLst/>
-                          <a:uLnTx/>
-                          <a:uFillTx/>
-                          <a:latin typeface="Arial" panose="020B0604020202020204" pitchFamily="34" charset="0"/>
-                          <a:ea typeface="+mn-ea"/>
-                          <a:cs typeface="+mn-cs"/>
-                        </a:rPr>
-                        <a:t>D</a:t>
-                      </a:r>
-                    </a:p>
-                  </a:txBody>
-                  <a:tcPr marL="168812" marR="0" marT="0" marB="0" anchor="ctr">
-                    <a:lnL>
-                      <a:noFill/>
-                    </a:lnL>
-                    <a:lnR w="12700" cap="flat" cmpd="sng" algn="ctr">
-                      <a:noFill/>
-                      <a:prstDash val="solid"/>
-                      <a:round/>
-                      <a:headEnd type="none" w="med" len="med"/>
-                      <a:tailEnd type="none" w="med" len="med"/>
-                    </a:lnR>
-                    <a:lnT w="6350" cap="flat" cmpd="sng" algn="ctr">
-                      <a:solidFill>
-                        <a:srgbClr val="DBD5CD"/>
-                      </a:solidFill>
-                      <a:prstDash val="solid"/>
-                      <a:round/>
-                      <a:headEnd type="none" w="med" len="med"/>
-                      <a:tailEnd type="none" w="med" len="med"/>
-                    </a:lnT>
-                    <a:lnB w="9525" cap="flat" cmpd="sng" algn="ctr">
-                      <a:solidFill>
-                        <a:schemeClr val="bg2"/>
-                      </a:solidFill>
-                      <a:prstDash val="solid"/>
-                      <a:round/>
-                      <a:headEnd type="none" w="med" len="med"/>
-                      <a:tailEnd type="none" w="med" len="med"/>
-                    </a:lnB>
-                    <a:lnTlToBr>
-                      <a:noFill/>
-                    </a:lnTlToBr>
-                    <a:lnBlToTr>
-                      <a:noFill/>
-                    </a:lnBlToTr>
-                    <a:solidFill>
-                      <a:srgbClr val="FFFFFF"/>
-                    </a:solidFill>
-                  </a:tcPr>
-                </a:tc>
-                <a:tc>
-                  <a:txBody>
-                    <a:bodyPr/>
-                    <a:lstStyle/>
-                    <a:p>
                       <a:pPr marL="0" marR="0" lvl="0" indent="0" algn="ctr" defTabSz="914395" rtl="0" eaLnBrk="1" fontAlgn="t" latinLnBrk="0" hangingPunct="1">
                         <a:lnSpc>
                           <a:spcPct val="100000"/>
@@ -15739,7 +15702,7 @@
                             <a:noFill/>
                           </a:ln>
                           <a:solidFill>
-                            <a:srgbClr val="C00000"/>
+                            <a:srgbClr val="00A87E"/>
                           </a:solidFill>
                           <a:effectLst/>
                           <a:uLnTx/>
@@ -15749,7 +15712,7 @@
                           <a:cs typeface="Arial"/>
                           <a:sym typeface="Wingdings" panose="05000000000000000000" pitchFamily="2" charset="2"/>
                         </a:rPr>
-                        <a:t></a:t>
+                        <a:t>✓</a:t>
                       </a:r>
                       <a:endParaRPr kumimoji="0" lang="en-US" sz="2200" b="0" i="0" u="none" strike="noStrike" kern="1200" cap="none" spc="0" normalizeH="0" baseline="0" noProof="0" dirty="0">
                         <a:ln>
@@ -15840,7 +15803,8 @@
                           <a:ea typeface="+mn-ea"/>
                           <a:cs typeface="+mn-cs"/>
                         </a:rPr>
-                        <a:t>Acquisitions:</a:t>
+                        <a:t>Acquisitions: - 
+Companies: nan</a:t>
                       </a:r>
                       <a:endParaRPr kumimoji="0" lang="en-US" sz="700" b="0" i="0" u="none" strike="noStrike" kern="1200" cap="none" spc="0" normalizeH="0" baseline="0" noProof="0" dirty="0">
                         <a:ln>
@@ -15875,56 +15839,6 @@
                         <a:tabLst/>
                         <a:defRPr/>
                       </a:pPr>
-                      <a:endParaRPr kumimoji="0" lang="en-US" sz="700" b="0" i="0" u="none" strike="noStrike" kern="1200" cap="none" spc="0" normalizeH="0" baseline="0" noProof="0" dirty="0">
-                        <a:ln>
-                          <a:noFill/>
-                        </a:ln>
-                        <a:solidFill>
-                          <a:srgbClr val="003B4C"/>
-                        </a:solidFill>
-                        <a:effectLst/>
-                        <a:uLnTx/>
-                        <a:uFillTx/>
-                        <a:latin typeface="+mn-lt"/>
-                        <a:ea typeface="+mn-ea"/>
-                        <a:cs typeface="+mn-cs"/>
-                      </a:endParaRPr>
-                    </a:p>
-                    <a:p>
-                      <a:pPr marL="0" marR="0" lvl="0" indent="0" algn="ctr" defTabSz="914395" rtl="0" eaLnBrk="1" fontAlgn="t" latinLnBrk="0" hangingPunct="1">
-                        <a:lnSpc>
-                          <a:spcPct val="100000"/>
-                        </a:lnSpc>
-                        <a:spcBef>
-                          <a:spcPts val="0"/>
-                        </a:spcBef>
-                        <a:spcAft>
-                          <a:spcPts val="0"/>
-                        </a:spcAft>
-                        <a:buClrTx/>
-                        <a:buSzTx/>
-                        <a:buFontTx/>
-                        <a:buNone/>
-                        <a:tabLst/>
-                        <a:defRPr/>
-                      </a:pPr>
-                      <a:r>
-                        <a:rPr kumimoji="0" lang="en-US" sz="700" b="1" i="0" u="none" strike="noStrike" kern="1200" cap="none" spc="0" normalizeH="0" baseline="0" noProof="0" dirty="0">
-                          <a:ln>
-                            <a:noFill/>
-                          </a:ln>
-                          <a:solidFill>
-                            <a:srgbClr val="003B4C"/>
-                          </a:solidFill>
-                          <a:effectLst/>
-                          <a:uLnTx/>
-                          <a:uFillTx/>
-                          <a:latin typeface="+mn-lt"/>
-                          <a:ea typeface="+mn-ea"/>
-                          <a:cs typeface="+mn-cs"/>
-                        </a:rPr>
-                        <a:t>Companies:</a:t>
-                      </a:r>
                       <a:endParaRPr kumimoji="0" lang="en-US" sz="700" b="0" i="0" u="none" strike="noStrike" kern="1200" cap="none" spc="0" normalizeH="0" baseline="0" noProof="0" dirty="0">
                         <a:ln>
                           <a:noFill/>
@@ -18091,8 +18005,8 @@
         </p:blipFill>
         <p:spPr>
           <a:xfrm>
-            <a:off x="798213" y="1387592"/>
-            <a:ext cx="1448346" cy="533941"/>
+            <a:off x="798213" y="1349454"/>
+            <a:ext cx="1367882" cy="419525"/>
           </a:xfrm>
           <a:prstGeom prst="rect">
             <a:avLst/>
@@ -18115,8 +18029,32 @@
         </p:blipFill>
         <p:spPr>
           <a:xfrm>
-            <a:off x="798213" y="2148906"/>
-            <a:ext cx="1448346" cy="528831"/>
+            <a:off x="798213" y="2111132"/>
+            <a:ext cx="1367882" cy="415510"/>
+          </a:xfrm>
+          <a:prstGeom prst="rect">
+            <a:avLst/>
+          </a:prstGeom>
+        </p:spPr>
+      </p:pic>
+      <p:pic>
+        <p:nvPicPr>
+          <p:cNvPr id="6" name="Picture 5" descr="abcbrasil.png"/>
+          <p:cNvPicPr>
+            <a:picLocks noChangeAspect="1"/>
+          </p:cNvPicPr>
+          <p:nvPr/>
+        </p:nvPicPr>
+        <p:blipFill>
+          <a:blip r:embed="rId4"/>
+          <a:stretch>
+            <a:fillRect/>
+          </a:stretch>
+        </p:blipFill>
+        <p:spPr>
+          <a:xfrm>
+            <a:off x="798213" y="2866605"/>
+            <a:ext cx="1367882" cy="415510"/>
           </a:xfrm>
           <a:prstGeom prst="rect">
             <a:avLst/>

</xml_diff>

<commit_message>
Added run file for external use
</commit_message>
<xml_diff>
--- a/buyers_presentation.pptx
+++ b/buyers_presentation.pptx
@@ -13399,7 +13399,7 @@
         </p:blipFill>
         <p:spPr>
           <a:xfrm>
-            <a:off x="798213" y="1368523"/>
+            <a:off x="798213" y="1364709"/>
             <a:ext cx="1367882" cy="419525"/>
           </a:xfrm>
           <a:prstGeom prst="rect">
@@ -13423,7 +13423,7 @@
         </p:blipFill>
         <p:spPr>
           <a:xfrm>
-            <a:off x="798213" y="2130019"/>
+            <a:off x="798213" y="2126242"/>
             <a:ext cx="1367882" cy="415510"/>
           </a:xfrm>
           <a:prstGeom prst="rect">
@@ -13447,7 +13447,7 @@
         </p:blipFill>
         <p:spPr>
           <a:xfrm>
-            <a:off x="798213" y="2885492"/>
+            <a:off x="798213" y="2881715"/>
             <a:ext cx="1367882" cy="415510"/>
           </a:xfrm>
           <a:prstGeom prst="rect">
@@ -13471,7 +13471,7 @@
         </p:blipFill>
         <p:spPr>
           <a:xfrm>
-            <a:off x="798213" y="3640965"/>
+            <a:off x="798213" y="3637188"/>
             <a:ext cx="1367882" cy="415510"/>
           </a:xfrm>
           <a:prstGeom prst="rect">
@@ -13495,7 +13495,7 @@
         </p:blipFill>
         <p:spPr>
           <a:xfrm>
-            <a:off x="798213" y="4396438"/>
+            <a:off x="798213" y="4392661"/>
             <a:ext cx="1367882" cy="415510"/>
           </a:xfrm>
           <a:prstGeom prst="rect">
@@ -17919,7 +17919,7 @@
         </p:blipFill>
         <p:spPr>
           <a:xfrm>
-            <a:off x="798213" y="1368523"/>
+            <a:off x="798213" y="1364709"/>
             <a:ext cx="1367882" cy="419525"/>
           </a:xfrm>
           <a:prstGeom prst="rect">
@@ -17943,7 +17943,7 @@
         </p:blipFill>
         <p:spPr>
           <a:xfrm>
-            <a:off x="798213" y="2130019"/>
+            <a:off x="798213" y="2126242"/>
             <a:ext cx="1367882" cy="415510"/>
           </a:xfrm>
           <a:prstGeom prst="rect">
@@ -17967,7 +17967,7 @@
         </p:blipFill>
         <p:spPr>
           <a:xfrm>
-            <a:off x="798213" y="2885492"/>
+            <a:off x="798213" y="2881715"/>
             <a:ext cx="1367882" cy="415510"/>
           </a:xfrm>
           <a:prstGeom prst="rect">
@@ -17991,7 +17991,7 @@
         </p:blipFill>
         <p:spPr>
           <a:xfrm>
-            <a:off x="798213" y="3640965"/>
+            <a:off x="798213" y="3637188"/>
             <a:ext cx="1367882" cy="415510"/>
           </a:xfrm>
           <a:prstGeom prst="rect">

</xml_diff>

<commit_message>
new streamlit edits to fit new data
</commit_message>
<xml_diff>
--- a/buyers_presentation.pptx
+++ b/buyers_presentation.pptx
@@ -26850,7 +26850,7 @@
                           <a:ea typeface="+mn-ea"/>
                           <a:cs typeface="+mn-cs"/>
                         </a:rPr>
-                        <a:t>#</a:t>
+                        <a:t>14</a:t>
                       </a:r>
                       <a:endParaRPr lang="en-US" sz="600" b="1" i="0" u="none" kern="1200" noProof="0" dirty="0">
                         <a:solidFill>
@@ -27089,26 +27089,151 @@
                           <a:ea typeface="+mn-ea"/>
                           <a:cs typeface="+mn-cs"/>
                         </a:rPr>
-                        <a:t>(Ticker2)</a:t>
+                        <a:t>(NYS:MMM)
+United States</a:t>
                       </a:r>
                     </a:p>
-                    <a:p>
-                      <a:pPr marL="0" marR="0" lvl="0" indent="0" algn="l" defTabSz="958850" rtl="0" eaLnBrk="1" fontAlgn="base" latinLnBrk="0" hangingPunct="1">
-                        <a:lnSpc>
-                          <a:spcPct val="100000"/>
-                        </a:lnSpc>
-                        <a:spcBef>
-                          <a:spcPct val="0"/>
-                        </a:spcBef>
-                        <a:spcAft>
-                          <a:spcPct val="0"/>
-                        </a:spcAft>
-                        <a:buClr>
-                          <a:srgbClr val="000080"/>
-                        </a:buClr>
-                        <a:buSzTx/>
-                        <a:buFont typeface="Wingdings" pitchFamily="2" charset="2"/>
-                        <a:buNone/>
+                  </a:txBody>
+                  <a:tcPr marL="0" marR="84406" marT="0" marB="0" anchor="ctr" horzOverflow="overflow">
+                    <a:lnL cap="flat">
+                      <a:noFill/>
+                    </a:lnL>
+                    <a:lnR>
+                      <a:noFill/>
+                    </a:lnR>
+                    <a:lnT w="6350" cap="flat" cmpd="sng" algn="ctr">
+                      <a:solidFill>
+                        <a:srgbClr val="DBD5CD"/>
+                      </a:solidFill>
+                      <a:prstDash val="solid"/>
+                      <a:round/>
+                      <a:headEnd type="none" w="med" len="med"/>
+                      <a:tailEnd type="none" w="med" len="med"/>
+                    </a:lnT>
+                    <a:lnB w="6350" cap="flat" cmpd="sng" algn="ctr">
+                      <a:solidFill>
+                        <a:srgbClr val="DBD5CD"/>
+                      </a:solidFill>
+                      <a:prstDash val="solid"/>
+                      <a:round/>
+                      <a:headEnd type="none" w="med" len="med"/>
+                      <a:tailEnd type="none" w="med" len="med"/>
+                    </a:lnB>
+                    <a:lnTlToBr>
+                      <a:noFill/>
+                    </a:lnTlToBr>
+                    <a:lnBlToTr>
+                      <a:noFill/>
+                    </a:lnBlToTr>
+                    <a:solidFill>
+                      <a:srgbClr val="F0F5F7"/>
+                    </a:solidFill>
+                  </a:tcPr>
+                </a:tc>
+                <a:tc>
+                  <a:txBody>
+                    <a:bodyPr/>
+                    <a:lstStyle/>
+                    <a:p>
+                      <a:pPr marL="0" marR="0" lvl="0" indent="0" algn="l" defTabSz="914395" rtl="0" eaLnBrk="1" fontAlgn="t" latinLnBrk="0" hangingPunct="1">
+                        <a:lnSpc>
+                          <a:spcPct val="100000"/>
+                        </a:lnSpc>
+                        <a:spcBef>
+                          <a:spcPts val="0"/>
+                        </a:spcBef>
+                        <a:spcAft>
+                          <a:spcPts val="0"/>
+                        </a:spcAft>
+                        <a:buClr>
+                          <a:srgbClr val="003B4C"/>
+                        </a:buClr>
+                        <a:buSzTx/>
+                        <a:buFont typeface="Wingdings" panose="05000000000000000000" pitchFamily="2" charset="2"/>
+                        <a:buNone/>
+                        <a:tabLst/>
+                        <a:defRPr/>
+                      </a:pPr>
+                      <a:r>
+                        <a:rPr kumimoji="0" lang="en-GB" sz="700" b="0" i="0" u="none" strike="noStrike" kern="1200" cap="none" spc="0" normalizeH="0" baseline="0" noProof="0" dirty="0">
+                          <a:ln>
+                            <a:noFill/>
+                          </a:ln>
+                          <a:solidFill>
+                            <a:srgbClr val="003B4C"/>
+                          </a:solidFill>
+                          <a:effectLst/>
+                          <a:uLnTx/>
+                          <a:uFillTx/>
+                          <a:latin typeface="Arial" panose="020B0604020202020204" pitchFamily="34" charset="0"/>
+                          <a:ea typeface="+mn-ea"/>
+                          <a:cs typeface="+mn-cs"/>
+                        </a:rPr>
+                        <a:t>Revenue: 1,211.41
+EBITDA: -651.33
+Market Cap: 266.31
+Total Debt: XXX
+FTE: nan</a:t>
+                      </a:r>
+                    </a:p>
+                  </a:txBody>
+                  <a:tcPr marL="168812" marR="0" marT="0" marB="0" anchor="ctr">
+                    <a:lnL>
+                      <a:noFill/>
+                    </a:lnL>
+                    <a:lnR>
+                      <a:noFill/>
+                    </a:lnR>
+                    <a:lnT w="6350" cap="flat" cmpd="sng" algn="ctr">
+                      <a:solidFill>
+                        <a:srgbClr val="DBD5CD"/>
+                      </a:solidFill>
+                      <a:prstDash val="solid"/>
+                      <a:round/>
+                      <a:headEnd type="none" w="med" len="med"/>
+                      <a:tailEnd type="none" w="med" len="med"/>
+                    </a:lnT>
+                    <a:lnB w="6350" cap="flat" cmpd="sng" algn="ctr">
+                      <a:solidFill>
+                        <a:srgbClr val="DBD5CD"/>
+                      </a:solidFill>
+                      <a:prstDash val="solid"/>
+                      <a:round/>
+                      <a:headEnd type="none" w="med" len="med"/>
+                      <a:tailEnd type="none" w="med" len="med"/>
+                    </a:lnB>
+                    <a:lnTlToBr>
+                      <a:noFill/>
+                    </a:lnTlToBr>
+                    <a:lnBlToTr>
+                      <a:noFill/>
+                    </a:lnBlToTr>
+                    <a:solidFill>
+                      <a:srgbClr val="F0F5F7"/>
+                    </a:solidFill>
+                  </a:tcPr>
+                </a:tc>
+                <a:tc>
+                  <a:txBody>
+                    <a:bodyPr/>
+                    <a:lstStyle/>
+                    <a:p>
+                      <a:pPr marL="171450" marR="0" lvl="0" indent="-171450" algn="l" defTabSz="914395" rtl="0" eaLnBrk="1" fontAlgn="t" latinLnBrk="0" hangingPunct="1">
+                        <a:lnSpc>
+                          <a:spcPct val="100000"/>
+                        </a:lnSpc>
+                        <a:spcBef>
+                          <a:spcPts val="0"/>
+                        </a:spcBef>
+                        <a:spcAft>
+                          <a:spcPts val="0"/>
+                        </a:spcAft>
+                        <a:buClr>
+                          <a:srgbClr val="003B4C"/>
+                        </a:buClr>
+                        <a:buSzTx/>
+                        <a:buFont typeface="Wingdings" panose="05000000000000000000" pitchFamily="2" charset="2"/>
+                        <a:buChar char="§"/>
                         <a:tabLst/>
                         <a:defRPr/>
                       </a:pPr>
@@ -27127,317 +27252,7 @@
                           <a:ea typeface="+mn-ea"/>
                           <a:cs typeface="+mn-cs"/>
                         </a:rPr>
-                        <a:t>Country2</a:t>
-                      </a:r>
-                    </a:p>
-                  </a:txBody>
-                  <a:tcPr marL="0" marR="84406" marT="0" marB="0" anchor="ctr" horzOverflow="overflow">
-                    <a:lnL cap="flat">
-                      <a:noFill/>
-                    </a:lnL>
-                    <a:lnR>
-                      <a:noFill/>
-                    </a:lnR>
-                    <a:lnT w="6350" cap="flat" cmpd="sng" algn="ctr">
-                      <a:solidFill>
-                        <a:srgbClr val="DBD5CD"/>
-                      </a:solidFill>
-                      <a:prstDash val="solid"/>
-                      <a:round/>
-                      <a:headEnd type="none" w="med" len="med"/>
-                      <a:tailEnd type="none" w="med" len="med"/>
-                    </a:lnT>
-                    <a:lnB w="6350" cap="flat" cmpd="sng" algn="ctr">
-                      <a:solidFill>
-                        <a:srgbClr val="DBD5CD"/>
-                      </a:solidFill>
-                      <a:prstDash val="solid"/>
-                      <a:round/>
-                      <a:headEnd type="none" w="med" len="med"/>
-                      <a:tailEnd type="none" w="med" len="med"/>
-                    </a:lnB>
-                    <a:lnTlToBr>
-                      <a:noFill/>
-                    </a:lnTlToBr>
-                    <a:lnBlToTr>
-                      <a:noFill/>
-                    </a:lnBlToTr>
-                    <a:solidFill>
-                      <a:srgbClr val="F0F5F7"/>
-                    </a:solidFill>
-                  </a:tcPr>
-                </a:tc>
-                <a:tc>
-                  <a:txBody>
-                    <a:bodyPr/>
-                    <a:lstStyle/>
-                    <a:p>
-                      <a:pPr marL="0" marR="0" lvl="0" indent="0" algn="l" defTabSz="914395" rtl="0" eaLnBrk="1" fontAlgn="t" latinLnBrk="0" hangingPunct="1">
-                        <a:lnSpc>
-                          <a:spcPct val="100000"/>
-                        </a:lnSpc>
-                        <a:spcBef>
-                          <a:spcPts val="0"/>
-                        </a:spcBef>
-                        <a:spcAft>
-                          <a:spcPts val="0"/>
-                        </a:spcAft>
-                        <a:buClr>
-                          <a:srgbClr val="003B4C"/>
-                        </a:buClr>
-                        <a:buSzTx/>
-                        <a:buFont typeface="Wingdings" panose="05000000000000000000" pitchFamily="2" charset="2"/>
-                        <a:buNone/>
-                        <a:tabLst/>
-                        <a:defRPr/>
-                      </a:pPr>
-                      <a:r>
-                        <a:rPr kumimoji="0" lang="en-GB" sz="700" b="0" i="0" u="none" strike="noStrike" kern="1200" cap="none" spc="0" normalizeH="0" baseline="0" noProof="0" dirty="0">
-                          <a:ln>
-                            <a:noFill/>
-                          </a:ln>
-                          <a:solidFill>
-                            <a:srgbClr val="003B4C"/>
-                          </a:solidFill>
-                          <a:effectLst/>
-                          <a:uLnTx/>
-                          <a:uFillTx/>
-                          <a:latin typeface="Arial" panose="020B0604020202020204" pitchFamily="34" charset="0"/>
-                          <a:ea typeface="+mn-ea"/>
-                          <a:cs typeface="+mn-cs"/>
-                        </a:rPr>
-                        <a:t>Revenue:</a:t>
-                      </a:r>
-                    </a:p>
-                    <a:p>
-                      <a:pPr marL="0" marR="0" lvl="0" indent="0" algn="l" defTabSz="914395" rtl="0" eaLnBrk="1" fontAlgn="t" latinLnBrk="0" hangingPunct="1">
-                        <a:lnSpc>
-                          <a:spcPct val="100000"/>
-                        </a:lnSpc>
-                        <a:spcBef>
-                          <a:spcPts val="0"/>
-                        </a:spcBef>
-                        <a:spcAft>
-                          <a:spcPts val="0"/>
-                        </a:spcAft>
-                        <a:buClr>
-                          <a:srgbClr val="003B4C"/>
-                        </a:buClr>
-                        <a:buSzTx/>
-                        <a:buFont typeface="Wingdings" panose="05000000000000000000" pitchFamily="2" charset="2"/>
-                        <a:buNone/>
-                        <a:tabLst/>
-                        <a:defRPr/>
-                      </a:pPr>
-                      <a:r>
-                        <a:rPr kumimoji="0" lang="en-GB" sz="700" b="0" i="0" u="none" strike="noStrike" kern="1200" cap="none" spc="0" normalizeH="0" baseline="0" noProof="0" dirty="0">
-                          <a:ln>
-                            <a:noFill/>
-                          </a:ln>
-                          <a:solidFill>
-                            <a:srgbClr val="003B4C"/>
-                          </a:solidFill>
-                          <a:effectLst/>
-                          <a:uLnTx/>
-                          <a:uFillTx/>
-                          <a:latin typeface="Arial" panose="020B0604020202020204" pitchFamily="34" charset="0"/>
-                          <a:ea typeface="+mn-ea"/>
-                          <a:cs typeface="+mn-cs"/>
-                        </a:rPr>
-                        <a:t>EBITDA:</a:t>
-                      </a:r>
-                    </a:p>
-                    <a:p>
-                      <a:pPr marL="0" marR="0" lvl="0" indent="0" algn="l" defTabSz="914395" rtl="0" eaLnBrk="1" fontAlgn="t" latinLnBrk="0" hangingPunct="1">
-                        <a:lnSpc>
-                          <a:spcPct val="100000"/>
-                        </a:lnSpc>
-                        <a:spcBef>
-                          <a:spcPts val="0"/>
-                        </a:spcBef>
-                        <a:spcAft>
-                          <a:spcPts val="0"/>
-                        </a:spcAft>
-                        <a:buClr>
-                          <a:srgbClr val="003B4C"/>
-                        </a:buClr>
-                        <a:buSzTx/>
-                        <a:buFont typeface="Wingdings" panose="05000000000000000000" pitchFamily="2" charset="2"/>
-                        <a:buNone/>
-                        <a:tabLst/>
-                        <a:defRPr/>
-                      </a:pPr>
-                      <a:r>
-                        <a:rPr kumimoji="0" lang="en-GB" sz="700" b="0" i="0" u="none" strike="noStrike" kern="1200" cap="none" spc="0" normalizeH="0" baseline="0" noProof="0" dirty="0">
-                          <a:ln>
-                            <a:noFill/>
-                          </a:ln>
-                          <a:solidFill>
-                            <a:srgbClr val="003B4C"/>
-                          </a:solidFill>
-                          <a:effectLst/>
-                          <a:uLnTx/>
-                          <a:uFillTx/>
-                          <a:latin typeface="Arial" panose="020B0604020202020204" pitchFamily="34" charset="0"/>
-                          <a:ea typeface="+mn-ea"/>
-                          <a:cs typeface="+mn-cs"/>
-                        </a:rPr>
-                        <a:t>Market Cap:</a:t>
-                      </a:r>
-                    </a:p>
-                    <a:p>
-                      <a:pPr marL="0" marR="0" lvl="0" indent="0" algn="l" defTabSz="914395" rtl="0" eaLnBrk="1" fontAlgn="t" latinLnBrk="0" hangingPunct="1">
-                        <a:lnSpc>
-                          <a:spcPct val="100000"/>
-                        </a:lnSpc>
-                        <a:spcBef>
-                          <a:spcPts val="0"/>
-                        </a:spcBef>
-                        <a:spcAft>
-                          <a:spcPts val="0"/>
-                        </a:spcAft>
-                        <a:buClr>
-                          <a:srgbClr val="003B4C"/>
-                        </a:buClr>
-                        <a:buSzTx/>
-                        <a:buFont typeface="Wingdings" panose="05000000000000000000" pitchFamily="2" charset="2"/>
-                        <a:buNone/>
-                        <a:tabLst/>
-                        <a:defRPr/>
-                      </a:pPr>
-                      <a:r>
-                        <a:rPr kumimoji="0" lang="en-GB" sz="700" b="0" i="0" u="none" strike="noStrike" kern="1200" cap="none" spc="0" normalizeH="0" baseline="0" noProof="0" dirty="0">
-                          <a:ln>
-                            <a:noFill/>
-                          </a:ln>
-                          <a:solidFill>
-                            <a:srgbClr val="003B4C"/>
-                          </a:solidFill>
-                          <a:effectLst/>
-                          <a:uLnTx/>
-                          <a:uFillTx/>
-                          <a:latin typeface="Arial" panose="020B0604020202020204" pitchFamily="34" charset="0"/>
-                          <a:ea typeface="+mn-ea"/>
-                          <a:cs typeface="+mn-cs"/>
-                        </a:rPr>
-                        <a:t>Total Debt:</a:t>
-                      </a:r>
-                    </a:p>
-                    <a:p>
-                      <a:pPr marL="0" marR="0" lvl="0" indent="0" algn="l" defTabSz="914395" rtl="0" eaLnBrk="1" fontAlgn="t" latinLnBrk="0" hangingPunct="1">
-                        <a:lnSpc>
-                          <a:spcPct val="100000"/>
-                        </a:lnSpc>
-                        <a:spcBef>
-                          <a:spcPts val="0"/>
-                        </a:spcBef>
-                        <a:spcAft>
-                          <a:spcPts val="0"/>
-                        </a:spcAft>
-                        <a:buClr>
-                          <a:srgbClr val="003B4C"/>
-                        </a:buClr>
-                        <a:buSzTx/>
-                        <a:buFont typeface="Wingdings" panose="05000000000000000000" pitchFamily="2" charset="2"/>
-                        <a:buNone/>
-                        <a:tabLst/>
-                        <a:defRPr/>
-                      </a:pPr>
-                      <a:r>
-                        <a:rPr kumimoji="0" lang="en-GB" sz="700" b="0" i="0" u="none" strike="noStrike" kern="1200" cap="none" spc="0" normalizeH="0" baseline="0" noProof="0" dirty="0">
-                          <a:ln>
-                            <a:noFill/>
-                          </a:ln>
-                          <a:solidFill>
-                            <a:srgbClr val="003B4C"/>
-                          </a:solidFill>
-                          <a:effectLst/>
-                          <a:uLnTx/>
-                          <a:uFillTx/>
-                          <a:latin typeface="Arial" panose="020B0604020202020204" pitchFamily="34" charset="0"/>
-                          <a:ea typeface="+mn-ea"/>
-                          <a:cs typeface="+mn-cs"/>
-                        </a:rPr>
-                        <a:t>FTE:</a:t>
-                      </a:r>
-                    </a:p>
-                  </a:txBody>
-                  <a:tcPr marL="168812" marR="0" marT="0" marB="0" anchor="ctr">
-                    <a:lnL>
-                      <a:noFill/>
-                    </a:lnL>
-                    <a:lnR>
-                      <a:noFill/>
-                    </a:lnR>
-                    <a:lnT w="6350" cap="flat" cmpd="sng" algn="ctr">
-                      <a:solidFill>
-                        <a:srgbClr val="DBD5CD"/>
-                      </a:solidFill>
-                      <a:prstDash val="solid"/>
-                      <a:round/>
-                      <a:headEnd type="none" w="med" len="med"/>
-                      <a:tailEnd type="none" w="med" len="med"/>
-                    </a:lnT>
-                    <a:lnB w="6350" cap="flat" cmpd="sng" algn="ctr">
-                      <a:solidFill>
-                        <a:srgbClr val="DBD5CD"/>
-                      </a:solidFill>
-                      <a:prstDash val="solid"/>
-                      <a:round/>
-                      <a:headEnd type="none" w="med" len="med"/>
-                      <a:tailEnd type="none" w="med" len="med"/>
-                    </a:lnB>
-                    <a:lnTlToBr>
-                      <a:noFill/>
-                    </a:lnTlToBr>
-                    <a:lnBlToTr>
-                      <a:noFill/>
-                    </a:lnBlToTr>
-                    <a:solidFill>
-                      <a:srgbClr val="F0F5F7"/>
-                    </a:solidFill>
-                  </a:tcPr>
-                </a:tc>
-                <a:tc>
-                  <a:txBody>
-                    <a:bodyPr/>
-                    <a:lstStyle/>
-                    <a:p>
-                      <a:pPr marL="171450" marR="0" lvl="0" indent="-171450" algn="l" defTabSz="914395" rtl="0" eaLnBrk="1" fontAlgn="t" latinLnBrk="0" hangingPunct="1">
-                        <a:lnSpc>
-                          <a:spcPct val="100000"/>
-                        </a:lnSpc>
-                        <a:spcBef>
-                          <a:spcPts val="0"/>
-                        </a:spcBef>
-                        <a:spcAft>
-                          <a:spcPts val="0"/>
-                        </a:spcAft>
-                        <a:buClr>
-                          <a:srgbClr val="003B4C"/>
-                        </a:buClr>
-                        <a:buSzTx/>
-                        <a:buFont typeface="Wingdings" panose="05000000000000000000" pitchFamily="2" charset="2"/>
-                        <a:buChar char="§"/>
-                        <a:tabLst/>
-                        <a:defRPr/>
-                      </a:pPr>
-                      <a:r>
-                        <a:rPr kumimoji="0" lang="en-US" sz="700" b="0" i="0" u="none" strike="noStrike" kern="1200" cap="none" spc="0" normalizeH="0" baseline="0" noProof="0" dirty="0">
-                          <a:ln>
-                            <a:noFill/>
-                          </a:ln>
-                          <a:solidFill>
-                            <a:srgbClr val="003B4C"/>
-                          </a:solidFill>
-                          <a:effectLst/>
-                          <a:uLnTx/>
-                          <a:uFillTx/>
-                          <a:latin typeface="Arial" panose="020B0604020202020204" pitchFamily="34" charset="0"/>
-                          <a:ea typeface="+mn-ea"/>
-                          <a:cs typeface="+mn-cs"/>
-                        </a:rPr>
-                        <a:t>D</a:t>
+                        <a:t>3M, a multinational conglomerate founded in 1902, sells tens of thousands of products ranging from sponges to respirators. The firm is well known for its extensive research and development capabilities, and it is a pioneer in inventing new use cases for its proprietary technologies. 3M is organized across three business segments: safety and industrial (representing around 44% of revenue), transportation and electronics (36%), and consumer (20%). The firm recently spun off its healthcare business, now known as Solventum. Nearly half of 3M's revenue comes from outside the Americas.</a:t>
                       </a:r>
                     </a:p>
                   </a:txBody>
@@ -27515,7 +27330,7 @@
                           <a:cs typeface="+mn-cs"/>
                           <a:sym typeface="Wingdings"/>
                         </a:rPr>
-                        <a:t></a:t>
+                        <a:t>✓</a:t>
                       </a:r>
                       <a:endParaRPr kumimoji="0" lang="en-US" sz="2200" b="0" i="0" u="none" strike="noStrike" kern="1200" cap="none" spc="0" normalizeH="0" baseline="0" noProof="0" dirty="0">
                         <a:ln>
@@ -27606,7 +27421,8 @@
                           <a:ea typeface="+mn-ea"/>
                           <a:cs typeface="+mn-cs"/>
                         </a:rPr>
-                        <a:t>Acquisitions:</a:t>
+                        <a:t>Acquisitions: 14 
+Companies: Chemours (Fluorosurfactants Business), Klöckner Pentaplast (Healthcare Business), LeanTec (Inventory Management)</a:t>
                       </a:r>
                       <a:endParaRPr kumimoji="0" lang="en-US" sz="700" b="0" i="0" u="none" strike="noStrike" kern="1200" cap="none" spc="0" normalizeH="0" baseline="0" noProof="0" dirty="0">
                         <a:ln>
@@ -27641,56 +27457,6 @@
                         <a:tabLst/>
                         <a:defRPr/>
                       </a:pPr>
-                      <a:endParaRPr kumimoji="0" lang="en-US" sz="700" b="0" i="0" u="none" strike="noStrike" kern="1200" cap="none" spc="0" normalizeH="0" baseline="0" noProof="0" dirty="0">
-                        <a:ln>
-                          <a:noFill/>
-                        </a:ln>
-                        <a:solidFill>
-                          <a:srgbClr val="003B4C"/>
-                        </a:solidFill>
-                        <a:effectLst/>
-                        <a:uLnTx/>
-                        <a:uFillTx/>
-                        <a:latin typeface="+mn-lt"/>
-                        <a:ea typeface="+mn-ea"/>
-                        <a:cs typeface="+mn-cs"/>
-                      </a:endParaRPr>
-                    </a:p>
-                    <a:p>
-                      <a:pPr marL="0" marR="0" lvl="0" indent="0" algn="ctr" defTabSz="914395" rtl="0" eaLnBrk="1" fontAlgn="t" latinLnBrk="0" hangingPunct="1">
-                        <a:lnSpc>
-                          <a:spcPct val="100000"/>
-                        </a:lnSpc>
-                        <a:spcBef>
-                          <a:spcPts val="0"/>
-                        </a:spcBef>
-                        <a:spcAft>
-                          <a:spcPts val="0"/>
-                        </a:spcAft>
-                        <a:buClrTx/>
-                        <a:buSzTx/>
-                        <a:buFontTx/>
-                        <a:buNone/>
-                        <a:tabLst/>
-                        <a:defRPr/>
-                      </a:pPr>
-                      <a:r>
-                        <a:rPr kumimoji="0" lang="en-US" sz="700" b="1" i="0" u="none" strike="noStrike" kern="1200" cap="none" spc="0" normalizeH="0" baseline="0" noProof="0" dirty="0">
-                          <a:ln>
-                            <a:noFill/>
-                          </a:ln>
-                          <a:solidFill>
-                            <a:srgbClr val="003B4C"/>
-                          </a:solidFill>
-                          <a:effectLst/>
-                          <a:uLnTx/>
-                          <a:uFillTx/>
-                          <a:latin typeface="+mn-lt"/>
-                          <a:ea typeface="+mn-ea"/>
-                          <a:cs typeface="+mn-cs"/>
-                        </a:rPr>
-                        <a:t>Companies:</a:t>
-                      </a:r>
                       <a:endParaRPr kumimoji="0" lang="en-US" sz="700" b="0" i="0" u="none" strike="noStrike" kern="1200" cap="none" spc="0" normalizeH="0" baseline="0" noProof="0" dirty="0">
                         <a:ln>
                           <a:noFill/>
@@ -31499,6 +31265,30 @@
           <a:xfrm>
             <a:off x="585274" y="1372337"/>
             <a:ext cx="1030918" cy="381387"/>
+          </a:xfrm>
+          <a:prstGeom prst="rect">
+            <a:avLst/>
+          </a:prstGeom>
+        </p:spPr>
+      </p:pic>
+      <p:pic>
+        <p:nvPicPr>
+          <p:cNvPr id="5" name="Picture 4" descr="mmm.png"/>
+          <p:cNvPicPr>
+            <a:picLocks noChangeAspect="1"/>
+          </p:cNvPicPr>
+          <p:nvPr/>
+        </p:nvPicPr>
+        <p:blipFill>
+          <a:blip r:embed="rId3"/>
+          <a:stretch>
+            <a:fillRect/>
+          </a:stretch>
+        </p:blipFill>
+        <p:spPr>
+          <a:xfrm>
+            <a:off x="585274" y="2133797"/>
+            <a:ext cx="1030918" cy="377736"/>
           </a:xfrm>
           <a:prstGeom prst="rect">
             <a:avLst/>

</xml_diff>

<commit_message>
removed old exe to build two separate
</commit_message>
<xml_diff>
--- a/buyers_presentation.pptx
+++ b/buyers_presentation.pptx
@@ -27089,8 +27089,8 @@
                           <a:ea typeface="+mn-ea"/>
                           <a:cs typeface="+mn-cs"/>
                         </a:rPr>
-                        <a:t>(NYS:MMM)
-United States</a:t>
+                        <a:t>(OSL:ATEA)
+Norway</a:t>
                       </a:r>
                     </a:p>
                   </a:txBody>
@@ -27252,7 +27252,7 @@
                           <a:ea typeface="+mn-ea"/>
                           <a:cs typeface="+mn-cs"/>
                         </a:rPr>
-                        <a:t>3M, a multinational conglomerate founded in 1902, sells tens of thousands of products ranging from sponges to respirators. The firm is well known for its extensive research and development capabilities, and it is a pioneer in inventing new use cases for its proprietary technologies. 3M is organized across three business segments: safety and industrial (representing around 44% of revenue), transportation and electronics (36%), and consumer (20%). The firm recently spun off its healthcare business, now known as Solventum. Nearly half of 3M's revenue comes from outside the Americas.</a:t>
+                        <a:t>Atea ASA is a Norway-based company that provides IT infrastructure and system integration services to customers. The company's product and services portfolio includes the sale of products such as third-party hardware and software, mobile device management and security software, and maintenance and operation of IT infrastructure services for companies, among others. The company operations are divided into six business segments based on geographical areas and services: Norway, Sweden, Denmark, Finland, The Baltics, and Shared Services. The firm generates the majority of its revenue in Sweden.</a:t>
                       </a:r>
                     </a:p>
                   </a:txBody>
@@ -27320,7 +27320,7 @@
                             <a:noFill/>
                           </a:ln>
                           <a:solidFill>
-                            <a:srgbClr val="00A87E"/>
+                            <a:srgbClr val="C00000"/>
                           </a:solidFill>
                           <a:effectLst/>
                           <a:uLnTx/>
@@ -27330,7 +27330,7 @@
                           <a:cs typeface="+mn-cs"/>
                           <a:sym typeface="Wingdings"/>
                         </a:rPr>
-                        <a:t>✓</a:t>
+                        <a:t>✘</a:t>
                       </a:r>
                       <a:endParaRPr kumimoji="0" lang="en-US" sz="2200" b="0" i="0" u="none" strike="noStrike" kern="1200" cap="none" spc="0" normalizeH="0" baseline="0" noProof="0" dirty="0">
                         <a:ln>
@@ -27421,8 +27421,8 @@
                           <a:ea typeface="+mn-ea"/>
                           <a:cs typeface="+mn-cs"/>
                         </a:rPr>
-                        <a:t>Acquisitions: 14 
-Companies: Chemours (Fluorosurfactants Business), Klöckner Pentaplast (Healthcare Business), LeanTec (Inventory Management)</a:t>
+                        <a:t>Acquisitions: 8 
+Companies: Dropitin, KMD (Hardware and Infrastructure Software Business), Gambit (IT Services)</a:t>
                       </a:r>
                       <a:endParaRPr kumimoji="0" lang="en-US" sz="700" b="0" i="0" u="none" strike="noStrike" kern="1200" cap="none" spc="0" normalizeH="0" baseline="0" noProof="0" dirty="0">
                         <a:ln>
@@ -31273,7 +31273,7 @@
       </p:pic>
       <p:pic>
         <p:nvPicPr>
-          <p:cNvPr id="5" name="Picture 4" descr="mmm.png"/>
+          <p:cNvPr id="5" name="Picture 4" descr="atea.png"/>
           <p:cNvPicPr>
             <a:picLocks noChangeAspect="1"/>
           </p:cNvPicPr>

</xml_diff>

<commit_message>
Added the portugues options for the same templates Refactored helper files to the helpers folder
</commit_message>
<xml_diff>
--- a/buyers_presentation.pptx
+++ b/buyers_presentation.pptx
@@ -15498,7 +15498,7 @@
           <p:nvPr>
             <p:extLst>
               <p:ext uri="{D42A27DB-BD31-4B8C-83A1-F6EECF244321}">
-                <p14:modId xmlns:p14="http://schemas.microsoft.com/office/powerpoint/2010/main" val="3128434163"/>
+                <p14:modId xmlns:p14="http://schemas.microsoft.com/office/powerpoint/2010/main" val="3557598170"/>
               </p:ext>
             </p:extLst>
           </p:nvPr>
@@ -15512,42 +15512,35 @@
             <a:tbl>
               <a:tblPr/>
               <a:tblGrid>
-                <a:gridCol w="341707">
+                <a:gridCol w="506738">
                   <a:extLst>
                     <a:ext uri="{9D8B030D-6E8A-4147-A177-3AD203B41FA5}">
                       <a16:colId xmlns:a16="http://schemas.microsoft.com/office/drawing/2014/main" val="1470184085"/>
                     </a:ext>
                   </a:extLst>
                 </a:gridCol>
-                <a:gridCol w="1085177">
+                <a:gridCol w="1609274">
                   <a:extLst>
                     <a:ext uri="{9D8B030D-6E8A-4147-A177-3AD203B41FA5}">
                       <a16:colId xmlns:a16="http://schemas.microsoft.com/office/drawing/2014/main" val="20000"/>
                     </a:ext>
                   </a:extLst>
                 </a:gridCol>
-                <a:gridCol w="1041296">
-                  <a:extLst>
-                    <a:ext uri="{9D8B030D-6E8A-4147-A177-3AD203B41FA5}">
-                      <a16:colId xmlns:a16="http://schemas.microsoft.com/office/drawing/2014/main" val="3721709830"/>
-                    </a:ext>
-                  </a:extLst>
-                </a:gridCol>
-                <a:gridCol w="4502658">
+                <a:gridCol w="4207126">
                   <a:extLst>
                     <a:ext uri="{9D8B030D-6E8A-4147-A177-3AD203B41FA5}">
                       <a16:colId xmlns:a16="http://schemas.microsoft.com/office/drawing/2014/main" val="20001"/>
                     </a:ext>
                   </a:extLst>
                 </a:gridCol>
-                <a:gridCol w="579609">
+                <a:gridCol w="666750">
                   <a:extLst>
                     <a:ext uri="{9D8B030D-6E8A-4147-A177-3AD203B41FA5}">
                       <a16:colId xmlns:a16="http://schemas.microsoft.com/office/drawing/2014/main" val="2479190757"/>
                     </a:ext>
                   </a:extLst>
                 </a:gridCol>
-                <a:gridCol w="1160671">
+                <a:gridCol w="1721230">
                   <a:extLst>
                     <a:ext uri="{9D8B030D-6E8A-4147-A177-3AD203B41FA5}">
                       <a16:colId xmlns:a16="http://schemas.microsoft.com/office/drawing/2014/main" val="4036884888"/>
@@ -15671,138 +15664,6 @@
                     </a:p>
                   </a:txBody>
                   <a:tcPr marL="0" marR="68580" marT="0" marB="0" anchor="ctr" horzOverflow="overflow">
-                    <a:lnL w="12700" cap="flat" cmpd="sng" algn="ctr">
-                      <a:solidFill>
-                        <a:schemeClr val="bg1">
-                          <a:alpha val="0"/>
-                        </a:schemeClr>
-                      </a:solidFill>
-                      <a:prstDash val="solid"/>
-                      <a:round/>
-                      <a:headEnd type="none" w="med" len="med"/>
-                      <a:tailEnd type="none" w="med" len="med"/>
-                    </a:lnL>
-                    <a:lnR w="12700" cap="flat" cmpd="sng" algn="ctr">
-                      <a:solidFill>
-                        <a:schemeClr val="bg1">
-                          <a:alpha val="0"/>
-                        </a:schemeClr>
-                      </a:solidFill>
-                      <a:prstDash val="solid"/>
-                      <a:round/>
-                      <a:headEnd type="none" w="med" len="med"/>
-                      <a:tailEnd type="none" w="med" len="med"/>
-                    </a:lnR>
-                    <a:lnT cap="flat">
-                      <a:noFill/>
-                    </a:lnT>
-                    <a:lnB w="6350" cap="flat" cmpd="sng" algn="ctr">
-                      <a:solidFill>
-                        <a:srgbClr val="DBD5CD"/>
-                      </a:solidFill>
-                      <a:prstDash val="solid"/>
-                      <a:round/>
-                      <a:headEnd type="none" w="med" len="med"/>
-                      <a:tailEnd type="none" w="med" len="med"/>
-                    </a:lnB>
-                    <a:lnTlToBr>
-                      <a:noFill/>
-                    </a:lnTlToBr>
-                    <a:lnBlToTr>
-                      <a:noFill/>
-                    </a:lnBlToTr>
-                    <a:solidFill>
-                      <a:schemeClr val="tx2"/>
-                    </a:solidFill>
-                  </a:tcPr>
-                </a:tc>
-                <a:tc>
-                  <a:txBody>
-                    <a:bodyPr/>
-                    <a:lstStyle/>
-                    <a:p>
-                      <a:pPr marL="0" marR="0" lvl="0" indent="0" algn="ctr" defTabSz="958850" rtl="0" eaLnBrk="1" fontAlgn="base" latinLnBrk="0" hangingPunct="1">
-                        <a:lnSpc>
-                          <a:spcPct val="100000"/>
-                        </a:lnSpc>
-                        <a:spcBef>
-                          <a:spcPct val="0"/>
-                        </a:spcBef>
-                        <a:spcAft>
-                          <a:spcPts val="0"/>
-                        </a:spcAft>
-                        <a:buClr>
-                          <a:srgbClr val="000080"/>
-                        </a:buClr>
-                        <a:buSzTx/>
-                        <a:buFont typeface="Wingdings" pitchFamily="2" charset="2"/>
-                        <a:buNone/>
-                        <a:tabLst/>
-                        <a:defRPr/>
-                      </a:pPr>
-                      <a:r>
-                        <a:rPr kumimoji="0" lang="en-GB" sz="700" b="1" i="0" u="none" strike="noStrike" cap="none" normalizeH="0" baseline="0" noProof="0">
-                          <a:ln>
-                            <a:noFill/>
-                          </a:ln>
-                          <a:solidFill>
-                            <a:srgbClr val="FFFFFF"/>
-                          </a:solidFill>
-                          <a:effectLst/>
-                          <a:latin typeface="Arial" panose="020B0604020202020204" pitchFamily="34" charset="0"/>
-                        </a:rPr>
-                        <a:t>Financials </a:t>
-                      </a:r>
-                    </a:p>
-                    <a:p>
-                      <a:pPr marL="0" marR="0" lvl="0" indent="0" algn="ctr" defTabSz="958850" rtl="0" eaLnBrk="1" fontAlgn="base" latinLnBrk="0" hangingPunct="1">
-                        <a:lnSpc>
-                          <a:spcPct val="100000"/>
-                        </a:lnSpc>
-                        <a:spcBef>
-                          <a:spcPct val="0"/>
-                        </a:spcBef>
-                        <a:spcAft>
-                          <a:spcPts val="0"/>
-                        </a:spcAft>
-                        <a:buClr>
-                          <a:srgbClr val="000080"/>
-                        </a:buClr>
-                        <a:buSzTx/>
-                        <a:buFont typeface="Wingdings" pitchFamily="2" charset="2"/>
-                        <a:buNone/>
-                        <a:tabLst/>
-                        <a:defRPr/>
-                      </a:pPr>
-                      <a:r>
-                        <a:rPr kumimoji="0" lang="en-GB" sz="700" b="1" i="0" u="none" strike="noStrike" cap="none" normalizeH="0" baseline="0" noProof="0">
-                          <a:ln>
-                            <a:noFill/>
-                          </a:ln>
-                          <a:solidFill>
-                            <a:srgbClr val="FFFFFF"/>
-                          </a:solidFill>
-                          <a:effectLst/>
-                          <a:latin typeface="Arial" panose="020B0604020202020204" pitchFamily="34" charset="0"/>
-                        </a:rPr>
-                        <a:t>(</a:t>
-                      </a:r>
-                      <a:r>
-                        <a:rPr kumimoji="0" lang="en-GB" sz="700" b="1" i="0" u="none" strike="noStrike" cap="none" normalizeH="0" baseline="0" noProof="0" dirty="0">
-                          <a:ln>
-                            <a:noFill/>
-                          </a:ln>
-                          <a:solidFill>
-                            <a:srgbClr val="FFFFFF"/>
-                          </a:solidFill>
-                          <a:effectLst/>
-                          <a:latin typeface="Arial" panose="020B0604020202020204" pitchFamily="34" charset="0"/>
-                        </a:rPr>
-                        <a:t>USD MM)</a:t>
-                      </a:r>
-                    </a:p>
-                  </a:txBody>
-                  <a:tcPr marL="137160" marR="68580" marT="0" marB="0" anchor="ctr" horzOverflow="overflow">
                     <a:lnL w="12700" cap="flat" cmpd="sng" algn="ctr">
                       <a:solidFill>
                         <a:schemeClr val="bg1">
@@ -16404,87 +16265,6 @@
                   </a:txBody>
                   <a:tcPr marL="0" marR="84406" marT="0" marB="0" anchor="ctr" horzOverflow="overflow">
                     <a:lnL cap="flat">
-                      <a:noFill/>
-                    </a:lnL>
-                    <a:lnR>
-                      <a:noFill/>
-                    </a:lnR>
-                    <a:lnT w="6350" cap="flat" cmpd="sng" algn="ctr">
-                      <a:solidFill>
-                        <a:srgbClr val="DBD5CD"/>
-                      </a:solidFill>
-                      <a:prstDash val="solid"/>
-                      <a:round/>
-                      <a:headEnd type="none" w="med" len="med"/>
-                      <a:tailEnd type="none" w="med" len="med"/>
-                    </a:lnT>
-                    <a:lnB w="6350" cap="flat" cmpd="sng" algn="ctr">
-                      <a:solidFill>
-                        <a:srgbClr val="DBD5CD"/>
-                      </a:solidFill>
-                      <a:prstDash val="solid"/>
-                      <a:round/>
-                      <a:headEnd type="none" w="med" len="med"/>
-                      <a:tailEnd type="none" w="med" len="med"/>
-                    </a:lnB>
-                    <a:lnTlToBr>
-                      <a:noFill/>
-                    </a:lnTlToBr>
-                    <a:lnBlToTr>
-                      <a:noFill/>
-                    </a:lnBlToTr>
-                    <a:noFill/>
-                  </a:tcPr>
-                </a:tc>
-                <a:tc>
-                  <a:txBody>
-                    <a:bodyPr/>
-                    <a:lstStyle/>
-                    <a:p>
-                      <a:pPr marL="0" marR="0" lvl="0" indent="0" algn="l" defTabSz="914395" rtl="0" eaLnBrk="1" fontAlgn="t" latinLnBrk="0" hangingPunct="1">
-                        <a:lnSpc>
-                          <a:spcPct val="100000"/>
-                        </a:lnSpc>
-                        <a:spcBef>
-                          <a:spcPts val="0"/>
-                        </a:spcBef>
-                        <a:spcAft>
-                          <a:spcPts val="0"/>
-                        </a:spcAft>
-                        <a:buClr>
-                          <a:srgbClr val="003B4C"/>
-                        </a:buClr>
-                        <a:buSzTx/>
-                        <a:buFont typeface="Wingdings" panose="05000000000000000000" pitchFamily="2" charset="2"/>
-                        <a:buNone/>
-                        <a:tabLst/>
-                        <a:defRPr/>
-                      </a:pPr>
-                      <a:r>
-                        <a:rPr kumimoji="0" lang="en-GB" sz="700" b="0" i="0" u="none" strike="noStrike" kern="1200" cap="none" spc="0" normalizeH="0" baseline="0" noProof="0" dirty="0">
-                          <a:ln>
-                            <a:noFill/>
-                          </a:ln>
-                          <a:solidFill>
-                            <a:srgbClr val="003B4C"/>
-                          </a:solidFill>
-                          <a:effectLst/>
-                          <a:uLnTx/>
-                          <a:uFillTx/>
-                          <a:latin typeface="Arial" panose="020B0604020202020204" pitchFamily="34" charset="0"/>
-                          <a:ea typeface="+mn-ea"/>
-                          <a:cs typeface="+mn-cs"/>
-                        </a:rPr>
-                        <a:t>Revenue: 3,436.45
-EBITDA: 1,305.15
-Market Cap: 1,377.90
-Total Debt: XXX
-FTE: nan</a:t>
-                      </a:r>
-                    </a:p>
-                  </a:txBody>
-                  <a:tcPr marL="168812" marR="0" marT="0" marB="0" anchor="ctr">
-                    <a:lnL>
                       <a:noFill/>
                     </a:lnL>
                     <a:lnR>
@@ -17138,89 +16918,6 @@
                     <a:bodyPr/>
                     <a:lstStyle/>
                     <a:p>
-                      <a:pPr marL="0" marR="0" lvl="0" indent="0" algn="l" defTabSz="914395" rtl="0" eaLnBrk="1" fontAlgn="t" latinLnBrk="0" hangingPunct="1">
-                        <a:lnSpc>
-                          <a:spcPct val="100000"/>
-                        </a:lnSpc>
-                        <a:spcBef>
-                          <a:spcPts val="0"/>
-                        </a:spcBef>
-                        <a:spcAft>
-                          <a:spcPts val="0"/>
-                        </a:spcAft>
-                        <a:buClr>
-                          <a:srgbClr val="003B4C"/>
-                        </a:buClr>
-                        <a:buSzTx/>
-                        <a:buFont typeface="Wingdings" panose="05000000000000000000" pitchFamily="2" charset="2"/>
-                        <a:buNone/>
-                        <a:tabLst/>
-                        <a:defRPr/>
-                      </a:pPr>
-                      <a:r>
-                        <a:rPr kumimoji="0" lang="en-GB" sz="700" b="0" i="0" u="none" strike="noStrike" kern="1200" cap="none" spc="0" normalizeH="0" baseline="0" noProof="0" dirty="0">
-                          <a:ln>
-                            <a:noFill/>
-                          </a:ln>
-                          <a:solidFill>
-                            <a:srgbClr val="003B4C"/>
-                          </a:solidFill>
-                          <a:effectLst/>
-                          <a:uLnTx/>
-                          <a:uFillTx/>
-                          <a:latin typeface="Arial" panose="020B0604020202020204" pitchFamily="34" charset="0"/>
-                          <a:ea typeface="+mn-ea"/>
-                          <a:cs typeface="+mn-cs"/>
-                        </a:rPr>
-                        <a:t>Revenue: 182.98
-EBITDA: -6.56
-Market Cap: nan
-Total Debt: XXX
-FTE: nan</a:t>
-                      </a:r>
-                    </a:p>
-                  </a:txBody>
-                  <a:tcPr marL="168812" marR="0" marT="0" marB="0" anchor="ctr">
-                    <a:lnL>
-                      <a:noFill/>
-                    </a:lnL>
-                    <a:lnR>
-                      <a:noFill/>
-                    </a:lnR>
-                    <a:lnT w="6350" cap="flat" cmpd="sng" algn="ctr">
-                      <a:solidFill>
-                        <a:srgbClr val="DBD5CD"/>
-                      </a:solidFill>
-                      <a:prstDash val="solid"/>
-                      <a:round/>
-                      <a:headEnd type="none" w="med" len="med"/>
-                      <a:tailEnd type="none" w="med" len="med"/>
-                    </a:lnT>
-                    <a:lnB w="6350" cap="flat" cmpd="sng" algn="ctr">
-                      <a:solidFill>
-                        <a:srgbClr val="DBD5CD"/>
-                      </a:solidFill>
-                      <a:prstDash val="solid"/>
-                      <a:round/>
-                      <a:headEnd type="none" w="med" len="med"/>
-                      <a:tailEnd type="none" w="med" len="med"/>
-                    </a:lnB>
-                    <a:lnTlToBr>
-                      <a:noFill/>
-                    </a:lnTlToBr>
-                    <a:lnBlToTr>
-                      <a:noFill/>
-                    </a:lnBlToTr>
-                    <a:solidFill>
-                      <a:srgbClr val="F0F5F7"/>
-                    </a:solidFill>
-                  </a:tcPr>
-                </a:tc>
-                <a:tc>
-                  <a:txBody>
-                    <a:bodyPr/>
-                    <a:lstStyle/>
-                    <a:p>
                       <a:pPr marL="171450" marR="0" lvl="0" indent="-171450" algn="l" defTabSz="914395" rtl="0" eaLnBrk="1" fontAlgn="t" latinLnBrk="0" hangingPunct="1">
                         <a:lnSpc>
                           <a:spcPct val="100000"/>
@@ -17843,93 +17540,6 @@
                     <a:bodyPr/>
                     <a:lstStyle/>
                     <a:p>
-                      <a:pPr marL="0" marR="0" lvl="0" indent="0" algn="l" defTabSz="914395" rtl="0" eaLnBrk="1" fontAlgn="t" latinLnBrk="0" hangingPunct="1">
-                        <a:lnSpc>
-                          <a:spcPct val="100000"/>
-                        </a:lnSpc>
-                        <a:spcBef>
-                          <a:spcPts val="0"/>
-                        </a:spcBef>
-                        <a:spcAft>
-                          <a:spcPts val="0"/>
-                        </a:spcAft>
-                        <a:buClr>
-                          <a:srgbClr val="003B4C"/>
-                        </a:buClr>
-                        <a:buSzTx/>
-                        <a:buFont typeface="Wingdings" panose="05000000000000000000" pitchFamily="2" charset="2"/>
-                        <a:buNone/>
-                        <a:tabLst/>
-                        <a:defRPr/>
-                      </a:pPr>
-                      <a:r>
-                        <a:rPr kumimoji="0" lang="en-GB" sz="700" b="0" i="0" u="none" strike="noStrike" kern="1200" cap="none" spc="0" normalizeH="0" baseline="0" noProof="0" dirty="0">
-                          <a:ln>
-                            <a:noFill/>
-                          </a:ln>
-                          <a:solidFill>
-                            <a:srgbClr val="003B4C"/>
-                          </a:solidFill>
-                          <a:effectLst/>
-                          <a:uLnTx/>
-                          <a:uFillTx/>
-                          <a:latin typeface="Arial" panose="020B0604020202020204" pitchFamily="34" charset="0"/>
-                          <a:ea typeface="+mn-ea"/>
-                          <a:cs typeface="+mn-cs"/>
-                        </a:rPr>
-                        <a:t>Revenue: nan
-EBITDA: nan
-Market Cap: nan
-Total Debt: XXX
-FTE: nan</a:t>
-                      </a:r>
-                    </a:p>
-                  </a:txBody>
-                  <a:tcPr marL="168812" marR="0" marT="0" marB="0" anchor="ctr">
-                    <a:lnL>
-                      <a:noFill/>
-                    </a:lnL>
-                    <a:lnR w="12700" cap="flat" cmpd="sng" algn="ctr">
-                      <a:noFill/>
-                      <a:prstDash val="solid"/>
-                      <a:round/>
-                      <a:headEnd type="none" w="med" len="med"/>
-                      <a:tailEnd type="none" w="med" len="med"/>
-                    </a:lnR>
-                    <a:lnT w="6350" cap="flat" cmpd="sng" algn="ctr">
-                      <a:solidFill>
-                        <a:srgbClr val="DBD5CD"/>
-                      </a:solidFill>
-                      <a:prstDash val="solid"/>
-                      <a:round/>
-                      <a:headEnd type="none" w="med" len="med"/>
-                      <a:tailEnd type="none" w="med" len="med"/>
-                    </a:lnT>
-                    <a:lnB w="9525" cap="flat" cmpd="sng" algn="ctr">
-                      <a:solidFill>
-                        <a:schemeClr val="bg2"/>
-                      </a:solidFill>
-                      <a:prstDash val="solid"/>
-                      <a:round/>
-                      <a:headEnd type="none" w="med" len="med"/>
-                      <a:tailEnd type="none" w="med" len="med"/>
-                    </a:lnB>
-                    <a:lnTlToBr>
-                      <a:noFill/>
-                    </a:lnTlToBr>
-                    <a:lnBlToTr>
-                      <a:noFill/>
-                    </a:lnBlToTr>
-                    <a:solidFill>
-                      <a:srgbClr val="FFFFFF"/>
-                    </a:solidFill>
-                  </a:tcPr>
-                </a:tc>
-                <a:tc>
-                  <a:txBody>
-                    <a:bodyPr/>
-                    <a:lstStyle/>
-                    <a:p>
                       <a:pPr marL="171450" marR="0" lvl="0" indent="-171450" algn="l" defTabSz="914395" rtl="0" eaLnBrk="1" fontAlgn="t" latinLnBrk="0" hangingPunct="1">
                         <a:lnSpc>
                           <a:spcPct val="100000"/>
@@ -18532,89 +18142,6 @@
                     <a:bodyPr/>
                     <a:lstStyle/>
                     <a:p>
-                      <a:pPr marL="0" marR="0" lvl="0" indent="0" algn="l" defTabSz="914395" rtl="0" eaLnBrk="1" fontAlgn="t" latinLnBrk="0" hangingPunct="1">
-                        <a:lnSpc>
-                          <a:spcPct val="100000"/>
-                        </a:lnSpc>
-                        <a:spcBef>
-                          <a:spcPts val="0"/>
-                        </a:spcBef>
-                        <a:spcAft>
-                          <a:spcPts val="0"/>
-                        </a:spcAft>
-                        <a:buClr>
-                          <a:srgbClr val="003B4C"/>
-                        </a:buClr>
-                        <a:buSzTx/>
-                        <a:buFont typeface="Wingdings" panose="05000000000000000000" pitchFamily="2" charset="2"/>
-                        <a:buNone/>
-                        <a:tabLst/>
-                        <a:defRPr/>
-                      </a:pPr>
-                      <a:r>
-                        <a:rPr kumimoji="0" lang="en-GB" sz="700" b="0" i="0" u="none" strike="noStrike" kern="1200" cap="none" spc="0" normalizeH="0" baseline="0" noProof="0" dirty="0">
-                          <a:ln>
-                            <a:noFill/>
-                          </a:ln>
-                          <a:solidFill>
-                            <a:srgbClr val="003B4C"/>
-                          </a:solidFill>
-                          <a:effectLst/>
-                          <a:uLnTx/>
-                          <a:uFillTx/>
-                          <a:latin typeface="Arial" panose="020B0604020202020204" pitchFamily="34" charset="0"/>
-                          <a:ea typeface="+mn-ea"/>
-                          <a:cs typeface="+mn-cs"/>
-                        </a:rPr>
-                        <a:t>Revenue: 5,806.85
-EBITDA: 1,578.53
-Market Cap: nan
-Total Debt: XXX
-FTE: nan</a:t>
-                      </a:r>
-                    </a:p>
-                  </a:txBody>
-                  <a:tcPr marL="168812" marR="0" marT="0" marB="0" anchor="ctr">
-                    <a:lnL>
-                      <a:noFill/>
-                    </a:lnL>
-                    <a:lnR>
-                      <a:noFill/>
-                    </a:lnR>
-                    <a:lnT w="9525" cap="flat" cmpd="sng" algn="ctr">
-                      <a:solidFill>
-                        <a:schemeClr val="bg2"/>
-                      </a:solidFill>
-                      <a:prstDash val="solid"/>
-                      <a:round/>
-                      <a:headEnd type="none" w="med" len="med"/>
-                      <a:tailEnd type="none" w="med" len="med"/>
-                    </a:lnT>
-                    <a:lnB w="9525" cap="flat" cmpd="sng" algn="ctr">
-                      <a:solidFill>
-                        <a:schemeClr val="bg2"/>
-                      </a:solidFill>
-                      <a:prstDash val="solid"/>
-                      <a:round/>
-                      <a:headEnd type="none" w="med" len="med"/>
-                      <a:tailEnd type="none" w="med" len="med"/>
-                    </a:lnB>
-                    <a:lnTlToBr>
-                      <a:noFill/>
-                    </a:lnTlToBr>
-                    <a:lnBlToTr>
-                      <a:noFill/>
-                    </a:lnBlToTr>
-                    <a:solidFill>
-                      <a:srgbClr val="F0F5F7"/>
-                    </a:solidFill>
-                  </a:tcPr>
-                </a:tc>
-                <a:tc>
-                  <a:txBody>
-                    <a:bodyPr/>
-                    <a:lstStyle/>
-                    <a:p>
                       <a:pPr marL="171450" marR="0" lvl="0" indent="-171450" algn="l" defTabSz="914395" rtl="0" eaLnBrk="1" fontAlgn="t" latinLnBrk="0" hangingPunct="1">
                         <a:lnSpc>
                           <a:spcPct val="100000"/>
@@ -19237,89 +18764,6 @@
                     <a:bodyPr/>
                     <a:lstStyle/>
                     <a:p>
-                      <a:pPr marL="0" marR="0" lvl="0" indent="0" algn="l" defTabSz="914395" rtl="0" eaLnBrk="1" fontAlgn="t" latinLnBrk="0" hangingPunct="1">
-                        <a:lnSpc>
-                          <a:spcPct val="100000"/>
-                        </a:lnSpc>
-                        <a:spcBef>
-                          <a:spcPts val="0"/>
-                        </a:spcBef>
-                        <a:spcAft>
-                          <a:spcPts val="0"/>
-                        </a:spcAft>
-                        <a:buClr>
-                          <a:srgbClr val="003B4C"/>
-                        </a:buClr>
-                        <a:buSzTx/>
-                        <a:buFont typeface="Wingdings" panose="05000000000000000000" pitchFamily="2" charset="2"/>
-                        <a:buNone/>
-                        <a:tabLst/>
-                        <a:defRPr/>
-                      </a:pPr>
-                      <a:r>
-                        <a:rPr kumimoji="0" lang="en-GB" sz="700" b="0" i="0" u="none" strike="noStrike" kern="1200" cap="none" spc="0" normalizeH="0" baseline="0" noProof="0" dirty="0">
-                          <a:ln>
-                            <a:noFill/>
-                          </a:ln>
-                          <a:solidFill>
-                            <a:srgbClr val="003B4C"/>
-                          </a:solidFill>
-                          <a:effectLst/>
-                          <a:uLnTx/>
-                          <a:uFillTx/>
-                          <a:latin typeface="Arial" panose="020B0604020202020204" pitchFamily="34" charset="0"/>
-                          <a:ea typeface="+mn-ea"/>
-                          <a:cs typeface="+mn-cs"/>
-                        </a:rPr>
-                        <a:t>Revenue: nan
-EBITDA: nan
-Market Cap: nan
-Total Debt: XXX
-FTE: nan</a:t>
-                      </a:r>
-                    </a:p>
-                  </a:txBody>
-                  <a:tcPr marL="168812" marR="0" marT="0" marB="0" anchor="ctr">
-                    <a:lnL>
-                      <a:noFill/>
-                    </a:lnL>
-                    <a:lnR>
-                      <a:noFill/>
-                    </a:lnR>
-                    <a:lnT w="9525" cap="flat" cmpd="sng" algn="ctr">
-                      <a:solidFill>
-                        <a:schemeClr val="bg2"/>
-                      </a:solidFill>
-                      <a:prstDash val="solid"/>
-                      <a:round/>
-                      <a:headEnd type="none" w="med" len="med"/>
-                      <a:tailEnd type="none" w="med" len="med"/>
-                    </a:lnT>
-                    <a:lnB w="9525" cap="flat" cmpd="sng" algn="ctr">
-                      <a:solidFill>
-                        <a:schemeClr val="bg2"/>
-                      </a:solidFill>
-                      <a:prstDash val="solid"/>
-                      <a:round/>
-                      <a:headEnd type="none" w="med" len="med"/>
-                      <a:tailEnd type="none" w="med" len="med"/>
-                    </a:lnB>
-                    <a:lnTlToBr>
-                      <a:noFill/>
-                    </a:lnTlToBr>
-                    <a:lnBlToTr>
-                      <a:noFill/>
-                    </a:lnBlToTr>
-                    <a:solidFill>
-                      <a:srgbClr val="FFFFFF"/>
-                    </a:solidFill>
-                  </a:tcPr>
-                </a:tc>
-                <a:tc>
-                  <a:txBody>
-                    <a:bodyPr/>
-                    <a:lstStyle/>
-                    <a:p>
                       <a:pPr marL="171450" marR="0" lvl="0" indent="-171450" algn="l" defTabSz="914395" rtl="0" eaLnBrk="1" fontAlgn="t" latinLnBrk="0" hangingPunct="1">
                         <a:lnSpc>
                           <a:spcPct val="100000"/>
@@ -19930,89 +19374,6 @@
                     <a:bodyPr/>
                     <a:lstStyle/>
                     <a:p>
-                      <a:pPr marL="0" marR="0" lvl="0" indent="0" algn="l" defTabSz="914395" rtl="0" eaLnBrk="1" fontAlgn="t" latinLnBrk="0" hangingPunct="1">
-                        <a:lnSpc>
-                          <a:spcPct val="100000"/>
-                        </a:lnSpc>
-                        <a:spcBef>
-                          <a:spcPts val="0"/>
-                        </a:spcBef>
-                        <a:spcAft>
-                          <a:spcPts val="0"/>
-                        </a:spcAft>
-                        <a:buClr>
-                          <a:srgbClr val="003B4C"/>
-                        </a:buClr>
-                        <a:buSzTx/>
-                        <a:buFont typeface="Wingdings" panose="05000000000000000000" pitchFamily="2" charset="2"/>
-                        <a:buNone/>
-                        <a:tabLst/>
-                        <a:defRPr/>
-                      </a:pPr>
-                      <a:r>
-                        <a:rPr kumimoji="0" lang="en-GB" sz="700" b="0" i="0" u="none" strike="noStrike" kern="1200" cap="none" spc="0" normalizeH="0" baseline="0" noProof="0" dirty="0">
-                          <a:ln>
-                            <a:noFill/>
-                          </a:ln>
-                          <a:solidFill>
-                            <a:srgbClr val="003B4C"/>
-                          </a:solidFill>
-                          <a:effectLst/>
-                          <a:uLnTx/>
-                          <a:uFillTx/>
-                          <a:latin typeface="Arial" panose="020B0604020202020204" pitchFamily="34" charset="0"/>
-                          <a:ea typeface="+mn-ea"/>
-                          <a:cs typeface="+mn-cs"/>
-                        </a:rPr>
-                        <a:t>Revenue: 11,415.67
-EBITDA: -653.22
-Market Cap: 366.34
-Total Debt: XXX
-FTE: nan</a:t>
-                      </a:r>
-                    </a:p>
-                  </a:txBody>
-                  <a:tcPr marL="168812" marR="0" marT="0" marB="0" anchor="ctr">
-                    <a:lnL>
-                      <a:noFill/>
-                    </a:lnL>
-                    <a:lnR>
-                      <a:noFill/>
-                    </a:lnR>
-                    <a:lnT w="9525" cap="flat" cmpd="sng" algn="ctr">
-                      <a:solidFill>
-                        <a:schemeClr val="bg2"/>
-                      </a:solidFill>
-                      <a:prstDash val="solid"/>
-                      <a:round/>
-                      <a:headEnd type="none" w="med" len="med"/>
-                      <a:tailEnd type="none" w="med" len="med"/>
-                    </a:lnT>
-                    <a:lnB w="9525" cap="flat" cmpd="sng" algn="ctr">
-                      <a:solidFill>
-                        <a:schemeClr val="bg2"/>
-                      </a:solidFill>
-                      <a:prstDash val="solid"/>
-                      <a:round/>
-                      <a:headEnd type="none" w="med" len="med"/>
-                      <a:tailEnd type="none" w="med" len="med"/>
-                    </a:lnB>
-                    <a:lnTlToBr>
-                      <a:noFill/>
-                    </a:lnTlToBr>
-                    <a:lnBlToTr>
-                      <a:noFill/>
-                    </a:lnBlToTr>
-                    <a:solidFill>
-                      <a:srgbClr val="F0F5F7"/>
-                    </a:solidFill>
-                  </a:tcPr>
-                </a:tc>
-                <a:tc>
-                  <a:txBody>
-                    <a:bodyPr/>
-                    <a:lstStyle/>
-                    <a:p>
                       <a:pPr marL="171450" marR="0" lvl="0" indent="-171450" algn="l" defTabSz="914395" rtl="0" eaLnBrk="1" fontAlgn="t" latinLnBrk="0" hangingPunct="1">
                         <a:lnSpc>
                           <a:spcPct val="100000"/>
@@ -20330,8 +19691,8 @@
         </p:blipFill>
         <p:spPr>
           <a:xfrm>
-            <a:off x="585274" y="1372337"/>
-            <a:ext cx="1030918" cy="381387"/>
+            <a:off x="798213" y="1364709"/>
+            <a:ext cx="1367882" cy="419525"/>
           </a:xfrm>
           <a:prstGeom prst="rect">
             <a:avLst/>
@@ -20354,8 +19715,8 @@
         </p:blipFill>
         <p:spPr>
           <a:xfrm>
-            <a:off x="585274" y="2133797"/>
-            <a:ext cx="1030918" cy="377736"/>
+            <a:off x="798213" y="2126242"/>
+            <a:ext cx="1367882" cy="415510"/>
           </a:xfrm>
           <a:prstGeom prst="rect">
             <a:avLst/>
@@ -20378,8 +19739,8 @@
         </p:blipFill>
         <p:spPr>
           <a:xfrm>
-            <a:off x="585274" y="2889270"/>
-            <a:ext cx="1030918" cy="377736"/>
+            <a:off x="798213" y="2881715"/>
+            <a:ext cx="1367882" cy="415510"/>
           </a:xfrm>
           <a:prstGeom prst="rect">
             <a:avLst/>
@@ -20402,8 +19763,8 @@
         </p:blipFill>
         <p:spPr>
           <a:xfrm>
-            <a:off x="585274" y="3644743"/>
-            <a:ext cx="1030918" cy="377736"/>
+            <a:off x="798213" y="3637188"/>
+            <a:ext cx="1367882" cy="415510"/>
           </a:xfrm>
           <a:prstGeom prst="rect">
             <a:avLst/>
@@ -20426,8 +19787,8 @@
         </p:blipFill>
         <p:spPr>
           <a:xfrm>
-            <a:off x="585274" y="4400216"/>
-            <a:ext cx="1030918" cy="377736"/>
+            <a:off x="798213" y="4392661"/>
+            <a:ext cx="1367882" cy="415510"/>
           </a:xfrm>
           <a:prstGeom prst="rect">
             <a:avLst/>
@@ -20484,7 +19845,7 @@
           <p:nvPr>
             <p:extLst>
               <p:ext uri="{D42A27DB-BD31-4B8C-83A1-F6EECF244321}">
-                <p14:modId xmlns:p14="http://schemas.microsoft.com/office/powerpoint/2010/main" val="3128434163"/>
+                <p14:modId xmlns:p14="http://schemas.microsoft.com/office/powerpoint/2010/main" val="3557598170"/>
               </p:ext>
             </p:extLst>
           </p:nvPr>
@@ -20498,42 +19859,35 @@
             <a:tbl>
               <a:tblPr/>
               <a:tblGrid>
-                <a:gridCol w="341707">
+                <a:gridCol w="506738">
                   <a:extLst>
                     <a:ext uri="{9D8B030D-6E8A-4147-A177-3AD203B41FA5}">
                       <a16:colId xmlns:a16="http://schemas.microsoft.com/office/drawing/2014/main" val="1470184085"/>
                     </a:ext>
                   </a:extLst>
                 </a:gridCol>
-                <a:gridCol w="1085177">
+                <a:gridCol w="1609274">
                   <a:extLst>
                     <a:ext uri="{9D8B030D-6E8A-4147-A177-3AD203B41FA5}">
                       <a16:colId xmlns:a16="http://schemas.microsoft.com/office/drawing/2014/main" val="20000"/>
                     </a:ext>
                   </a:extLst>
                 </a:gridCol>
-                <a:gridCol w="1041296">
-                  <a:extLst>
-                    <a:ext uri="{9D8B030D-6E8A-4147-A177-3AD203B41FA5}">
-                      <a16:colId xmlns:a16="http://schemas.microsoft.com/office/drawing/2014/main" val="3721709830"/>
-                    </a:ext>
-                  </a:extLst>
-                </a:gridCol>
-                <a:gridCol w="4502658">
+                <a:gridCol w="4207126">
                   <a:extLst>
                     <a:ext uri="{9D8B030D-6E8A-4147-A177-3AD203B41FA5}">
                       <a16:colId xmlns:a16="http://schemas.microsoft.com/office/drawing/2014/main" val="20001"/>
                     </a:ext>
                   </a:extLst>
                 </a:gridCol>
-                <a:gridCol w="579609">
+                <a:gridCol w="666750">
                   <a:extLst>
                     <a:ext uri="{9D8B030D-6E8A-4147-A177-3AD203B41FA5}">
                       <a16:colId xmlns:a16="http://schemas.microsoft.com/office/drawing/2014/main" val="2479190757"/>
                     </a:ext>
                   </a:extLst>
                 </a:gridCol>
-                <a:gridCol w="1160671">
+                <a:gridCol w="1721230">
                   <a:extLst>
                     <a:ext uri="{9D8B030D-6E8A-4147-A177-3AD203B41FA5}">
                       <a16:colId xmlns:a16="http://schemas.microsoft.com/office/drawing/2014/main" val="4036884888"/>
@@ -20657,138 +20011,6 @@
                     </a:p>
                   </a:txBody>
                   <a:tcPr marL="0" marR="68580" marT="0" marB="0" anchor="ctr" horzOverflow="overflow">
-                    <a:lnL w="12700" cap="flat" cmpd="sng" algn="ctr">
-                      <a:solidFill>
-                        <a:schemeClr val="bg1">
-                          <a:alpha val="0"/>
-                        </a:schemeClr>
-                      </a:solidFill>
-                      <a:prstDash val="solid"/>
-                      <a:round/>
-                      <a:headEnd type="none" w="med" len="med"/>
-                      <a:tailEnd type="none" w="med" len="med"/>
-                    </a:lnL>
-                    <a:lnR w="12700" cap="flat" cmpd="sng" algn="ctr">
-                      <a:solidFill>
-                        <a:schemeClr val="bg1">
-                          <a:alpha val="0"/>
-                        </a:schemeClr>
-                      </a:solidFill>
-                      <a:prstDash val="solid"/>
-                      <a:round/>
-                      <a:headEnd type="none" w="med" len="med"/>
-                      <a:tailEnd type="none" w="med" len="med"/>
-                    </a:lnR>
-                    <a:lnT cap="flat">
-                      <a:noFill/>
-                    </a:lnT>
-                    <a:lnB w="6350" cap="flat" cmpd="sng" algn="ctr">
-                      <a:solidFill>
-                        <a:srgbClr val="DBD5CD"/>
-                      </a:solidFill>
-                      <a:prstDash val="solid"/>
-                      <a:round/>
-                      <a:headEnd type="none" w="med" len="med"/>
-                      <a:tailEnd type="none" w="med" len="med"/>
-                    </a:lnB>
-                    <a:lnTlToBr>
-                      <a:noFill/>
-                    </a:lnTlToBr>
-                    <a:lnBlToTr>
-                      <a:noFill/>
-                    </a:lnBlToTr>
-                    <a:solidFill>
-                      <a:schemeClr val="tx2"/>
-                    </a:solidFill>
-                  </a:tcPr>
-                </a:tc>
-                <a:tc>
-                  <a:txBody>
-                    <a:bodyPr/>
-                    <a:lstStyle/>
-                    <a:p>
-                      <a:pPr marL="0" marR="0" lvl="0" indent="0" algn="ctr" defTabSz="958850" rtl="0" eaLnBrk="1" fontAlgn="base" latinLnBrk="0" hangingPunct="1">
-                        <a:lnSpc>
-                          <a:spcPct val="100000"/>
-                        </a:lnSpc>
-                        <a:spcBef>
-                          <a:spcPct val="0"/>
-                        </a:spcBef>
-                        <a:spcAft>
-                          <a:spcPts val="0"/>
-                        </a:spcAft>
-                        <a:buClr>
-                          <a:srgbClr val="000080"/>
-                        </a:buClr>
-                        <a:buSzTx/>
-                        <a:buFont typeface="Wingdings" pitchFamily="2" charset="2"/>
-                        <a:buNone/>
-                        <a:tabLst/>
-                        <a:defRPr/>
-                      </a:pPr>
-                      <a:r>
-                        <a:rPr kumimoji="0" lang="en-GB" sz="700" b="1" i="0" u="none" strike="noStrike" cap="none" normalizeH="0" baseline="0" noProof="0">
-                          <a:ln>
-                            <a:noFill/>
-                          </a:ln>
-                          <a:solidFill>
-                            <a:srgbClr val="FFFFFF"/>
-                          </a:solidFill>
-                          <a:effectLst/>
-                          <a:latin typeface="Arial" panose="020B0604020202020204" pitchFamily="34" charset="0"/>
-                        </a:rPr>
-                        <a:t>Financials </a:t>
-                      </a:r>
-                    </a:p>
-                    <a:p>
-                      <a:pPr marL="0" marR="0" lvl="0" indent="0" algn="ctr" defTabSz="958850" rtl="0" eaLnBrk="1" fontAlgn="base" latinLnBrk="0" hangingPunct="1">
-                        <a:lnSpc>
-                          <a:spcPct val="100000"/>
-                        </a:lnSpc>
-                        <a:spcBef>
-                          <a:spcPct val="0"/>
-                        </a:spcBef>
-                        <a:spcAft>
-                          <a:spcPts val="0"/>
-                        </a:spcAft>
-                        <a:buClr>
-                          <a:srgbClr val="000080"/>
-                        </a:buClr>
-                        <a:buSzTx/>
-                        <a:buFont typeface="Wingdings" pitchFamily="2" charset="2"/>
-                        <a:buNone/>
-                        <a:tabLst/>
-                        <a:defRPr/>
-                      </a:pPr>
-                      <a:r>
-                        <a:rPr kumimoji="0" lang="en-GB" sz="700" b="1" i="0" u="none" strike="noStrike" cap="none" normalizeH="0" baseline="0" noProof="0">
-                          <a:ln>
-                            <a:noFill/>
-                          </a:ln>
-                          <a:solidFill>
-                            <a:srgbClr val="FFFFFF"/>
-                          </a:solidFill>
-                          <a:effectLst/>
-                          <a:latin typeface="Arial" panose="020B0604020202020204" pitchFamily="34" charset="0"/>
-                        </a:rPr>
-                        <a:t>(</a:t>
-                      </a:r>
-                      <a:r>
-                        <a:rPr kumimoji="0" lang="en-GB" sz="700" b="1" i="0" u="none" strike="noStrike" cap="none" normalizeH="0" baseline="0" noProof="0" dirty="0">
-                          <a:ln>
-                            <a:noFill/>
-                          </a:ln>
-                          <a:solidFill>
-                            <a:srgbClr val="FFFFFF"/>
-                          </a:solidFill>
-                          <a:effectLst/>
-                          <a:latin typeface="Arial" panose="020B0604020202020204" pitchFamily="34" charset="0"/>
-                        </a:rPr>
-                        <a:t>USD MM)</a:t>
-                      </a:r>
-                    </a:p>
-                  </a:txBody>
-                  <a:tcPr marL="137160" marR="68580" marT="0" marB="0" anchor="ctr" horzOverflow="overflow">
                     <a:lnL w="12700" cap="flat" cmpd="sng" algn="ctr">
                       <a:solidFill>
                         <a:schemeClr val="bg1">
@@ -21390,87 +20612,6 @@
                   </a:txBody>
                   <a:tcPr marL="0" marR="84406" marT="0" marB="0" anchor="ctr" horzOverflow="overflow">
                     <a:lnL cap="flat">
-                      <a:noFill/>
-                    </a:lnL>
-                    <a:lnR>
-                      <a:noFill/>
-                    </a:lnR>
-                    <a:lnT w="6350" cap="flat" cmpd="sng" algn="ctr">
-                      <a:solidFill>
-                        <a:srgbClr val="DBD5CD"/>
-                      </a:solidFill>
-                      <a:prstDash val="solid"/>
-                      <a:round/>
-                      <a:headEnd type="none" w="med" len="med"/>
-                      <a:tailEnd type="none" w="med" len="med"/>
-                    </a:lnT>
-                    <a:lnB w="6350" cap="flat" cmpd="sng" algn="ctr">
-                      <a:solidFill>
-                        <a:srgbClr val="DBD5CD"/>
-                      </a:solidFill>
-                      <a:prstDash val="solid"/>
-                      <a:round/>
-                      <a:headEnd type="none" w="med" len="med"/>
-                      <a:tailEnd type="none" w="med" len="med"/>
-                    </a:lnB>
-                    <a:lnTlToBr>
-                      <a:noFill/>
-                    </a:lnTlToBr>
-                    <a:lnBlToTr>
-                      <a:noFill/>
-                    </a:lnBlToTr>
-                    <a:noFill/>
-                  </a:tcPr>
-                </a:tc>
-                <a:tc>
-                  <a:txBody>
-                    <a:bodyPr/>
-                    <a:lstStyle/>
-                    <a:p>
-                      <a:pPr marL="0" marR="0" lvl="0" indent="0" algn="l" defTabSz="914395" rtl="0" eaLnBrk="1" fontAlgn="t" latinLnBrk="0" hangingPunct="1">
-                        <a:lnSpc>
-                          <a:spcPct val="100000"/>
-                        </a:lnSpc>
-                        <a:spcBef>
-                          <a:spcPts val="0"/>
-                        </a:spcBef>
-                        <a:spcAft>
-                          <a:spcPts val="0"/>
-                        </a:spcAft>
-                        <a:buClr>
-                          <a:srgbClr val="003B4C"/>
-                        </a:buClr>
-                        <a:buSzTx/>
-                        <a:buFont typeface="Wingdings" panose="05000000000000000000" pitchFamily="2" charset="2"/>
-                        <a:buNone/>
-                        <a:tabLst/>
-                        <a:defRPr/>
-                      </a:pPr>
-                      <a:r>
-                        <a:rPr kumimoji="0" lang="en-GB" sz="700" b="0" i="0" u="none" strike="noStrike" kern="1200" cap="none" spc="0" normalizeH="0" baseline="0" noProof="0" dirty="0">
-                          <a:ln>
-                            <a:noFill/>
-                          </a:ln>
-                          <a:solidFill>
-                            <a:srgbClr val="003B4C"/>
-                          </a:solidFill>
-                          <a:effectLst/>
-                          <a:uLnTx/>
-                          <a:uFillTx/>
-                          <a:latin typeface="Arial" panose="020B0604020202020204" pitchFamily="34" charset="0"/>
-                          <a:ea typeface="+mn-ea"/>
-                          <a:cs typeface="+mn-cs"/>
-                        </a:rPr>
-                        <a:t>Revenue: nan
-EBITDA: nan
-Market Cap: nan
-Total Debt: XXX
-FTE: nan</a:t>
-                      </a:r>
-                    </a:p>
-                  </a:txBody>
-                  <a:tcPr marL="168812" marR="0" marT="0" marB="0" anchor="ctr">
-                    <a:lnL>
                       <a:noFill/>
                     </a:lnL>
                     <a:lnR>
@@ -22124,89 +21265,6 @@
                     <a:bodyPr/>
                     <a:lstStyle/>
                     <a:p>
-                      <a:pPr marL="0" marR="0" lvl="0" indent="0" algn="l" defTabSz="914395" rtl="0" eaLnBrk="1" fontAlgn="t" latinLnBrk="0" hangingPunct="1">
-                        <a:lnSpc>
-                          <a:spcPct val="100000"/>
-                        </a:lnSpc>
-                        <a:spcBef>
-                          <a:spcPts val="0"/>
-                        </a:spcBef>
-                        <a:spcAft>
-                          <a:spcPts val="0"/>
-                        </a:spcAft>
-                        <a:buClr>
-                          <a:srgbClr val="003B4C"/>
-                        </a:buClr>
-                        <a:buSzTx/>
-                        <a:buFont typeface="Wingdings" panose="05000000000000000000" pitchFamily="2" charset="2"/>
-                        <a:buNone/>
-                        <a:tabLst/>
-                        <a:defRPr/>
-                      </a:pPr>
-                      <a:r>
-                        <a:rPr kumimoji="0" lang="en-GB" sz="700" b="0" i="0" u="none" strike="noStrike" kern="1200" cap="none" spc="0" normalizeH="0" baseline="0" noProof="0" dirty="0">
-                          <a:ln>
-                            <a:noFill/>
-                          </a:ln>
-                          <a:solidFill>
-                            <a:srgbClr val="003B4C"/>
-                          </a:solidFill>
-                          <a:effectLst/>
-                          <a:uLnTx/>
-                          <a:uFillTx/>
-                          <a:latin typeface="Arial" panose="020B0604020202020204" pitchFamily="34" charset="0"/>
-                          <a:ea typeface="+mn-ea"/>
-                          <a:cs typeface="+mn-cs"/>
-                        </a:rPr>
-                        <a:t>Revenue: 5,411.15
-EBITDA: 1,137.76
-Market Cap: nan
-Total Debt: XXX
-FTE: nan</a:t>
-                      </a:r>
-                    </a:p>
-                  </a:txBody>
-                  <a:tcPr marL="168812" marR="0" marT="0" marB="0" anchor="ctr">
-                    <a:lnL>
-                      <a:noFill/>
-                    </a:lnL>
-                    <a:lnR>
-                      <a:noFill/>
-                    </a:lnR>
-                    <a:lnT w="6350" cap="flat" cmpd="sng" algn="ctr">
-                      <a:solidFill>
-                        <a:srgbClr val="DBD5CD"/>
-                      </a:solidFill>
-                      <a:prstDash val="solid"/>
-                      <a:round/>
-                      <a:headEnd type="none" w="med" len="med"/>
-                      <a:tailEnd type="none" w="med" len="med"/>
-                    </a:lnT>
-                    <a:lnB w="6350" cap="flat" cmpd="sng" algn="ctr">
-                      <a:solidFill>
-                        <a:srgbClr val="DBD5CD"/>
-                      </a:solidFill>
-                      <a:prstDash val="solid"/>
-                      <a:round/>
-                      <a:headEnd type="none" w="med" len="med"/>
-                      <a:tailEnd type="none" w="med" len="med"/>
-                    </a:lnB>
-                    <a:lnTlToBr>
-                      <a:noFill/>
-                    </a:lnTlToBr>
-                    <a:lnBlToTr>
-                      <a:noFill/>
-                    </a:lnBlToTr>
-                    <a:solidFill>
-                      <a:srgbClr val="F0F5F7"/>
-                    </a:solidFill>
-                  </a:tcPr>
-                </a:tc>
-                <a:tc>
-                  <a:txBody>
-                    <a:bodyPr/>
-                    <a:lstStyle/>
-                    <a:p>
                       <a:pPr marL="171450" marR="0" lvl="0" indent="-171450" algn="l" defTabSz="914395" rtl="0" eaLnBrk="1" fontAlgn="t" latinLnBrk="0" hangingPunct="1">
                         <a:lnSpc>
                           <a:spcPct val="100000"/>
@@ -22830,93 +21888,6 @@
                     <a:bodyPr/>
                     <a:lstStyle/>
                     <a:p>
-                      <a:pPr marL="0" marR="0" lvl="0" indent="0" algn="l" defTabSz="914395" rtl="0" eaLnBrk="1" fontAlgn="t" latinLnBrk="0" hangingPunct="1">
-                        <a:lnSpc>
-                          <a:spcPct val="100000"/>
-                        </a:lnSpc>
-                        <a:spcBef>
-                          <a:spcPts val="0"/>
-                        </a:spcBef>
-                        <a:spcAft>
-                          <a:spcPts val="0"/>
-                        </a:spcAft>
-                        <a:buClr>
-                          <a:srgbClr val="003B4C"/>
-                        </a:buClr>
-                        <a:buSzTx/>
-                        <a:buFont typeface="Wingdings" panose="05000000000000000000" pitchFamily="2" charset="2"/>
-                        <a:buNone/>
-                        <a:tabLst/>
-                        <a:defRPr/>
-                      </a:pPr>
-                      <a:r>
-                        <a:rPr kumimoji="0" lang="en-GB" sz="700" b="0" i="0" u="none" strike="noStrike" kern="1200" cap="none" spc="0" normalizeH="0" baseline="0" noProof="0" dirty="0">
-                          <a:ln>
-                            <a:noFill/>
-                          </a:ln>
-                          <a:solidFill>
-                            <a:srgbClr val="003B4C"/>
-                          </a:solidFill>
-                          <a:effectLst/>
-                          <a:uLnTx/>
-                          <a:uFillTx/>
-                          <a:latin typeface="Arial" panose="020B0604020202020204" pitchFamily="34" charset="0"/>
-                          <a:ea typeface="+mn-ea"/>
-                          <a:cs typeface="+mn-cs"/>
-                        </a:rPr>
-                        <a:t>Revenue: 2,779.22
-EBITDA: nan
-Market Cap: 5,059.03
-Total Debt: XXX
-FTE: nan</a:t>
-                      </a:r>
-                    </a:p>
-                  </a:txBody>
-                  <a:tcPr marL="168812" marR="0" marT="0" marB="0" anchor="ctr">
-                    <a:lnL>
-                      <a:noFill/>
-                    </a:lnL>
-                    <a:lnR w="12700" cap="flat" cmpd="sng" algn="ctr">
-                      <a:noFill/>
-                      <a:prstDash val="solid"/>
-                      <a:round/>
-                      <a:headEnd type="none" w="med" len="med"/>
-                      <a:tailEnd type="none" w="med" len="med"/>
-                    </a:lnR>
-                    <a:lnT w="6350" cap="flat" cmpd="sng" algn="ctr">
-                      <a:solidFill>
-                        <a:srgbClr val="DBD5CD"/>
-                      </a:solidFill>
-                      <a:prstDash val="solid"/>
-                      <a:round/>
-                      <a:headEnd type="none" w="med" len="med"/>
-                      <a:tailEnd type="none" w="med" len="med"/>
-                    </a:lnT>
-                    <a:lnB w="9525" cap="flat" cmpd="sng" algn="ctr">
-                      <a:solidFill>
-                        <a:schemeClr val="bg2"/>
-                      </a:solidFill>
-                      <a:prstDash val="solid"/>
-                      <a:round/>
-                      <a:headEnd type="none" w="med" len="med"/>
-                      <a:tailEnd type="none" w="med" len="med"/>
-                    </a:lnB>
-                    <a:lnTlToBr>
-                      <a:noFill/>
-                    </a:lnTlToBr>
-                    <a:lnBlToTr>
-                      <a:noFill/>
-                    </a:lnBlToTr>
-                    <a:solidFill>
-                      <a:srgbClr val="FFFFFF"/>
-                    </a:solidFill>
-                  </a:tcPr>
-                </a:tc>
-                <a:tc>
-                  <a:txBody>
-                    <a:bodyPr/>
-                    <a:lstStyle/>
-                    <a:p>
                       <a:pPr marL="171450" marR="0" lvl="0" indent="-171450" algn="l" defTabSz="914395" rtl="0" eaLnBrk="1" fontAlgn="t" latinLnBrk="0" hangingPunct="1">
                         <a:lnSpc>
                           <a:spcPct val="100000"/>
@@ -23519,89 +22490,6 @@
                     <a:bodyPr/>
                     <a:lstStyle/>
                     <a:p>
-                      <a:pPr marL="0" marR="0" lvl="0" indent="0" algn="l" defTabSz="914395" rtl="0" eaLnBrk="1" fontAlgn="t" latinLnBrk="0" hangingPunct="1">
-                        <a:lnSpc>
-                          <a:spcPct val="100000"/>
-                        </a:lnSpc>
-                        <a:spcBef>
-                          <a:spcPts val="0"/>
-                        </a:spcBef>
-                        <a:spcAft>
-                          <a:spcPts val="0"/>
-                        </a:spcAft>
-                        <a:buClr>
-                          <a:srgbClr val="003B4C"/>
-                        </a:buClr>
-                        <a:buSzTx/>
-                        <a:buFont typeface="Wingdings" panose="05000000000000000000" pitchFamily="2" charset="2"/>
-                        <a:buNone/>
-                        <a:tabLst/>
-                        <a:defRPr/>
-                      </a:pPr>
-                      <a:r>
-                        <a:rPr kumimoji="0" lang="en-GB" sz="700" b="0" i="0" u="none" strike="noStrike" kern="1200" cap="none" spc="0" normalizeH="0" baseline="0" noProof="0" dirty="0">
-                          <a:ln>
-                            <a:noFill/>
-                          </a:ln>
-                          <a:solidFill>
-                            <a:srgbClr val="003B4C"/>
-                          </a:solidFill>
-                          <a:effectLst/>
-                          <a:uLnTx/>
-                          <a:uFillTx/>
-                          <a:latin typeface="Arial" panose="020B0604020202020204" pitchFamily="34" charset="0"/>
-                          <a:ea typeface="+mn-ea"/>
-                          <a:cs typeface="+mn-cs"/>
-                        </a:rPr>
-                        <a:t>Revenue: 998.37
-EBITDA: 16.34
-Market Cap: nan
-Total Debt: XXX
-FTE: nan</a:t>
-                      </a:r>
-                    </a:p>
-                  </a:txBody>
-                  <a:tcPr marL="168812" marR="0" marT="0" marB="0" anchor="ctr">
-                    <a:lnL>
-                      <a:noFill/>
-                    </a:lnL>
-                    <a:lnR>
-                      <a:noFill/>
-                    </a:lnR>
-                    <a:lnT w="9525" cap="flat" cmpd="sng" algn="ctr">
-                      <a:solidFill>
-                        <a:schemeClr val="bg2"/>
-                      </a:solidFill>
-                      <a:prstDash val="solid"/>
-                      <a:round/>
-                      <a:headEnd type="none" w="med" len="med"/>
-                      <a:tailEnd type="none" w="med" len="med"/>
-                    </a:lnT>
-                    <a:lnB w="9525" cap="flat" cmpd="sng" algn="ctr">
-                      <a:solidFill>
-                        <a:schemeClr val="bg2"/>
-                      </a:solidFill>
-                      <a:prstDash val="solid"/>
-                      <a:round/>
-                      <a:headEnd type="none" w="med" len="med"/>
-                      <a:tailEnd type="none" w="med" len="med"/>
-                    </a:lnB>
-                    <a:lnTlToBr>
-                      <a:noFill/>
-                    </a:lnTlToBr>
-                    <a:lnBlToTr>
-                      <a:noFill/>
-                    </a:lnBlToTr>
-                    <a:solidFill>
-                      <a:srgbClr val="F0F5F7"/>
-                    </a:solidFill>
-                  </a:tcPr>
-                </a:tc>
-                <a:tc>
-                  <a:txBody>
-                    <a:bodyPr/>
-                    <a:lstStyle/>
-                    <a:p>
                       <a:pPr marL="171450" marR="0" lvl="0" indent="-171450" algn="l" defTabSz="914395" rtl="0" eaLnBrk="1" fontAlgn="t" latinLnBrk="0" hangingPunct="1">
                         <a:lnSpc>
                           <a:spcPct val="100000"/>
@@ -24224,89 +23112,6 @@
                     <a:bodyPr/>
                     <a:lstStyle/>
                     <a:p>
-                      <a:pPr marL="0" marR="0" lvl="0" indent="0" algn="l" defTabSz="914395" rtl="0" eaLnBrk="1" fontAlgn="t" latinLnBrk="0" hangingPunct="1">
-                        <a:lnSpc>
-                          <a:spcPct val="100000"/>
-                        </a:lnSpc>
-                        <a:spcBef>
-                          <a:spcPts val="0"/>
-                        </a:spcBef>
-                        <a:spcAft>
-                          <a:spcPts val="0"/>
-                        </a:spcAft>
-                        <a:buClr>
-                          <a:srgbClr val="003B4C"/>
-                        </a:buClr>
-                        <a:buSzTx/>
-                        <a:buFont typeface="Wingdings" panose="05000000000000000000" pitchFamily="2" charset="2"/>
-                        <a:buNone/>
-                        <a:tabLst/>
-                        <a:defRPr/>
-                      </a:pPr>
-                      <a:r>
-                        <a:rPr kumimoji="0" lang="en-GB" sz="700" b="0" i="0" u="none" strike="noStrike" kern="1200" cap="none" spc="0" normalizeH="0" baseline="0" noProof="0" dirty="0">
-                          <a:ln>
-                            <a:noFill/>
-                          </a:ln>
-                          <a:solidFill>
-                            <a:srgbClr val="003B4C"/>
-                          </a:solidFill>
-                          <a:effectLst/>
-                          <a:uLnTx/>
-                          <a:uFillTx/>
-                          <a:latin typeface="Arial" panose="020B0604020202020204" pitchFamily="34" charset="0"/>
-                          <a:ea typeface="+mn-ea"/>
-                          <a:cs typeface="+mn-cs"/>
-                        </a:rPr>
-                        <a:t>Revenue: 4,976.27
-EBITDA: 2,610.50
-Market Cap: 6,970.54
-Total Debt: XXX
-FTE: nan</a:t>
-                      </a:r>
-                    </a:p>
-                  </a:txBody>
-                  <a:tcPr marL="168812" marR="0" marT="0" marB="0" anchor="ctr">
-                    <a:lnL>
-                      <a:noFill/>
-                    </a:lnL>
-                    <a:lnR>
-                      <a:noFill/>
-                    </a:lnR>
-                    <a:lnT w="9525" cap="flat" cmpd="sng" algn="ctr">
-                      <a:solidFill>
-                        <a:schemeClr val="bg2"/>
-                      </a:solidFill>
-                      <a:prstDash val="solid"/>
-                      <a:round/>
-                      <a:headEnd type="none" w="med" len="med"/>
-                      <a:tailEnd type="none" w="med" len="med"/>
-                    </a:lnT>
-                    <a:lnB w="9525" cap="flat" cmpd="sng" algn="ctr">
-                      <a:solidFill>
-                        <a:schemeClr val="bg2"/>
-                      </a:solidFill>
-                      <a:prstDash val="solid"/>
-                      <a:round/>
-                      <a:headEnd type="none" w="med" len="med"/>
-                      <a:tailEnd type="none" w="med" len="med"/>
-                    </a:lnB>
-                    <a:lnTlToBr>
-                      <a:noFill/>
-                    </a:lnTlToBr>
-                    <a:lnBlToTr>
-                      <a:noFill/>
-                    </a:lnBlToTr>
-                    <a:solidFill>
-                      <a:srgbClr val="FFFFFF"/>
-                    </a:solidFill>
-                  </a:tcPr>
-                </a:tc>
-                <a:tc>
-                  <a:txBody>
-                    <a:bodyPr/>
-                    <a:lstStyle/>
-                    <a:p>
                       <a:pPr marL="171450" marR="0" lvl="0" indent="-171450" algn="l" defTabSz="914395" rtl="0" eaLnBrk="1" fontAlgn="t" latinLnBrk="0" hangingPunct="1">
                         <a:lnSpc>
                           <a:spcPct val="100000"/>
@@ -24917,89 +23722,6 @@
                     <a:bodyPr/>
                     <a:lstStyle/>
                     <a:p>
-                      <a:pPr marL="0" marR="0" lvl="0" indent="0" algn="l" defTabSz="914395" rtl="0" eaLnBrk="1" fontAlgn="t" latinLnBrk="0" hangingPunct="1">
-                        <a:lnSpc>
-                          <a:spcPct val="100000"/>
-                        </a:lnSpc>
-                        <a:spcBef>
-                          <a:spcPts val="0"/>
-                        </a:spcBef>
-                        <a:spcAft>
-                          <a:spcPts val="0"/>
-                        </a:spcAft>
-                        <a:buClr>
-                          <a:srgbClr val="003B4C"/>
-                        </a:buClr>
-                        <a:buSzTx/>
-                        <a:buFont typeface="Wingdings" panose="05000000000000000000" pitchFamily="2" charset="2"/>
-                        <a:buNone/>
-                        <a:tabLst/>
-                        <a:defRPr/>
-                      </a:pPr>
-                      <a:r>
-                        <a:rPr kumimoji="0" lang="en-GB" sz="700" b="0" i="0" u="none" strike="noStrike" kern="1200" cap="none" spc="0" normalizeH="0" baseline="0" noProof="0" dirty="0">
-                          <a:ln>
-                            <a:noFill/>
-                          </a:ln>
-                          <a:solidFill>
-                            <a:srgbClr val="003B4C"/>
-                          </a:solidFill>
-                          <a:effectLst/>
-                          <a:uLnTx/>
-                          <a:uFillTx/>
-                          <a:latin typeface="Arial" panose="020B0604020202020204" pitchFamily="34" charset="0"/>
-                          <a:ea typeface="+mn-ea"/>
-                          <a:cs typeface="+mn-cs"/>
-                        </a:rPr>
-                        <a:t>Revenue: nan
-EBITDA: nan
-Market Cap: nan
-Total Debt: XXX
-FTE: nan</a:t>
-                      </a:r>
-                    </a:p>
-                  </a:txBody>
-                  <a:tcPr marL="168812" marR="0" marT="0" marB="0" anchor="ctr">
-                    <a:lnL>
-                      <a:noFill/>
-                    </a:lnL>
-                    <a:lnR>
-                      <a:noFill/>
-                    </a:lnR>
-                    <a:lnT w="9525" cap="flat" cmpd="sng" algn="ctr">
-                      <a:solidFill>
-                        <a:schemeClr val="bg2"/>
-                      </a:solidFill>
-                      <a:prstDash val="solid"/>
-                      <a:round/>
-                      <a:headEnd type="none" w="med" len="med"/>
-                      <a:tailEnd type="none" w="med" len="med"/>
-                    </a:lnT>
-                    <a:lnB w="9525" cap="flat" cmpd="sng" algn="ctr">
-                      <a:solidFill>
-                        <a:schemeClr val="bg2"/>
-                      </a:solidFill>
-                      <a:prstDash val="solid"/>
-                      <a:round/>
-                      <a:headEnd type="none" w="med" len="med"/>
-                      <a:tailEnd type="none" w="med" len="med"/>
-                    </a:lnB>
-                    <a:lnTlToBr>
-                      <a:noFill/>
-                    </a:lnTlToBr>
-                    <a:lnBlToTr>
-                      <a:noFill/>
-                    </a:lnBlToTr>
-                    <a:solidFill>
-                      <a:srgbClr val="F0F5F7"/>
-                    </a:solidFill>
-                  </a:tcPr>
-                </a:tc>
-                <a:tc>
-                  <a:txBody>
-                    <a:bodyPr/>
-                    <a:lstStyle/>
-                    <a:p>
                       <a:pPr marL="171450" marR="0" lvl="0" indent="-171450" algn="l" defTabSz="914395" rtl="0" eaLnBrk="1" fontAlgn="t" latinLnBrk="0" hangingPunct="1">
                         <a:lnSpc>
                           <a:spcPct val="100000"/>
@@ -25317,8 +24039,8 @@
         </p:blipFill>
         <p:spPr>
           <a:xfrm>
-            <a:off x="585274" y="1372337"/>
-            <a:ext cx="1030918" cy="381387"/>
+            <a:off x="798213" y="1364709"/>
+            <a:ext cx="1367882" cy="419525"/>
           </a:xfrm>
           <a:prstGeom prst="rect">
             <a:avLst/>
@@ -25341,8 +24063,8 @@
         </p:blipFill>
         <p:spPr>
           <a:xfrm>
-            <a:off x="585274" y="2133797"/>
-            <a:ext cx="1030918" cy="377736"/>
+            <a:off x="798213" y="2126242"/>
+            <a:ext cx="1367882" cy="415510"/>
           </a:xfrm>
           <a:prstGeom prst="rect">
             <a:avLst/>
@@ -25365,8 +24087,8 @@
         </p:blipFill>
         <p:spPr>
           <a:xfrm>
-            <a:off x="585274" y="2889270"/>
-            <a:ext cx="1030918" cy="377736"/>
+            <a:off x="798213" y="2881715"/>
+            <a:ext cx="1367882" cy="415510"/>
           </a:xfrm>
           <a:prstGeom prst="rect">
             <a:avLst/>
@@ -25389,8 +24111,8 @@
         </p:blipFill>
         <p:spPr>
           <a:xfrm>
-            <a:off x="585274" y="3644743"/>
-            <a:ext cx="1030918" cy="377736"/>
+            <a:off x="798213" y="3637188"/>
+            <a:ext cx="1367882" cy="415510"/>
           </a:xfrm>
           <a:prstGeom prst="rect">
             <a:avLst/>
@@ -25413,8 +24135,8 @@
         </p:blipFill>
         <p:spPr>
           <a:xfrm>
-            <a:off x="585274" y="4400216"/>
-            <a:ext cx="1030918" cy="377736"/>
+            <a:off x="798213" y="4392661"/>
+            <a:ext cx="1367882" cy="415510"/>
           </a:xfrm>
           <a:prstGeom prst="rect">
             <a:avLst/>
@@ -25437,8 +24159,8 @@
         </p:blipFill>
         <p:spPr>
           <a:xfrm>
-            <a:off x="585274" y="5155689"/>
-            <a:ext cx="1030918" cy="377736"/>
+            <a:off x="798213" y="5148134"/>
+            <a:ext cx="1367882" cy="415510"/>
           </a:xfrm>
           <a:prstGeom prst="rect">
             <a:avLst/>
@@ -25495,7 +24217,7 @@
           <p:nvPr>
             <p:extLst>
               <p:ext uri="{D42A27DB-BD31-4B8C-83A1-F6EECF244321}">
-                <p14:modId xmlns:p14="http://schemas.microsoft.com/office/powerpoint/2010/main" val="3128434163"/>
+                <p14:modId xmlns:p14="http://schemas.microsoft.com/office/powerpoint/2010/main" val="3557598170"/>
               </p:ext>
             </p:extLst>
           </p:nvPr>
@@ -25509,42 +24231,35 @@
             <a:tbl>
               <a:tblPr/>
               <a:tblGrid>
-                <a:gridCol w="341707">
+                <a:gridCol w="506738">
                   <a:extLst>
                     <a:ext uri="{9D8B030D-6E8A-4147-A177-3AD203B41FA5}">
                       <a16:colId xmlns:a16="http://schemas.microsoft.com/office/drawing/2014/main" val="1470184085"/>
                     </a:ext>
                   </a:extLst>
                 </a:gridCol>
-                <a:gridCol w="1085177">
+                <a:gridCol w="1609274">
                   <a:extLst>
                     <a:ext uri="{9D8B030D-6E8A-4147-A177-3AD203B41FA5}">
                       <a16:colId xmlns:a16="http://schemas.microsoft.com/office/drawing/2014/main" val="20000"/>
                     </a:ext>
                   </a:extLst>
                 </a:gridCol>
-                <a:gridCol w="1041296">
-                  <a:extLst>
-                    <a:ext uri="{9D8B030D-6E8A-4147-A177-3AD203B41FA5}">
-                      <a16:colId xmlns:a16="http://schemas.microsoft.com/office/drawing/2014/main" val="3721709830"/>
-                    </a:ext>
-                  </a:extLst>
-                </a:gridCol>
-                <a:gridCol w="4502658">
+                <a:gridCol w="4207126">
                   <a:extLst>
                     <a:ext uri="{9D8B030D-6E8A-4147-A177-3AD203B41FA5}">
                       <a16:colId xmlns:a16="http://schemas.microsoft.com/office/drawing/2014/main" val="20001"/>
                     </a:ext>
                   </a:extLst>
                 </a:gridCol>
-                <a:gridCol w="579609">
+                <a:gridCol w="666750">
                   <a:extLst>
                     <a:ext uri="{9D8B030D-6E8A-4147-A177-3AD203B41FA5}">
                       <a16:colId xmlns:a16="http://schemas.microsoft.com/office/drawing/2014/main" val="2479190757"/>
                     </a:ext>
                   </a:extLst>
                 </a:gridCol>
-                <a:gridCol w="1160671">
+                <a:gridCol w="1721230">
                   <a:extLst>
                     <a:ext uri="{9D8B030D-6E8A-4147-A177-3AD203B41FA5}">
                       <a16:colId xmlns:a16="http://schemas.microsoft.com/office/drawing/2014/main" val="4036884888"/>
@@ -25668,138 +24383,6 @@
                     </a:p>
                   </a:txBody>
                   <a:tcPr marL="0" marR="68580" marT="0" marB="0" anchor="ctr" horzOverflow="overflow">
-                    <a:lnL w="12700" cap="flat" cmpd="sng" algn="ctr">
-                      <a:solidFill>
-                        <a:schemeClr val="bg1">
-                          <a:alpha val="0"/>
-                        </a:schemeClr>
-                      </a:solidFill>
-                      <a:prstDash val="solid"/>
-                      <a:round/>
-                      <a:headEnd type="none" w="med" len="med"/>
-                      <a:tailEnd type="none" w="med" len="med"/>
-                    </a:lnL>
-                    <a:lnR w="12700" cap="flat" cmpd="sng" algn="ctr">
-                      <a:solidFill>
-                        <a:schemeClr val="bg1">
-                          <a:alpha val="0"/>
-                        </a:schemeClr>
-                      </a:solidFill>
-                      <a:prstDash val="solid"/>
-                      <a:round/>
-                      <a:headEnd type="none" w="med" len="med"/>
-                      <a:tailEnd type="none" w="med" len="med"/>
-                    </a:lnR>
-                    <a:lnT cap="flat">
-                      <a:noFill/>
-                    </a:lnT>
-                    <a:lnB w="6350" cap="flat" cmpd="sng" algn="ctr">
-                      <a:solidFill>
-                        <a:srgbClr val="DBD5CD"/>
-                      </a:solidFill>
-                      <a:prstDash val="solid"/>
-                      <a:round/>
-                      <a:headEnd type="none" w="med" len="med"/>
-                      <a:tailEnd type="none" w="med" len="med"/>
-                    </a:lnB>
-                    <a:lnTlToBr>
-                      <a:noFill/>
-                    </a:lnTlToBr>
-                    <a:lnBlToTr>
-                      <a:noFill/>
-                    </a:lnBlToTr>
-                    <a:solidFill>
-                      <a:schemeClr val="tx2"/>
-                    </a:solidFill>
-                  </a:tcPr>
-                </a:tc>
-                <a:tc>
-                  <a:txBody>
-                    <a:bodyPr/>
-                    <a:lstStyle/>
-                    <a:p>
-                      <a:pPr marL="0" marR="0" lvl="0" indent="0" algn="ctr" defTabSz="958850" rtl="0" eaLnBrk="1" fontAlgn="base" latinLnBrk="0" hangingPunct="1">
-                        <a:lnSpc>
-                          <a:spcPct val="100000"/>
-                        </a:lnSpc>
-                        <a:spcBef>
-                          <a:spcPct val="0"/>
-                        </a:spcBef>
-                        <a:spcAft>
-                          <a:spcPts val="0"/>
-                        </a:spcAft>
-                        <a:buClr>
-                          <a:srgbClr val="000080"/>
-                        </a:buClr>
-                        <a:buSzTx/>
-                        <a:buFont typeface="Wingdings" pitchFamily="2" charset="2"/>
-                        <a:buNone/>
-                        <a:tabLst/>
-                        <a:defRPr/>
-                      </a:pPr>
-                      <a:r>
-                        <a:rPr kumimoji="0" lang="en-GB" sz="700" b="1" i="0" u="none" strike="noStrike" cap="none" normalizeH="0" baseline="0" noProof="0">
-                          <a:ln>
-                            <a:noFill/>
-                          </a:ln>
-                          <a:solidFill>
-                            <a:srgbClr val="FFFFFF"/>
-                          </a:solidFill>
-                          <a:effectLst/>
-                          <a:latin typeface="Arial" panose="020B0604020202020204" pitchFamily="34" charset="0"/>
-                        </a:rPr>
-                        <a:t>Financials </a:t>
-                      </a:r>
-                    </a:p>
-                    <a:p>
-                      <a:pPr marL="0" marR="0" lvl="0" indent="0" algn="ctr" defTabSz="958850" rtl="0" eaLnBrk="1" fontAlgn="base" latinLnBrk="0" hangingPunct="1">
-                        <a:lnSpc>
-                          <a:spcPct val="100000"/>
-                        </a:lnSpc>
-                        <a:spcBef>
-                          <a:spcPct val="0"/>
-                        </a:spcBef>
-                        <a:spcAft>
-                          <a:spcPts val="0"/>
-                        </a:spcAft>
-                        <a:buClr>
-                          <a:srgbClr val="000080"/>
-                        </a:buClr>
-                        <a:buSzTx/>
-                        <a:buFont typeface="Wingdings" pitchFamily="2" charset="2"/>
-                        <a:buNone/>
-                        <a:tabLst/>
-                        <a:defRPr/>
-                      </a:pPr>
-                      <a:r>
-                        <a:rPr kumimoji="0" lang="en-GB" sz="700" b="1" i="0" u="none" strike="noStrike" cap="none" normalizeH="0" baseline="0" noProof="0">
-                          <a:ln>
-                            <a:noFill/>
-                          </a:ln>
-                          <a:solidFill>
-                            <a:srgbClr val="FFFFFF"/>
-                          </a:solidFill>
-                          <a:effectLst/>
-                          <a:latin typeface="Arial" panose="020B0604020202020204" pitchFamily="34" charset="0"/>
-                        </a:rPr>
-                        <a:t>(</a:t>
-                      </a:r>
-                      <a:r>
-                        <a:rPr kumimoji="0" lang="en-GB" sz="700" b="1" i="0" u="none" strike="noStrike" cap="none" normalizeH="0" baseline="0" noProof="0" dirty="0">
-                          <a:ln>
-                            <a:noFill/>
-                          </a:ln>
-                          <a:solidFill>
-                            <a:srgbClr val="FFFFFF"/>
-                          </a:solidFill>
-                          <a:effectLst/>
-                          <a:latin typeface="Arial" panose="020B0604020202020204" pitchFamily="34" charset="0"/>
-                        </a:rPr>
-                        <a:t>USD MM)</a:t>
-                      </a:r>
-                    </a:p>
-                  </a:txBody>
-                  <a:tcPr marL="137160" marR="68580" marT="0" marB="0" anchor="ctr" horzOverflow="overflow">
                     <a:lnL w="12700" cap="flat" cmpd="sng" algn="ctr">
                       <a:solidFill>
                         <a:schemeClr val="bg1">
@@ -26401,87 +24984,6 @@
                   </a:txBody>
                   <a:tcPr marL="0" marR="84406" marT="0" marB="0" anchor="ctr" horzOverflow="overflow">
                     <a:lnL cap="flat">
-                      <a:noFill/>
-                    </a:lnL>
-                    <a:lnR>
-                      <a:noFill/>
-                    </a:lnR>
-                    <a:lnT w="6350" cap="flat" cmpd="sng" algn="ctr">
-                      <a:solidFill>
-                        <a:srgbClr val="DBD5CD"/>
-                      </a:solidFill>
-                      <a:prstDash val="solid"/>
-                      <a:round/>
-                      <a:headEnd type="none" w="med" len="med"/>
-                      <a:tailEnd type="none" w="med" len="med"/>
-                    </a:lnT>
-                    <a:lnB w="6350" cap="flat" cmpd="sng" algn="ctr">
-                      <a:solidFill>
-                        <a:srgbClr val="DBD5CD"/>
-                      </a:solidFill>
-                      <a:prstDash val="solid"/>
-                      <a:round/>
-                      <a:headEnd type="none" w="med" len="med"/>
-                      <a:tailEnd type="none" w="med" len="med"/>
-                    </a:lnB>
-                    <a:lnTlToBr>
-                      <a:noFill/>
-                    </a:lnTlToBr>
-                    <a:lnBlToTr>
-                      <a:noFill/>
-                    </a:lnBlToTr>
-                    <a:noFill/>
-                  </a:tcPr>
-                </a:tc>
-                <a:tc>
-                  <a:txBody>
-                    <a:bodyPr/>
-                    <a:lstStyle/>
-                    <a:p>
-                      <a:pPr marL="0" marR="0" lvl="0" indent="0" algn="l" defTabSz="914395" rtl="0" eaLnBrk="1" fontAlgn="t" latinLnBrk="0" hangingPunct="1">
-                        <a:lnSpc>
-                          <a:spcPct val="100000"/>
-                        </a:lnSpc>
-                        <a:spcBef>
-                          <a:spcPts val="0"/>
-                        </a:spcBef>
-                        <a:spcAft>
-                          <a:spcPts val="0"/>
-                        </a:spcAft>
-                        <a:buClr>
-                          <a:srgbClr val="003B4C"/>
-                        </a:buClr>
-                        <a:buSzTx/>
-                        <a:buFont typeface="Wingdings" panose="05000000000000000000" pitchFamily="2" charset="2"/>
-                        <a:buNone/>
-                        <a:tabLst/>
-                        <a:defRPr/>
-                      </a:pPr>
-                      <a:r>
-                        <a:rPr kumimoji="0" lang="en-GB" sz="700" b="0" i="0" u="none" strike="noStrike" kern="1200" cap="none" spc="0" normalizeH="0" baseline="0" noProof="0" dirty="0">
-                          <a:ln>
-                            <a:noFill/>
-                          </a:ln>
-                          <a:solidFill>
-                            <a:srgbClr val="003B4C"/>
-                          </a:solidFill>
-                          <a:effectLst/>
-                          <a:uLnTx/>
-                          <a:uFillTx/>
-                          <a:latin typeface="Arial" panose="020B0604020202020204" pitchFamily="34" charset="0"/>
-                          <a:ea typeface="+mn-ea"/>
-                          <a:cs typeface="+mn-cs"/>
-                        </a:rPr>
-                        <a:t>Revenue: 1,211.41
-EBITDA: -651.33
-Market Cap: 266.31
-Total Debt: XXX
-FTE: nan</a:t>
-                      </a:r>
-                    </a:p>
-                  </a:txBody>
-                  <a:tcPr marL="168812" marR="0" marT="0" marB="0" anchor="ctr">
-                    <a:lnL>
                       <a:noFill/>
                     </a:lnL>
                     <a:lnR>
@@ -27135,89 +25637,6 @@
                     <a:bodyPr/>
                     <a:lstStyle/>
                     <a:p>
-                      <a:pPr marL="0" marR="0" lvl="0" indent="0" algn="l" defTabSz="914395" rtl="0" eaLnBrk="1" fontAlgn="t" latinLnBrk="0" hangingPunct="1">
-                        <a:lnSpc>
-                          <a:spcPct val="100000"/>
-                        </a:lnSpc>
-                        <a:spcBef>
-                          <a:spcPts val="0"/>
-                        </a:spcBef>
-                        <a:spcAft>
-                          <a:spcPts val="0"/>
-                        </a:spcAft>
-                        <a:buClr>
-                          <a:srgbClr val="003B4C"/>
-                        </a:buClr>
-                        <a:buSzTx/>
-                        <a:buFont typeface="Wingdings" panose="05000000000000000000" pitchFamily="2" charset="2"/>
-                        <a:buNone/>
-                        <a:tabLst/>
-                        <a:defRPr/>
-                      </a:pPr>
-                      <a:r>
-                        <a:rPr kumimoji="0" lang="en-GB" sz="700" b="0" i="0" u="none" strike="noStrike" kern="1200" cap="none" spc="0" normalizeH="0" baseline="0" noProof="0" dirty="0">
-                          <a:ln>
-                            <a:noFill/>
-                          </a:ln>
-                          <a:solidFill>
-                            <a:srgbClr val="003B4C"/>
-                          </a:solidFill>
-                          <a:effectLst/>
-                          <a:uLnTx/>
-                          <a:uFillTx/>
-                          <a:latin typeface="Arial" panose="020B0604020202020204" pitchFamily="34" charset="0"/>
-                          <a:ea typeface="+mn-ea"/>
-                          <a:cs typeface="+mn-cs"/>
-                        </a:rPr>
-                        <a:t>Revenue: 1,211.41
-EBITDA: -651.33
-Market Cap: 266.31
-Total Debt: XXX
-FTE: nan</a:t>
-                      </a:r>
-                    </a:p>
-                  </a:txBody>
-                  <a:tcPr marL="168812" marR="0" marT="0" marB="0" anchor="ctr">
-                    <a:lnL>
-                      <a:noFill/>
-                    </a:lnL>
-                    <a:lnR>
-                      <a:noFill/>
-                    </a:lnR>
-                    <a:lnT w="6350" cap="flat" cmpd="sng" algn="ctr">
-                      <a:solidFill>
-                        <a:srgbClr val="DBD5CD"/>
-                      </a:solidFill>
-                      <a:prstDash val="solid"/>
-                      <a:round/>
-                      <a:headEnd type="none" w="med" len="med"/>
-                      <a:tailEnd type="none" w="med" len="med"/>
-                    </a:lnT>
-                    <a:lnB w="6350" cap="flat" cmpd="sng" algn="ctr">
-                      <a:solidFill>
-                        <a:srgbClr val="DBD5CD"/>
-                      </a:solidFill>
-                      <a:prstDash val="solid"/>
-                      <a:round/>
-                      <a:headEnd type="none" w="med" len="med"/>
-                      <a:tailEnd type="none" w="med" len="med"/>
-                    </a:lnB>
-                    <a:lnTlToBr>
-                      <a:noFill/>
-                    </a:lnTlToBr>
-                    <a:lnBlToTr>
-                      <a:noFill/>
-                    </a:lnBlToTr>
-                    <a:solidFill>
-                      <a:srgbClr val="F0F5F7"/>
-                    </a:solidFill>
-                  </a:tcPr>
-                </a:tc>
-                <a:tc>
-                  <a:txBody>
-                    <a:bodyPr/>
-                    <a:lstStyle/>
-                    <a:p>
                       <a:pPr marL="171450" marR="0" lvl="0" indent="-171450" algn="l" defTabSz="914395" rtl="0" eaLnBrk="1" fontAlgn="t" latinLnBrk="0" hangingPunct="1">
                         <a:lnSpc>
                           <a:spcPct val="100000"/>
@@ -27877,241 +26296,6 @@
                     <a:bodyPr/>
                     <a:lstStyle/>
                     <a:p>
-                      <a:pPr marL="0" marR="0" lvl="0" indent="0" algn="l" defTabSz="914395" rtl="0" eaLnBrk="1" fontAlgn="t" latinLnBrk="0" hangingPunct="1">
-                        <a:lnSpc>
-                          <a:spcPct val="100000"/>
-                        </a:lnSpc>
-                        <a:spcBef>
-                          <a:spcPts val="0"/>
-                        </a:spcBef>
-                        <a:spcAft>
-                          <a:spcPts val="0"/>
-                        </a:spcAft>
-                        <a:buClr>
-                          <a:srgbClr val="003B4C"/>
-                        </a:buClr>
-                        <a:buSzTx/>
-                        <a:buFont typeface="Wingdings" panose="05000000000000000000" pitchFamily="2" charset="2"/>
-                        <a:buNone/>
-                        <a:tabLst/>
-                        <a:defRPr/>
-                      </a:pPr>
-                      <a:r>
-                        <a:rPr kumimoji="0" lang="en-GB" sz="700" b="0" i="0" u="none" strike="noStrike" kern="1200" cap="none" spc="0" normalizeH="0" baseline="0" noProof="0" dirty="0">
-                          <a:ln>
-                            <a:noFill/>
-                          </a:ln>
-                          <a:solidFill>
-                            <a:srgbClr val="003B4C"/>
-                          </a:solidFill>
-                          <a:effectLst/>
-                          <a:uLnTx/>
-                          <a:uFillTx/>
-                          <a:latin typeface="Arial" panose="020B0604020202020204" pitchFamily="34" charset="0"/>
-                          <a:ea typeface="+mn-ea"/>
-                          <a:cs typeface="+mn-cs"/>
-                        </a:rPr>
-                        <a:t>Revenue:</a:t>
-                      </a:r>
-                    </a:p>
-                    <a:p>
-                      <a:pPr marL="0" marR="0" lvl="0" indent="0" algn="l" defTabSz="914395" rtl="0" eaLnBrk="1" fontAlgn="t" latinLnBrk="0" hangingPunct="1">
-                        <a:lnSpc>
-                          <a:spcPct val="100000"/>
-                        </a:lnSpc>
-                        <a:spcBef>
-                          <a:spcPts val="0"/>
-                        </a:spcBef>
-                        <a:spcAft>
-                          <a:spcPts val="0"/>
-                        </a:spcAft>
-                        <a:buClr>
-                          <a:srgbClr val="003B4C"/>
-                        </a:buClr>
-                        <a:buSzTx/>
-                        <a:buFont typeface="Wingdings" panose="05000000000000000000" pitchFamily="2" charset="2"/>
-                        <a:buNone/>
-                        <a:tabLst/>
-                        <a:defRPr/>
-                      </a:pPr>
-                      <a:r>
-                        <a:rPr kumimoji="0" lang="en-GB" sz="700" b="0" i="0" u="none" strike="noStrike" kern="1200" cap="none" spc="0" normalizeH="0" baseline="0" noProof="0" dirty="0">
-                          <a:ln>
-                            <a:noFill/>
-                          </a:ln>
-                          <a:solidFill>
-                            <a:srgbClr val="003B4C"/>
-                          </a:solidFill>
-                          <a:effectLst/>
-                          <a:uLnTx/>
-                          <a:uFillTx/>
-                          <a:latin typeface="Arial" panose="020B0604020202020204" pitchFamily="34" charset="0"/>
-                          <a:ea typeface="+mn-ea"/>
-                          <a:cs typeface="+mn-cs"/>
-                        </a:rPr>
-                        <a:t>EBITDA:</a:t>
-                      </a:r>
-                    </a:p>
-                    <a:p>
-                      <a:pPr marL="0" marR="0" lvl="0" indent="0" algn="l" defTabSz="914395" rtl="0" eaLnBrk="1" fontAlgn="t" latinLnBrk="0" hangingPunct="1">
-                        <a:lnSpc>
-                          <a:spcPct val="100000"/>
-                        </a:lnSpc>
-                        <a:spcBef>
-                          <a:spcPts val="0"/>
-                        </a:spcBef>
-                        <a:spcAft>
-                          <a:spcPts val="0"/>
-                        </a:spcAft>
-                        <a:buClr>
-                          <a:srgbClr val="003B4C"/>
-                        </a:buClr>
-                        <a:buSzTx/>
-                        <a:buFont typeface="Wingdings" panose="05000000000000000000" pitchFamily="2" charset="2"/>
-                        <a:buNone/>
-                        <a:tabLst/>
-                        <a:defRPr/>
-                      </a:pPr>
-                      <a:r>
-                        <a:rPr kumimoji="0" lang="en-GB" sz="700" b="0" i="0" u="none" strike="noStrike" kern="1200" cap="none" spc="0" normalizeH="0" baseline="0" noProof="0" dirty="0">
-                          <a:ln>
-                            <a:noFill/>
-                          </a:ln>
-                          <a:solidFill>
-                            <a:srgbClr val="003B4C"/>
-                          </a:solidFill>
-                          <a:effectLst/>
-                          <a:uLnTx/>
-                          <a:uFillTx/>
-                          <a:latin typeface="Arial" panose="020B0604020202020204" pitchFamily="34" charset="0"/>
-                          <a:ea typeface="+mn-ea"/>
-                          <a:cs typeface="+mn-cs"/>
-                        </a:rPr>
-                        <a:t>Market Cap:</a:t>
-                      </a:r>
-                    </a:p>
-                    <a:p>
-                      <a:pPr marL="0" marR="0" lvl="0" indent="0" algn="l" defTabSz="914395" rtl="0" eaLnBrk="1" fontAlgn="t" latinLnBrk="0" hangingPunct="1">
-                        <a:lnSpc>
-                          <a:spcPct val="100000"/>
-                        </a:lnSpc>
-                        <a:spcBef>
-                          <a:spcPts val="0"/>
-                        </a:spcBef>
-                        <a:spcAft>
-                          <a:spcPts val="0"/>
-                        </a:spcAft>
-                        <a:buClr>
-                          <a:srgbClr val="003B4C"/>
-                        </a:buClr>
-                        <a:buSzTx/>
-                        <a:buFont typeface="Wingdings" panose="05000000000000000000" pitchFamily="2" charset="2"/>
-                        <a:buNone/>
-                        <a:tabLst/>
-                        <a:defRPr/>
-                      </a:pPr>
-                      <a:r>
-                        <a:rPr kumimoji="0" lang="en-GB" sz="700" b="0" i="0" u="none" strike="noStrike" kern="1200" cap="none" spc="0" normalizeH="0" baseline="0" noProof="0" dirty="0">
-                          <a:ln>
-                            <a:noFill/>
-                          </a:ln>
-                          <a:solidFill>
-                            <a:srgbClr val="003B4C"/>
-                          </a:solidFill>
-                          <a:effectLst/>
-                          <a:uLnTx/>
-                          <a:uFillTx/>
-                          <a:latin typeface="Arial" panose="020B0604020202020204" pitchFamily="34" charset="0"/>
-                          <a:ea typeface="+mn-ea"/>
-                          <a:cs typeface="+mn-cs"/>
-                        </a:rPr>
-                        <a:t>Total Debt:</a:t>
-                      </a:r>
-                    </a:p>
-                    <a:p>
-                      <a:pPr marL="0" marR="0" lvl="0" indent="0" algn="l" defTabSz="914395" rtl="0" eaLnBrk="1" fontAlgn="t" latinLnBrk="0" hangingPunct="1">
-                        <a:lnSpc>
-                          <a:spcPct val="100000"/>
-                        </a:lnSpc>
-                        <a:spcBef>
-                          <a:spcPts val="0"/>
-                        </a:spcBef>
-                        <a:spcAft>
-                          <a:spcPts val="0"/>
-                        </a:spcAft>
-                        <a:buClr>
-                          <a:srgbClr val="003B4C"/>
-                        </a:buClr>
-                        <a:buSzTx/>
-                        <a:buFont typeface="Wingdings" panose="05000000000000000000" pitchFamily="2" charset="2"/>
-                        <a:buNone/>
-                        <a:tabLst/>
-                        <a:defRPr/>
-                      </a:pPr>
-                      <a:r>
-                        <a:rPr kumimoji="0" lang="en-GB" sz="700" b="0" i="0" u="none" strike="noStrike" kern="1200" cap="none" spc="0" normalizeH="0" baseline="0" noProof="0" dirty="0">
-                          <a:ln>
-                            <a:noFill/>
-                          </a:ln>
-                          <a:solidFill>
-                            <a:srgbClr val="003B4C"/>
-                          </a:solidFill>
-                          <a:effectLst/>
-                          <a:uLnTx/>
-                          <a:uFillTx/>
-                          <a:latin typeface="Arial" panose="020B0604020202020204" pitchFamily="34" charset="0"/>
-                          <a:ea typeface="+mn-ea"/>
-                          <a:cs typeface="+mn-cs"/>
-                        </a:rPr>
-                        <a:t>FTE:</a:t>
-                      </a:r>
-                    </a:p>
-                  </a:txBody>
-                  <a:tcPr marL="168812" marR="0" marT="0" marB="0" anchor="ctr">
-                    <a:lnL>
-                      <a:noFill/>
-                    </a:lnL>
-                    <a:lnR w="12700" cap="flat" cmpd="sng" algn="ctr">
-                      <a:noFill/>
-                      <a:prstDash val="solid"/>
-                      <a:round/>
-                      <a:headEnd type="none" w="med" len="med"/>
-                      <a:tailEnd type="none" w="med" len="med"/>
-                    </a:lnR>
-                    <a:lnT w="6350" cap="flat" cmpd="sng" algn="ctr">
-                      <a:solidFill>
-                        <a:srgbClr val="DBD5CD"/>
-                      </a:solidFill>
-                      <a:prstDash val="solid"/>
-                      <a:round/>
-                      <a:headEnd type="none" w="med" len="med"/>
-                      <a:tailEnd type="none" w="med" len="med"/>
-                    </a:lnT>
-                    <a:lnB w="9525" cap="flat" cmpd="sng" algn="ctr">
-                      <a:solidFill>
-                        <a:schemeClr val="bg2"/>
-                      </a:solidFill>
-                      <a:prstDash val="solid"/>
-                      <a:round/>
-                      <a:headEnd type="none" w="med" len="med"/>
-                      <a:tailEnd type="none" w="med" len="med"/>
-                    </a:lnB>
-                    <a:lnTlToBr>
-                      <a:noFill/>
-                    </a:lnTlToBr>
-                    <a:lnBlToTr>
-                      <a:noFill/>
-                    </a:lnBlToTr>
-                    <a:solidFill>
-                      <a:srgbClr val="FFFFFF"/>
-                    </a:solidFill>
-                  </a:tcPr>
-                </a:tc>
-                <a:tc>
-                  <a:txBody>
-                    <a:bodyPr/>
-                    <a:lstStyle/>
-                    <a:p>
                       <a:pPr marL="171450" marR="0" lvl="0" indent="-171450" algn="l" defTabSz="914395" rtl="0" eaLnBrk="1" fontAlgn="t" latinLnBrk="0" hangingPunct="1">
                         <a:lnSpc>
                           <a:spcPct val="100000"/>
@@ -28800,237 +26984,6 @@
                     <a:bodyPr/>
                     <a:lstStyle/>
                     <a:p>
-                      <a:pPr marL="0" marR="0" lvl="0" indent="0" algn="l" defTabSz="914395" rtl="0" eaLnBrk="1" fontAlgn="t" latinLnBrk="0" hangingPunct="1">
-                        <a:lnSpc>
-                          <a:spcPct val="100000"/>
-                        </a:lnSpc>
-                        <a:spcBef>
-                          <a:spcPts val="0"/>
-                        </a:spcBef>
-                        <a:spcAft>
-                          <a:spcPts val="0"/>
-                        </a:spcAft>
-                        <a:buClr>
-                          <a:srgbClr val="003B4C"/>
-                        </a:buClr>
-                        <a:buSzTx/>
-                        <a:buFont typeface="Wingdings" panose="05000000000000000000" pitchFamily="2" charset="2"/>
-                        <a:buNone/>
-                        <a:tabLst/>
-                        <a:defRPr/>
-                      </a:pPr>
-                      <a:r>
-                        <a:rPr kumimoji="0" lang="en-GB" sz="700" b="0" i="0" u="none" strike="noStrike" kern="1200" cap="none" spc="0" normalizeH="0" baseline="0" noProof="0" dirty="0">
-                          <a:ln>
-                            <a:noFill/>
-                          </a:ln>
-                          <a:solidFill>
-                            <a:srgbClr val="003B4C"/>
-                          </a:solidFill>
-                          <a:effectLst/>
-                          <a:uLnTx/>
-                          <a:uFillTx/>
-                          <a:latin typeface="Arial" panose="020B0604020202020204" pitchFamily="34" charset="0"/>
-                          <a:ea typeface="+mn-ea"/>
-                          <a:cs typeface="+mn-cs"/>
-                        </a:rPr>
-                        <a:t>Revenue:</a:t>
-                      </a:r>
-                    </a:p>
-                    <a:p>
-                      <a:pPr marL="0" marR="0" lvl="0" indent="0" algn="l" defTabSz="914395" rtl="0" eaLnBrk="1" fontAlgn="t" latinLnBrk="0" hangingPunct="1">
-                        <a:lnSpc>
-                          <a:spcPct val="100000"/>
-                        </a:lnSpc>
-                        <a:spcBef>
-                          <a:spcPts val="0"/>
-                        </a:spcBef>
-                        <a:spcAft>
-                          <a:spcPts val="0"/>
-                        </a:spcAft>
-                        <a:buClr>
-                          <a:srgbClr val="003B4C"/>
-                        </a:buClr>
-                        <a:buSzTx/>
-                        <a:buFont typeface="Wingdings" panose="05000000000000000000" pitchFamily="2" charset="2"/>
-                        <a:buNone/>
-                        <a:tabLst/>
-                        <a:defRPr/>
-                      </a:pPr>
-                      <a:r>
-                        <a:rPr kumimoji="0" lang="en-GB" sz="700" b="0" i="0" u="none" strike="noStrike" kern="1200" cap="none" spc="0" normalizeH="0" baseline="0" noProof="0" dirty="0">
-                          <a:ln>
-                            <a:noFill/>
-                          </a:ln>
-                          <a:solidFill>
-                            <a:srgbClr val="003B4C"/>
-                          </a:solidFill>
-                          <a:effectLst/>
-                          <a:uLnTx/>
-                          <a:uFillTx/>
-                          <a:latin typeface="Arial" panose="020B0604020202020204" pitchFamily="34" charset="0"/>
-                          <a:ea typeface="+mn-ea"/>
-                          <a:cs typeface="+mn-cs"/>
-                        </a:rPr>
-                        <a:t>EBITDA:</a:t>
-                      </a:r>
-                    </a:p>
-                    <a:p>
-                      <a:pPr marL="0" marR="0" lvl="0" indent="0" algn="l" defTabSz="914395" rtl="0" eaLnBrk="1" fontAlgn="t" latinLnBrk="0" hangingPunct="1">
-                        <a:lnSpc>
-                          <a:spcPct val="100000"/>
-                        </a:lnSpc>
-                        <a:spcBef>
-                          <a:spcPts val="0"/>
-                        </a:spcBef>
-                        <a:spcAft>
-                          <a:spcPts val="0"/>
-                        </a:spcAft>
-                        <a:buClr>
-                          <a:srgbClr val="003B4C"/>
-                        </a:buClr>
-                        <a:buSzTx/>
-                        <a:buFont typeface="Wingdings" panose="05000000000000000000" pitchFamily="2" charset="2"/>
-                        <a:buNone/>
-                        <a:tabLst/>
-                        <a:defRPr/>
-                      </a:pPr>
-                      <a:r>
-                        <a:rPr kumimoji="0" lang="en-GB" sz="700" b="0" i="0" u="none" strike="noStrike" kern="1200" cap="none" spc="0" normalizeH="0" baseline="0" noProof="0" dirty="0">
-                          <a:ln>
-                            <a:noFill/>
-                          </a:ln>
-                          <a:solidFill>
-                            <a:srgbClr val="003B4C"/>
-                          </a:solidFill>
-                          <a:effectLst/>
-                          <a:uLnTx/>
-                          <a:uFillTx/>
-                          <a:latin typeface="Arial" panose="020B0604020202020204" pitchFamily="34" charset="0"/>
-                          <a:ea typeface="+mn-ea"/>
-                          <a:cs typeface="+mn-cs"/>
-                        </a:rPr>
-                        <a:t>Market Cap:</a:t>
-                      </a:r>
-                    </a:p>
-                    <a:p>
-                      <a:pPr marL="0" marR="0" lvl="0" indent="0" algn="l" defTabSz="914395" rtl="0" eaLnBrk="1" fontAlgn="t" latinLnBrk="0" hangingPunct="1">
-                        <a:lnSpc>
-                          <a:spcPct val="100000"/>
-                        </a:lnSpc>
-                        <a:spcBef>
-                          <a:spcPts val="0"/>
-                        </a:spcBef>
-                        <a:spcAft>
-                          <a:spcPts val="0"/>
-                        </a:spcAft>
-                        <a:buClr>
-                          <a:srgbClr val="003B4C"/>
-                        </a:buClr>
-                        <a:buSzTx/>
-                        <a:buFont typeface="Wingdings" panose="05000000000000000000" pitchFamily="2" charset="2"/>
-                        <a:buNone/>
-                        <a:tabLst/>
-                        <a:defRPr/>
-                      </a:pPr>
-                      <a:r>
-                        <a:rPr kumimoji="0" lang="en-GB" sz="700" b="0" i="0" u="none" strike="noStrike" kern="1200" cap="none" spc="0" normalizeH="0" baseline="0" noProof="0" dirty="0">
-                          <a:ln>
-                            <a:noFill/>
-                          </a:ln>
-                          <a:solidFill>
-                            <a:srgbClr val="003B4C"/>
-                          </a:solidFill>
-                          <a:effectLst/>
-                          <a:uLnTx/>
-                          <a:uFillTx/>
-                          <a:latin typeface="Arial" panose="020B0604020202020204" pitchFamily="34" charset="0"/>
-                          <a:ea typeface="+mn-ea"/>
-                          <a:cs typeface="+mn-cs"/>
-                        </a:rPr>
-                        <a:t>Total Debt:</a:t>
-                      </a:r>
-                    </a:p>
-                    <a:p>
-                      <a:pPr marL="0" marR="0" lvl="0" indent="0" algn="l" defTabSz="914395" rtl="0" eaLnBrk="1" fontAlgn="t" latinLnBrk="0" hangingPunct="1">
-                        <a:lnSpc>
-                          <a:spcPct val="100000"/>
-                        </a:lnSpc>
-                        <a:spcBef>
-                          <a:spcPts val="0"/>
-                        </a:spcBef>
-                        <a:spcAft>
-                          <a:spcPts val="0"/>
-                        </a:spcAft>
-                        <a:buClr>
-                          <a:srgbClr val="003B4C"/>
-                        </a:buClr>
-                        <a:buSzTx/>
-                        <a:buFont typeface="Wingdings" panose="05000000000000000000" pitchFamily="2" charset="2"/>
-                        <a:buNone/>
-                        <a:tabLst/>
-                        <a:defRPr/>
-                      </a:pPr>
-                      <a:r>
-                        <a:rPr kumimoji="0" lang="en-GB" sz="700" b="0" i="0" u="none" strike="noStrike" kern="1200" cap="none" spc="0" normalizeH="0" baseline="0" noProof="0" dirty="0">
-                          <a:ln>
-                            <a:noFill/>
-                          </a:ln>
-                          <a:solidFill>
-                            <a:srgbClr val="003B4C"/>
-                          </a:solidFill>
-                          <a:effectLst/>
-                          <a:uLnTx/>
-                          <a:uFillTx/>
-                          <a:latin typeface="Arial" panose="020B0604020202020204" pitchFamily="34" charset="0"/>
-                          <a:ea typeface="+mn-ea"/>
-                          <a:cs typeface="+mn-cs"/>
-                        </a:rPr>
-                        <a:t>FTE:</a:t>
-                      </a:r>
-                    </a:p>
-                  </a:txBody>
-                  <a:tcPr marL="168812" marR="0" marT="0" marB="0" anchor="ctr">
-                    <a:lnL>
-                      <a:noFill/>
-                    </a:lnL>
-                    <a:lnR>
-                      <a:noFill/>
-                    </a:lnR>
-                    <a:lnT w="9525" cap="flat" cmpd="sng" algn="ctr">
-                      <a:solidFill>
-                        <a:schemeClr val="bg2"/>
-                      </a:solidFill>
-                      <a:prstDash val="solid"/>
-                      <a:round/>
-                      <a:headEnd type="none" w="med" len="med"/>
-                      <a:tailEnd type="none" w="med" len="med"/>
-                    </a:lnT>
-                    <a:lnB w="9525" cap="flat" cmpd="sng" algn="ctr">
-                      <a:solidFill>
-                        <a:schemeClr val="bg2"/>
-                      </a:solidFill>
-                      <a:prstDash val="solid"/>
-                      <a:round/>
-                      <a:headEnd type="none" w="med" len="med"/>
-                      <a:tailEnd type="none" w="med" len="med"/>
-                    </a:lnB>
-                    <a:lnTlToBr>
-                      <a:noFill/>
-                    </a:lnTlToBr>
-                    <a:lnBlToTr>
-                      <a:noFill/>
-                    </a:lnBlToTr>
-                    <a:solidFill>
-                      <a:srgbClr val="F0F5F7"/>
-                    </a:solidFill>
-                  </a:tcPr>
-                </a:tc>
-                <a:tc>
-                  <a:txBody>
-                    <a:bodyPr/>
-                    <a:lstStyle/>
-                    <a:p>
                       <a:pPr marL="171450" marR="0" lvl="0" indent="-171450" algn="l" defTabSz="914395" rtl="0" eaLnBrk="1" fontAlgn="t" latinLnBrk="0" hangingPunct="1">
                         <a:lnSpc>
                           <a:spcPct val="100000"/>
@@ -29739,237 +27692,6 @@
                     <a:bodyPr/>
                     <a:lstStyle/>
                     <a:p>
-                      <a:pPr marL="0" marR="0" lvl="0" indent="0" algn="l" defTabSz="914395" rtl="0" eaLnBrk="1" fontAlgn="t" latinLnBrk="0" hangingPunct="1">
-                        <a:lnSpc>
-                          <a:spcPct val="100000"/>
-                        </a:lnSpc>
-                        <a:spcBef>
-                          <a:spcPts val="0"/>
-                        </a:spcBef>
-                        <a:spcAft>
-                          <a:spcPts val="0"/>
-                        </a:spcAft>
-                        <a:buClr>
-                          <a:srgbClr val="003B4C"/>
-                        </a:buClr>
-                        <a:buSzTx/>
-                        <a:buFont typeface="Wingdings" panose="05000000000000000000" pitchFamily="2" charset="2"/>
-                        <a:buNone/>
-                        <a:tabLst/>
-                        <a:defRPr/>
-                      </a:pPr>
-                      <a:r>
-                        <a:rPr kumimoji="0" lang="en-GB" sz="700" b="0" i="0" u="none" strike="noStrike" kern="1200" cap="none" spc="0" normalizeH="0" baseline="0" noProof="0" dirty="0">
-                          <a:ln>
-                            <a:noFill/>
-                          </a:ln>
-                          <a:solidFill>
-                            <a:srgbClr val="003B4C"/>
-                          </a:solidFill>
-                          <a:effectLst/>
-                          <a:uLnTx/>
-                          <a:uFillTx/>
-                          <a:latin typeface="Arial" panose="020B0604020202020204" pitchFamily="34" charset="0"/>
-                          <a:ea typeface="+mn-ea"/>
-                          <a:cs typeface="+mn-cs"/>
-                        </a:rPr>
-                        <a:t>Revenue:</a:t>
-                      </a:r>
-                    </a:p>
-                    <a:p>
-                      <a:pPr marL="0" marR="0" lvl="0" indent="0" algn="l" defTabSz="914395" rtl="0" eaLnBrk="1" fontAlgn="t" latinLnBrk="0" hangingPunct="1">
-                        <a:lnSpc>
-                          <a:spcPct val="100000"/>
-                        </a:lnSpc>
-                        <a:spcBef>
-                          <a:spcPts val="0"/>
-                        </a:spcBef>
-                        <a:spcAft>
-                          <a:spcPts val="0"/>
-                        </a:spcAft>
-                        <a:buClr>
-                          <a:srgbClr val="003B4C"/>
-                        </a:buClr>
-                        <a:buSzTx/>
-                        <a:buFont typeface="Wingdings" panose="05000000000000000000" pitchFamily="2" charset="2"/>
-                        <a:buNone/>
-                        <a:tabLst/>
-                        <a:defRPr/>
-                      </a:pPr>
-                      <a:r>
-                        <a:rPr kumimoji="0" lang="en-GB" sz="700" b="0" i="0" u="none" strike="noStrike" kern="1200" cap="none" spc="0" normalizeH="0" baseline="0" noProof="0" dirty="0">
-                          <a:ln>
-                            <a:noFill/>
-                          </a:ln>
-                          <a:solidFill>
-                            <a:srgbClr val="003B4C"/>
-                          </a:solidFill>
-                          <a:effectLst/>
-                          <a:uLnTx/>
-                          <a:uFillTx/>
-                          <a:latin typeface="Arial" panose="020B0604020202020204" pitchFamily="34" charset="0"/>
-                          <a:ea typeface="+mn-ea"/>
-                          <a:cs typeface="+mn-cs"/>
-                        </a:rPr>
-                        <a:t>EBITDA:</a:t>
-                      </a:r>
-                    </a:p>
-                    <a:p>
-                      <a:pPr marL="0" marR="0" lvl="0" indent="0" algn="l" defTabSz="914395" rtl="0" eaLnBrk="1" fontAlgn="t" latinLnBrk="0" hangingPunct="1">
-                        <a:lnSpc>
-                          <a:spcPct val="100000"/>
-                        </a:lnSpc>
-                        <a:spcBef>
-                          <a:spcPts val="0"/>
-                        </a:spcBef>
-                        <a:spcAft>
-                          <a:spcPts val="0"/>
-                        </a:spcAft>
-                        <a:buClr>
-                          <a:srgbClr val="003B4C"/>
-                        </a:buClr>
-                        <a:buSzTx/>
-                        <a:buFont typeface="Wingdings" panose="05000000000000000000" pitchFamily="2" charset="2"/>
-                        <a:buNone/>
-                        <a:tabLst/>
-                        <a:defRPr/>
-                      </a:pPr>
-                      <a:r>
-                        <a:rPr kumimoji="0" lang="en-GB" sz="700" b="0" i="0" u="none" strike="noStrike" kern="1200" cap="none" spc="0" normalizeH="0" baseline="0" noProof="0" dirty="0">
-                          <a:ln>
-                            <a:noFill/>
-                          </a:ln>
-                          <a:solidFill>
-                            <a:srgbClr val="003B4C"/>
-                          </a:solidFill>
-                          <a:effectLst/>
-                          <a:uLnTx/>
-                          <a:uFillTx/>
-                          <a:latin typeface="Arial" panose="020B0604020202020204" pitchFamily="34" charset="0"/>
-                          <a:ea typeface="+mn-ea"/>
-                          <a:cs typeface="+mn-cs"/>
-                        </a:rPr>
-                        <a:t>Market Cap:</a:t>
-                      </a:r>
-                    </a:p>
-                    <a:p>
-                      <a:pPr marL="0" marR="0" lvl="0" indent="0" algn="l" defTabSz="914395" rtl="0" eaLnBrk="1" fontAlgn="t" latinLnBrk="0" hangingPunct="1">
-                        <a:lnSpc>
-                          <a:spcPct val="100000"/>
-                        </a:lnSpc>
-                        <a:spcBef>
-                          <a:spcPts val="0"/>
-                        </a:spcBef>
-                        <a:spcAft>
-                          <a:spcPts val="0"/>
-                        </a:spcAft>
-                        <a:buClr>
-                          <a:srgbClr val="003B4C"/>
-                        </a:buClr>
-                        <a:buSzTx/>
-                        <a:buFont typeface="Wingdings" panose="05000000000000000000" pitchFamily="2" charset="2"/>
-                        <a:buNone/>
-                        <a:tabLst/>
-                        <a:defRPr/>
-                      </a:pPr>
-                      <a:r>
-                        <a:rPr kumimoji="0" lang="en-GB" sz="700" b="0" i="0" u="none" strike="noStrike" kern="1200" cap="none" spc="0" normalizeH="0" baseline="0" noProof="0" dirty="0">
-                          <a:ln>
-                            <a:noFill/>
-                          </a:ln>
-                          <a:solidFill>
-                            <a:srgbClr val="003B4C"/>
-                          </a:solidFill>
-                          <a:effectLst/>
-                          <a:uLnTx/>
-                          <a:uFillTx/>
-                          <a:latin typeface="Arial" panose="020B0604020202020204" pitchFamily="34" charset="0"/>
-                          <a:ea typeface="+mn-ea"/>
-                          <a:cs typeface="+mn-cs"/>
-                        </a:rPr>
-                        <a:t>Total Debt:</a:t>
-                      </a:r>
-                    </a:p>
-                    <a:p>
-                      <a:pPr marL="0" marR="0" lvl="0" indent="0" algn="l" defTabSz="914395" rtl="0" eaLnBrk="1" fontAlgn="t" latinLnBrk="0" hangingPunct="1">
-                        <a:lnSpc>
-                          <a:spcPct val="100000"/>
-                        </a:lnSpc>
-                        <a:spcBef>
-                          <a:spcPts val="0"/>
-                        </a:spcBef>
-                        <a:spcAft>
-                          <a:spcPts val="0"/>
-                        </a:spcAft>
-                        <a:buClr>
-                          <a:srgbClr val="003B4C"/>
-                        </a:buClr>
-                        <a:buSzTx/>
-                        <a:buFont typeface="Wingdings" panose="05000000000000000000" pitchFamily="2" charset="2"/>
-                        <a:buNone/>
-                        <a:tabLst/>
-                        <a:defRPr/>
-                      </a:pPr>
-                      <a:r>
-                        <a:rPr kumimoji="0" lang="en-GB" sz="700" b="0" i="0" u="none" strike="noStrike" kern="1200" cap="none" spc="0" normalizeH="0" baseline="0" noProof="0" dirty="0">
-                          <a:ln>
-                            <a:noFill/>
-                          </a:ln>
-                          <a:solidFill>
-                            <a:srgbClr val="003B4C"/>
-                          </a:solidFill>
-                          <a:effectLst/>
-                          <a:uLnTx/>
-                          <a:uFillTx/>
-                          <a:latin typeface="Arial" panose="020B0604020202020204" pitchFamily="34" charset="0"/>
-                          <a:ea typeface="+mn-ea"/>
-                          <a:cs typeface="+mn-cs"/>
-                        </a:rPr>
-                        <a:t>FTE:</a:t>
-                      </a:r>
-                    </a:p>
-                  </a:txBody>
-                  <a:tcPr marL="168812" marR="0" marT="0" marB="0" anchor="ctr">
-                    <a:lnL>
-                      <a:noFill/>
-                    </a:lnL>
-                    <a:lnR>
-                      <a:noFill/>
-                    </a:lnR>
-                    <a:lnT w="9525" cap="flat" cmpd="sng" algn="ctr">
-                      <a:solidFill>
-                        <a:schemeClr val="bg2"/>
-                      </a:solidFill>
-                      <a:prstDash val="solid"/>
-                      <a:round/>
-                      <a:headEnd type="none" w="med" len="med"/>
-                      <a:tailEnd type="none" w="med" len="med"/>
-                    </a:lnT>
-                    <a:lnB w="9525" cap="flat" cmpd="sng" algn="ctr">
-                      <a:solidFill>
-                        <a:schemeClr val="bg2"/>
-                      </a:solidFill>
-                      <a:prstDash val="solid"/>
-                      <a:round/>
-                      <a:headEnd type="none" w="med" len="med"/>
-                      <a:tailEnd type="none" w="med" len="med"/>
-                    </a:lnB>
-                    <a:lnTlToBr>
-                      <a:noFill/>
-                    </a:lnTlToBr>
-                    <a:lnBlToTr>
-                      <a:noFill/>
-                    </a:lnBlToTr>
-                    <a:solidFill>
-                      <a:srgbClr val="FFFFFF"/>
-                    </a:solidFill>
-                  </a:tcPr>
-                </a:tc>
-                <a:tc>
-                  <a:txBody>
-                    <a:bodyPr/>
-                    <a:lstStyle/>
-                    <a:p>
                       <a:pPr marL="171450" marR="0" lvl="0" indent="-171450" algn="l" defTabSz="914395" rtl="0" eaLnBrk="1" fontAlgn="t" latinLnBrk="0" hangingPunct="1">
                         <a:lnSpc>
                           <a:spcPct val="100000"/>
@@ -30666,237 +28388,6 @@
                     <a:bodyPr/>
                     <a:lstStyle/>
                     <a:p>
-                      <a:pPr marL="0" marR="0" lvl="0" indent="0" algn="l" defTabSz="914395" rtl="0" eaLnBrk="1" fontAlgn="t" latinLnBrk="0" hangingPunct="1">
-                        <a:lnSpc>
-                          <a:spcPct val="100000"/>
-                        </a:lnSpc>
-                        <a:spcBef>
-                          <a:spcPts val="0"/>
-                        </a:spcBef>
-                        <a:spcAft>
-                          <a:spcPts val="0"/>
-                        </a:spcAft>
-                        <a:buClr>
-                          <a:srgbClr val="003B4C"/>
-                        </a:buClr>
-                        <a:buSzTx/>
-                        <a:buFont typeface="Wingdings" panose="05000000000000000000" pitchFamily="2" charset="2"/>
-                        <a:buNone/>
-                        <a:tabLst/>
-                        <a:defRPr/>
-                      </a:pPr>
-                      <a:r>
-                        <a:rPr kumimoji="0" lang="en-GB" sz="700" b="0" i="0" u="none" strike="noStrike" kern="1200" cap="none" spc="0" normalizeH="0" baseline="0" noProof="0" dirty="0">
-                          <a:ln>
-                            <a:noFill/>
-                          </a:ln>
-                          <a:solidFill>
-                            <a:srgbClr val="003B4C"/>
-                          </a:solidFill>
-                          <a:effectLst/>
-                          <a:uLnTx/>
-                          <a:uFillTx/>
-                          <a:latin typeface="Arial" panose="020B0604020202020204" pitchFamily="34" charset="0"/>
-                          <a:ea typeface="+mn-ea"/>
-                          <a:cs typeface="+mn-cs"/>
-                        </a:rPr>
-                        <a:t>Revenue:</a:t>
-                      </a:r>
-                    </a:p>
-                    <a:p>
-                      <a:pPr marL="0" marR="0" lvl="0" indent="0" algn="l" defTabSz="914395" rtl="0" eaLnBrk="1" fontAlgn="t" latinLnBrk="0" hangingPunct="1">
-                        <a:lnSpc>
-                          <a:spcPct val="100000"/>
-                        </a:lnSpc>
-                        <a:spcBef>
-                          <a:spcPts val="0"/>
-                        </a:spcBef>
-                        <a:spcAft>
-                          <a:spcPts val="0"/>
-                        </a:spcAft>
-                        <a:buClr>
-                          <a:srgbClr val="003B4C"/>
-                        </a:buClr>
-                        <a:buSzTx/>
-                        <a:buFont typeface="Wingdings" panose="05000000000000000000" pitchFamily="2" charset="2"/>
-                        <a:buNone/>
-                        <a:tabLst/>
-                        <a:defRPr/>
-                      </a:pPr>
-                      <a:r>
-                        <a:rPr kumimoji="0" lang="en-GB" sz="700" b="0" i="0" u="none" strike="noStrike" kern="1200" cap="none" spc="0" normalizeH="0" baseline="0" noProof="0" dirty="0">
-                          <a:ln>
-                            <a:noFill/>
-                          </a:ln>
-                          <a:solidFill>
-                            <a:srgbClr val="003B4C"/>
-                          </a:solidFill>
-                          <a:effectLst/>
-                          <a:uLnTx/>
-                          <a:uFillTx/>
-                          <a:latin typeface="Arial" panose="020B0604020202020204" pitchFamily="34" charset="0"/>
-                          <a:ea typeface="+mn-ea"/>
-                          <a:cs typeface="+mn-cs"/>
-                        </a:rPr>
-                        <a:t>EBITDA:</a:t>
-                      </a:r>
-                    </a:p>
-                    <a:p>
-                      <a:pPr marL="0" marR="0" lvl="0" indent="0" algn="l" defTabSz="914395" rtl="0" eaLnBrk="1" fontAlgn="t" latinLnBrk="0" hangingPunct="1">
-                        <a:lnSpc>
-                          <a:spcPct val="100000"/>
-                        </a:lnSpc>
-                        <a:spcBef>
-                          <a:spcPts val="0"/>
-                        </a:spcBef>
-                        <a:spcAft>
-                          <a:spcPts val="0"/>
-                        </a:spcAft>
-                        <a:buClr>
-                          <a:srgbClr val="003B4C"/>
-                        </a:buClr>
-                        <a:buSzTx/>
-                        <a:buFont typeface="Wingdings" panose="05000000000000000000" pitchFamily="2" charset="2"/>
-                        <a:buNone/>
-                        <a:tabLst/>
-                        <a:defRPr/>
-                      </a:pPr>
-                      <a:r>
-                        <a:rPr kumimoji="0" lang="en-GB" sz="700" b="0" i="0" u="none" strike="noStrike" kern="1200" cap="none" spc="0" normalizeH="0" baseline="0" noProof="0" dirty="0">
-                          <a:ln>
-                            <a:noFill/>
-                          </a:ln>
-                          <a:solidFill>
-                            <a:srgbClr val="003B4C"/>
-                          </a:solidFill>
-                          <a:effectLst/>
-                          <a:uLnTx/>
-                          <a:uFillTx/>
-                          <a:latin typeface="Arial" panose="020B0604020202020204" pitchFamily="34" charset="0"/>
-                          <a:ea typeface="+mn-ea"/>
-                          <a:cs typeface="+mn-cs"/>
-                        </a:rPr>
-                        <a:t>Market Cap:</a:t>
-                      </a:r>
-                    </a:p>
-                    <a:p>
-                      <a:pPr marL="0" marR="0" lvl="0" indent="0" algn="l" defTabSz="914395" rtl="0" eaLnBrk="1" fontAlgn="t" latinLnBrk="0" hangingPunct="1">
-                        <a:lnSpc>
-                          <a:spcPct val="100000"/>
-                        </a:lnSpc>
-                        <a:spcBef>
-                          <a:spcPts val="0"/>
-                        </a:spcBef>
-                        <a:spcAft>
-                          <a:spcPts val="0"/>
-                        </a:spcAft>
-                        <a:buClr>
-                          <a:srgbClr val="003B4C"/>
-                        </a:buClr>
-                        <a:buSzTx/>
-                        <a:buFont typeface="Wingdings" panose="05000000000000000000" pitchFamily="2" charset="2"/>
-                        <a:buNone/>
-                        <a:tabLst/>
-                        <a:defRPr/>
-                      </a:pPr>
-                      <a:r>
-                        <a:rPr kumimoji="0" lang="en-GB" sz="700" b="0" i="0" u="none" strike="noStrike" kern="1200" cap="none" spc="0" normalizeH="0" baseline="0" noProof="0" dirty="0">
-                          <a:ln>
-                            <a:noFill/>
-                          </a:ln>
-                          <a:solidFill>
-                            <a:srgbClr val="003B4C"/>
-                          </a:solidFill>
-                          <a:effectLst/>
-                          <a:uLnTx/>
-                          <a:uFillTx/>
-                          <a:latin typeface="Arial" panose="020B0604020202020204" pitchFamily="34" charset="0"/>
-                          <a:ea typeface="+mn-ea"/>
-                          <a:cs typeface="+mn-cs"/>
-                        </a:rPr>
-                        <a:t>Total Debt:</a:t>
-                      </a:r>
-                    </a:p>
-                    <a:p>
-                      <a:pPr marL="0" marR="0" lvl="0" indent="0" algn="l" defTabSz="914395" rtl="0" eaLnBrk="1" fontAlgn="t" latinLnBrk="0" hangingPunct="1">
-                        <a:lnSpc>
-                          <a:spcPct val="100000"/>
-                        </a:lnSpc>
-                        <a:spcBef>
-                          <a:spcPts val="0"/>
-                        </a:spcBef>
-                        <a:spcAft>
-                          <a:spcPts val="0"/>
-                        </a:spcAft>
-                        <a:buClr>
-                          <a:srgbClr val="003B4C"/>
-                        </a:buClr>
-                        <a:buSzTx/>
-                        <a:buFont typeface="Wingdings" panose="05000000000000000000" pitchFamily="2" charset="2"/>
-                        <a:buNone/>
-                        <a:tabLst/>
-                        <a:defRPr/>
-                      </a:pPr>
-                      <a:r>
-                        <a:rPr kumimoji="0" lang="en-GB" sz="700" b="0" i="0" u="none" strike="noStrike" kern="1200" cap="none" spc="0" normalizeH="0" baseline="0" noProof="0" dirty="0">
-                          <a:ln>
-                            <a:noFill/>
-                          </a:ln>
-                          <a:solidFill>
-                            <a:srgbClr val="003B4C"/>
-                          </a:solidFill>
-                          <a:effectLst/>
-                          <a:uLnTx/>
-                          <a:uFillTx/>
-                          <a:latin typeface="Arial" panose="020B0604020202020204" pitchFamily="34" charset="0"/>
-                          <a:ea typeface="+mn-ea"/>
-                          <a:cs typeface="+mn-cs"/>
-                        </a:rPr>
-                        <a:t>FTE:</a:t>
-                      </a:r>
-                    </a:p>
-                  </a:txBody>
-                  <a:tcPr marL="168812" marR="0" marT="0" marB="0" anchor="ctr">
-                    <a:lnL>
-                      <a:noFill/>
-                    </a:lnL>
-                    <a:lnR>
-                      <a:noFill/>
-                    </a:lnR>
-                    <a:lnT w="9525" cap="flat" cmpd="sng" algn="ctr">
-                      <a:solidFill>
-                        <a:schemeClr val="bg2"/>
-                      </a:solidFill>
-                      <a:prstDash val="solid"/>
-                      <a:round/>
-                      <a:headEnd type="none" w="med" len="med"/>
-                      <a:tailEnd type="none" w="med" len="med"/>
-                    </a:lnT>
-                    <a:lnB w="9525" cap="flat" cmpd="sng" algn="ctr">
-                      <a:solidFill>
-                        <a:schemeClr val="bg2"/>
-                      </a:solidFill>
-                      <a:prstDash val="solid"/>
-                      <a:round/>
-                      <a:headEnd type="none" w="med" len="med"/>
-                      <a:tailEnd type="none" w="med" len="med"/>
-                    </a:lnB>
-                    <a:lnTlToBr>
-                      <a:noFill/>
-                    </a:lnTlToBr>
-                    <a:lnBlToTr>
-                      <a:noFill/>
-                    </a:lnBlToTr>
-                    <a:solidFill>
-                      <a:srgbClr val="F0F5F7"/>
-                    </a:solidFill>
-                  </a:tcPr>
-                </a:tc>
-                <a:tc>
-                  <a:txBody>
-                    <a:bodyPr/>
-                    <a:lstStyle/>
-                    <a:p>
                       <a:pPr marL="171450" marR="0" lvl="0" indent="-171450" algn="l" defTabSz="914395" rtl="0" eaLnBrk="1" fontAlgn="t" latinLnBrk="0" hangingPunct="1">
                         <a:lnSpc>
                           <a:spcPct val="100000"/>
@@ -31263,8 +28754,8 @@
         </p:blipFill>
         <p:spPr>
           <a:xfrm>
-            <a:off x="585274" y="1372337"/>
-            <a:ext cx="1030918" cy="381387"/>
+            <a:off x="798213" y="1364709"/>
+            <a:ext cx="1367882" cy="419525"/>
           </a:xfrm>
           <a:prstGeom prst="rect">
             <a:avLst/>
@@ -31287,8 +28778,8 @@
         </p:blipFill>
         <p:spPr>
           <a:xfrm>
-            <a:off x="585274" y="2133797"/>
-            <a:ext cx="1030918" cy="377736"/>
+            <a:off x="798213" y="2126242"/>
+            <a:ext cx="1367882" cy="415510"/>
           </a:xfrm>
           <a:prstGeom prst="rect">
             <a:avLst/>

</xml_diff>

<commit_message>
copied and removed files for new project
</commit_message>
<xml_diff>
--- a/buyers_presentation.pptx
+++ b/buyers_presentation.pptx
@@ -28077,7 +28077,7 @@
                         <a:t>Revenue: 3,436.45
 EBITDA: 1,305.15
 Market Cap: 1,377.90
-Total Debt: XXX
+Total Debt: nan
 FTE: nan</a:t>
                       </a:r>
                     </a:p>
@@ -28774,7 +28774,7 @@
                         <a:t>Revenue: 182.98
 EBITDA: -6.56
 Market Cap: nan
-Total Debt: XXX
+Total Debt: nan
 FTE: nan</a:t>
                       </a:r>
                     </a:p>
@@ -29479,7 +29479,7 @@
                         <a:t>Revenue: nan
 EBITDA: nan
 Market Cap: nan
-Total Debt: XXX
+Total Debt: nan
 FTE: nan</a:t>
                       </a:r>
                     </a:p>
@@ -30168,7 +30168,7 @@
                         <a:t>Revenue: 5,806.85
 EBITDA: 1,578.53
 Market Cap: nan
-Total Debt: XXX
+Total Debt: nan
 FTE: nan</a:t>
                       </a:r>
                     </a:p>
@@ -30873,7 +30873,7 @@
                         <a:t>Revenue: nan
 EBITDA: nan
 Market Cap: nan
-Total Debt: XXX
+Total Debt: nan
 FTE: nan</a:t>
                       </a:r>
                     </a:p>
@@ -31566,7 +31566,7 @@
                         <a:t>Revenue: 11,415.67
 EBITDA: -653.22
 Market Cap: 366.34
-Total Debt: XXX
+Total Debt: nan
 FTE: nan</a:t>
                       </a:r>
                     </a:p>
@@ -33050,7 +33050,7 @@
                         <a:t>Revenue: nan
 EBITDA: nan
 Market Cap: nan
-Total Debt: XXX
+Total Debt: nan
 FTE: nan</a:t>
                       </a:r>
                     </a:p>
@@ -33747,7 +33747,7 @@
                         <a:t>Revenue: 5,411.15
 EBITDA: 1,137.76
 Market Cap: nan
-Total Debt: XXX
+Total Debt: nan
 FTE: nan</a:t>
                       </a:r>
                     </a:p>
@@ -34453,7 +34453,7 @@
                         <a:t>Revenue: 2,779.22
 EBITDA: nan
 Market Cap: 5,059.03
-Total Debt: XXX
+Total Debt: nan
 FTE: nan</a:t>
                       </a:r>
                     </a:p>
@@ -35142,7 +35142,7 @@
                         <a:t>Revenue: 998.37
 EBITDA: 16.34
 Market Cap: nan
-Total Debt: XXX
+Total Debt: nan
 FTE: nan</a:t>
                       </a:r>
                     </a:p>
@@ -35847,7 +35847,7 @@
                         <a:t>Revenue: 4,976.27
 EBITDA: 2,610.50
 Market Cap: 6,970.54
-Total Debt: XXX
+Total Debt: nan
 FTE: nan</a:t>
                       </a:r>
                     </a:p>
@@ -36540,7 +36540,7 @@
                         <a:t>Revenue: nan
 EBITDA: nan
 Market Cap: nan
-Total Debt: XXX
+Total Debt: nan
 FTE: nan</a:t>
                       </a:r>
                     </a:p>
@@ -38048,7 +38048,7 @@
                         <a:t>Revenue: 1,211.41
 EBITDA: -651.33
 Market Cap: 266.31
-Total Debt: XXX
+Total Debt: nan
 FTE: nan</a:t>
                       </a:r>
                     </a:p>
@@ -38745,7 +38745,7 @@
                         <a:t>Revenue: 1,211.41
 EBITDA: -651.33
 Market Cap: 266.31
-Total Debt: XXX
+Total Debt: nan
 FTE: nan</a:t>
                       </a:r>
                     </a:p>

</xml_diff>

<commit_message>
Added linc advised favi Refactored column order
</commit_message>
<xml_diff>
--- a/buyers_presentation.pptx
+++ b/buyers_presentation.pptx
@@ -27110,7 +27110,7 @@
           <p:nvPr>
             <p:extLst>
               <p:ext uri="{D42A27DB-BD31-4B8C-83A1-F6EECF244321}">
-                <p14:modId xmlns:p14="http://schemas.microsoft.com/office/powerpoint/2010/main" val="341992840"/>
+                <p14:modId xmlns:p14="http://schemas.microsoft.com/office/powerpoint/2010/main" val="3557598170"/>
               </p:ext>
             </p:extLst>
           </p:nvPr>
@@ -27124,42 +27124,35 @@
             <a:tbl>
               <a:tblPr/>
               <a:tblGrid>
-                <a:gridCol w="341707">
+                <a:gridCol w="506738">
                   <a:extLst>
                     <a:ext uri="{9D8B030D-6E8A-4147-A177-3AD203B41FA5}">
                       <a16:colId xmlns:a16="http://schemas.microsoft.com/office/drawing/2014/main" val="1470184085"/>
                     </a:ext>
                   </a:extLst>
                 </a:gridCol>
-                <a:gridCol w="1085177">
+                <a:gridCol w="1609274">
                   <a:extLst>
                     <a:ext uri="{9D8B030D-6E8A-4147-A177-3AD203B41FA5}">
                       <a16:colId xmlns:a16="http://schemas.microsoft.com/office/drawing/2014/main" val="20000"/>
                     </a:ext>
                   </a:extLst>
                 </a:gridCol>
-                <a:gridCol w="1041296">
-                  <a:extLst>
-                    <a:ext uri="{9D8B030D-6E8A-4147-A177-3AD203B41FA5}">
-                      <a16:colId xmlns:a16="http://schemas.microsoft.com/office/drawing/2014/main" val="3721709830"/>
-                    </a:ext>
-                  </a:extLst>
-                </a:gridCol>
-                <a:gridCol w="4502658">
+                <a:gridCol w="4207126">
                   <a:extLst>
                     <a:ext uri="{9D8B030D-6E8A-4147-A177-3AD203B41FA5}">
                       <a16:colId xmlns:a16="http://schemas.microsoft.com/office/drawing/2014/main" val="20001"/>
                     </a:ext>
                   </a:extLst>
                 </a:gridCol>
-                <a:gridCol w="579609">
+                <a:gridCol w="666750">
                   <a:extLst>
                     <a:ext uri="{9D8B030D-6E8A-4147-A177-3AD203B41FA5}">
                       <a16:colId xmlns:a16="http://schemas.microsoft.com/office/drawing/2014/main" val="2479190757"/>
                     </a:ext>
                   </a:extLst>
                 </a:gridCol>
-                <a:gridCol w="1160671">
+                <a:gridCol w="1721230">
                   <a:extLst>
                     <a:ext uri="{9D8B030D-6E8A-4147-A177-3AD203B41FA5}">
                       <a16:colId xmlns:a16="http://schemas.microsoft.com/office/drawing/2014/main" val="4036884888"/>
@@ -27249,7 +27242,7 @@
                     <a:bodyPr/>
                     <a:lstStyle/>
                     <a:p>
-                      <a:pPr marL="0" marR="0" lvl="0" indent="0" algn="ctr" defTabSz="958850" rtl="0" eaLnBrk="1" fontAlgn="base" latinLnBrk="0" hangingPunct="1">
+                      <a:pPr marL="0" marR="0" lvl="0" indent="0" algn="l" defTabSz="958850" rtl="0" eaLnBrk="1" fontAlgn="base" latinLnBrk="0" hangingPunct="1">
                         <a:lnSpc>
                           <a:spcPct val="100000"/>
                         </a:lnSpc>
@@ -27283,125 +27276,6 @@
                     </a:p>
                   </a:txBody>
                   <a:tcPr marL="0" marR="68580" marT="0" marB="0" anchor="ctr" horzOverflow="overflow">
-                    <a:lnL w="12700" cap="flat" cmpd="sng" algn="ctr">
-                      <a:solidFill>
-                        <a:schemeClr val="bg1">
-                          <a:alpha val="0"/>
-                        </a:schemeClr>
-                      </a:solidFill>
-                      <a:prstDash val="solid"/>
-                      <a:round/>
-                      <a:headEnd type="none" w="med" len="med"/>
-                      <a:tailEnd type="none" w="med" len="med"/>
-                    </a:lnL>
-                    <a:lnR w="12700" cap="flat" cmpd="sng" algn="ctr">
-                      <a:solidFill>
-                        <a:schemeClr val="bg1">
-                          <a:alpha val="0"/>
-                        </a:schemeClr>
-                      </a:solidFill>
-                      <a:prstDash val="solid"/>
-                      <a:round/>
-                      <a:headEnd type="none" w="med" len="med"/>
-                      <a:tailEnd type="none" w="med" len="med"/>
-                    </a:lnR>
-                    <a:lnT cap="flat">
-                      <a:noFill/>
-                    </a:lnT>
-                    <a:lnB w="6350" cap="flat" cmpd="sng" algn="ctr">
-                      <a:solidFill>
-                        <a:srgbClr val="DBD5CD"/>
-                      </a:solidFill>
-                      <a:prstDash val="solid"/>
-                      <a:round/>
-                      <a:headEnd type="none" w="med" len="med"/>
-                      <a:tailEnd type="none" w="med" len="med"/>
-                    </a:lnB>
-                    <a:lnTlToBr>
-                      <a:noFill/>
-                    </a:lnTlToBr>
-                    <a:lnBlToTr>
-                      <a:noFill/>
-                    </a:lnBlToTr>
-                    <a:solidFill>
-                      <a:schemeClr val="tx2"/>
-                    </a:solidFill>
-                  </a:tcPr>
-                </a:tc>
-                <a:tc>
-                  <a:txBody>
-                    <a:bodyPr/>
-                    <a:lstStyle/>
-                    <a:p>
-                      <a:pPr marL="0" marR="0" lvl="0" indent="0" algn="ctr" defTabSz="958850" rtl="0" eaLnBrk="1" fontAlgn="base" latinLnBrk="0" hangingPunct="1">
-                        <a:lnSpc>
-                          <a:spcPct val="100000"/>
-                        </a:lnSpc>
-                        <a:spcBef>
-                          <a:spcPct val="0"/>
-                        </a:spcBef>
-                        <a:spcAft>
-                          <a:spcPts val="0"/>
-                        </a:spcAft>
-                        <a:buClr>
-                          <a:srgbClr val="000080"/>
-                        </a:buClr>
-                        <a:buSzTx/>
-                        <a:buFont typeface="Wingdings" pitchFamily="2" charset="2"/>
-                        <a:buNone/>
-                        <a:tabLst/>
-                        <a:defRPr/>
-                      </a:pPr>
-                      <a:r>
-                        <a:rPr kumimoji="0" lang="en-GB" sz="700" b="1" i="0" u="none" strike="noStrike" cap="none" normalizeH="0" baseline="0" noProof="0" dirty="0">
-                          <a:ln>
-                            <a:noFill/>
-                          </a:ln>
-                          <a:solidFill>
-                            <a:srgbClr val="FFFFFF"/>
-                          </a:solidFill>
-                          <a:effectLst/>
-                          <a:latin typeface="Arial" panose="020B0604020202020204" pitchFamily="34" charset="0"/>
-                        </a:rPr>
-                        <a:t>Financials </a:t>
-                      </a:r>
-                    </a:p>
-                    <a:p>
-                      <a:pPr marL="0" marR="0" lvl="0" indent="0" algn="ctr" defTabSz="958850" rtl="0" eaLnBrk="1" fontAlgn="base" latinLnBrk="0" hangingPunct="1">
-                        <a:lnSpc>
-                          <a:spcPct val="100000"/>
-                        </a:lnSpc>
-                        <a:spcBef>
-                          <a:spcPct val="0"/>
-                        </a:spcBef>
-                        <a:spcAft>
-                          <a:spcPts val="0"/>
-                        </a:spcAft>
-                        <a:buClr>
-                          <a:srgbClr val="000080"/>
-                        </a:buClr>
-                        <a:buSzTx/>
-                        <a:buFont typeface="Wingdings" pitchFamily="2" charset="2"/>
-                        <a:buNone/>
-                        <a:tabLst/>
-                        <a:defRPr/>
-                      </a:pPr>
-                      <a:r>
-                        <a:rPr kumimoji="0" lang="en-GB" sz="700" b="1" i="0" u="none" strike="noStrike" cap="none" normalizeH="0" baseline="0" noProof="0" dirty="0">
-                          <a:ln>
-                            <a:noFill/>
-                          </a:ln>
-                          <a:solidFill>
-                            <a:srgbClr val="FFFFFF"/>
-                          </a:solidFill>
-                          <a:effectLst/>
-                          <a:latin typeface="Arial" panose="020B0604020202020204" pitchFamily="34" charset="0"/>
-                        </a:rPr>
-                        <a:t>(USD MM)</a:t>
-                      </a:r>
-                    </a:p>
-                  </a:txBody>
-                  <a:tcPr marL="137160" marR="68580" marT="0" marB="0" anchor="ctr" horzOverflow="overflow">
                     <a:lnL w="12700" cap="flat" cmpd="sng" algn="ctr">
                       <a:solidFill>
                         <a:schemeClr val="bg1">
@@ -28003,87 +27877,6 @@
                   </a:txBody>
                   <a:tcPr marL="0" marR="84406" marT="0" marB="0" anchor="ctr" horzOverflow="overflow">
                     <a:lnL cap="flat">
-                      <a:noFill/>
-                    </a:lnL>
-                    <a:lnR>
-                      <a:noFill/>
-                    </a:lnR>
-                    <a:lnT w="6350" cap="flat" cmpd="sng" algn="ctr">
-                      <a:solidFill>
-                        <a:srgbClr val="DBD5CD"/>
-                      </a:solidFill>
-                      <a:prstDash val="solid"/>
-                      <a:round/>
-                      <a:headEnd type="none" w="med" len="med"/>
-                      <a:tailEnd type="none" w="med" len="med"/>
-                    </a:lnT>
-                    <a:lnB w="6350" cap="flat" cmpd="sng" algn="ctr">
-                      <a:solidFill>
-                        <a:srgbClr val="DBD5CD"/>
-                      </a:solidFill>
-                      <a:prstDash val="solid"/>
-                      <a:round/>
-                      <a:headEnd type="none" w="med" len="med"/>
-                      <a:tailEnd type="none" w="med" len="med"/>
-                    </a:lnB>
-                    <a:lnTlToBr>
-                      <a:noFill/>
-                    </a:lnTlToBr>
-                    <a:lnBlToTr>
-                      <a:noFill/>
-                    </a:lnBlToTr>
-                    <a:noFill/>
-                  </a:tcPr>
-                </a:tc>
-                <a:tc>
-                  <a:txBody>
-                    <a:bodyPr/>
-                    <a:lstStyle/>
-                    <a:p>
-                      <a:pPr marL="0" marR="0" lvl="0" indent="0" algn="l" defTabSz="914395" rtl="0" eaLnBrk="1" fontAlgn="t" latinLnBrk="0" hangingPunct="1">
-                        <a:lnSpc>
-                          <a:spcPct val="100000"/>
-                        </a:lnSpc>
-                        <a:spcBef>
-                          <a:spcPts val="0"/>
-                        </a:spcBef>
-                        <a:spcAft>
-                          <a:spcPts val="0"/>
-                        </a:spcAft>
-                        <a:buClr>
-                          <a:srgbClr val="003B4C"/>
-                        </a:buClr>
-                        <a:buSzTx/>
-                        <a:buFont typeface="Wingdings" panose="05000000000000000000" pitchFamily="2" charset="2"/>
-                        <a:buNone/>
-                        <a:tabLst/>
-                        <a:defRPr/>
-                      </a:pPr>
-                      <a:r>
-                        <a:rPr kumimoji="0" lang="en-GB" sz="700" b="0" i="0" u="none" strike="noStrike" kern="1200" cap="none" spc="0" normalizeH="0" baseline="0" noProof="0" dirty="0">
-                          <a:ln>
-                            <a:noFill/>
-                          </a:ln>
-                          <a:solidFill>
-                            <a:srgbClr val="003B4C"/>
-                          </a:solidFill>
-                          <a:effectLst/>
-                          <a:uLnTx/>
-                          <a:uFillTx/>
-                          <a:latin typeface="Arial" panose="020B0604020202020204" pitchFamily="34" charset="0"/>
-                          <a:ea typeface="+mn-ea"/>
-                          <a:cs typeface="+mn-cs"/>
-                        </a:rPr>
-                        <a:t>Revenue: 3,436.45
-EBITDA: 1,305.15
-Market Cap: 1,377.90
-Total Debt: nan
-FTE: nan</a:t>
-                      </a:r>
-                    </a:p>
-                  </a:txBody>
-                  <a:tcPr marL="168812" marR="0" marT="0" marB="0" anchor="ctr">
-                    <a:lnL>
                       <a:noFill/>
                     </a:lnL>
                     <a:lnR>
@@ -28737,89 +28530,6 @@
                     <a:bodyPr/>
                     <a:lstStyle/>
                     <a:p>
-                      <a:pPr marL="0" marR="0" lvl="0" indent="0" algn="l" defTabSz="914395" rtl="0" eaLnBrk="1" fontAlgn="t" latinLnBrk="0" hangingPunct="1">
-                        <a:lnSpc>
-                          <a:spcPct val="100000"/>
-                        </a:lnSpc>
-                        <a:spcBef>
-                          <a:spcPts val="0"/>
-                        </a:spcBef>
-                        <a:spcAft>
-                          <a:spcPts val="0"/>
-                        </a:spcAft>
-                        <a:buClr>
-                          <a:srgbClr val="003B4C"/>
-                        </a:buClr>
-                        <a:buSzTx/>
-                        <a:buFont typeface="Wingdings" panose="05000000000000000000" pitchFamily="2" charset="2"/>
-                        <a:buNone/>
-                        <a:tabLst/>
-                        <a:defRPr/>
-                      </a:pPr>
-                      <a:r>
-                        <a:rPr kumimoji="0" lang="en-GB" sz="700" b="0" i="0" u="none" strike="noStrike" kern="1200" cap="none" spc="0" normalizeH="0" baseline="0" noProof="0" dirty="0">
-                          <a:ln>
-                            <a:noFill/>
-                          </a:ln>
-                          <a:solidFill>
-                            <a:srgbClr val="003B4C"/>
-                          </a:solidFill>
-                          <a:effectLst/>
-                          <a:uLnTx/>
-                          <a:uFillTx/>
-                          <a:latin typeface="Arial" panose="020B0604020202020204" pitchFamily="34" charset="0"/>
-                          <a:ea typeface="+mn-ea"/>
-                          <a:cs typeface="+mn-cs"/>
-                        </a:rPr>
-                        <a:t>Revenue: 182.98
-EBITDA: -6.56
-Market Cap: nan
-Total Debt: nan
-FTE: nan</a:t>
-                      </a:r>
-                    </a:p>
-                  </a:txBody>
-                  <a:tcPr marL="168812" marR="0" marT="0" marB="0" anchor="ctr">
-                    <a:lnL>
-                      <a:noFill/>
-                    </a:lnL>
-                    <a:lnR>
-                      <a:noFill/>
-                    </a:lnR>
-                    <a:lnT w="6350" cap="flat" cmpd="sng" algn="ctr">
-                      <a:solidFill>
-                        <a:srgbClr val="DBD5CD"/>
-                      </a:solidFill>
-                      <a:prstDash val="solid"/>
-                      <a:round/>
-                      <a:headEnd type="none" w="med" len="med"/>
-                      <a:tailEnd type="none" w="med" len="med"/>
-                    </a:lnT>
-                    <a:lnB w="6350" cap="flat" cmpd="sng" algn="ctr">
-                      <a:solidFill>
-                        <a:srgbClr val="DBD5CD"/>
-                      </a:solidFill>
-                      <a:prstDash val="solid"/>
-                      <a:round/>
-                      <a:headEnd type="none" w="med" len="med"/>
-                      <a:tailEnd type="none" w="med" len="med"/>
-                    </a:lnB>
-                    <a:lnTlToBr>
-                      <a:noFill/>
-                    </a:lnTlToBr>
-                    <a:lnBlToTr>
-                      <a:noFill/>
-                    </a:lnBlToTr>
-                    <a:solidFill>
-                      <a:srgbClr val="F0F5F7"/>
-                    </a:solidFill>
-                  </a:tcPr>
-                </a:tc>
-                <a:tc>
-                  <a:txBody>
-                    <a:bodyPr/>
-                    <a:lstStyle/>
-                    <a:p>
                       <a:pPr marL="171450" marR="0" lvl="0" indent="-171450" algn="l" defTabSz="914395" rtl="0" eaLnBrk="1" fontAlgn="t" latinLnBrk="0" hangingPunct="1">
                         <a:lnSpc>
                           <a:spcPct val="100000"/>
@@ -29442,93 +29152,6 @@
                     <a:bodyPr/>
                     <a:lstStyle/>
                     <a:p>
-                      <a:pPr marL="0" marR="0" lvl="0" indent="0" algn="l" defTabSz="914395" rtl="0" eaLnBrk="1" fontAlgn="t" latinLnBrk="0" hangingPunct="1">
-                        <a:lnSpc>
-                          <a:spcPct val="100000"/>
-                        </a:lnSpc>
-                        <a:spcBef>
-                          <a:spcPts val="0"/>
-                        </a:spcBef>
-                        <a:spcAft>
-                          <a:spcPts val="0"/>
-                        </a:spcAft>
-                        <a:buClr>
-                          <a:srgbClr val="003B4C"/>
-                        </a:buClr>
-                        <a:buSzTx/>
-                        <a:buFont typeface="Wingdings" panose="05000000000000000000" pitchFamily="2" charset="2"/>
-                        <a:buNone/>
-                        <a:tabLst/>
-                        <a:defRPr/>
-                      </a:pPr>
-                      <a:r>
-                        <a:rPr kumimoji="0" lang="en-GB" sz="700" b="0" i="0" u="none" strike="noStrike" kern="1200" cap="none" spc="0" normalizeH="0" baseline="0" noProof="0" dirty="0">
-                          <a:ln>
-                            <a:noFill/>
-                          </a:ln>
-                          <a:solidFill>
-                            <a:srgbClr val="003B4C"/>
-                          </a:solidFill>
-                          <a:effectLst/>
-                          <a:uLnTx/>
-                          <a:uFillTx/>
-                          <a:latin typeface="Arial" panose="020B0604020202020204" pitchFamily="34" charset="0"/>
-                          <a:ea typeface="+mn-ea"/>
-                          <a:cs typeface="+mn-cs"/>
-                        </a:rPr>
-                        <a:t>Revenue: nan
-EBITDA: nan
-Market Cap: nan
-Total Debt: nan
-FTE: nan</a:t>
-                      </a:r>
-                    </a:p>
-                  </a:txBody>
-                  <a:tcPr marL="168812" marR="0" marT="0" marB="0" anchor="ctr">
-                    <a:lnL>
-                      <a:noFill/>
-                    </a:lnL>
-                    <a:lnR w="12700" cap="flat" cmpd="sng" algn="ctr">
-                      <a:noFill/>
-                      <a:prstDash val="solid"/>
-                      <a:round/>
-                      <a:headEnd type="none" w="med" len="med"/>
-                      <a:tailEnd type="none" w="med" len="med"/>
-                    </a:lnR>
-                    <a:lnT w="6350" cap="flat" cmpd="sng" algn="ctr">
-                      <a:solidFill>
-                        <a:srgbClr val="DBD5CD"/>
-                      </a:solidFill>
-                      <a:prstDash val="solid"/>
-                      <a:round/>
-                      <a:headEnd type="none" w="med" len="med"/>
-                      <a:tailEnd type="none" w="med" len="med"/>
-                    </a:lnT>
-                    <a:lnB w="9525" cap="flat" cmpd="sng" algn="ctr">
-                      <a:solidFill>
-                        <a:schemeClr val="bg2"/>
-                      </a:solidFill>
-                      <a:prstDash val="solid"/>
-                      <a:round/>
-                      <a:headEnd type="none" w="med" len="med"/>
-                      <a:tailEnd type="none" w="med" len="med"/>
-                    </a:lnB>
-                    <a:lnTlToBr>
-                      <a:noFill/>
-                    </a:lnTlToBr>
-                    <a:lnBlToTr>
-                      <a:noFill/>
-                    </a:lnBlToTr>
-                    <a:solidFill>
-                      <a:srgbClr val="FFFFFF"/>
-                    </a:solidFill>
-                  </a:tcPr>
-                </a:tc>
-                <a:tc>
-                  <a:txBody>
-                    <a:bodyPr/>
-                    <a:lstStyle/>
-                    <a:p>
                       <a:pPr marL="171450" marR="0" lvl="0" indent="-171450" algn="l" defTabSz="914395" rtl="0" eaLnBrk="1" fontAlgn="t" latinLnBrk="0" hangingPunct="1">
                         <a:lnSpc>
                           <a:spcPct val="100000"/>
@@ -30131,89 +29754,6 @@
                     <a:bodyPr/>
                     <a:lstStyle/>
                     <a:p>
-                      <a:pPr marL="0" marR="0" lvl="0" indent="0" algn="l" defTabSz="914395" rtl="0" eaLnBrk="1" fontAlgn="t" latinLnBrk="0" hangingPunct="1">
-                        <a:lnSpc>
-                          <a:spcPct val="100000"/>
-                        </a:lnSpc>
-                        <a:spcBef>
-                          <a:spcPts val="0"/>
-                        </a:spcBef>
-                        <a:spcAft>
-                          <a:spcPts val="0"/>
-                        </a:spcAft>
-                        <a:buClr>
-                          <a:srgbClr val="003B4C"/>
-                        </a:buClr>
-                        <a:buSzTx/>
-                        <a:buFont typeface="Wingdings" panose="05000000000000000000" pitchFamily="2" charset="2"/>
-                        <a:buNone/>
-                        <a:tabLst/>
-                        <a:defRPr/>
-                      </a:pPr>
-                      <a:r>
-                        <a:rPr kumimoji="0" lang="en-GB" sz="700" b="0" i="0" u="none" strike="noStrike" kern="1200" cap="none" spc="0" normalizeH="0" baseline="0" noProof="0" dirty="0">
-                          <a:ln>
-                            <a:noFill/>
-                          </a:ln>
-                          <a:solidFill>
-                            <a:srgbClr val="003B4C"/>
-                          </a:solidFill>
-                          <a:effectLst/>
-                          <a:uLnTx/>
-                          <a:uFillTx/>
-                          <a:latin typeface="Arial" panose="020B0604020202020204" pitchFamily="34" charset="0"/>
-                          <a:ea typeface="+mn-ea"/>
-                          <a:cs typeface="+mn-cs"/>
-                        </a:rPr>
-                        <a:t>Revenue: 5,806.85
-EBITDA: 1,578.53
-Market Cap: nan
-Total Debt: nan
-FTE: nan</a:t>
-                      </a:r>
-                    </a:p>
-                  </a:txBody>
-                  <a:tcPr marL="168812" marR="0" marT="0" marB="0" anchor="ctr">
-                    <a:lnL>
-                      <a:noFill/>
-                    </a:lnL>
-                    <a:lnR>
-                      <a:noFill/>
-                    </a:lnR>
-                    <a:lnT w="9525" cap="flat" cmpd="sng" algn="ctr">
-                      <a:solidFill>
-                        <a:schemeClr val="bg2"/>
-                      </a:solidFill>
-                      <a:prstDash val="solid"/>
-                      <a:round/>
-                      <a:headEnd type="none" w="med" len="med"/>
-                      <a:tailEnd type="none" w="med" len="med"/>
-                    </a:lnT>
-                    <a:lnB w="9525" cap="flat" cmpd="sng" algn="ctr">
-                      <a:solidFill>
-                        <a:schemeClr val="bg2"/>
-                      </a:solidFill>
-                      <a:prstDash val="solid"/>
-                      <a:round/>
-                      <a:headEnd type="none" w="med" len="med"/>
-                      <a:tailEnd type="none" w="med" len="med"/>
-                    </a:lnB>
-                    <a:lnTlToBr>
-                      <a:noFill/>
-                    </a:lnTlToBr>
-                    <a:lnBlToTr>
-                      <a:noFill/>
-                    </a:lnBlToTr>
-                    <a:solidFill>
-                      <a:srgbClr val="F0F5F7"/>
-                    </a:solidFill>
-                  </a:tcPr>
-                </a:tc>
-                <a:tc>
-                  <a:txBody>
-                    <a:bodyPr/>
-                    <a:lstStyle/>
-                    <a:p>
                       <a:pPr marL="171450" marR="0" lvl="0" indent="-171450" algn="l" defTabSz="914395" rtl="0" eaLnBrk="1" fontAlgn="t" latinLnBrk="0" hangingPunct="1">
                         <a:lnSpc>
                           <a:spcPct val="100000"/>
@@ -30836,89 +30376,6 @@
                     <a:bodyPr/>
                     <a:lstStyle/>
                     <a:p>
-                      <a:pPr marL="0" marR="0" lvl="0" indent="0" algn="l" defTabSz="914395" rtl="0" eaLnBrk="1" fontAlgn="t" latinLnBrk="0" hangingPunct="1">
-                        <a:lnSpc>
-                          <a:spcPct val="100000"/>
-                        </a:lnSpc>
-                        <a:spcBef>
-                          <a:spcPts val="0"/>
-                        </a:spcBef>
-                        <a:spcAft>
-                          <a:spcPts val="0"/>
-                        </a:spcAft>
-                        <a:buClr>
-                          <a:srgbClr val="003B4C"/>
-                        </a:buClr>
-                        <a:buSzTx/>
-                        <a:buFont typeface="Wingdings" panose="05000000000000000000" pitchFamily="2" charset="2"/>
-                        <a:buNone/>
-                        <a:tabLst/>
-                        <a:defRPr/>
-                      </a:pPr>
-                      <a:r>
-                        <a:rPr kumimoji="0" lang="en-GB" sz="700" b="0" i="0" u="none" strike="noStrike" kern="1200" cap="none" spc="0" normalizeH="0" baseline="0" noProof="0" dirty="0">
-                          <a:ln>
-                            <a:noFill/>
-                          </a:ln>
-                          <a:solidFill>
-                            <a:srgbClr val="003B4C"/>
-                          </a:solidFill>
-                          <a:effectLst/>
-                          <a:uLnTx/>
-                          <a:uFillTx/>
-                          <a:latin typeface="Arial" panose="020B0604020202020204" pitchFamily="34" charset="0"/>
-                          <a:ea typeface="+mn-ea"/>
-                          <a:cs typeface="+mn-cs"/>
-                        </a:rPr>
-                        <a:t>Revenue: nan
-EBITDA: nan
-Market Cap: nan
-Total Debt: nan
-FTE: nan</a:t>
-                      </a:r>
-                    </a:p>
-                  </a:txBody>
-                  <a:tcPr marL="168812" marR="0" marT="0" marB="0" anchor="ctr">
-                    <a:lnL>
-                      <a:noFill/>
-                    </a:lnL>
-                    <a:lnR>
-                      <a:noFill/>
-                    </a:lnR>
-                    <a:lnT w="9525" cap="flat" cmpd="sng" algn="ctr">
-                      <a:solidFill>
-                        <a:schemeClr val="bg2"/>
-                      </a:solidFill>
-                      <a:prstDash val="solid"/>
-                      <a:round/>
-                      <a:headEnd type="none" w="med" len="med"/>
-                      <a:tailEnd type="none" w="med" len="med"/>
-                    </a:lnT>
-                    <a:lnB w="9525" cap="flat" cmpd="sng" algn="ctr">
-                      <a:solidFill>
-                        <a:schemeClr val="bg2"/>
-                      </a:solidFill>
-                      <a:prstDash val="solid"/>
-                      <a:round/>
-                      <a:headEnd type="none" w="med" len="med"/>
-                      <a:tailEnd type="none" w="med" len="med"/>
-                    </a:lnB>
-                    <a:lnTlToBr>
-                      <a:noFill/>
-                    </a:lnTlToBr>
-                    <a:lnBlToTr>
-                      <a:noFill/>
-                    </a:lnBlToTr>
-                    <a:solidFill>
-                      <a:srgbClr val="FFFFFF"/>
-                    </a:solidFill>
-                  </a:tcPr>
-                </a:tc>
-                <a:tc>
-                  <a:txBody>
-                    <a:bodyPr/>
-                    <a:lstStyle/>
-                    <a:p>
                       <a:pPr marL="171450" marR="0" lvl="0" indent="-171450" algn="l" defTabSz="914395" rtl="0" eaLnBrk="1" fontAlgn="t" latinLnBrk="0" hangingPunct="1">
                         <a:lnSpc>
                           <a:spcPct val="100000"/>
@@ -31529,89 +30986,6 @@
                     <a:bodyPr/>
                     <a:lstStyle/>
                     <a:p>
-                      <a:pPr marL="0" marR="0" lvl="0" indent="0" algn="l" defTabSz="914395" rtl="0" eaLnBrk="1" fontAlgn="t" latinLnBrk="0" hangingPunct="1">
-                        <a:lnSpc>
-                          <a:spcPct val="100000"/>
-                        </a:lnSpc>
-                        <a:spcBef>
-                          <a:spcPts val="0"/>
-                        </a:spcBef>
-                        <a:spcAft>
-                          <a:spcPts val="0"/>
-                        </a:spcAft>
-                        <a:buClr>
-                          <a:srgbClr val="003B4C"/>
-                        </a:buClr>
-                        <a:buSzTx/>
-                        <a:buFont typeface="Wingdings" panose="05000000000000000000" pitchFamily="2" charset="2"/>
-                        <a:buNone/>
-                        <a:tabLst/>
-                        <a:defRPr/>
-                      </a:pPr>
-                      <a:r>
-                        <a:rPr kumimoji="0" lang="en-GB" sz="700" b="0" i="0" u="none" strike="noStrike" kern="1200" cap="none" spc="0" normalizeH="0" baseline="0" noProof="0" dirty="0">
-                          <a:ln>
-                            <a:noFill/>
-                          </a:ln>
-                          <a:solidFill>
-                            <a:srgbClr val="003B4C"/>
-                          </a:solidFill>
-                          <a:effectLst/>
-                          <a:uLnTx/>
-                          <a:uFillTx/>
-                          <a:latin typeface="Arial" panose="020B0604020202020204" pitchFamily="34" charset="0"/>
-                          <a:ea typeface="+mn-ea"/>
-                          <a:cs typeface="+mn-cs"/>
-                        </a:rPr>
-                        <a:t>Revenue: 11,415.67
-EBITDA: -653.22
-Market Cap: 366.34
-Total Debt: nan
-FTE: nan</a:t>
-                      </a:r>
-                    </a:p>
-                  </a:txBody>
-                  <a:tcPr marL="168812" marR="0" marT="0" marB="0" anchor="ctr">
-                    <a:lnL>
-                      <a:noFill/>
-                    </a:lnL>
-                    <a:lnR>
-                      <a:noFill/>
-                    </a:lnR>
-                    <a:lnT w="9525" cap="flat" cmpd="sng" algn="ctr">
-                      <a:solidFill>
-                        <a:schemeClr val="bg2"/>
-                      </a:solidFill>
-                      <a:prstDash val="solid"/>
-                      <a:round/>
-                      <a:headEnd type="none" w="med" len="med"/>
-                      <a:tailEnd type="none" w="med" len="med"/>
-                    </a:lnT>
-                    <a:lnB w="9525" cap="flat" cmpd="sng" algn="ctr">
-                      <a:solidFill>
-                        <a:schemeClr val="bg2"/>
-                      </a:solidFill>
-                      <a:prstDash val="solid"/>
-                      <a:round/>
-                      <a:headEnd type="none" w="med" len="med"/>
-                      <a:tailEnd type="none" w="med" len="med"/>
-                    </a:lnB>
-                    <a:lnTlToBr>
-                      <a:noFill/>
-                    </a:lnTlToBr>
-                    <a:lnBlToTr>
-                      <a:noFill/>
-                    </a:lnBlToTr>
-                    <a:solidFill>
-                      <a:srgbClr val="F0F5F7"/>
-                    </a:solidFill>
-                  </a:tcPr>
-                </a:tc>
-                <a:tc>
-                  <a:txBody>
-                    <a:bodyPr/>
-                    <a:lstStyle/>
-                    <a:p>
                       <a:pPr marL="171450" marR="0" lvl="0" indent="-171450" algn="l" defTabSz="914395" rtl="0" eaLnBrk="1" fontAlgn="t" latinLnBrk="0" hangingPunct="1">
                         <a:lnSpc>
                           <a:spcPct val="100000"/>
@@ -31929,8 +31303,8 @@
         </p:blipFill>
         <p:spPr>
           <a:xfrm>
-            <a:off x="585274" y="1372337"/>
-            <a:ext cx="1030918" cy="381387"/>
+            <a:off x="798213" y="1364709"/>
+            <a:ext cx="1367882" cy="419525"/>
           </a:xfrm>
           <a:prstGeom prst="rect">
             <a:avLst/>
@@ -31953,8 +31327,8 @@
         </p:blipFill>
         <p:spPr>
           <a:xfrm>
-            <a:off x="585274" y="2133797"/>
-            <a:ext cx="1030918" cy="377736"/>
+            <a:off x="798213" y="2126242"/>
+            <a:ext cx="1367882" cy="415510"/>
           </a:xfrm>
           <a:prstGeom prst="rect">
             <a:avLst/>
@@ -31977,8 +31351,8 @@
         </p:blipFill>
         <p:spPr>
           <a:xfrm>
-            <a:off x="585274" y="2889270"/>
-            <a:ext cx="1030918" cy="377736"/>
+            <a:off x="798213" y="2881715"/>
+            <a:ext cx="1367882" cy="415510"/>
           </a:xfrm>
           <a:prstGeom prst="rect">
             <a:avLst/>
@@ -32001,8 +31375,8 @@
         </p:blipFill>
         <p:spPr>
           <a:xfrm>
-            <a:off x="585274" y="3644743"/>
-            <a:ext cx="1030918" cy="377736"/>
+            <a:off x="798213" y="3637188"/>
+            <a:ext cx="1367882" cy="415510"/>
           </a:xfrm>
           <a:prstGeom prst="rect">
             <a:avLst/>
@@ -32025,8 +31399,8 @@
         </p:blipFill>
         <p:spPr>
           <a:xfrm>
-            <a:off x="585274" y="4400216"/>
-            <a:ext cx="1030918" cy="377736"/>
+            <a:off x="798213" y="4392661"/>
+            <a:ext cx="1367882" cy="415510"/>
           </a:xfrm>
           <a:prstGeom prst="rect">
             <a:avLst/>
@@ -32083,7 +31457,7 @@
           <p:nvPr>
             <p:extLst>
               <p:ext uri="{D42A27DB-BD31-4B8C-83A1-F6EECF244321}">
-                <p14:modId xmlns:p14="http://schemas.microsoft.com/office/powerpoint/2010/main" val="341992840"/>
+                <p14:modId xmlns:p14="http://schemas.microsoft.com/office/powerpoint/2010/main" val="3557598170"/>
               </p:ext>
             </p:extLst>
           </p:nvPr>
@@ -32097,42 +31471,35 @@
             <a:tbl>
               <a:tblPr/>
               <a:tblGrid>
-                <a:gridCol w="341707">
+                <a:gridCol w="506738">
                   <a:extLst>
                     <a:ext uri="{9D8B030D-6E8A-4147-A177-3AD203B41FA5}">
                       <a16:colId xmlns:a16="http://schemas.microsoft.com/office/drawing/2014/main" val="1470184085"/>
                     </a:ext>
                   </a:extLst>
                 </a:gridCol>
-                <a:gridCol w="1085177">
+                <a:gridCol w="1609274">
                   <a:extLst>
                     <a:ext uri="{9D8B030D-6E8A-4147-A177-3AD203B41FA5}">
                       <a16:colId xmlns:a16="http://schemas.microsoft.com/office/drawing/2014/main" val="20000"/>
                     </a:ext>
                   </a:extLst>
                 </a:gridCol>
-                <a:gridCol w="1041296">
-                  <a:extLst>
-                    <a:ext uri="{9D8B030D-6E8A-4147-A177-3AD203B41FA5}">
-                      <a16:colId xmlns:a16="http://schemas.microsoft.com/office/drawing/2014/main" val="3721709830"/>
-                    </a:ext>
-                  </a:extLst>
-                </a:gridCol>
-                <a:gridCol w="4502658">
+                <a:gridCol w="4207126">
                   <a:extLst>
                     <a:ext uri="{9D8B030D-6E8A-4147-A177-3AD203B41FA5}">
                       <a16:colId xmlns:a16="http://schemas.microsoft.com/office/drawing/2014/main" val="20001"/>
                     </a:ext>
                   </a:extLst>
                 </a:gridCol>
-                <a:gridCol w="579609">
+                <a:gridCol w="666750">
                   <a:extLst>
                     <a:ext uri="{9D8B030D-6E8A-4147-A177-3AD203B41FA5}">
                       <a16:colId xmlns:a16="http://schemas.microsoft.com/office/drawing/2014/main" val="2479190757"/>
                     </a:ext>
                   </a:extLst>
                 </a:gridCol>
-                <a:gridCol w="1160671">
+                <a:gridCol w="1721230">
                   <a:extLst>
                     <a:ext uri="{9D8B030D-6E8A-4147-A177-3AD203B41FA5}">
                       <a16:colId xmlns:a16="http://schemas.microsoft.com/office/drawing/2014/main" val="4036884888"/>
@@ -32222,7 +31589,7 @@
                     <a:bodyPr/>
                     <a:lstStyle/>
                     <a:p>
-                      <a:pPr marL="0" marR="0" lvl="0" indent="0" algn="ctr" defTabSz="958850" rtl="0" eaLnBrk="1" fontAlgn="base" latinLnBrk="0" hangingPunct="1">
+                      <a:pPr marL="0" marR="0" lvl="0" indent="0" algn="l" defTabSz="958850" rtl="0" eaLnBrk="1" fontAlgn="base" latinLnBrk="0" hangingPunct="1">
                         <a:lnSpc>
                           <a:spcPct val="100000"/>
                         </a:lnSpc>
@@ -32256,125 +31623,6 @@
                     </a:p>
                   </a:txBody>
                   <a:tcPr marL="0" marR="68580" marT="0" marB="0" anchor="ctr" horzOverflow="overflow">
-                    <a:lnL w="12700" cap="flat" cmpd="sng" algn="ctr">
-                      <a:solidFill>
-                        <a:schemeClr val="bg1">
-                          <a:alpha val="0"/>
-                        </a:schemeClr>
-                      </a:solidFill>
-                      <a:prstDash val="solid"/>
-                      <a:round/>
-                      <a:headEnd type="none" w="med" len="med"/>
-                      <a:tailEnd type="none" w="med" len="med"/>
-                    </a:lnL>
-                    <a:lnR w="12700" cap="flat" cmpd="sng" algn="ctr">
-                      <a:solidFill>
-                        <a:schemeClr val="bg1">
-                          <a:alpha val="0"/>
-                        </a:schemeClr>
-                      </a:solidFill>
-                      <a:prstDash val="solid"/>
-                      <a:round/>
-                      <a:headEnd type="none" w="med" len="med"/>
-                      <a:tailEnd type="none" w="med" len="med"/>
-                    </a:lnR>
-                    <a:lnT cap="flat">
-                      <a:noFill/>
-                    </a:lnT>
-                    <a:lnB w="6350" cap="flat" cmpd="sng" algn="ctr">
-                      <a:solidFill>
-                        <a:srgbClr val="DBD5CD"/>
-                      </a:solidFill>
-                      <a:prstDash val="solid"/>
-                      <a:round/>
-                      <a:headEnd type="none" w="med" len="med"/>
-                      <a:tailEnd type="none" w="med" len="med"/>
-                    </a:lnB>
-                    <a:lnTlToBr>
-                      <a:noFill/>
-                    </a:lnTlToBr>
-                    <a:lnBlToTr>
-                      <a:noFill/>
-                    </a:lnBlToTr>
-                    <a:solidFill>
-                      <a:schemeClr val="tx2"/>
-                    </a:solidFill>
-                  </a:tcPr>
-                </a:tc>
-                <a:tc>
-                  <a:txBody>
-                    <a:bodyPr/>
-                    <a:lstStyle/>
-                    <a:p>
-                      <a:pPr marL="0" marR="0" lvl="0" indent="0" algn="ctr" defTabSz="958850" rtl="0" eaLnBrk="1" fontAlgn="base" latinLnBrk="0" hangingPunct="1">
-                        <a:lnSpc>
-                          <a:spcPct val="100000"/>
-                        </a:lnSpc>
-                        <a:spcBef>
-                          <a:spcPct val="0"/>
-                        </a:spcBef>
-                        <a:spcAft>
-                          <a:spcPts val="0"/>
-                        </a:spcAft>
-                        <a:buClr>
-                          <a:srgbClr val="000080"/>
-                        </a:buClr>
-                        <a:buSzTx/>
-                        <a:buFont typeface="Wingdings" pitchFamily="2" charset="2"/>
-                        <a:buNone/>
-                        <a:tabLst/>
-                        <a:defRPr/>
-                      </a:pPr>
-                      <a:r>
-                        <a:rPr kumimoji="0" lang="en-GB" sz="700" b="1" i="0" u="none" strike="noStrike" cap="none" normalizeH="0" baseline="0" noProof="0" dirty="0">
-                          <a:ln>
-                            <a:noFill/>
-                          </a:ln>
-                          <a:solidFill>
-                            <a:srgbClr val="FFFFFF"/>
-                          </a:solidFill>
-                          <a:effectLst/>
-                          <a:latin typeface="Arial" panose="020B0604020202020204" pitchFamily="34" charset="0"/>
-                        </a:rPr>
-                        <a:t>Financials </a:t>
-                      </a:r>
-                    </a:p>
-                    <a:p>
-                      <a:pPr marL="0" marR="0" lvl="0" indent="0" algn="ctr" defTabSz="958850" rtl="0" eaLnBrk="1" fontAlgn="base" latinLnBrk="0" hangingPunct="1">
-                        <a:lnSpc>
-                          <a:spcPct val="100000"/>
-                        </a:lnSpc>
-                        <a:spcBef>
-                          <a:spcPct val="0"/>
-                        </a:spcBef>
-                        <a:spcAft>
-                          <a:spcPts val="0"/>
-                        </a:spcAft>
-                        <a:buClr>
-                          <a:srgbClr val="000080"/>
-                        </a:buClr>
-                        <a:buSzTx/>
-                        <a:buFont typeface="Wingdings" pitchFamily="2" charset="2"/>
-                        <a:buNone/>
-                        <a:tabLst/>
-                        <a:defRPr/>
-                      </a:pPr>
-                      <a:r>
-                        <a:rPr kumimoji="0" lang="en-GB" sz="700" b="1" i="0" u="none" strike="noStrike" cap="none" normalizeH="0" baseline="0" noProof="0" dirty="0">
-                          <a:ln>
-                            <a:noFill/>
-                          </a:ln>
-                          <a:solidFill>
-                            <a:srgbClr val="FFFFFF"/>
-                          </a:solidFill>
-                          <a:effectLst/>
-                          <a:latin typeface="Arial" panose="020B0604020202020204" pitchFamily="34" charset="0"/>
-                        </a:rPr>
-                        <a:t>(USD MM)</a:t>
-                      </a:r>
-                    </a:p>
-                  </a:txBody>
-                  <a:tcPr marL="137160" marR="68580" marT="0" marB="0" anchor="ctr" horzOverflow="overflow">
                     <a:lnL w="12700" cap="flat" cmpd="sng" algn="ctr">
                       <a:solidFill>
                         <a:schemeClr val="bg1">
@@ -32976,87 +32224,6 @@
                   </a:txBody>
                   <a:tcPr marL="0" marR="84406" marT="0" marB="0" anchor="ctr" horzOverflow="overflow">
                     <a:lnL cap="flat">
-                      <a:noFill/>
-                    </a:lnL>
-                    <a:lnR>
-                      <a:noFill/>
-                    </a:lnR>
-                    <a:lnT w="6350" cap="flat" cmpd="sng" algn="ctr">
-                      <a:solidFill>
-                        <a:srgbClr val="DBD5CD"/>
-                      </a:solidFill>
-                      <a:prstDash val="solid"/>
-                      <a:round/>
-                      <a:headEnd type="none" w="med" len="med"/>
-                      <a:tailEnd type="none" w="med" len="med"/>
-                    </a:lnT>
-                    <a:lnB w="6350" cap="flat" cmpd="sng" algn="ctr">
-                      <a:solidFill>
-                        <a:srgbClr val="DBD5CD"/>
-                      </a:solidFill>
-                      <a:prstDash val="solid"/>
-                      <a:round/>
-                      <a:headEnd type="none" w="med" len="med"/>
-                      <a:tailEnd type="none" w="med" len="med"/>
-                    </a:lnB>
-                    <a:lnTlToBr>
-                      <a:noFill/>
-                    </a:lnTlToBr>
-                    <a:lnBlToTr>
-                      <a:noFill/>
-                    </a:lnBlToTr>
-                    <a:noFill/>
-                  </a:tcPr>
-                </a:tc>
-                <a:tc>
-                  <a:txBody>
-                    <a:bodyPr/>
-                    <a:lstStyle/>
-                    <a:p>
-                      <a:pPr marL="0" marR="0" lvl="0" indent="0" algn="l" defTabSz="914395" rtl="0" eaLnBrk="1" fontAlgn="t" latinLnBrk="0" hangingPunct="1">
-                        <a:lnSpc>
-                          <a:spcPct val="100000"/>
-                        </a:lnSpc>
-                        <a:spcBef>
-                          <a:spcPts val="0"/>
-                        </a:spcBef>
-                        <a:spcAft>
-                          <a:spcPts val="0"/>
-                        </a:spcAft>
-                        <a:buClr>
-                          <a:srgbClr val="003B4C"/>
-                        </a:buClr>
-                        <a:buSzTx/>
-                        <a:buFont typeface="Wingdings" panose="05000000000000000000" pitchFamily="2" charset="2"/>
-                        <a:buNone/>
-                        <a:tabLst/>
-                        <a:defRPr/>
-                      </a:pPr>
-                      <a:r>
-                        <a:rPr kumimoji="0" lang="en-GB" sz="700" b="0" i="0" u="none" strike="noStrike" kern="1200" cap="none" spc="0" normalizeH="0" baseline="0" noProof="0" dirty="0">
-                          <a:ln>
-                            <a:noFill/>
-                          </a:ln>
-                          <a:solidFill>
-                            <a:srgbClr val="003B4C"/>
-                          </a:solidFill>
-                          <a:effectLst/>
-                          <a:uLnTx/>
-                          <a:uFillTx/>
-                          <a:latin typeface="Arial" panose="020B0604020202020204" pitchFamily="34" charset="0"/>
-                          <a:ea typeface="+mn-ea"/>
-                          <a:cs typeface="+mn-cs"/>
-                        </a:rPr>
-                        <a:t>Revenue: nan
-EBITDA: nan
-Market Cap: nan
-Total Debt: nan
-FTE: nan</a:t>
-                      </a:r>
-                    </a:p>
-                  </a:txBody>
-                  <a:tcPr marL="168812" marR="0" marT="0" marB="0" anchor="ctr">
-                    <a:lnL>
                       <a:noFill/>
                     </a:lnL>
                     <a:lnR>
@@ -33710,89 +32877,6 @@
                     <a:bodyPr/>
                     <a:lstStyle/>
                     <a:p>
-                      <a:pPr marL="0" marR="0" lvl="0" indent="0" algn="l" defTabSz="914395" rtl="0" eaLnBrk="1" fontAlgn="t" latinLnBrk="0" hangingPunct="1">
-                        <a:lnSpc>
-                          <a:spcPct val="100000"/>
-                        </a:lnSpc>
-                        <a:spcBef>
-                          <a:spcPts val="0"/>
-                        </a:spcBef>
-                        <a:spcAft>
-                          <a:spcPts val="0"/>
-                        </a:spcAft>
-                        <a:buClr>
-                          <a:srgbClr val="003B4C"/>
-                        </a:buClr>
-                        <a:buSzTx/>
-                        <a:buFont typeface="Wingdings" panose="05000000000000000000" pitchFamily="2" charset="2"/>
-                        <a:buNone/>
-                        <a:tabLst/>
-                        <a:defRPr/>
-                      </a:pPr>
-                      <a:r>
-                        <a:rPr kumimoji="0" lang="en-GB" sz="700" b="0" i="0" u="none" strike="noStrike" kern="1200" cap="none" spc="0" normalizeH="0" baseline="0" noProof="0" dirty="0">
-                          <a:ln>
-                            <a:noFill/>
-                          </a:ln>
-                          <a:solidFill>
-                            <a:srgbClr val="003B4C"/>
-                          </a:solidFill>
-                          <a:effectLst/>
-                          <a:uLnTx/>
-                          <a:uFillTx/>
-                          <a:latin typeface="Arial" panose="020B0604020202020204" pitchFamily="34" charset="0"/>
-                          <a:ea typeface="+mn-ea"/>
-                          <a:cs typeface="+mn-cs"/>
-                        </a:rPr>
-                        <a:t>Revenue: 5,411.15
-EBITDA: 1,137.76
-Market Cap: nan
-Total Debt: nan
-FTE: nan</a:t>
-                      </a:r>
-                    </a:p>
-                  </a:txBody>
-                  <a:tcPr marL="168812" marR="0" marT="0" marB="0" anchor="ctr">
-                    <a:lnL>
-                      <a:noFill/>
-                    </a:lnL>
-                    <a:lnR>
-                      <a:noFill/>
-                    </a:lnR>
-                    <a:lnT w="6350" cap="flat" cmpd="sng" algn="ctr">
-                      <a:solidFill>
-                        <a:srgbClr val="DBD5CD"/>
-                      </a:solidFill>
-                      <a:prstDash val="solid"/>
-                      <a:round/>
-                      <a:headEnd type="none" w="med" len="med"/>
-                      <a:tailEnd type="none" w="med" len="med"/>
-                    </a:lnT>
-                    <a:lnB w="6350" cap="flat" cmpd="sng" algn="ctr">
-                      <a:solidFill>
-                        <a:srgbClr val="DBD5CD"/>
-                      </a:solidFill>
-                      <a:prstDash val="solid"/>
-                      <a:round/>
-                      <a:headEnd type="none" w="med" len="med"/>
-                      <a:tailEnd type="none" w="med" len="med"/>
-                    </a:lnB>
-                    <a:lnTlToBr>
-                      <a:noFill/>
-                    </a:lnTlToBr>
-                    <a:lnBlToTr>
-                      <a:noFill/>
-                    </a:lnBlToTr>
-                    <a:solidFill>
-                      <a:srgbClr val="F0F5F7"/>
-                    </a:solidFill>
-                  </a:tcPr>
-                </a:tc>
-                <a:tc>
-                  <a:txBody>
-                    <a:bodyPr/>
-                    <a:lstStyle/>
-                    <a:p>
                       <a:pPr marL="171450" marR="0" lvl="0" indent="-171450" algn="l" defTabSz="914395" rtl="0" eaLnBrk="1" fontAlgn="t" latinLnBrk="0" hangingPunct="1">
                         <a:lnSpc>
                           <a:spcPct val="100000"/>
@@ -34416,93 +33500,6 @@
                     <a:bodyPr/>
                     <a:lstStyle/>
                     <a:p>
-                      <a:pPr marL="0" marR="0" lvl="0" indent="0" algn="l" defTabSz="914395" rtl="0" eaLnBrk="1" fontAlgn="t" latinLnBrk="0" hangingPunct="1">
-                        <a:lnSpc>
-                          <a:spcPct val="100000"/>
-                        </a:lnSpc>
-                        <a:spcBef>
-                          <a:spcPts val="0"/>
-                        </a:spcBef>
-                        <a:spcAft>
-                          <a:spcPts val="0"/>
-                        </a:spcAft>
-                        <a:buClr>
-                          <a:srgbClr val="003B4C"/>
-                        </a:buClr>
-                        <a:buSzTx/>
-                        <a:buFont typeface="Wingdings" panose="05000000000000000000" pitchFamily="2" charset="2"/>
-                        <a:buNone/>
-                        <a:tabLst/>
-                        <a:defRPr/>
-                      </a:pPr>
-                      <a:r>
-                        <a:rPr kumimoji="0" lang="en-GB" sz="700" b="0" i="0" u="none" strike="noStrike" kern="1200" cap="none" spc="0" normalizeH="0" baseline="0" noProof="0" dirty="0">
-                          <a:ln>
-                            <a:noFill/>
-                          </a:ln>
-                          <a:solidFill>
-                            <a:srgbClr val="003B4C"/>
-                          </a:solidFill>
-                          <a:effectLst/>
-                          <a:uLnTx/>
-                          <a:uFillTx/>
-                          <a:latin typeface="Arial" panose="020B0604020202020204" pitchFamily="34" charset="0"/>
-                          <a:ea typeface="+mn-ea"/>
-                          <a:cs typeface="+mn-cs"/>
-                        </a:rPr>
-                        <a:t>Revenue: 2,779.22
-EBITDA: nan
-Market Cap: 5,059.03
-Total Debt: nan
-FTE: nan</a:t>
-                      </a:r>
-                    </a:p>
-                  </a:txBody>
-                  <a:tcPr marL="168812" marR="0" marT="0" marB="0" anchor="ctr">
-                    <a:lnL>
-                      <a:noFill/>
-                    </a:lnL>
-                    <a:lnR w="12700" cap="flat" cmpd="sng" algn="ctr">
-                      <a:noFill/>
-                      <a:prstDash val="solid"/>
-                      <a:round/>
-                      <a:headEnd type="none" w="med" len="med"/>
-                      <a:tailEnd type="none" w="med" len="med"/>
-                    </a:lnR>
-                    <a:lnT w="6350" cap="flat" cmpd="sng" algn="ctr">
-                      <a:solidFill>
-                        <a:srgbClr val="DBD5CD"/>
-                      </a:solidFill>
-                      <a:prstDash val="solid"/>
-                      <a:round/>
-                      <a:headEnd type="none" w="med" len="med"/>
-                      <a:tailEnd type="none" w="med" len="med"/>
-                    </a:lnT>
-                    <a:lnB w="9525" cap="flat" cmpd="sng" algn="ctr">
-                      <a:solidFill>
-                        <a:schemeClr val="bg2"/>
-                      </a:solidFill>
-                      <a:prstDash val="solid"/>
-                      <a:round/>
-                      <a:headEnd type="none" w="med" len="med"/>
-                      <a:tailEnd type="none" w="med" len="med"/>
-                    </a:lnB>
-                    <a:lnTlToBr>
-                      <a:noFill/>
-                    </a:lnTlToBr>
-                    <a:lnBlToTr>
-                      <a:noFill/>
-                    </a:lnBlToTr>
-                    <a:solidFill>
-                      <a:srgbClr val="FFFFFF"/>
-                    </a:solidFill>
-                  </a:tcPr>
-                </a:tc>
-                <a:tc>
-                  <a:txBody>
-                    <a:bodyPr/>
-                    <a:lstStyle/>
-                    <a:p>
                       <a:pPr marL="171450" marR="0" lvl="0" indent="-171450" algn="l" defTabSz="914395" rtl="0" eaLnBrk="1" fontAlgn="t" latinLnBrk="0" hangingPunct="1">
                         <a:lnSpc>
                           <a:spcPct val="100000"/>
@@ -35105,89 +34102,6 @@
                     <a:bodyPr/>
                     <a:lstStyle/>
                     <a:p>
-                      <a:pPr marL="0" marR="0" lvl="0" indent="0" algn="l" defTabSz="914395" rtl="0" eaLnBrk="1" fontAlgn="t" latinLnBrk="0" hangingPunct="1">
-                        <a:lnSpc>
-                          <a:spcPct val="100000"/>
-                        </a:lnSpc>
-                        <a:spcBef>
-                          <a:spcPts val="0"/>
-                        </a:spcBef>
-                        <a:spcAft>
-                          <a:spcPts val="0"/>
-                        </a:spcAft>
-                        <a:buClr>
-                          <a:srgbClr val="003B4C"/>
-                        </a:buClr>
-                        <a:buSzTx/>
-                        <a:buFont typeface="Wingdings" panose="05000000000000000000" pitchFamily="2" charset="2"/>
-                        <a:buNone/>
-                        <a:tabLst/>
-                        <a:defRPr/>
-                      </a:pPr>
-                      <a:r>
-                        <a:rPr kumimoji="0" lang="en-GB" sz="700" b="0" i="0" u="none" strike="noStrike" kern="1200" cap="none" spc="0" normalizeH="0" baseline="0" noProof="0" dirty="0">
-                          <a:ln>
-                            <a:noFill/>
-                          </a:ln>
-                          <a:solidFill>
-                            <a:srgbClr val="003B4C"/>
-                          </a:solidFill>
-                          <a:effectLst/>
-                          <a:uLnTx/>
-                          <a:uFillTx/>
-                          <a:latin typeface="Arial" panose="020B0604020202020204" pitchFamily="34" charset="0"/>
-                          <a:ea typeface="+mn-ea"/>
-                          <a:cs typeface="+mn-cs"/>
-                        </a:rPr>
-                        <a:t>Revenue: 998.37
-EBITDA: 16.34
-Market Cap: nan
-Total Debt: nan
-FTE: nan</a:t>
-                      </a:r>
-                    </a:p>
-                  </a:txBody>
-                  <a:tcPr marL="168812" marR="0" marT="0" marB="0" anchor="ctr">
-                    <a:lnL>
-                      <a:noFill/>
-                    </a:lnL>
-                    <a:lnR>
-                      <a:noFill/>
-                    </a:lnR>
-                    <a:lnT w="9525" cap="flat" cmpd="sng" algn="ctr">
-                      <a:solidFill>
-                        <a:schemeClr val="bg2"/>
-                      </a:solidFill>
-                      <a:prstDash val="solid"/>
-                      <a:round/>
-                      <a:headEnd type="none" w="med" len="med"/>
-                      <a:tailEnd type="none" w="med" len="med"/>
-                    </a:lnT>
-                    <a:lnB w="9525" cap="flat" cmpd="sng" algn="ctr">
-                      <a:solidFill>
-                        <a:schemeClr val="bg2"/>
-                      </a:solidFill>
-                      <a:prstDash val="solid"/>
-                      <a:round/>
-                      <a:headEnd type="none" w="med" len="med"/>
-                      <a:tailEnd type="none" w="med" len="med"/>
-                    </a:lnB>
-                    <a:lnTlToBr>
-                      <a:noFill/>
-                    </a:lnTlToBr>
-                    <a:lnBlToTr>
-                      <a:noFill/>
-                    </a:lnBlToTr>
-                    <a:solidFill>
-                      <a:srgbClr val="F0F5F7"/>
-                    </a:solidFill>
-                  </a:tcPr>
-                </a:tc>
-                <a:tc>
-                  <a:txBody>
-                    <a:bodyPr/>
-                    <a:lstStyle/>
-                    <a:p>
                       <a:pPr marL="171450" marR="0" lvl="0" indent="-171450" algn="l" defTabSz="914395" rtl="0" eaLnBrk="1" fontAlgn="t" latinLnBrk="0" hangingPunct="1">
                         <a:lnSpc>
                           <a:spcPct val="100000"/>
@@ -35810,89 +34724,6 @@
                     <a:bodyPr/>
                     <a:lstStyle/>
                     <a:p>
-                      <a:pPr marL="0" marR="0" lvl="0" indent="0" algn="l" defTabSz="914395" rtl="0" eaLnBrk="1" fontAlgn="t" latinLnBrk="0" hangingPunct="1">
-                        <a:lnSpc>
-                          <a:spcPct val="100000"/>
-                        </a:lnSpc>
-                        <a:spcBef>
-                          <a:spcPts val="0"/>
-                        </a:spcBef>
-                        <a:spcAft>
-                          <a:spcPts val="0"/>
-                        </a:spcAft>
-                        <a:buClr>
-                          <a:srgbClr val="003B4C"/>
-                        </a:buClr>
-                        <a:buSzTx/>
-                        <a:buFont typeface="Wingdings" panose="05000000000000000000" pitchFamily="2" charset="2"/>
-                        <a:buNone/>
-                        <a:tabLst/>
-                        <a:defRPr/>
-                      </a:pPr>
-                      <a:r>
-                        <a:rPr kumimoji="0" lang="en-GB" sz="700" b="0" i="0" u="none" strike="noStrike" kern="1200" cap="none" spc="0" normalizeH="0" baseline="0" noProof="0" dirty="0">
-                          <a:ln>
-                            <a:noFill/>
-                          </a:ln>
-                          <a:solidFill>
-                            <a:srgbClr val="003B4C"/>
-                          </a:solidFill>
-                          <a:effectLst/>
-                          <a:uLnTx/>
-                          <a:uFillTx/>
-                          <a:latin typeface="Arial" panose="020B0604020202020204" pitchFamily="34" charset="0"/>
-                          <a:ea typeface="+mn-ea"/>
-                          <a:cs typeface="+mn-cs"/>
-                        </a:rPr>
-                        <a:t>Revenue: 4,976.27
-EBITDA: 2,610.50
-Market Cap: 6,970.54
-Total Debt: nan
-FTE: nan</a:t>
-                      </a:r>
-                    </a:p>
-                  </a:txBody>
-                  <a:tcPr marL="168812" marR="0" marT="0" marB="0" anchor="ctr">
-                    <a:lnL>
-                      <a:noFill/>
-                    </a:lnL>
-                    <a:lnR>
-                      <a:noFill/>
-                    </a:lnR>
-                    <a:lnT w="9525" cap="flat" cmpd="sng" algn="ctr">
-                      <a:solidFill>
-                        <a:schemeClr val="bg2"/>
-                      </a:solidFill>
-                      <a:prstDash val="solid"/>
-                      <a:round/>
-                      <a:headEnd type="none" w="med" len="med"/>
-                      <a:tailEnd type="none" w="med" len="med"/>
-                    </a:lnT>
-                    <a:lnB w="9525" cap="flat" cmpd="sng" algn="ctr">
-                      <a:solidFill>
-                        <a:schemeClr val="bg2"/>
-                      </a:solidFill>
-                      <a:prstDash val="solid"/>
-                      <a:round/>
-                      <a:headEnd type="none" w="med" len="med"/>
-                      <a:tailEnd type="none" w="med" len="med"/>
-                    </a:lnB>
-                    <a:lnTlToBr>
-                      <a:noFill/>
-                    </a:lnTlToBr>
-                    <a:lnBlToTr>
-                      <a:noFill/>
-                    </a:lnBlToTr>
-                    <a:solidFill>
-                      <a:srgbClr val="FFFFFF"/>
-                    </a:solidFill>
-                  </a:tcPr>
-                </a:tc>
-                <a:tc>
-                  <a:txBody>
-                    <a:bodyPr/>
-                    <a:lstStyle/>
-                    <a:p>
                       <a:pPr marL="171450" marR="0" lvl="0" indent="-171450" algn="l" defTabSz="914395" rtl="0" eaLnBrk="1" fontAlgn="t" latinLnBrk="0" hangingPunct="1">
                         <a:lnSpc>
                           <a:spcPct val="100000"/>
@@ -36503,89 +35334,6 @@
                     <a:bodyPr/>
                     <a:lstStyle/>
                     <a:p>
-                      <a:pPr marL="0" marR="0" lvl="0" indent="0" algn="l" defTabSz="914395" rtl="0" eaLnBrk="1" fontAlgn="t" latinLnBrk="0" hangingPunct="1">
-                        <a:lnSpc>
-                          <a:spcPct val="100000"/>
-                        </a:lnSpc>
-                        <a:spcBef>
-                          <a:spcPts val="0"/>
-                        </a:spcBef>
-                        <a:spcAft>
-                          <a:spcPts val="0"/>
-                        </a:spcAft>
-                        <a:buClr>
-                          <a:srgbClr val="003B4C"/>
-                        </a:buClr>
-                        <a:buSzTx/>
-                        <a:buFont typeface="Wingdings" panose="05000000000000000000" pitchFamily="2" charset="2"/>
-                        <a:buNone/>
-                        <a:tabLst/>
-                        <a:defRPr/>
-                      </a:pPr>
-                      <a:r>
-                        <a:rPr kumimoji="0" lang="en-GB" sz="700" b="0" i="0" u="none" strike="noStrike" kern="1200" cap="none" spc="0" normalizeH="0" baseline="0" noProof="0" dirty="0">
-                          <a:ln>
-                            <a:noFill/>
-                          </a:ln>
-                          <a:solidFill>
-                            <a:srgbClr val="003B4C"/>
-                          </a:solidFill>
-                          <a:effectLst/>
-                          <a:uLnTx/>
-                          <a:uFillTx/>
-                          <a:latin typeface="Arial" panose="020B0604020202020204" pitchFamily="34" charset="0"/>
-                          <a:ea typeface="+mn-ea"/>
-                          <a:cs typeface="+mn-cs"/>
-                        </a:rPr>
-                        <a:t>Revenue: nan
-EBITDA: nan
-Market Cap: nan
-Total Debt: nan
-FTE: nan</a:t>
-                      </a:r>
-                    </a:p>
-                  </a:txBody>
-                  <a:tcPr marL="168812" marR="0" marT="0" marB="0" anchor="ctr">
-                    <a:lnL>
-                      <a:noFill/>
-                    </a:lnL>
-                    <a:lnR>
-                      <a:noFill/>
-                    </a:lnR>
-                    <a:lnT w="9525" cap="flat" cmpd="sng" algn="ctr">
-                      <a:solidFill>
-                        <a:schemeClr val="bg2"/>
-                      </a:solidFill>
-                      <a:prstDash val="solid"/>
-                      <a:round/>
-                      <a:headEnd type="none" w="med" len="med"/>
-                      <a:tailEnd type="none" w="med" len="med"/>
-                    </a:lnT>
-                    <a:lnB w="9525" cap="flat" cmpd="sng" algn="ctr">
-                      <a:solidFill>
-                        <a:schemeClr val="bg2"/>
-                      </a:solidFill>
-                      <a:prstDash val="solid"/>
-                      <a:round/>
-                      <a:headEnd type="none" w="med" len="med"/>
-                      <a:tailEnd type="none" w="med" len="med"/>
-                    </a:lnB>
-                    <a:lnTlToBr>
-                      <a:noFill/>
-                    </a:lnTlToBr>
-                    <a:lnBlToTr>
-                      <a:noFill/>
-                    </a:lnBlToTr>
-                    <a:solidFill>
-                      <a:srgbClr val="F0F5F7"/>
-                    </a:solidFill>
-                  </a:tcPr>
-                </a:tc>
-                <a:tc>
-                  <a:txBody>
-                    <a:bodyPr/>
-                    <a:lstStyle/>
-                    <a:p>
                       <a:pPr marL="171450" marR="0" lvl="0" indent="-171450" algn="l" defTabSz="914395" rtl="0" eaLnBrk="1" fontAlgn="t" latinLnBrk="0" hangingPunct="1">
                         <a:lnSpc>
                           <a:spcPct val="100000"/>
@@ -36903,8 +35651,8 @@
         </p:blipFill>
         <p:spPr>
           <a:xfrm>
-            <a:off x="585274" y="1372337"/>
-            <a:ext cx="1030918" cy="381387"/>
+            <a:off x="798213" y="1364709"/>
+            <a:ext cx="1367882" cy="419525"/>
           </a:xfrm>
           <a:prstGeom prst="rect">
             <a:avLst/>
@@ -36927,8 +35675,8 @@
         </p:blipFill>
         <p:spPr>
           <a:xfrm>
-            <a:off x="585274" y="2133797"/>
-            <a:ext cx="1030918" cy="377736"/>
+            <a:off x="798213" y="2126242"/>
+            <a:ext cx="1367882" cy="415510"/>
           </a:xfrm>
           <a:prstGeom prst="rect">
             <a:avLst/>
@@ -36951,8 +35699,8 @@
         </p:blipFill>
         <p:spPr>
           <a:xfrm>
-            <a:off x="585274" y="2889270"/>
-            <a:ext cx="1030918" cy="377736"/>
+            <a:off x="798213" y="2881715"/>
+            <a:ext cx="1367882" cy="415510"/>
           </a:xfrm>
           <a:prstGeom prst="rect">
             <a:avLst/>
@@ -36975,8 +35723,8 @@
         </p:blipFill>
         <p:spPr>
           <a:xfrm>
-            <a:off x="585274" y="3644743"/>
-            <a:ext cx="1030918" cy="377736"/>
+            <a:off x="798213" y="3637188"/>
+            <a:ext cx="1367882" cy="415510"/>
           </a:xfrm>
           <a:prstGeom prst="rect">
             <a:avLst/>
@@ -36999,8 +35747,8 @@
         </p:blipFill>
         <p:spPr>
           <a:xfrm>
-            <a:off x="585274" y="4400216"/>
-            <a:ext cx="1030918" cy="377736"/>
+            <a:off x="798213" y="4392661"/>
+            <a:ext cx="1367882" cy="415510"/>
           </a:xfrm>
           <a:prstGeom prst="rect">
             <a:avLst/>
@@ -37009,7 +35757,7 @@
       </p:pic>
       <p:pic>
         <p:nvPicPr>
-          <p:cNvPr id="9" name="Picture 8" descr="adria.png"/>
+          <p:cNvPr id="9" name="Picture 8" descr="linc_favi.png"/>
           <p:cNvPicPr>
             <a:picLocks noChangeAspect="1"/>
           </p:cNvPicPr>
@@ -37023,8 +35771,32 @@
         </p:blipFill>
         <p:spPr>
           <a:xfrm>
-            <a:off x="585274" y="5155689"/>
-            <a:ext cx="1030918" cy="377736"/>
+            <a:off x="2166096" y="4339778"/>
+            <a:ext cx="321854" cy="226641"/>
+          </a:xfrm>
+          <a:prstGeom prst="rect">
+            <a:avLst/>
+          </a:prstGeom>
+        </p:spPr>
+      </p:pic>
+      <p:pic>
+        <p:nvPicPr>
+          <p:cNvPr id="10" name="Picture 9" descr="adria.png"/>
+          <p:cNvPicPr>
+            <a:picLocks noChangeAspect="1"/>
+          </p:cNvPicPr>
+          <p:nvPr/>
+        </p:nvPicPr>
+        <p:blipFill>
+          <a:blip r:embed="rId8"/>
+          <a:stretch>
+            <a:fillRect/>
+          </a:stretch>
+        </p:blipFill>
+        <p:spPr>
+          <a:xfrm>
+            <a:off x="798213" y="5148134"/>
+            <a:ext cx="1367882" cy="415510"/>
           </a:xfrm>
           <a:prstGeom prst="rect">
             <a:avLst/>
@@ -37081,7 +35853,7 @@
           <p:nvPr>
             <p:extLst>
               <p:ext uri="{D42A27DB-BD31-4B8C-83A1-F6EECF244321}">
-                <p14:modId xmlns:p14="http://schemas.microsoft.com/office/powerpoint/2010/main" val="341992840"/>
+                <p14:modId xmlns:p14="http://schemas.microsoft.com/office/powerpoint/2010/main" val="3557598170"/>
               </p:ext>
             </p:extLst>
           </p:nvPr>
@@ -37095,42 +35867,35 @@
             <a:tbl>
               <a:tblPr/>
               <a:tblGrid>
-                <a:gridCol w="341707">
+                <a:gridCol w="506738">
                   <a:extLst>
                     <a:ext uri="{9D8B030D-6E8A-4147-A177-3AD203B41FA5}">
                       <a16:colId xmlns:a16="http://schemas.microsoft.com/office/drawing/2014/main" val="1470184085"/>
                     </a:ext>
                   </a:extLst>
                 </a:gridCol>
-                <a:gridCol w="1085177">
+                <a:gridCol w="1609274">
                   <a:extLst>
                     <a:ext uri="{9D8B030D-6E8A-4147-A177-3AD203B41FA5}">
                       <a16:colId xmlns:a16="http://schemas.microsoft.com/office/drawing/2014/main" val="20000"/>
                     </a:ext>
                   </a:extLst>
                 </a:gridCol>
-                <a:gridCol w="1041296">
-                  <a:extLst>
-                    <a:ext uri="{9D8B030D-6E8A-4147-A177-3AD203B41FA5}">
-                      <a16:colId xmlns:a16="http://schemas.microsoft.com/office/drawing/2014/main" val="3721709830"/>
-                    </a:ext>
-                  </a:extLst>
-                </a:gridCol>
-                <a:gridCol w="4502658">
+                <a:gridCol w="4207126">
                   <a:extLst>
                     <a:ext uri="{9D8B030D-6E8A-4147-A177-3AD203B41FA5}">
                       <a16:colId xmlns:a16="http://schemas.microsoft.com/office/drawing/2014/main" val="20001"/>
                     </a:ext>
                   </a:extLst>
                 </a:gridCol>
-                <a:gridCol w="579609">
+                <a:gridCol w="666750">
                   <a:extLst>
                     <a:ext uri="{9D8B030D-6E8A-4147-A177-3AD203B41FA5}">
                       <a16:colId xmlns:a16="http://schemas.microsoft.com/office/drawing/2014/main" val="2479190757"/>
                     </a:ext>
                   </a:extLst>
                 </a:gridCol>
-                <a:gridCol w="1160671">
+                <a:gridCol w="1721230">
                   <a:extLst>
                     <a:ext uri="{9D8B030D-6E8A-4147-A177-3AD203B41FA5}">
                       <a16:colId xmlns:a16="http://schemas.microsoft.com/office/drawing/2014/main" val="4036884888"/>
@@ -37220,7 +35985,7 @@
                     <a:bodyPr/>
                     <a:lstStyle/>
                     <a:p>
-                      <a:pPr marL="0" marR="0" lvl="0" indent="0" algn="ctr" defTabSz="958850" rtl="0" eaLnBrk="1" fontAlgn="base" latinLnBrk="0" hangingPunct="1">
+                      <a:pPr marL="0" marR="0" lvl="0" indent="0" algn="l" defTabSz="958850" rtl="0" eaLnBrk="1" fontAlgn="base" latinLnBrk="0" hangingPunct="1">
                         <a:lnSpc>
                           <a:spcPct val="100000"/>
                         </a:lnSpc>
@@ -37254,125 +36019,6 @@
                     </a:p>
                   </a:txBody>
                   <a:tcPr marL="0" marR="68580" marT="0" marB="0" anchor="ctr" horzOverflow="overflow">
-                    <a:lnL w="12700" cap="flat" cmpd="sng" algn="ctr">
-                      <a:solidFill>
-                        <a:schemeClr val="bg1">
-                          <a:alpha val="0"/>
-                        </a:schemeClr>
-                      </a:solidFill>
-                      <a:prstDash val="solid"/>
-                      <a:round/>
-                      <a:headEnd type="none" w="med" len="med"/>
-                      <a:tailEnd type="none" w="med" len="med"/>
-                    </a:lnL>
-                    <a:lnR w="12700" cap="flat" cmpd="sng" algn="ctr">
-                      <a:solidFill>
-                        <a:schemeClr val="bg1">
-                          <a:alpha val="0"/>
-                        </a:schemeClr>
-                      </a:solidFill>
-                      <a:prstDash val="solid"/>
-                      <a:round/>
-                      <a:headEnd type="none" w="med" len="med"/>
-                      <a:tailEnd type="none" w="med" len="med"/>
-                    </a:lnR>
-                    <a:lnT cap="flat">
-                      <a:noFill/>
-                    </a:lnT>
-                    <a:lnB w="6350" cap="flat" cmpd="sng" algn="ctr">
-                      <a:solidFill>
-                        <a:srgbClr val="DBD5CD"/>
-                      </a:solidFill>
-                      <a:prstDash val="solid"/>
-                      <a:round/>
-                      <a:headEnd type="none" w="med" len="med"/>
-                      <a:tailEnd type="none" w="med" len="med"/>
-                    </a:lnB>
-                    <a:lnTlToBr>
-                      <a:noFill/>
-                    </a:lnTlToBr>
-                    <a:lnBlToTr>
-                      <a:noFill/>
-                    </a:lnBlToTr>
-                    <a:solidFill>
-                      <a:schemeClr val="tx2"/>
-                    </a:solidFill>
-                  </a:tcPr>
-                </a:tc>
-                <a:tc>
-                  <a:txBody>
-                    <a:bodyPr/>
-                    <a:lstStyle/>
-                    <a:p>
-                      <a:pPr marL="0" marR="0" lvl="0" indent="0" algn="ctr" defTabSz="958850" rtl="0" eaLnBrk="1" fontAlgn="base" latinLnBrk="0" hangingPunct="1">
-                        <a:lnSpc>
-                          <a:spcPct val="100000"/>
-                        </a:lnSpc>
-                        <a:spcBef>
-                          <a:spcPct val="0"/>
-                        </a:spcBef>
-                        <a:spcAft>
-                          <a:spcPts val="0"/>
-                        </a:spcAft>
-                        <a:buClr>
-                          <a:srgbClr val="000080"/>
-                        </a:buClr>
-                        <a:buSzTx/>
-                        <a:buFont typeface="Wingdings" pitchFamily="2" charset="2"/>
-                        <a:buNone/>
-                        <a:tabLst/>
-                        <a:defRPr/>
-                      </a:pPr>
-                      <a:r>
-                        <a:rPr kumimoji="0" lang="en-GB" sz="700" b="1" i="0" u="none" strike="noStrike" cap="none" normalizeH="0" baseline="0" noProof="0" dirty="0">
-                          <a:ln>
-                            <a:noFill/>
-                          </a:ln>
-                          <a:solidFill>
-                            <a:srgbClr val="FFFFFF"/>
-                          </a:solidFill>
-                          <a:effectLst/>
-                          <a:latin typeface="Arial" panose="020B0604020202020204" pitchFamily="34" charset="0"/>
-                        </a:rPr>
-                        <a:t>Financials </a:t>
-                      </a:r>
-                    </a:p>
-                    <a:p>
-                      <a:pPr marL="0" marR="0" lvl="0" indent="0" algn="ctr" defTabSz="958850" rtl="0" eaLnBrk="1" fontAlgn="base" latinLnBrk="0" hangingPunct="1">
-                        <a:lnSpc>
-                          <a:spcPct val="100000"/>
-                        </a:lnSpc>
-                        <a:spcBef>
-                          <a:spcPct val="0"/>
-                        </a:spcBef>
-                        <a:spcAft>
-                          <a:spcPts val="0"/>
-                        </a:spcAft>
-                        <a:buClr>
-                          <a:srgbClr val="000080"/>
-                        </a:buClr>
-                        <a:buSzTx/>
-                        <a:buFont typeface="Wingdings" pitchFamily="2" charset="2"/>
-                        <a:buNone/>
-                        <a:tabLst/>
-                        <a:defRPr/>
-                      </a:pPr>
-                      <a:r>
-                        <a:rPr kumimoji="0" lang="en-GB" sz="700" b="1" i="0" u="none" strike="noStrike" cap="none" normalizeH="0" baseline="0" noProof="0" dirty="0">
-                          <a:ln>
-                            <a:noFill/>
-                          </a:ln>
-                          <a:solidFill>
-                            <a:srgbClr val="FFFFFF"/>
-                          </a:solidFill>
-                          <a:effectLst/>
-                          <a:latin typeface="Arial" panose="020B0604020202020204" pitchFamily="34" charset="0"/>
-                        </a:rPr>
-                        <a:t>(USD MM)</a:t>
-                      </a:r>
-                    </a:p>
-                  </a:txBody>
-                  <a:tcPr marL="137160" marR="68580" marT="0" marB="0" anchor="ctr" horzOverflow="overflow">
                     <a:lnL w="12700" cap="flat" cmpd="sng" algn="ctr">
                       <a:solidFill>
                         <a:schemeClr val="bg1">
@@ -37974,87 +36620,6 @@
                   </a:txBody>
                   <a:tcPr marL="0" marR="84406" marT="0" marB="0" anchor="ctr" horzOverflow="overflow">
                     <a:lnL cap="flat">
-                      <a:noFill/>
-                    </a:lnL>
-                    <a:lnR>
-                      <a:noFill/>
-                    </a:lnR>
-                    <a:lnT w="6350" cap="flat" cmpd="sng" algn="ctr">
-                      <a:solidFill>
-                        <a:srgbClr val="DBD5CD"/>
-                      </a:solidFill>
-                      <a:prstDash val="solid"/>
-                      <a:round/>
-                      <a:headEnd type="none" w="med" len="med"/>
-                      <a:tailEnd type="none" w="med" len="med"/>
-                    </a:lnT>
-                    <a:lnB w="6350" cap="flat" cmpd="sng" algn="ctr">
-                      <a:solidFill>
-                        <a:srgbClr val="DBD5CD"/>
-                      </a:solidFill>
-                      <a:prstDash val="solid"/>
-                      <a:round/>
-                      <a:headEnd type="none" w="med" len="med"/>
-                      <a:tailEnd type="none" w="med" len="med"/>
-                    </a:lnB>
-                    <a:lnTlToBr>
-                      <a:noFill/>
-                    </a:lnTlToBr>
-                    <a:lnBlToTr>
-                      <a:noFill/>
-                    </a:lnBlToTr>
-                    <a:noFill/>
-                  </a:tcPr>
-                </a:tc>
-                <a:tc>
-                  <a:txBody>
-                    <a:bodyPr/>
-                    <a:lstStyle/>
-                    <a:p>
-                      <a:pPr marL="0" marR="0" lvl="0" indent="0" algn="l" defTabSz="914395" rtl="0" eaLnBrk="1" fontAlgn="t" latinLnBrk="0" hangingPunct="1">
-                        <a:lnSpc>
-                          <a:spcPct val="100000"/>
-                        </a:lnSpc>
-                        <a:spcBef>
-                          <a:spcPts val="0"/>
-                        </a:spcBef>
-                        <a:spcAft>
-                          <a:spcPts val="0"/>
-                        </a:spcAft>
-                        <a:buClr>
-                          <a:srgbClr val="003B4C"/>
-                        </a:buClr>
-                        <a:buSzTx/>
-                        <a:buFont typeface="Wingdings" panose="05000000000000000000" pitchFamily="2" charset="2"/>
-                        <a:buNone/>
-                        <a:tabLst/>
-                        <a:defRPr/>
-                      </a:pPr>
-                      <a:r>
-                        <a:rPr kumimoji="0" lang="en-GB" sz="700" b="0" i="0" u="none" strike="noStrike" kern="1200" cap="none" spc="0" normalizeH="0" baseline="0" noProof="0" dirty="0">
-                          <a:ln>
-                            <a:noFill/>
-                          </a:ln>
-                          <a:solidFill>
-                            <a:srgbClr val="003B4C"/>
-                          </a:solidFill>
-                          <a:effectLst/>
-                          <a:uLnTx/>
-                          <a:uFillTx/>
-                          <a:latin typeface="Arial" panose="020B0604020202020204" pitchFamily="34" charset="0"/>
-                          <a:ea typeface="+mn-ea"/>
-                          <a:cs typeface="+mn-cs"/>
-                        </a:rPr>
-                        <a:t>Revenue: 1,211.41
-EBITDA: -651.33
-Market Cap: 266.31
-Total Debt: nan
-FTE: nan</a:t>
-                      </a:r>
-                    </a:p>
-                  </a:txBody>
-                  <a:tcPr marL="168812" marR="0" marT="0" marB="0" anchor="ctr">
-                    <a:lnL>
                       <a:noFill/>
                     </a:lnL>
                     <a:lnR>
@@ -38708,89 +37273,6 @@
                     <a:bodyPr/>
                     <a:lstStyle/>
                     <a:p>
-                      <a:pPr marL="0" marR="0" lvl="0" indent="0" algn="l" defTabSz="914395" rtl="0" eaLnBrk="1" fontAlgn="t" latinLnBrk="0" hangingPunct="1">
-                        <a:lnSpc>
-                          <a:spcPct val="100000"/>
-                        </a:lnSpc>
-                        <a:spcBef>
-                          <a:spcPts val="0"/>
-                        </a:spcBef>
-                        <a:spcAft>
-                          <a:spcPts val="0"/>
-                        </a:spcAft>
-                        <a:buClr>
-                          <a:srgbClr val="003B4C"/>
-                        </a:buClr>
-                        <a:buSzTx/>
-                        <a:buFont typeface="Wingdings" panose="05000000000000000000" pitchFamily="2" charset="2"/>
-                        <a:buNone/>
-                        <a:tabLst/>
-                        <a:defRPr/>
-                      </a:pPr>
-                      <a:r>
-                        <a:rPr kumimoji="0" lang="en-GB" sz="700" b="0" i="0" u="none" strike="noStrike" kern="1200" cap="none" spc="0" normalizeH="0" baseline="0" noProof="0" dirty="0">
-                          <a:ln>
-                            <a:noFill/>
-                          </a:ln>
-                          <a:solidFill>
-                            <a:srgbClr val="003B4C"/>
-                          </a:solidFill>
-                          <a:effectLst/>
-                          <a:uLnTx/>
-                          <a:uFillTx/>
-                          <a:latin typeface="Arial" panose="020B0604020202020204" pitchFamily="34" charset="0"/>
-                          <a:ea typeface="+mn-ea"/>
-                          <a:cs typeface="+mn-cs"/>
-                        </a:rPr>
-                        <a:t>Revenue: 1,211.41
-EBITDA: -651.33
-Market Cap: 266.31
-Total Debt: nan
-FTE: nan</a:t>
-                      </a:r>
-                    </a:p>
-                  </a:txBody>
-                  <a:tcPr marL="168812" marR="0" marT="0" marB="0" anchor="ctr">
-                    <a:lnL>
-                      <a:noFill/>
-                    </a:lnL>
-                    <a:lnR>
-                      <a:noFill/>
-                    </a:lnR>
-                    <a:lnT w="6350" cap="flat" cmpd="sng" algn="ctr">
-                      <a:solidFill>
-                        <a:srgbClr val="DBD5CD"/>
-                      </a:solidFill>
-                      <a:prstDash val="solid"/>
-                      <a:round/>
-                      <a:headEnd type="none" w="med" len="med"/>
-                      <a:tailEnd type="none" w="med" len="med"/>
-                    </a:lnT>
-                    <a:lnB w="6350" cap="flat" cmpd="sng" algn="ctr">
-                      <a:solidFill>
-                        <a:srgbClr val="DBD5CD"/>
-                      </a:solidFill>
-                      <a:prstDash val="solid"/>
-                      <a:round/>
-                      <a:headEnd type="none" w="med" len="med"/>
-                      <a:tailEnd type="none" w="med" len="med"/>
-                    </a:lnB>
-                    <a:lnTlToBr>
-                      <a:noFill/>
-                    </a:lnTlToBr>
-                    <a:lnBlToTr>
-                      <a:noFill/>
-                    </a:lnBlToTr>
-                    <a:solidFill>
-                      <a:srgbClr val="F0F5F7"/>
-                    </a:solidFill>
-                  </a:tcPr>
-                </a:tc>
-                <a:tc>
-                  <a:txBody>
-                    <a:bodyPr/>
-                    <a:lstStyle/>
-                    <a:p>
                       <a:pPr marL="171450" marR="0" lvl="0" indent="-171450" algn="l" defTabSz="914395" rtl="0" eaLnBrk="1" fontAlgn="t" latinLnBrk="0" hangingPunct="1">
                         <a:lnSpc>
                           <a:spcPct val="100000"/>
@@ -39450,241 +37932,6 @@
                     <a:bodyPr/>
                     <a:lstStyle/>
                     <a:p>
-                      <a:pPr marL="0" marR="0" lvl="0" indent="0" algn="l" defTabSz="914395" rtl="0" eaLnBrk="1" fontAlgn="t" latinLnBrk="0" hangingPunct="1">
-                        <a:lnSpc>
-                          <a:spcPct val="100000"/>
-                        </a:lnSpc>
-                        <a:spcBef>
-                          <a:spcPts val="0"/>
-                        </a:spcBef>
-                        <a:spcAft>
-                          <a:spcPts val="0"/>
-                        </a:spcAft>
-                        <a:buClr>
-                          <a:srgbClr val="003B4C"/>
-                        </a:buClr>
-                        <a:buSzTx/>
-                        <a:buFont typeface="Wingdings" panose="05000000000000000000" pitchFamily="2" charset="2"/>
-                        <a:buNone/>
-                        <a:tabLst/>
-                        <a:defRPr/>
-                      </a:pPr>
-                      <a:r>
-                        <a:rPr kumimoji="0" lang="en-GB" sz="700" b="0" i="0" u="none" strike="noStrike" kern="1200" cap="none" spc="0" normalizeH="0" baseline="0" noProof="0" dirty="0">
-                          <a:ln>
-                            <a:noFill/>
-                          </a:ln>
-                          <a:solidFill>
-                            <a:srgbClr val="003B4C"/>
-                          </a:solidFill>
-                          <a:effectLst/>
-                          <a:uLnTx/>
-                          <a:uFillTx/>
-                          <a:latin typeface="Arial" panose="020B0604020202020204" pitchFamily="34" charset="0"/>
-                          <a:ea typeface="+mn-ea"/>
-                          <a:cs typeface="+mn-cs"/>
-                        </a:rPr>
-                        <a:t>Revenue:</a:t>
-                      </a:r>
-                    </a:p>
-                    <a:p>
-                      <a:pPr marL="0" marR="0" lvl="0" indent="0" algn="l" defTabSz="914395" rtl="0" eaLnBrk="1" fontAlgn="t" latinLnBrk="0" hangingPunct="1">
-                        <a:lnSpc>
-                          <a:spcPct val="100000"/>
-                        </a:lnSpc>
-                        <a:spcBef>
-                          <a:spcPts val="0"/>
-                        </a:spcBef>
-                        <a:spcAft>
-                          <a:spcPts val="0"/>
-                        </a:spcAft>
-                        <a:buClr>
-                          <a:srgbClr val="003B4C"/>
-                        </a:buClr>
-                        <a:buSzTx/>
-                        <a:buFont typeface="Wingdings" panose="05000000000000000000" pitchFamily="2" charset="2"/>
-                        <a:buNone/>
-                        <a:tabLst/>
-                        <a:defRPr/>
-                      </a:pPr>
-                      <a:r>
-                        <a:rPr kumimoji="0" lang="en-GB" sz="700" b="0" i="0" u="none" strike="noStrike" kern="1200" cap="none" spc="0" normalizeH="0" baseline="0" noProof="0" dirty="0">
-                          <a:ln>
-                            <a:noFill/>
-                          </a:ln>
-                          <a:solidFill>
-                            <a:srgbClr val="003B4C"/>
-                          </a:solidFill>
-                          <a:effectLst/>
-                          <a:uLnTx/>
-                          <a:uFillTx/>
-                          <a:latin typeface="Arial" panose="020B0604020202020204" pitchFamily="34" charset="0"/>
-                          <a:ea typeface="+mn-ea"/>
-                          <a:cs typeface="+mn-cs"/>
-                        </a:rPr>
-                        <a:t>EBITDA:</a:t>
-                      </a:r>
-                    </a:p>
-                    <a:p>
-                      <a:pPr marL="0" marR="0" lvl="0" indent="0" algn="l" defTabSz="914395" rtl="0" eaLnBrk="1" fontAlgn="t" latinLnBrk="0" hangingPunct="1">
-                        <a:lnSpc>
-                          <a:spcPct val="100000"/>
-                        </a:lnSpc>
-                        <a:spcBef>
-                          <a:spcPts val="0"/>
-                        </a:spcBef>
-                        <a:spcAft>
-                          <a:spcPts val="0"/>
-                        </a:spcAft>
-                        <a:buClr>
-                          <a:srgbClr val="003B4C"/>
-                        </a:buClr>
-                        <a:buSzTx/>
-                        <a:buFont typeface="Wingdings" panose="05000000000000000000" pitchFamily="2" charset="2"/>
-                        <a:buNone/>
-                        <a:tabLst/>
-                        <a:defRPr/>
-                      </a:pPr>
-                      <a:r>
-                        <a:rPr kumimoji="0" lang="en-GB" sz="700" b="0" i="0" u="none" strike="noStrike" kern="1200" cap="none" spc="0" normalizeH="0" baseline="0" noProof="0" dirty="0">
-                          <a:ln>
-                            <a:noFill/>
-                          </a:ln>
-                          <a:solidFill>
-                            <a:srgbClr val="003B4C"/>
-                          </a:solidFill>
-                          <a:effectLst/>
-                          <a:uLnTx/>
-                          <a:uFillTx/>
-                          <a:latin typeface="Arial" panose="020B0604020202020204" pitchFamily="34" charset="0"/>
-                          <a:ea typeface="+mn-ea"/>
-                          <a:cs typeface="+mn-cs"/>
-                        </a:rPr>
-                        <a:t>Market Cap:</a:t>
-                      </a:r>
-                    </a:p>
-                    <a:p>
-                      <a:pPr marL="0" marR="0" lvl="0" indent="0" algn="l" defTabSz="914395" rtl="0" eaLnBrk="1" fontAlgn="t" latinLnBrk="0" hangingPunct="1">
-                        <a:lnSpc>
-                          <a:spcPct val="100000"/>
-                        </a:lnSpc>
-                        <a:spcBef>
-                          <a:spcPts val="0"/>
-                        </a:spcBef>
-                        <a:spcAft>
-                          <a:spcPts val="0"/>
-                        </a:spcAft>
-                        <a:buClr>
-                          <a:srgbClr val="003B4C"/>
-                        </a:buClr>
-                        <a:buSzTx/>
-                        <a:buFont typeface="Wingdings" panose="05000000000000000000" pitchFamily="2" charset="2"/>
-                        <a:buNone/>
-                        <a:tabLst/>
-                        <a:defRPr/>
-                      </a:pPr>
-                      <a:r>
-                        <a:rPr kumimoji="0" lang="en-GB" sz="700" b="0" i="0" u="none" strike="noStrike" kern="1200" cap="none" spc="0" normalizeH="0" baseline="0" noProof="0" dirty="0">
-                          <a:ln>
-                            <a:noFill/>
-                          </a:ln>
-                          <a:solidFill>
-                            <a:srgbClr val="003B4C"/>
-                          </a:solidFill>
-                          <a:effectLst/>
-                          <a:uLnTx/>
-                          <a:uFillTx/>
-                          <a:latin typeface="Arial" panose="020B0604020202020204" pitchFamily="34" charset="0"/>
-                          <a:ea typeface="+mn-ea"/>
-                          <a:cs typeface="+mn-cs"/>
-                        </a:rPr>
-                        <a:t>Total Debt:</a:t>
-                      </a:r>
-                    </a:p>
-                    <a:p>
-                      <a:pPr marL="0" marR="0" lvl="0" indent="0" algn="l" defTabSz="914395" rtl="0" eaLnBrk="1" fontAlgn="t" latinLnBrk="0" hangingPunct="1">
-                        <a:lnSpc>
-                          <a:spcPct val="100000"/>
-                        </a:lnSpc>
-                        <a:spcBef>
-                          <a:spcPts val="0"/>
-                        </a:spcBef>
-                        <a:spcAft>
-                          <a:spcPts val="0"/>
-                        </a:spcAft>
-                        <a:buClr>
-                          <a:srgbClr val="003B4C"/>
-                        </a:buClr>
-                        <a:buSzTx/>
-                        <a:buFont typeface="Wingdings" panose="05000000000000000000" pitchFamily="2" charset="2"/>
-                        <a:buNone/>
-                        <a:tabLst/>
-                        <a:defRPr/>
-                      </a:pPr>
-                      <a:r>
-                        <a:rPr kumimoji="0" lang="en-GB" sz="700" b="0" i="0" u="none" strike="noStrike" kern="1200" cap="none" spc="0" normalizeH="0" baseline="0" noProof="0" dirty="0">
-                          <a:ln>
-                            <a:noFill/>
-                          </a:ln>
-                          <a:solidFill>
-                            <a:srgbClr val="003B4C"/>
-                          </a:solidFill>
-                          <a:effectLst/>
-                          <a:uLnTx/>
-                          <a:uFillTx/>
-                          <a:latin typeface="Arial" panose="020B0604020202020204" pitchFamily="34" charset="0"/>
-                          <a:ea typeface="+mn-ea"/>
-                          <a:cs typeface="+mn-cs"/>
-                        </a:rPr>
-                        <a:t>FTE:</a:t>
-                      </a:r>
-                    </a:p>
-                  </a:txBody>
-                  <a:tcPr marL="168812" marR="0" marT="0" marB="0" anchor="ctr">
-                    <a:lnL>
-                      <a:noFill/>
-                    </a:lnL>
-                    <a:lnR w="12700" cap="flat" cmpd="sng" algn="ctr">
-                      <a:noFill/>
-                      <a:prstDash val="solid"/>
-                      <a:round/>
-                      <a:headEnd type="none" w="med" len="med"/>
-                      <a:tailEnd type="none" w="med" len="med"/>
-                    </a:lnR>
-                    <a:lnT w="6350" cap="flat" cmpd="sng" algn="ctr">
-                      <a:solidFill>
-                        <a:srgbClr val="DBD5CD"/>
-                      </a:solidFill>
-                      <a:prstDash val="solid"/>
-                      <a:round/>
-                      <a:headEnd type="none" w="med" len="med"/>
-                      <a:tailEnd type="none" w="med" len="med"/>
-                    </a:lnT>
-                    <a:lnB w="9525" cap="flat" cmpd="sng" algn="ctr">
-                      <a:solidFill>
-                        <a:schemeClr val="bg2"/>
-                      </a:solidFill>
-                      <a:prstDash val="solid"/>
-                      <a:round/>
-                      <a:headEnd type="none" w="med" len="med"/>
-                      <a:tailEnd type="none" w="med" len="med"/>
-                    </a:lnB>
-                    <a:lnTlToBr>
-                      <a:noFill/>
-                    </a:lnTlToBr>
-                    <a:lnBlToTr>
-                      <a:noFill/>
-                    </a:lnBlToTr>
-                    <a:solidFill>
-                      <a:srgbClr val="FFFFFF"/>
-                    </a:solidFill>
-                  </a:tcPr>
-                </a:tc>
-                <a:tc>
-                  <a:txBody>
-                    <a:bodyPr/>
-                    <a:lstStyle/>
-                    <a:p>
                       <a:pPr marL="171450" marR="0" lvl="0" indent="-171450" algn="l" defTabSz="914395" rtl="0" eaLnBrk="1" fontAlgn="t" latinLnBrk="0" hangingPunct="1">
                         <a:lnSpc>
                           <a:spcPct val="100000"/>
@@ -40373,237 +38620,6 @@
                     <a:bodyPr/>
                     <a:lstStyle/>
                     <a:p>
-                      <a:pPr marL="0" marR="0" lvl="0" indent="0" algn="l" defTabSz="914395" rtl="0" eaLnBrk="1" fontAlgn="t" latinLnBrk="0" hangingPunct="1">
-                        <a:lnSpc>
-                          <a:spcPct val="100000"/>
-                        </a:lnSpc>
-                        <a:spcBef>
-                          <a:spcPts val="0"/>
-                        </a:spcBef>
-                        <a:spcAft>
-                          <a:spcPts val="0"/>
-                        </a:spcAft>
-                        <a:buClr>
-                          <a:srgbClr val="003B4C"/>
-                        </a:buClr>
-                        <a:buSzTx/>
-                        <a:buFont typeface="Wingdings" panose="05000000000000000000" pitchFamily="2" charset="2"/>
-                        <a:buNone/>
-                        <a:tabLst/>
-                        <a:defRPr/>
-                      </a:pPr>
-                      <a:r>
-                        <a:rPr kumimoji="0" lang="en-GB" sz="700" b="0" i="0" u="none" strike="noStrike" kern="1200" cap="none" spc="0" normalizeH="0" baseline="0" noProof="0" dirty="0">
-                          <a:ln>
-                            <a:noFill/>
-                          </a:ln>
-                          <a:solidFill>
-                            <a:srgbClr val="003B4C"/>
-                          </a:solidFill>
-                          <a:effectLst/>
-                          <a:uLnTx/>
-                          <a:uFillTx/>
-                          <a:latin typeface="Arial" panose="020B0604020202020204" pitchFamily="34" charset="0"/>
-                          <a:ea typeface="+mn-ea"/>
-                          <a:cs typeface="+mn-cs"/>
-                        </a:rPr>
-                        <a:t>Revenue:</a:t>
-                      </a:r>
-                    </a:p>
-                    <a:p>
-                      <a:pPr marL="0" marR="0" lvl="0" indent="0" algn="l" defTabSz="914395" rtl="0" eaLnBrk="1" fontAlgn="t" latinLnBrk="0" hangingPunct="1">
-                        <a:lnSpc>
-                          <a:spcPct val="100000"/>
-                        </a:lnSpc>
-                        <a:spcBef>
-                          <a:spcPts val="0"/>
-                        </a:spcBef>
-                        <a:spcAft>
-                          <a:spcPts val="0"/>
-                        </a:spcAft>
-                        <a:buClr>
-                          <a:srgbClr val="003B4C"/>
-                        </a:buClr>
-                        <a:buSzTx/>
-                        <a:buFont typeface="Wingdings" panose="05000000000000000000" pitchFamily="2" charset="2"/>
-                        <a:buNone/>
-                        <a:tabLst/>
-                        <a:defRPr/>
-                      </a:pPr>
-                      <a:r>
-                        <a:rPr kumimoji="0" lang="en-GB" sz="700" b="0" i="0" u="none" strike="noStrike" kern="1200" cap="none" spc="0" normalizeH="0" baseline="0" noProof="0" dirty="0">
-                          <a:ln>
-                            <a:noFill/>
-                          </a:ln>
-                          <a:solidFill>
-                            <a:srgbClr val="003B4C"/>
-                          </a:solidFill>
-                          <a:effectLst/>
-                          <a:uLnTx/>
-                          <a:uFillTx/>
-                          <a:latin typeface="Arial" panose="020B0604020202020204" pitchFamily="34" charset="0"/>
-                          <a:ea typeface="+mn-ea"/>
-                          <a:cs typeface="+mn-cs"/>
-                        </a:rPr>
-                        <a:t>EBITDA:</a:t>
-                      </a:r>
-                    </a:p>
-                    <a:p>
-                      <a:pPr marL="0" marR="0" lvl="0" indent="0" algn="l" defTabSz="914395" rtl="0" eaLnBrk="1" fontAlgn="t" latinLnBrk="0" hangingPunct="1">
-                        <a:lnSpc>
-                          <a:spcPct val="100000"/>
-                        </a:lnSpc>
-                        <a:spcBef>
-                          <a:spcPts val="0"/>
-                        </a:spcBef>
-                        <a:spcAft>
-                          <a:spcPts val="0"/>
-                        </a:spcAft>
-                        <a:buClr>
-                          <a:srgbClr val="003B4C"/>
-                        </a:buClr>
-                        <a:buSzTx/>
-                        <a:buFont typeface="Wingdings" panose="05000000000000000000" pitchFamily="2" charset="2"/>
-                        <a:buNone/>
-                        <a:tabLst/>
-                        <a:defRPr/>
-                      </a:pPr>
-                      <a:r>
-                        <a:rPr kumimoji="0" lang="en-GB" sz="700" b="0" i="0" u="none" strike="noStrike" kern="1200" cap="none" spc="0" normalizeH="0" baseline="0" noProof="0" dirty="0">
-                          <a:ln>
-                            <a:noFill/>
-                          </a:ln>
-                          <a:solidFill>
-                            <a:srgbClr val="003B4C"/>
-                          </a:solidFill>
-                          <a:effectLst/>
-                          <a:uLnTx/>
-                          <a:uFillTx/>
-                          <a:latin typeface="Arial" panose="020B0604020202020204" pitchFamily="34" charset="0"/>
-                          <a:ea typeface="+mn-ea"/>
-                          <a:cs typeface="+mn-cs"/>
-                        </a:rPr>
-                        <a:t>Market Cap:</a:t>
-                      </a:r>
-                    </a:p>
-                    <a:p>
-                      <a:pPr marL="0" marR="0" lvl="0" indent="0" algn="l" defTabSz="914395" rtl="0" eaLnBrk="1" fontAlgn="t" latinLnBrk="0" hangingPunct="1">
-                        <a:lnSpc>
-                          <a:spcPct val="100000"/>
-                        </a:lnSpc>
-                        <a:spcBef>
-                          <a:spcPts val="0"/>
-                        </a:spcBef>
-                        <a:spcAft>
-                          <a:spcPts val="0"/>
-                        </a:spcAft>
-                        <a:buClr>
-                          <a:srgbClr val="003B4C"/>
-                        </a:buClr>
-                        <a:buSzTx/>
-                        <a:buFont typeface="Wingdings" panose="05000000000000000000" pitchFamily="2" charset="2"/>
-                        <a:buNone/>
-                        <a:tabLst/>
-                        <a:defRPr/>
-                      </a:pPr>
-                      <a:r>
-                        <a:rPr kumimoji="0" lang="en-GB" sz="700" b="0" i="0" u="none" strike="noStrike" kern="1200" cap="none" spc="0" normalizeH="0" baseline="0" noProof="0" dirty="0">
-                          <a:ln>
-                            <a:noFill/>
-                          </a:ln>
-                          <a:solidFill>
-                            <a:srgbClr val="003B4C"/>
-                          </a:solidFill>
-                          <a:effectLst/>
-                          <a:uLnTx/>
-                          <a:uFillTx/>
-                          <a:latin typeface="Arial" panose="020B0604020202020204" pitchFamily="34" charset="0"/>
-                          <a:ea typeface="+mn-ea"/>
-                          <a:cs typeface="+mn-cs"/>
-                        </a:rPr>
-                        <a:t>Total Debt:</a:t>
-                      </a:r>
-                    </a:p>
-                    <a:p>
-                      <a:pPr marL="0" marR="0" lvl="0" indent="0" algn="l" defTabSz="914395" rtl="0" eaLnBrk="1" fontAlgn="t" latinLnBrk="0" hangingPunct="1">
-                        <a:lnSpc>
-                          <a:spcPct val="100000"/>
-                        </a:lnSpc>
-                        <a:spcBef>
-                          <a:spcPts val="0"/>
-                        </a:spcBef>
-                        <a:spcAft>
-                          <a:spcPts val="0"/>
-                        </a:spcAft>
-                        <a:buClr>
-                          <a:srgbClr val="003B4C"/>
-                        </a:buClr>
-                        <a:buSzTx/>
-                        <a:buFont typeface="Wingdings" panose="05000000000000000000" pitchFamily="2" charset="2"/>
-                        <a:buNone/>
-                        <a:tabLst/>
-                        <a:defRPr/>
-                      </a:pPr>
-                      <a:r>
-                        <a:rPr kumimoji="0" lang="en-GB" sz="700" b="0" i="0" u="none" strike="noStrike" kern="1200" cap="none" spc="0" normalizeH="0" baseline="0" noProof="0" dirty="0">
-                          <a:ln>
-                            <a:noFill/>
-                          </a:ln>
-                          <a:solidFill>
-                            <a:srgbClr val="003B4C"/>
-                          </a:solidFill>
-                          <a:effectLst/>
-                          <a:uLnTx/>
-                          <a:uFillTx/>
-                          <a:latin typeface="Arial" panose="020B0604020202020204" pitchFamily="34" charset="0"/>
-                          <a:ea typeface="+mn-ea"/>
-                          <a:cs typeface="+mn-cs"/>
-                        </a:rPr>
-                        <a:t>FTE:</a:t>
-                      </a:r>
-                    </a:p>
-                  </a:txBody>
-                  <a:tcPr marL="168812" marR="0" marT="0" marB="0" anchor="ctr">
-                    <a:lnL>
-                      <a:noFill/>
-                    </a:lnL>
-                    <a:lnR>
-                      <a:noFill/>
-                    </a:lnR>
-                    <a:lnT w="9525" cap="flat" cmpd="sng" algn="ctr">
-                      <a:solidFill>
-                        <a:schemeClr val="bg2"/>
-                      </a:solidFill>
-                      <a:prstDash val="solid"/>
-                      <a:round/>
-                      <a:headEnd type="none" w="med" len="med"/>
-                      <a:tailEnd type="none" w="med" len="med"/>
-                    </a:lnT>
-                    <a:lnB w="9525" cap="flat" cmpd="sng" algn="ctr">
-                      <a:solidFill>
-                        <a:schemeClr val="bg2"/>
-                      </a:solidFill>
-                      <a:prstDash val="solid"/>
-                      <a:round/>
-                      <a:headEnd type="none" w="med" len="med"/>
-                      <a:tailEnd type="none" w="med" len="med"/>
-                    </a:lnB>
-                    <a:lnTlToBr>
-                      <a:noFill/>
-                    </a:lnTlToBr>
-                    <a:lnBlToTr>
-                      <a:noFill/>
-                    </a:lnBlToTr>
-                    <a:solidFill>
-                      <a:srgbClr val="F0F5F7"/>
-                    </a:solidFill>
-                  </a:tcPr>
-                </a:tc>
-                <a:tc>
-                  <a:txBody>
-                    <a:bodyPr/>
-                    <a:lstStyle/>
-                    <a:p>
                       <a:pPr marL="171450" marR="0" lvl="0" indent="-171450" algn="l" defTabSz="914395" rtl="0" eaLnBrk="1" fontAlgn="t" latinLnBrk="0" hangingPunct="1">
                         <a:lnSpc>
                           <a:spcPct val="100000"/>
@@ -41312,237 +39328,6 @@
                     <a:bodyPr/>
                     <a:lstStyle/>
                     <a:p>
-                      <a:pPr marL="0" marR="0" lvl="0" indent="0" algn="l" defTabSz="914395" rtl="0" eaLnBrk="1" fontAlgn="t" latinLnBrk="0" hangingPunct="1">
-                        <a:lnSpc>
-                          <a:spcPct val="100000"/>
-                        </a:lnSpc>
-                        <a:spcBef>
-                          <a:spcPts val="0"/>
-                        </a:spcBef>
-                        <a:spcAft>
-                          <a:spcPts val="0"/>
-                        </a:spcAft>
-                        <a:buClr>
-                          <a:srgbClr val="003B4C"/>
-                        </a:buClr>
-                        <a:buSzTx/>
-                        <a:buFont typeface="Wingdings" panose="05000000000000000000" pitchFamily="2" charset="2"/>
-                        <a:buNone/>
-                        <a:tabLst/>
-                        <a:defRPr/>
-                      </a:pPr>
-                      <a:r>
-                        <a:rPr kumimoji="0" lang="en-GB" sz="700" b="0" i="0" u="none" strike="noStrike" kern="1200" cap="none" spc="0" normalizeH="0" baseline="0" noProof="0" dirty="0">
-                          <a:ln>
-                            <a:noFill/>
-                          </a:ln>
-                          <a:solidFill>
-                            <a:srgbClr val="003B4C"/>
-                          </a:solidFill>
-                          <a:effectLst/>
-                          <a:uLnTx/>
-                          <a:uFillTx/>
-                          <a:latin typeface="Arial" panose="020B0604020202020204" pitchFamily="34" charset="0"/>
-                          <a:ea typeface="+mn-ea"/>
-                          <a:cs typeface="+mn-cs"/>
-                        </a:rPr>
-                        <a:t>Revenue:</a:t>
-                      </a:r>
-                    </a:p>
-                    <a:p>
-                      <a:pPr marL="0" marR="0" lvl="0" indent="0" algn="l" defTabSz="914395" rtl="0" eaLnBrk="1" fontAlgn="t" latinLnBrk="0" hangingPunct="1">
-                        <a:lnSpc>
-                          <a:spcPct val="100000"/>
-                        </a:lnSpc>
-                        <a:spcBef>
-                          <a:spcPts val="0"/>
-                        </a:spcBef>
-                        <a:spcAft>
-                          <a:spcPts val="0"/>
-                        </a:spcAft>
-                        <a:buClr>
-                          <a:srgbClr val="003B4C"/>
-                        </a:buClr>
-                        <a:buSzTx/>
-                        <a:buFont typeface="Wingdings" panose="05000000000000000000" pitchFamily="2" charset="2"/>
-                        <a:buNone/>
-                        <a:tabLst/>
-                        <a:defRPr/>
-                      </a:pPr>
-                      <a:r>
-                        <a:rPr kumimoji="0" lang="en-GB" sz="700" b="0" i="0" u="none" strike="noStrike" kern="1200" cap="none" spc="0" normalizeH="0" baseline="0" noProof="0" dirty="0">
-                          <a:ln>
-                            <a:noFill/>
-                          </a:ln>
-                          <a:solidFill>
-                            <a:srgbClr val="003B4C"/>
-                          </a:solidFill>
-                          <a:effectLst/>
-                          <a:uLnTx/>
-                          <a:uFillTx/>
-                          <a:latin typeface="Arial" panose="020B0604020202020204" pitchFamily="34" charset="0"/>
-                          <a:ea typeface="+mn-ea"/>
-                          <a:cs typeface="+mn-cs"/>
-                        </a:rPr>
-                        <a:t>EBITDA:</a:t>
-                      </a:r>
-                    </a:p>
-                    <a:p>
-                      <a:pPr marL="0" marR="0" lvl="0" indent="0" algn="l" defTabSz="914395" rtl="0" eaLnBrk="1" fontAlgn="t" latinLnBrk="0" hangingPunct="1">
-                        <a:lnSpc>
-                          <a:spcPct val="100000"/>
-                        </a:lnSpc>
-                        <a:spcBef>
-                          <a:spcPts val="0"/>
-                        </a:spcBef>
-                        <a:spcAft>
-                          <a:spcPts val="0"/>
-                        </a:spcAft>
-                        <a:buClr>
-                          <a:srgbClr val="003B4C"/>
-                        </a:buClr>
-                        <a:buSzTx/>
-                        <a:buFont typeface="Wingdings" panose="05000000000000000000" pitchFamily="2" charset="2"/>
-                        <a:buNone/>
-                        <a:tabLst/>
-                        <a:defRPr/>
-                      </a:pPr>
-                      <a:r>
-                        <a:rPr kumimoji="0" lang="en-GB" sz="700" b="0" i="0" u="none" strike="noStrike" kern="1200" cap="none" spc="0" normalizeH="0" baseline="0" noProof="0" dirty="0">
-                          <a:ln>
-                            <a:noFill/>
-                          </a:ln>
-                          <a:solidFill>
-                            <a:srgbClr val="003B4C"/>
-                          </a:solidFill>
-                          <a:effectLst/>
-                          <a:uLnTx/>
-                          <a:uFillTx/>
-                          <a:latin typeface="Arial" panose="020B0604020202020204" pitchFamily="34" charset="0"/>
-                          <a:ea typeface="+mn-ea"/>
-                          <a:cs typeface="+mn-cs"/>
-                        </a:rPr>
-                        <a:t>Market Cap:</a:t>
-                      </a:r>
-                    </a:p>
-                    <a:p>
-                      <a:pPr marL="0" marR="0" lvl="0" indent="0" algn="l" defTabSz="914395" rtl="0" eaLnBrk="1" fontAlgn="t" latinLnBrk="0" hangingPunct="1">
-                        <a:lnSpc>
-                          <a:spcPct val="100000"/>
-                        </a:lnSpc>
-                        <a:spcBef>
-                          <a:spcPts val="0"/>
-                        </a:spcBef>
-                        <a:spcAft>
-                          <a:spcPts val="0"/>
-                        </a:spcAft>
-                        <a:buClr>
-                          <a:srgbClr val="003B4C"/>
-                        </a:buClr>
-                        <a:buSzTx/>
-                        <a:buFont typeface="Wingdings" panose="05000000000000000000" pitchFamily="2" charset="2"/>
-                        <a:buNone/>
-                        <a:tabLst/>
-                        <a:defRPr/>
-                      </a:pPr>
-                      <a:r>
-                        <a:rPr kumimoji="0" lang="en-GB" sz="700" b="0" i="0" u="none" strike="noStrike" kern="1200" cap="none" spc="0" normalizeH="0" baseline="0" noProof="0" dirty="0">
-                          <a:ln>
-                            <a:noFill/>
-                          </a:ln>
-                          <a:solidFill>
-                            <a:srgbClr val="003B4C"/>
-                          </a:solidFill>
-                          <a:effectLst/>
-                          <a:uLnTx/>
-                          <a:uFillTx/>
-                          <a:latin typeface="Arial" panose="020B0604020202020204" pitchFamily="34" charset="0"/>
-                          <a:ea typeface="+mn-ea"/>
-                          <a:cs typeface="+mn-cs"/>
-                        </a:rPr>
-                        <a:t>Total Debt:</a:t>
-                      </a:r>
-                    </a:p>
-                    <a:p>
-                      <a:pPr marL="0" marR="0" lvl="0" indent="0" algn="l" defTabSz="914395" rtl="0" eaLnBrk="1" fontAlgn="t" latinLnBrk="0" hangingPunct="1">
-                        <a:lnSpc>
-                          <a:spcPct val="100000"/>
-                        </a:lnSpc>
-                        <a:spcBef>
-                          <a:spcPts val="0"/>
-                        </a:spcBef>
-                        <a:spcAft>
-                          <a:spcPts val="0"/>
-                        </a:spcAft>
-                        <a:buClr>
-                          <a:srgbClr val="003B4C"/>
-                        </a:buClr>
-                        <a:buSzTx/>
-                        <a:buFont typeface="Wingdings" panose="05000000000000000000" pitchFamily="2" charset="2"/>
-                        <a:buNone/>
-                        <a:tabLst/>
-                        <a:defRPr/>
-                      </a:pPr>
-                      <a:r>
-                        <a:rPr kumimoji="0" lang="en-GB" sz="700" b="0" i="0" u="none" strike="noStrike" kern="1200" cap="none" spc="0" normalizeH="0" baseline="0" noProof="0" dirty="0">
-                          <a:ln>
-                            <a:noFill/>
-                          </a:ln>
-                          <a:solidFill>
-                            <a:srgbClr val="003B4C"/>
-                          </a:solidFill>
-                          <a:effectLst/>
-                          <a:uLnTx/>
-                          <a:uFillTx/>
-                          <a:latin typeface="Arial" panose="020B0604020202020204" pitchFamily="34" charset="0"/>
-                          <a:ea typeface="+mn-ea"/>
-                          <a:cs typeface="+mn-cs"/>
-                        </a:rPr>
-                        <a:t>FTE:</a:t>
-                      </a:r>
-                    </a:p>
-                  </a:txBody>
-                  <a:tcPr marL="168812" marR="0" marT="0" marB="0" anchor="ctr">
-                    <a:lnL>
-                      <a:noFill/>
-                    </a:lnL>
-                    <a:lnR>
-                      <a:noFill/>
-                    </a:lnR>
-                    <a:lnT w="9525" cap="flat" cmpd="sng" algn="ctr">
-                      <a:solidFill>
-                        <a:schemeClr val="bg2"/>
-                      </a:solidFill>
-                      <a:prstDash val="solid"/>
-                      <a:round/>
-                      <a:headEnd type="none" w="med" len="med"/>
-                      <a:tailEnd type="none" w="med" len="med"/>
-                    </a:lnT>
-                    <a:lnB w="9525" cap="flat" cmpd="sng" algn="ctr">
-                      <a:solidFill>
-                        <a:schemeClr val="bg2"/>
-                      </a:solidFill>
-                      <a:prstDash val="solid"/>
-                      <a:round/>
-                      <a:headEnd type="none" w="med" len="med"/>
-                      <a:tailEnd type="none" w="med" len="med"/>
-                    </a:lnB>
-                    <a:lnTlToBr>
-                      <a:noFill/>
-                    </a:lnTlToBr>
-                    <a:lnBlToTr>
-                      <a:noFill/>
-                    </a:lnBlToTr>
-                    <a:solidFill>
-                      <a:srgbClr val="FFFFFF"/>
-                    </a:solidFill>
-                  </a:tcPr>
-                </a:tc>
-                <a:tc>
-                  <a:txBody>
-                    <a:bodyPr/>
-                    <a:lstStyle/>
-                    <a:p>
                       <a:pPr marL="171450" marR="0" lvl="0" indent="-171450" algn="l" defTabSz="914395" rtl="0" eaLnBrk="1" fontAlgn="t" latinLnBrk="0" hangingPunct="1">
                         <a:lnSpc>
                           <a:spcPct val="100000"/>
@@ -42239,237 +40024,6 @@
                     <a:bodyPr/>
                     <a:lstStyle/>
                     <a:p>
-                      <a:pPr marL="0" marR="0" lvl="0" indent="0" algn="l" defTabSz="914395" rtl="0" eaLnBrk="1" fontAlgn="t" latinLnBrk="0" hangingPunct="1">
-                        <a:lnSpc>
-                          <a:spcPct val="100000"/>
-                        </a:lnSpc>
-                        <a:spcBef>
-                          <a:spcPts val="0"/>
-                        </a:spcBef>
-                        <a:spcAft>
-                          <a:spcPts val="0"/>
-                        </a:spcAft>
-                        <a:buClr>
-                          <a:srgbClr val="003B4C"/>
-                        </a:buClr>
-                        <a:buSzTx/>
-                        <a:buFont typeface="Wingdings" panose="05000000000000000000" pitchFamily="2" charset="2"/>
-                        <a:buNone/>
-                        <a:tabLst/>
-                        <a:defRPr/>
-                      </a:pPr>
-                      <a:r>
-                        <a:rPr kumimoji="0" lang="en-GB" sz="700" b="0" i="0" u="none" strike="noStrike" kern="1200" cap="none" spc="0" normalizeH="0" baseline="0" noProof="0" dirty="0">
-                          <a:ln>
-                            <a:noFill/>
-                          </a:ln>
-                          <a:solidFill>
-                            <a:srgbClr val="003B4C"/>
-                          </a:solidFill>
-                          <a:effectLst/>
-                          <a:uLnTx/>
-                          <a:uFillTx/>
-                          <a:latin typeface="Arial" panose="020B0604020202020204" pitchFamily="34" charset="0"/>
-                          <a:ea typeface="+mn-ea"/>
-                          <a:cs typeface="+mn-cs"/>
-                        </a:rPr>
-                        <a:t>Revenue:</a:t>
-                      </a:r>
-                    </a:p>
-                    <a:p>
-                      <a:pPr marL="0" marR="0" lvl="0" indent="0" algn="l" defTabSz="914395" rtl="0" eaLnBrk="1" fontAlgn="t" latinLnBrk="0" hangingPunct="1">
-                        <a:lnSpc>
-                          <a:spcPct val="100000"/>
-                        </a:lnSpc>
-                        <a:spcBef>
-                          <a:spcPts val="0"/>
-                        </a:spcBef>
-                        <a:spcAft>
-                          <a:spcPts val="0"/>
-                        </a:spcAft>
-                        <a:buClr>
-                          <a:srgbClr val="003B4C"/>
-                        </a:buClr>
-                        <a:buSzTx/>
-                        <a:buFont typeface="Wingdings" panose="05000000000000000000" pitchFamily="2" charset="2"/>
-                        <a:buNone/>
-                        <a:tabLst/>
-                        <a:defRPr/>
-                      </a:pPr>
-                      <a:r>
-                        <a:rPr kumimoji="0" lang="en-GB" sz="700" b="0" i="0" u="none" strike="noStrike" kern="1200" cap="none" spc="0" normalizeH="0" baseline="0" noProof="0" dirty="0">
-                          <a:ln>
-                            <a:noFill/>
-                          </a:ln>
-                          <a:solidFill>
-                            <a:srgbClr val="003B4C"/>
-                          </a:solidFill>
-                          <a:effectLst/>
-                          <a:uLnTx/>
-                          <a:uFillTx/>
-                          <a:latin typeface="Arial" panose="020B0604020202020204" pitchFamily="34" charset="0"/>
-                          <a:ea typeface="+mn-ea"/>
-                          <a:cs typeface="+mn-cs"/>
-                        </a:rPr>
-                        <a:t>EBITDA:</a:t>
-                      </a:r>
-                    </a:p>
-                    <a:p>
-                      <a:pPr marL="0" marR="0" lvl="0" indent="0" algn="l" defTabSz="914395" rtl="0" eaLnBrk="1" fontAlgn="t" latinLnBrk="0" hangingPunct="1">
-                        <a:lnSpc>
-                          <a:spcPct val="100000"/>
-                        </a:lnSpc>
-                        <a:spcBef>
-                          <a:spcPts val="0"/>
-                        </a:spcBef>
-                        <a:spcAft>
-                          <a:spcPts val="0"/>
-                        </a:spcAft>
-                        <a:buClr>
-                          <a:srgbClr val="003B4C"/>
-                        </a:buClr>
-                        <a:buSzTx/>
-                        <a:buFont typeface="Wingdings" panose="05000000000000000000" pitchFamily="2" charset="2"/>
-                        <a:buNone/>
-                        <a:tabLst/>
-                        <a:defRPr/>
-                      </a:pPr>
-                      <a:r>
-                        <a:rPr kumimoji="0" lang="en-GB" sz="700" b="0" i="0" u="none" strike="noStrike" kern="1200" cap="none" spc="0" normalizeH="0" baseline="0" noProof="0" dirty="0">
-                          <a:ln>
-                            <a:noFill/>
-                          </a:ln>
-                          <a:solidFill>
-                            <a:srgbClr val="003B4C"/>
-                          </a:solidFill>
-                          <a:effectLst/>
-                          <a:uLnTx/>
-                          <a:uFillTx/>
-                          <a:latin typeface="Arial" panose="020B0604020202020204" pitchFamily="34" charset="0"/>
-                          <a:ea typeface="+mn-ea"/>
-                          <a:cs typeface="+mn-cs"/>
-                        </a:rPr>
-                        <a:t>Market Cap:</a:t>
-                      </a:r>
-                    </a:p>
-                    <a:p>
-                      <a:pPr marL="0" marR="0" lvl="0" indent="0" algn="l" defTabSz="914395" rtl="0" eaLnBrk="1" fontAlgn="t" latinLnBrk="0" hangingPunct="1">
-                        <a:lnSpc>
-                          <a:spcPct val="100000"/>
-                        </a:lnSpc>
-                        <a:spcBef>
-                          <a:spcPts val="0"/>
-                        </a:spcBef>
-                        <a:spcAft>
-                          <a:spcPts val="0"/>
-                        </a:spcAft>
-                        <a:buClr>
-                          <a:srgbClr val="003B4C"/>
-                        </a:buClr>
-                        <a:buSzTx/>
-                        <a:buFont typeface="Wingdings" panose="05000000000000000000" pitchFamily="2" charset="2"/>
-                        <a:buNone/>
-                        <a:tabLst/>
-                        <a:defRPr/>
-                      </a:pPr>
-                      <a:r>
-                        <a:rPr kumimoji="0" lang="en-GB" sz="700" b="0" i="0" u="none" strike="noStrike" kern="1200" cap="none" spc="0" normalizeH="0" baseline="0" noProof="0" dirty="0">
-                          <a:ln>
-                            <a:noFill/>
-                          </a:ln>
-                          <a:solidFill>
-                            <a:srgbClr val="003B4C"/>
-                          </a:solidFill>
-                          <a:effectLst/>
-                          <a:uLnTx/>
-                          <a:uFillTx/>
-                          <a:latin typeface="Arial" panose="020B0604020202020204" pitchFamily="34" charset="0"/>
-                          <a:ea typeface="+mn-ea"/>
-                          <a:cs typeface="+mn-cs"/>
-                        </a:rPr>
-                        <a:t>Total Debt:</a:t>
-                      </a:r>
-                    </a:p>
-                    <a:p>
-                      <a:pPr marL="0" marR="0" lvl="0" indent="0" algn="l" defTabSz="914395" rtl="0" eaLnBrk="1" fontAlgn="t" latinLnBrk="0" hangingPunct="1">
-                        <a:lnSpc>
-                          <a:spcPct val="100000"/>
-                        </a:lnSpc>
-                        <a:spcBef>
-                          <a:spcPts val="0"/>
-                        </a:spcBef>
-                        <a:spcAft>
-                          <a:spcPts val="0"/>
-                        </a:spcAft>
-                        <a:buClr>
-                          <a:srgbClr val="003B4C"/>
-                        </a:buClr>
-                        <a:buSzTx/>
-                        <a:buFont typeface="Wingdings" panose="05000000000000000000" pitchFamily="2" charset="2"/>
-                        <a:buNone/>
-                        <a:tabLst/>
-                        <a:defRPr/>
-                      </a:pPr>
-                      <a:r>
-                        <a:rPr kumimoji="0" lang="en-GB" sz="700" b="0" i="0" u="none" strike="noStrike" kern="1200" cap="none" spc="0" normalizeH="0" baseline="0" noProof="0" dirty="0">
-                          <a:ln>
-                            <a:noFill/>
-                          </a:ln>
-                          <a:solidFill>
-                            <a:srgbClr val="003B4C"/>
-                          </a:solidFill>
-                          <a:effectLst/>
-                          <a:uLnTx/>
-                          <a:uFillTx/>
-                          <a:latin typeface="Arial" panose="020B0604020202020204" pitchFamily="34" charset="0"/>
-                          <a:ea typeface="+mn-ea"/>
-                          <a:cs typeface="+mn-cs"/>
-                        </a:rPr>
-                        <a:t>FTE:</a:t>
-                      </a:r>
-                    </a:p>
-                  </a:txBody>
-                  <a:tcPr marL="168812" marR="0" marT="0" marB="0" anchor="ctr">
-                    <a:lnL>
-                      <a:noFill/>
-                    </a:lnL>
-                    <a:lnR>
-                      <a:noFill/>
-                    </a:lnR>
-                    <a:lnT w="9525" cap="flat" cmpd="sng" algn="ctr">
-                      <a:solidFill>
-                        <a:schemeClr val="bg2"/>
-                      </a:solidFill>
-                      <a:prstDash val="solid"/>
-                      <a:round/>
-                      <a:headEnd type="none" w="med" len="med"/>
-                      <a:tailEnd type="none" w="med" len="med"/>
-                    </a:lnT>
-                    <a:lnB w="9525" cap="flat" cmpd="sng" algn="ctr">
-                      <a:solidFill>
-                        <a:schemeClr val="bg2"/>
-                      </a:solidFill>
-                      <a:prstDash val="solid"/>
-                      <a:round/>
-                      <a:headEnd type="none" w="med" len="med"/>
-                      <a:tailEnd type="none" w="med" len="med"/>
-                    </a:lnB>
-                    <a:lnTlToBr>
-                      <a:noFill/>
-                    </a:lnTlToBr>
-                    <a:lnBlToTr>
-                      <a:noFill/>
-                    </a:lnBlToTr>
-                    <a:solidFill>
-                      <a:srgbClr val="F0F5F7"/>
-                    </a:solidFill>
-                  </a:tcPr>
-                </a:tc>
-                <a:tc>
-                  <a:txBody>
-                    <a:bodyPr/>
-                    <a:lstStyle/>
-                    <a:p>
                       <a:pPr marL="171450" marR="0" lvl="0" indent="-171450" algn="l" defTabSz="914395" rtl="0" eaLnBrk="1" fontAlgn="t" latinLnBrk="0" hangingPunct="1">
                         <a:lnSpc>
                           <a:spcPct val="100000"/>
@@ -42836,8 +40390,8 @@
         </p:blipFill>
         <p:spPr>
           <a:xfrm>
-            <a:off x="585274" y="1372337"/>
-            <a:ext cx="1030918" cy="381387"/>
+            <a:off x="798213" y="1364709"/>
+            <a:ext cx="1367882" cy="419525"/>
           </a:xfrm>
           <a:prstGeom prst="rect">
             <a:avLst/>
@@ -42860,8 +40414,8 @@
         </p:blipFill>
         <p:spPr>
           <a:xfrm>
-            <a:off x="585274" y="2133797"/>
-            <a:ext cx="1030918" cy="377736"/>
+            <a:off x="798213" y="2126242"/>
+            <a:ext cx="1367882" cy="415510"/>
           </a:xfrm>
           <a:prstGeom prst="rect">
             <a:avLst/>

</xml_diff>